<commit_message>
Commit at 2025-01-26 16:30:00
</commit_message>
<xml_diff>
--- a/mt_presentation.pptx
+++ b/mt_presentation.pptx
@@ -5,11 +5,12 @@
     <p:sldMasterId id="2147483648" r:id="rId1"/>
   </p:sldMasterIdLst>
   <p:notesMasterIdLst>
-    <p:notesMasterId r:id="rId4"/>
+    <p:notesMasterId r:id="rId5"/>
   </p:notesMasterIdLst>
   <p:sldIdLst>
     <p:sldId id="256" r:id="rId2"/>
     <p:sldId id="383" r:id="rId3"/>
+    <p:sldId id="382" r:id="rId4"/>
   </p:sldIdLst>
   <p:sldSz cx="12192000" cy="6858000"/>
   <p:notesSz cx="6858000" cy="9144000"/>
@@ -491,6 +492,93 @@
     </a:lvl9pPr>
   </p:notesStyle>
 </p:notesMaster>
+</file>
+
+<file path=ppt/notesSlides/notesSlide1.xml><?xml version="1.0" encoding="utf-8"?>
+<p:notes xmlns:a="http://schemas.openxmlformats.org/drawingml/2006/main" xmlns:r="http://schemas.openxmlformats.org/officeDocument/2006/relationships" xmlns:p="http://schemas.openxmlformats.org/presentationml/2006/main">
+  <p:cSld>
+    <p:spTree>
+      <p:nvGrpSpPr>
+        <p:cNvPr id="1" name=""/>
+        <p:cNvGrpSpPr/>
+        <p:nvPr/>
+      </p:nvGrpSpPr>
+      <p:grpSpPr>
+        <a:xfrm>
+          <a:off x="0" y="0"/>
+          <a:ext cx="0" cy="0"/>
+          <a:chOff x="0" y="0"/>
+          <a:chExt cx="0" cy="0"/>
+        </a:xfrm>
+      </p:grpSpPr>
+      <p:sp>
+        <p:nvSpPr>
+          <p:cNvPr id="2" name="スライド イメージ プレースホルダー 1"/>
+          <p:cNvSpPr>
+            <a:spLocks noGrp="1" noRot="1" noChangeAspect="1"/>
+          </p:cNvSpPr>
+          <p:nvPr>
+            <p:ph type="sldImg"/>
+          </p:nvPr>
+        </p:nvSpPr>
+        <p:spPr/>
+      </p:sp>
+      <p:sp>
+        <p:nvSpPr>
+          <p:cNvPr id="3" name="ノート プレースホルダー 2"/>
+          <p:cNvSpPr>
+            <a:spLocks noGrp="1"/>
+          </p:cNvSpPr>
+          <p:nvPr>
+            <p:ph type="body" idx="1"/>
+          </p:nvPr>
+        </p:nvSpPr>
+        <p:spPr/>
+        <p:txBody>
+          <a:bodyPr/>
+          <a:lstStyle/>
+          <a:p>
+            <a:r>
+              <a:rPr kumimoji="1" lang="en-US" altLang="ja-ES"/>
+              <a:t> </a:t>
+            </a:r>
+          </a:p>
+        </p:txBody>
+      </p:sp>
+      <p:sp>
+        <p:nvSpPr>
+          <p:cNvPr id="4" name="スライド番号プレースホルダー 3"/>
+          <p:cNvSpPr>
+            <a:spLocks noGrp="1"/>
+          </p:cNvSpPr>
+          <p:nvPr>
+            <p:ph type="sldNum" sz="quarter" idx="5"/>
+          </p:nvPr>
+        </p:nvSpPr>
+        <p:spPr/>
+        <p:txBody>
+          <a:bodyPr/>
+          <a:lstStyle/>
+          <a:p>
+            <a:fld id="{3498438F-8954-6F4B-8CFE-5C58AB865F80}" type="slidenum">
+              <a:rPr kumimoji="1" lang="ja-ES" altLang="en-US" smtClean="0"/>
+              <a:t>3</a:t>
+            </a:fld>
+            <a:endParaRPr kumimoji="1" lang="ja-ES" altLang="en-US"/>
+          </a:p>
+        </p:txBody>
+      </p:sp>
+    </p:spTree>
+    <p:extLst>
+      <p:ext uri="{BB962C8B-B14F-4D97-AF65-F5344CB8AC3E}">
+        <p14:creationId xmlns:p14="http://schemas.microsoft.com/office/powerpoint/2010/main" val="3881037302"/>
+      </p:ext>
+    </p:extLst>
+  </p:cSld>
+  <p:clrMapOvr>
+    <a:masterClrMapping/>
+  </p:clrMapOvr>
+</p:notes>
 </file>
 
 <file path=ppt/slideLayouts/slideLayout1.xml><?xml version="1.0" encoding="utf-8"?>
@@ -4433,6 +4521,388 @@
     <p:extLst>
       <p:ext uri="{BB962C8B-B14F-4D97-AF65-F5344CB8AC3E}">
         <p14:creationId xmlns:p14="http://schemas.microsoft.com/office/powerpoint/2010/main" val="2153538279"/>
+      </p:ext>
+    </p:extLst>
+  </p:cSld>
+  <p:clrMapOvr>
+    <a:masterClrMapping/>
+  </p:clrMapOvr>
+</p:sld>
+</file>
+
+<file path=ppt/slides/slide3.xml><?xml version="1.0" encoding="utf-8"?>
+<p:sld xmlns:a="http://schemas.openxmlformats.org/drawingml/2006/main" xmlns:r="http://schemas.openxmlformats.org/officeDocument/2006/relationships" xmlns:p="http://schemas.openxmlformats.org/presentationml/2006/main">
+  <p:cSld>
+    <p:spTree>
+      <p:nvGrpSpPr>
+        <p:cNvPr id="1" name=""/>
+        <p:cNvGrpSpPr/>
+        <p:nvPr/>
+      </p:nvGrpSpPr>
+      <p:grpSpPr>
+        <a:xfrm>
+          <a:off x="0" y="0"/>
+          <a:ext cx="0" cy="0"/>
+          <a:chOff x="0" y="0"/>
+          <a:chExt cx="0" cy="0"/>
+        </a:xfrm>
+      </p:grpSpPr>
+      <p:sp>
+        <p:nvSpPr>
+          <p:cNvPr id="2" name="タイトル 1">
+            <a:extLst>
+              <a:ext uri="{FF2B5EF4-FFF2-40B4-BE49-F238E27FC236}">
+                <a16:creationId xmlns:a16="http://schemas.microsoft.com/office/drawing/2014/main" id="{C1EDAB28-2F53-87A8-0055-333268FA214C}"/>
+              </a:ext>
+            </a:extLst>
+          </p:cNvPr>
+          <p:cNvSpPr>
+            <a:spLocks noGrp="1"/>
+          </p:cNvSpPr>
+          <p:nvPr>
+            <p:ph type="title"/>
+          </p:nvPr>
+        </p:nvSpPr>
+        <p:spPr>
+          <a:xfrm>
+            <a:off x="0" y="-6128"/>
+            <a:ext cx="12192000" cy="1089862"/>
+          </a:xfrm>
+          <a:solidFill>
+            <a:schemeClr val="tx2">
+              <a:lumMod val="25000"/>
+              <a:lumOff val="75000"/>
+            </a:schemeClr>
+          </a:solidFill>
+        </p:spPr>
+        <p:txBody>
+          <a:bodyPr>
+            <a:normAutofit/>
+          </a:bodyPr>
+          <a:lstStyle/>
+          <a:p>
+            <a:r>
+              <a:rPr kumimoji="1" lang="en-US" altLang="ja-JP" sz="3600" dirty="0">
+                <a:latin typeface="Meiryo" panose="020B0604030504040204" pitchFamily="34" charset="-128"/>
+                <a:ea typeface="Meiryo" panose="020B0604030504040204" pitchFamily="34" charset="-128"/>
+              </a:rPr>
+              <a:t>   </a:t>
+            </a:r>
+            <a:r>
+              <a:rPr kumimoji="1" lang="ja-ES" altLang="en-US" sz="3600" dirty="0">
+                <a:latin typeface="Meiryo" panose="020B0604030504040204" pitchFamily="34" charset="-128"/>
+                <a:ea typeface="Meiryo" panose="020B0604030504040204" pitchFamily="34" charset="-128"/>
+              </a:rPr>
+              <a:t>宇宙マイクロ波背景放射</a:t>
+            </a:r>
+            <a:r>
+              <a:rPr kumimoji="1" lang="en-US" altLang="ja-ES" sz="3600" dirty="0">
+                <a:latin typeface="Meiryo" panose="020B0604030504040204" pitchFamily="34" charset="-128"/>
+                <a:ea typeface="Meiryo" panose="020B0604030504040204" pitchFamily="34" charset="-128"/>
+              </a:rPr>
+              <a:t>(CMB)</a:t>
+            </a:r>
+            <a:endParaRPr kumimoji="1" lang="ja-JP" altLang="en-US" sz="2400">
+              <a:latin typeface="Meiryo" panose="020B0604030504040204" pitchFamily="34" charset="-128"/>
+              <a:ea typeface="Meiryo" panose="020B0604030504040204" pitchFamily="34" charset="-128"/>
+            </a:endParaRPr>
+          </a:p>
+        </p:txBody>
+      </p:sp>
+      <p:sp>
+        <p:nvSpPr>
+          <p:cNvPr id="4" name="日付プレースホルダー 3">
+            <a:extLst>
+              <a:ext uri="{FF2B5EF4-FFF2-40B4-BE49-F238E27FC236}">
+                <a16:creationId xmlns:a16="http://schemas.microsoft.com/office/drawing/2014/main" id="{12F178BA-5992-445A-E4A0-3F56D94A9257}"/>
+              </a:ext>
+            </a:extLst>
+          </p:cNvPr>
+          <p:cNvSpPr>
+            <a:spLocks noGrp="1"/>
+          </p:cNvSpPr>
+          <p:nvPr>
+            <p:ph type="dt" sz="half" idx="10"/>
+          </p:nvPr>
+        </p:nvSpPr>
+        <p:spPr/>
+        <p:txBody>
+          <a:bodyPr/>
+          <a:lstStyle/>
+          <a:p>
+            <a:r>
+              <a:rPr kumimoji="1" lang="en-US" altLang="ja-JP"/>
+              <a:t>2025/2/3</a:t>
+            </a:r>
+            <a:endParaRPr kumimoji="1" lang="ja-JP" altLang="en-US"/>
+          </a:p>
+        </p:txBody>
+      </p:sp>
+      <p:sp>
+        <p:nvSpPr>
+          <p:cNvPr id="6" name="スライド番号プレースホルダー 5">
+            <a:extLst>
+              <a:ext uri="{FF2B5EF4-FFF2-40B4-BE49-F238E27FC236}">
+                <a16:creationId xmlns:a16="http://schemas.microsoft.com/office/drawing/2014/main" id="{2DD794BA-154A-C65F-FFBE-0AEFDE45333C}"/>
+              </a:ext>
+            </a:extLst>
+          </p:cNvPr>
+          <p:cNvSpPr>
+            <a:spLocks noGrp="1"/>
+          </p:cNvSpPr>
+          <p:nvPr>
+            <p:ph type="sldNum" sz="quarter" idx="12"/>
+          </p:nvPr>
+        </p:nvSpPr>
+        <p:spPr/>
+        <p:txBody>
+          <a:bodyPr/>
+          <a:lstStyle/>
+          <a:p>
+            <a:fld id="{A346F7B0-2C6C-2749-AD43-9AA6CBC0C428}" type="slidenum">
+              <a:rPr kumimoji="1" lang="ja-JP" altLang="en-US" smtClean="0"/>
+              <a:t>3</a:t>
+            </a:fld>
+            <a:endParaRPr kumimoji="1" lang="ja-JP" altLang="en-US"/>
+          </a:p>
+        </p:txBody>
+      </p:sp>
+      <p:sp>
+        <p:nvSpPr>
+          <p:cNvPr id="9" name="コンテンツ プレースホルダー 2">
+            <a:extLst>
+              <a:ext uri="{FF2B5EF4-FFF2-40B4-BE49-F238E27FC236}">
+                <a16:creationId xmlns:a16="http://schemas.microsoft.com/office/drawing/2014/main" id="{8494E7C6-3186-ACE0-92C8-2214EB5F0516}"/>
+              </a:ext>
+            </a:extLst>
+          </p:cNvPr>
+          <p:cNvSpPr txBox="1">
+            <a:spLocks/>
+          </p:cNvSpPr>
+          <p:nvPr/>
+        </p:nvSpPr>
+        <p:spPr>
+          <a:xfrm>
+            <a:off x="1008890" y="1571559"/>
+            <a:ext cx="10515600" cy="880999"/>
+          </a:xfrm>
+          <a:prstGeom prst="rect">
+            <a:avLst/>
+          </a:prstGeom>
+        </p:spPr>
+        <p:txBody>
+          <a:bodyPr vert="horz" lIns="91440" tIns="45720" rIns="91440" bIns="45720" rtlCol="0">
+            <a:normAutofit/>
+          </a:bodyPr>
+          <a:lstStyle>
+            <a:lvl1pPr marL="228600" indent="-228600" algn="l" defTabSz="914400" rtl="0" eaLnBrk="1" latinLnBrk="0" hangingPunct="1">
+              <a:lnSpc>
+                <a:spcPct val="90000"/>
+              </a:lnSpc>
+              <a:spcBef>
+                <a:spcPts val="1000"/>
+              </a:spcBef>
+              <a:buFont typeface="Arial" panose="020B0604020202020204" pitchFamily="34" charset="0"/>
+              <a:buChar char="•"/>
+              <a:defRPr kumimoji="1" sz="2800" kern="1200">
+                <a:solidFill>
+                  <a:schemeClr val="tx1"/>
+                </a:solidFill>
+                <a:latin typeface="+mn-lt"/>
+                <a:ea typeface="+mn-ea"/>
+                <a:cs typeface="+mn-cs"/>
+              </a:defRPr>
+            </a:lvl1pPr>
+            <a:lvl2pPr marL="685800" indent="-228600" algn="l" defTabSz="914400" rtl="0" eaLnBrk="1" latinLnBrk="0" hangingPunct="1">
+              <a:lnSpc>
+                <a:spcPct val="90000"/>
+              </a:lnSpc>
+              <a:spcBef>
+                <a:spcPts val="500"/>
+              </a:spcBef>
+              <a:buFont typeface="Arial" panose="020B0604020202020204" pitchFamily="34" charset="0"/>
+              <a:buChar char="•"/>
+              <a:defRPr kumimoji="1" sz="2400" kern="1200">
+                <a:solidFill>
+                  <a:schemeClr val="tx1"/>
+                </a:solidFill>
+                <a:latin typeface="+mn-lt"/>
+                <a:ea typeface="+mn-ea"/>
+                <a:cs typeface="+mn-cs"/>
+              </a:defRPr>
+            </a:lvl2pPr>
+            <a:lvl3pPr marL="1143000" indent="-228600" algn="l" defTabSz="914400" rtl="0" eaLnBrk="1" latinLnBrk="0" hangingPunct="1">
+              <a:lnSpc>
+                <a:spcPct val="90000"/>
+              </a:lnSpc>
+              <a:spcBef>
+                <a:spcPts val="500"/>
+              </a:spcBef>
+              <a:buFont typeface="Arial" panose="020B0604020202020204" pitchFamily="34" charset="0"/>
+              <a:buChar char="•"/>
+              <a:defRPr kumimoji="1" sz="2000" kern="1200">
+                <a:solidFill>
+                  <a:schemeClr val="tx1"/>
+                </a:solidFill>
+                <a:latin typeface="+mn-lt"/>
+                <a:ea typeface="+mn-ea"/>
+                <a:cs typeface="+mn-cs"/>
+              </a:defRPr>
+            </a:lvl3pPr>
+            <a:lvl4pPr marL="1600200" indent="-228600" algn="l" defTabSz="914400" rtl="0" eaLnBrk="1" latinLnBrk="0" hangingPunct="1">
+              <a:lnSpc>
+                <a:spcPct val="90000"/>
+              </a:lnSpc>
+              <a:spcBef>
+                <a:spcPts val="500"/>
+              </a:spcBef>
+              <a:buFont typeface="Arial" panose="020B0604020202020204" pitchFamily="34" charset="0"/>
+              <a:buChar char="•"/>
+              <a:defRPr kumimoji="1" sz="1800" kern="1200">
+                <a:solidFill>
+                  <a:schemeClr val="tx1"/>
+                </a:solidFill>
+                <a:latin typeface="+mn-lt"/>
+                <a:ea typeface="+mn-ea"/>
+                <a:cs typeface="+mn-cs"/>
+              </a:defRPr>
+            </a:lvl4pPr>
+            <a:lvl5pPr marL="2057400" indent="-228600" algn="l" defTabSz="914400" rtl="0" eaLnBrk="1" latinLnBrk="0" hangingPunct="1">
+              <a:lnSpc>
+                <a:spcPct val="90000"/>
+              </a:lnSpc>
+              <a:spcBef>
+                <a:spcPts val="500"/>
+              </a:spcBef>
+              <a:buFont typeface="Arial" panose="020B0604020202020204" pitchFamily="34" charset="0"/>
+              <a:buChar char="•"/>
+              <a:defRPr kumimoji="1" sz="1800" kern="1200">
+                <a:solidFill>
+                  <a:schemeClr val="tx1"/>
+                </a:solidFill>
+                <a:latin typeface="+mn-lt"/>
+                <a:ea typeface="+mn-ea"/>
+                <a:cs typeface="+mn-cs"/>
+              </a:defRPr>
+            </a:lvl5pPr>
+            <a:lvl6pPr marL="2514600" indent="-228600" algn="l" defTabSz="914400" rtl="0" eaLnBrk="1" latinLnBrk="0" hangingPunct="1">
+              <a:lnSpc>
+                <a:spcPct val="90000"/>
+              </a:lnSpc>
+              <a:spcBef>
+                <a:spcPts val="500"/>
+              </a:spcBef>
+              <a:buFont typeface="Arial" panose="020B0604020202020204" pitchFamily="34" charset="0"/>
+              <a:buChar char="•"/>
+              <a:defRPr kumimoji="1" sz="1800" kern="1200">
+                <a:solidFill>
+                  <a:schemeClr val="tx1"/>
+                </a:solidFill>
+                <a:latin typeface="+mn-lt"/>
+                <a:ea typeface="+mn-ea"/>
+                <a:cs typeface="+mn-cs"/>
+              </a:defRPr>
+            </a:lvl6pPr>
+            <a:lvl7pPr marL="2971800" indent="-228600" algn="l" defTabSz="914400" rtl="0" eaLnBrk="1" latinLnBrk="0" hangingPunct="1">
+              <a:lnSpc>
+                <a:spcPct val="90000"/>
+              </a:lnSpc>
+              <a:spcBef>
+                <a:spcPts val="500"/>
+              </a:spcBef>
+              <a:buFont typeface="Arial" panose="020B0604020202020204" pitchFamily="34" charset="0"/>
+              <a:buChar char="•"/>
+              <a:defRPr kumimoji="1" sz="1800" kern="1200">
+                <a:solidFill>
+                  <a:schemeClr val="tx1"/>
+                </a:solidFill>
+                <a:latin typeface="+mn-lt"/>
+                <a:ea typeface="+mn-ea"/>
+                <a:cs typeface="+mn-cs"/>
+              </a:defRPr>
+            </a:lvl7pPr>
+            <a:lvl8pPr marL="3429000" indent="-228600" algn="l" defTabSz="914400" rtl="0" eaLnBrk="1" latinLnBrk="0" hangingPunct="1">
+              <a:lnSpc>
+                <a:spcPct val="90000"/>
+              </a:lnSpc>
+              <a:spcBef>
+                <a:spcPts val="500"/>
+              </a:spcBef>
+              <a:buFont typeface="Arial" panose="020B0604020202020204" pitchFamily="34" charset="0"/>
+              <a:buChar char="•"/>
+              <a:defRPr kumimoji="1" sz="1800" kern="1200">
+                <a:solidFill>
+                  <a:schemeClr val="tx1"/>
+                </a:solidFill>
+                <a:latin typeface="+mn-lt"/>
+                <a:ea typeface="+mn-ea"/>
+                <a:cs typeface="+mn-cs"/>
+              </a:defRPr>
+            </a:lvl8pPr>
+            <a:lvl9pPr marL="3886200" indent="-228600" algn="l" defTabSz="914400" rtl="0" eaLnBrk="1" latinLnBrk="0" hangingPunct="1">
+              <a:lnSpc>
+                <a:spcPct val="90000"/>
+              </a:lnSpc>
+              <a:spcBef>
+                <a:spcPts val="500"/>
+              </a:spcBef>
+              <a:buFont typeface="Arial" panose="020B0604020202020204" pitchFamily="34" charset="0"/>
+              <a:buChar char="•"/>
+              <a:defRPr kumimoji="1" sz="1800" kern="1200">
+                <a:solidFill>
+                  <a:schemeClr val="tx1"/>
+                </a:solidFill>
+                <a:latin typeface="+mn-lt"/>
+                <a:ea typeface="+mn-ea"/>
+                <a:cs typeface="+mn-cs"/>
+              </a:defRPr>
+            </a:lvl9pPr>
+          </a:lstStyle>
+          <a:p>
+            <a:pPr marL="0" indent="0">
+              <a:buFont typeface="Arial" panose="020B0604020202020204" pitchFamily="34" charset="0"/>
+              <a:buNone/>
+            </a:pPr>
+            <a:endParaRPr lang="ja-JP" altLang="en-US">
+              <a:latin typeface="Meiryo" panose="020B0604030504040204" pitchFamily="34" charset="-128"/>
+              <a:ea typeface="Meiryo" panose="020B0604030504040204" pitchFamily="34" charset="-128"/>
+            </a:endParaRPr>
+          </a:p>
+        </p:txBody>
+      </p:sp>
+      <p:sp>
+        <p:nvSpPr>
+          <p:cNvPr id="3" name="フッター プレースホルダー 2">
+            <a:extLst>
+              <a:ext uri="{FF2B5EF4-FFF2-40B4-BE49-F238E27FC236}">
+                <a16:creationId xmlns:a16="http://schemas.microsoft.com/office/drawing/2014/main" id="{3811A8B9-EA4C-BB01-E8CD-8AE366845C2D}"/>
+              </a:ext>
+            </a:extLst>
+          </p:cNvPr>
+          <p:cNvSpPr>
+            <a:spLocks noGrp="1"/>
+          </p:cNvSpPr>
+          <p:nvPr>
+            <p:ph type="ftr" sz="quarter" idx="11"/>
+          </p:nvPr>
+        </p:nvSpPr>
+        <p:spPr/>
+        <p:txBody>
+          <a:bodyPr/>
+          <a:lstStyle/>
+          <a:p>
+            <a:r>
+              <a:rPr kumimoji="1" lang="ja-JP" altLang="en-US"/>
+              <a:t>修論発表会</a:t>
+            </a:r>
+            <a:endParaRPr kumimoji="1" lang="ja-ES" altLang="en-US"/>
+          </a:p>
+        </p:txBody>
+      </p:sp>
+    </p:spTree>
+    <p:extLst>
+      <p:ext uri="{BB962C8B-B14F-4D97-AF65-F5344CB8AC3E}">
+        <p14:creationId xmlns:p14="http://schemas.microsoft.com/office/powerpoint/2010/main" val="1828092857"/>
       </p:ext>
     </p:extLst>
   </p:cSld>

</xml_diff>

<commit_message>
Commit at 2025-01-26 17:00:00
</commit_message>
<xml_diff>
--- a/mt_presentation.pptx
+++ b/mt_presentation.pptx
@@ -5,12 +5,17 @@
     <p:sldMasterId id="2147483648" r:id="rId1"/>
   </p:sldMasterIdLst>
   <p:notesMasterIdLst>
-    <p:notesMasterId r:id="rId5"/>
+    <p:notesMasterId r:id="rId10"/>
   </p:notesMasterIdLst>
   <p:sldIdLst>
     <p:sldId id="256" r:id="rId2"/>
     <p:sldId id="383" r:id="rId3"/>
     <p:sldId id="382" r:id="rId4"/>
+    <p:sldId id="384" r:id="rId5"/>
+    <p:sldId id="385" r:id="rId6"/>
+    <p:sldId id="386" r:id="rId7"/>
+    <p:sldId id="387" r:id="rId8"/>
+    <p:sldId id="388" r:id="rId9"/>
   </p:sldIdLst>
   <p:sldSz cx="12192000" cy="6858000"/>
   <p:notesSz cx="6858000" cy="9144000"/>
@@ -572,6 +577,561 @@
     <p:extLst>
       <p:ext uri="{BB962C8B-B14F-4D97-AF65-F5344CB8AC3E}">
         <p14:creationId xmlns:p14="http://schemas.microsoft.com/office/powerpoint/2010/main" val="3881037302"/>
+      </p:ext>
+    </p:extLst>
+  </p:cSld>
+  <p:clrMapOvr>
+    <a:masterClrMapping/>
+  </p:clrMapOvr>
+</p:notes>
+</file>
+
+<file path=ppt/notesSlides/notesSlide2.xml><?xml version="1.0" encoding="utf-8"?>
+<p:notes xmlns:a="http://schemas.openxmlformats.org/drawingml/2006/main" xmlns:r="http://schemas.openxmlformats.org/officeDocument/2006/relationships" xmlns:p="http://schemas.openxmlformats.org/presentationml/2006/main">
+  <p:cSld>
+    <p:spTree>
+      <p:nvGrpSpPr>
+        <p:cNvPr id="1" name="">
+          <a:extLst>
+            <a:ext uri="{FF2B5EF4-FFF2-40B4-BE49-F238E27FC236}">
+              <a16:creationId xmlns:a16="http://schemas.microsoft.com/office/drawing/2014/main" id="{B3B43DA5-DCAC-0E7E-8AE7-0D3A6955BEF4}"/>
+            </a:ext>
+          </a:extLst>
+        </p:cNvPr>
+        <p:cNvGrpSpPr/>
+        <p:nvPr/>
+      </p:nvGrpSpPr>
+      <p:grpSpPr>
+        <a:xfrm>
+          <a:off x="0" y="0"/>
+          <a:ext cx="0" cy="0"/>
+          <a:chOff x="0" y="0"/>
+          <a:chExt cx="0" cy="0"/>
+        </a:xfrm>
+      </p:grpSpPr>
+      <p:sp>
+        <p:nvSpPr>
+          <p:cNvPr id="2" name="スライド イメージ プレースホルダー 1">
+            <a:extLst>
+              <a:ext uri="{FF2B5EF4-FFF2-40B4-BE49-F238E27FC236}">
+                <a16:creationId xmlns:a16="http://schemas.microsoft.com/office/drawing/2014/main" id="{8AE1021D-A003-B413-93C6-18CFCC69DEEE}"/>
+              </a:ext>
+            </a:extLst>
+          </p:cNvPr>
+          <p:cNvSpPr>
+            <a:spLocks noGrp="1" noRot="1" noChangeAspect="1"/>
+          </p:cNvSpPr>
+          <p:nvPr>
+            <p:ph type="sldImg"/>
+          </p:nvPr>
+        </p:nvSpPr>
+        <p:spPr/>
+      </p:sp>
+      <p:sp>
+        <p:nvSpPr>
+          <p:cNvPr id="3" name="ノート プレースホルダー 2">
+            <a:extLst>
+              <a:ext uri="{FF2B5EF4-FFF2-40B4-BE49-F238E27FC236}">
+                <a16:creationId xmlns:a16="http://schemas.microsoft.com/office/drawing/2014/main" id="{769000A6-4683-FAC1-3754-97D384A11E23}"/>
+              </a:ext>
+            </a:extLst>
+          </p:cNvPr>
+          <p:cNvSpPr>
+            <a:spLocks noGrp="1"/>
+          </p:cNvSpPr>
+          <p:nvPr>
+            <p:ph type="body" idx="1"/>
+          </p:nvPr>
+        </p:nvSpPr>
+        <p:spPr/>
+        <p:txBody>
+          <a:bodyPr/>
+          <a:lstStyle/>
+          <a:p>
+            <a:r>
+              <a:rPr kumimoji="1" lang="en-US" altLang="ja-ES"/>
+              <a:t> </a:t>
+            </a:r>
+          </a:p>
+        </p:txBody>
+      </p:sp>
+      <p:sp>
+        <p:nvSpPr>
+          <p:cNvPr id="4" name="スライド番号プレースホルダー 3">
+            <a:extLst>
+              <a:ext uri="{FF2B5EF4-FFF2-40B4-BE49-F238E27FC236}">
+                <a16:creationId xmlns:a16="http://schemas.microsoft.com/office/drawing/2014/main" id="{922A1A0D-C3E8-0D76-9F99-9F68EC563646}"/>
+              </a:ext>
+            </a:extLst>
+          </p:cNvPr>
+          <p:cNvSpPr>
+            <a:spLocks noGrp="1"/>
+          </p:cNvSpPr>
+          <p:nvPr>
+            <p:ph type="sldNum" sz="quarter" idx="5"/>
+          </p:nvPr>
+        </p:nvSpPr>
+        <p:spPr/>
+        <p:txBody>
+          <a:bodyPr/>
+          <a:lstStyle/>
+          <a:p>
+            <a:fld id="{3498438F-8954-6F4B-8CFE-5C58AB865F80}" type="slidenum">
+              <a:rPr kumimoji="1" lang="ja-ES" altLang="en-US" smtClean="0"/>
+              <a:t>4</a:t>
+            </a:fld>
+            <a:endParaRPr kumimoji="1" lang="ja-ES" altLang="en-US"/>
+          </a:p>
+        </p:txBody>
+      </p:sp>
+    </p:spTree>
+    <p:extLst>
+      <p:ext uri="{BB962C8B-B14F-4D97-AF65-F5344CB8AC3E}">
+        <p14:creationId xmlns:p14="http://schemas.microsoft.com/office/powerpoint/2010/main" val="3257920284"/>
+      </p:ext>
+    </p:extLst>
+  </p:cSld>
+  <p:clrMapOvr>
+    <a:masterClrMapping/>
+  </p:clrMapOvr>
+</p:notes>
+</file>
+
+<file path=ppt/notesSlides/notesSlide3.xml><?xml version="1.0" encoding="utf-8"?>
+<p:notes xmlns:a="http://schemas.openxmlformats.org/drawingml/2006/main" xmlns:r="http://schemas.openxmlformats.org/officeDocument/2006/relationships" xmlns:p="http://schemas.openxmlformats.org/presentationml/2006/main">
+  <p:cSld>
+    <p:spTree>
+      <p:nvGrpSpPr>
+        <p:cNvPr id="1" name="">
+          <a:extLst>
+            <a:ext uri="{FF2B5EF4-FFF2-40B4-BE49-F238E27FC236}">
+              <a16:creationId xmlns:a16="http://schemas.microsoft.com/office/drawing/2014/main" id="{49FE36B3-3AA8-7F66-A4FB-CB1EC26D69FA}"/>
+            </a:ext>
+          </a:extLst>
+        </p:cNvPr>
+        <p:cNvGrpSpPr/>
+        <p:nvPr/>
+      </p:nvGrpSpPr>
+      <p:grpSpPr>
+        <a:xfrm>
+          <a:off x="0" y="0"/>
+          <a:ext cx="0" cy="0"/>
+          <a:chOff x="0" y="0"/>
+          <a:chExt cx="0" cy="0"/>
+        </a:xfrm>
+      </p:grpSpPr>
+      <p:sp>
+        <p:nvSpPr>
+          <p:cNvPr id="2" name="スライド イメージ プレースホルダー 1">
+            <a:extLst>
+              <a:ext uri="{FF2B5EF4-FFF2-40B4-BE49-F238E27FC236}">
+                <a16:creationId xmlns:a16="http://schemas.microsoft.com/office/drawing/2014/main" id="{7EFE5852-76F7-27F4-9EE7-D914B6DDA431}"/>
+              </a:ext>
+            </a:extLst>
+          </p:cNvPr>
+          <p:cNvSpPr>
+            <a:spLocks noGrp="1" noRot="1" noChangeAspect="1"/>
+          </p:cNvSpPr>
+          <p:nvPr>
+            <p:ph type="sldImg"/>
+          </p:nvPr>
+        </p:nvSpPr>
+        <p:spPr/>
+      </p:sp>
+      <p:sp>
+        <p:nvSpPr>
+          <p:cNvPr id="3" name="ノート プレースホルダー 2">
+            <a:extLst>
+              <a:ext uri="{FF2B5EF4-FFF2-40B4-BE49-F238E27FC236}">
+                <a16:creationId xmlns:a16="http://schemas.microsoft.com/office/drawing/2014/main" id="{9F6AA2A0-6239-DBFF-1812-48469CEB45A3}"/>
+              </a:ext>
+            </a:extLst>
+          </p:cNvPr>
+          <p:cNvSpPr>
+            <a:spLocks noGrp="1"/>
+          </p:cNvSpPr>
+          <p:nvPr>
+            <p:ph type="body" idx="1"/>
+          </p:nvPr>
+        </p:nvSpPr>
+        <p:spPr/>
+        <p:txBody>
+          <a:bodyPr/>
+          <a:lstStyle/>
+          <a:p>
+            <a:r>
+              <a:rPr kumimoji="1" lang="en-US" altLang="ja-ES"/>
+              <a:t> </a:t>
+            </a:r>
+          </a:p>
+        </p:txBody>
+      </p:sp>
+      <p:sp>
+        <p:nvSpPr>
+          <p:cNvPr id="4" name="スライド番号プレースホルダー 3">
+            <a:extLst>
+              <a:ext uri="{FF2B5EF4-FFF2-40B4-BE49-F238E27FC236}">
+                <a16:creationId xmlns:a16="http://schemas.microsoft.com/office/drawing/2014/main" id="{876D5C3B-F692-D130-6C7D-D43A43B54C92}"/>
+              </a:ext>
+            </a:extLst>
+          </p:cNvPr>
+          <p:cNvSpPr>
+            <a:spLocks noGrp="1"/>
+          </p:cNvSpPr>
+          <p:nvPr>
+            <p:ph type="sldNum" sz="quarter" idx="5"/>
+          </p:nvPr>
+        </p:nvSpPr>
+        <p:spPr/>
+        <p:txBody>
+          <a:bodyPr/>
+          <a:lstStyle/>
+          <a:p>
+            <a:fld id="{3498438F-8954-6F4B-8CFE-5C58AB865F80}" type="slidenum">
+              <a:rPr kumimoji="1" lang="ja-ES" altLang="en-US" smtClean="0"/>
+              <a:t>5</a:t>
+            </a:fld>
+            <a:endParaRPr kumimoji="1" lang="ja-ES" altLang="en-US"/>
+          </a:p>
+        </p:txBody>
+      </p:sp>
+    </p:spTree>
+    <p:extLst>
+      <p:ext uri="{BB962C8B-B14F-4D97-AF65-F5344CB8AC3E}">
+        <p14:creationId xmlns:p14="http://schemas.microsoft.com/office/powerpoint/2010/main" val="2685656053"/>
+      </p:ext>
+    </p:extLst>
+  </p:cSld>
+  <p:clrMapOvr>
+    <a:masterClrMapping/>
+  </p:clrMapOvr>
+</p:notes>
+</file>
+
+<file path=ppt/notesSlides/notesSlide4.xml><?xml version="1.0" encoding="utf-8"?>
+<p:notes xmlns:a="http://schemas.openxmlformats.org/drawingml/2006/main" xmlns:r="http://schemas.openxmlformats.org/officeDocument/2006/relationships" xmlns:p="http://schemas.openxmlformats.org/presentationml/2006/main">
+  <p:cSld>
+    <p:spTree>
+      <p:nvGrpSpPr>
+        <p:cNvPr id="1" name="">
+          <a:extLst>
+            <a:ext uri="{FF2B5EF4-FFF2-40B4-BE49-F238E27FC236}">
+              <a16:creationId xmlns:a16="http://schemas.microsoft.com/office/drawing/2014/main" id="{81949C3F-2607-5D80-5DB7-04AC1378A5AF}"/>
+            </a:ext>
+          </a:extLst>
+        </p:cNvPr>
+        <p:cNvGrpSpPr/>
+        <p:nvPr/>
+      </p:nvGrpSpPr>
+      <p:grpSpPr>
+        <a:xfrm>
+          <a:off x="0" y="0"/>
+          <a:ext cx="0" cy="0"/>
+          <a:chOff x="0" y="0"/>
+          <a:chExt cx="0" cy="0"/>
+        </a:xfrm>
+      </p:grpSpPr>
+      <p:sp>
+        <p:nvSpPr>
+          <p:cNvPr id="2" name="スライド イメージ プレースホルダー 1">
+            <a:extLst>
+              <a:ext uri="{FF2B5EF4-FFF2-40B4-BE49-F238E27FC236}">
+                <a16:creationId xmlns:a16="http://schemas.microsoft.com/office/drawing/2014/main" id="{75FF5AD6-96C1-4942-3F16-96D6F2AE1D00}"/>
+              </a:ext>
+            </a:extLst>
+          </p:cNvPr>
+          <p:cNvSpPr>
+            <a:spLocks noGrp="1" noRot="1" noChangeAspect="1"/>
+          </p:cNvSpPr>
+          <p:nvPr>
+            <p:ph type="sldImg"/>
+          </p:nvPr>
+        </p:nvSpPr>
+        <p:spPr/>
+      </p:sp>
+      <p:sp>
+        <p:nvSpPr>
+          <p:cNvPr id="3" name="ノート プレースホルダー 2">
+            <a:extLst>
+              <a:ext uri="{FF2B5EF4-FFF2-40B4-BE49-F238E27FC236}">
+                <a16:creationId xmlns:a16="http://schemas.microsoft.com/office/drawing/2014/main" id="{800E3831-50E1-1CF2-5D05-766DB728F9A1}"/>
+              </a:ext>
+            </a:extLst>
+          </p:cNvPr>
+          <p:cNvSpPr>
+            <a:spLocks noGrp="1"/>
+          </p:cNvSpPr>
+          <p:nvPr>
+            <p:ph type="body" idx="1"/>
+          </p:nvPr>
+        </p:nvSpPr>
+        <p:spPr/>
+        <p:txBody>
+          <a:bodyPr/>
+          <a:lstStyle/>
+          <a:p>
+            <a:r>
+              <a:rPr kumimoji="1" lang="en-US" altLang="ja-ES"/>
+              <a:t> </a:t>
+            </a:r>
+          </a:p>
+        </p:txBody>
+      </p:sp>
+      <p:sp>
+        <p:nvSpPr>
+          <p:cNvPr id="4" name="スライド番号プレースホルダー 3">
+            <a:extLst>
+              <a:ext uri="{FF2B5EF4-FFF2-40B4-BE49-F238E27FC236}">
+                <a16:creationId xmlns:a16="http://schemas.microsoft.com/office/drawing/2014/main" id="{BC7CF7EB-A3D4-E9B2-1F69-B9653586985B}"/>
+              </a:ext>
+            </a:extLst>
+          </p:cNvPr>
+          <p:cNvSpPr>
+            <a:spLocks noGrp="1"/>
+          </p:cNvSpPr>
+          <p:nvPr>
+            <p:ph type="sldNum" sz="quarter" idx="5"/>
+          </p:nvPr>
+        </p:nvSpPr>
+        <p:spPr/>
+        <p:txBody>
+          <a:bodyPr/>
+          <a:lstStyle/>
+          <a:p>
+            <a:fld id="{3498438F-8954-6F4B-8CFE-5C58AB865F80}" type="slidenum">
+              <a:rPr kumimoji="1" lang="ja-ES" altLang="en-US" smtClean="0"/>
+              <a:t>6</a:t>
+            </a:fld>
+            <a:endParaRPr kumimoji="1" lang="ja-ES" altLang="en-US"/>
+          </a:p>
+        </p:txBody>
+      </p:sp>
+    </p:spTree>
+    <p:extLst>
+      <p:ext uri="{BB962C8B-B14F-4D97-AF65-F5344CB8AC3E}">
+        <p14:creationId xmlns:p14="http://schemas.microsoft.com/office/powerpoint/2010/main" val="4160101799"/>
+      </p:ext>
+    </p:extLst>
+  </p:cSld>
+  <p:clrMapOvr>
+    <a:masterClrMapping/>
+  </p:clrMapOvr>
+</p:notes>
+</file>
+
+<file path=ppt/notesSlides/notesSlide5.xml><?xml version="1.0" encoding="utf-8"?>
+<p:notes xmlns:a="http://schemas.openxmlformats.org/drawingml/2006/main" xmlns:r="http://schemas.openxmlformats.org/officeDocument/2006/relationships" xmlns:p="http://schemas.openxmlformats.org/presentationml/2006/main">
+  <p:cSld>
+    <p:spTree>
+      <p:nvGrpSpPr>
+        <p:cNvPr id="1" name="">
+          <a:extLst>
+            <a:ext uri="{FF2B5EF4-FFF2-40B4-BE49-F238E27FC236}">
+              <a16:creationId xmlns:a16="http://schemas.microsoft.com/office/drawing/2014/main" id="{54AC3D72-D0E7-E7A9-B978-ADF6C7F5E623}"/>
+            </a:ext>
+          </a:extLst>
+        </p:cNvPr>
+        <p:cNvGrpSpPr/>
+        <p:nvPr/>
+      </p:nvGrpSpPr>
+      <p:grpSpPr>
+        <a:xfrm>
+          <a:off x="0" y="0"/>
+          <a:ext cx="0" cy="0"/>
+          <a:chOff x="0" y="0"/>
+          <a:chExt cx="0" cy="0"/>
+        </a:xfrm>
+      </p:grpSpPr>
+      <p:sp>
+        <p:nvSpPr>
+          <p:cNvPr id="2" name="スライド イメージ プレースホルダー 1">
+            <a:extLst>
+              <a:ext uri="{FF2B5EF4-FFF2-40B4-BE49-F238E27FC236}">
+                <a16:creationId xmlns:a16="http://schemas.microsoft.com/office/drawing/2014/main" id="{81670B00-1A0E-84C0-ADB6-68105D84005A}"/>
+              </a:ext>
+            </a:extLst>
+          </p:cNvPr>
+          <p:cNvSpPr>
+            <a:spLocks noGrp="1" noRot="1" noChangeAspect="1"/>
+          </p:cNvSpPr>
+          <p:nvPr>
+            <p:ph type="sldImg"/>
+          </p:nvPr>
+        </p:nvSpPr>
+        <p:spPr/>
+      </p:sp>
+      <p:sp>
+        <p:nvSpPr>
+          <p:cNvPr id="3" name="ノート プレースホルダー 2">
+            <a:extLst>
+              <a:ext uri="{FF2B5EF4-FFF2-40B4-BE49-F238E27FC236}">
+                <a16:creationId xmlns:a16="http://schemas.microsoft.com/office/drawing/2014/main" id="{627E91F5-C848-57ED-4510-BF4DE5AC49E4}"/>
+              </a:ext>
+            </a:extLst>
+          </p:cNvPr>
+          <p:cNvSpPr>
+            <a:spLocks noGrp="1"/>
+          </p:cNvSpPr>
+          <p:nvPr>
+            <p:ph type="body" idx="1"/>
+          </p:nvPr>
+        </p:nvSpPr>
+        <p:spPr/>
+        <p:txBody>
+          <a:bodyPr/>
+          <a:lstStyle/>
+          <a:p>
+            <a:r>
+              <a:rPr kumimoji="1" lang="en-US" altLang="ja-ES"/>
+              <a:t> </a:t>
+            </a:r>
+          </a:p>
+        </p:txBody>
+      </p:sp>
+      <p:sp>
+        <p:nvSpPr>
+          <p:cNvPr id="4" name="スライド番号プレースホルダー 3">
+            <a:extLst>
+              <a:ext uri="{FF2B5EF4-FFF2-40B4-BE49-F238E27FC236}">
+                <a16:creationId xmlns:a16="http://schemas.microsoft.com/office/drawing/2014/main" id="{156E8E57-E69A-EE79-3F29-5ADCC7A868C8}"/>
+              </a:ext>
+            </a:extLst>
+          </p:cNvPr>
+          <p:cNvSpPr>
+            <a:spLocks noGrp="1"/>
+          </p:cNvSpPr>
+          <p:nvPr>
+            <p:ph type="sldNum" sz="quarter" idx="5"/>
+          </p:nvPr>
+        </p:nvSpPr>
+        <p:spPr/>
+        <p:txBody>
+          <a:bodyPr/>
+          <a:lstStyle/>
+          <a:p>
+            <a:fld id="{3498438F-8954-6F4B-8CFE-5C58AB865F80}" type="slidenum">
+              <a:rPr kumimoji="1" lang="ja-ES" altLang="en-US" smtClean="0"/>
+              <a:t>7</a:t>
+            </a:fld>
+            <a:endParaRPr kumimoji="1" lang="ja-ES" altLang="en-US"/>
+          </a:p>
+        </p:txBody>
+      </p:sp>
+    </p:spTree>
+    <p:extLst>
+      <p:ext uri="{BB962C8B-B14F-4D97-AF65-F5344CB8AC3E}">
+        <p14:creationId xmlns:p14="http://schemas.microsoft.com/office/powerpoint/2010/main" val="326359210"/>
+      </p:ext>
+    </p:extLst>
+  </p:cSld>
+  <p:clrMapOvr>
+    <a:masterClrMapping/>
+  </p:clrMapOvr>
+</p:notes>
+</file>
+
+<file path=ppt/notesSlides/notesSlide6.xml><?xml version="1.0" encoding="utf-8"?>
+<p:notes xmlns:a="http://schemas.openxmlformats.org/drawingml/2006/main" xmlns:r="http://schemas.openxmlformats.org/officeDocument/2006/relationships" xmlns:p="http://schemas.openxmlformats.org/presentationml/2006/main">
+  <p:cSld>
+    <p:spTree>
+      <p:nvGrpSpPr>
+        <p:cNvPr id="1" name="">
+          <a:extLst>
+            <a:ext uri="{FF2B5EF4-FFF2-40B4-BE49-F238E27FC236}">
+              <a16:creationId xmlns:a16="http://schemas.microsoft.com/office/drawing/2014/main" id="{9F8A0E1D-9D58-44F3-ABA8-36C29986E4D9}"/>
+            </a:ext>
+          </a:extLst>
+        </p:cNvPr>
+        <p:cNvGrpSpPr/>
+        <p:nvPr/>
+      </p:nvGrpSpPr>
+      <p:grpSpPr>
+        <a:xfrm>
+          <a:off x="0" y="0"/>
+          <a:ext cx="0" cy="0"/>
+          <a:chOff x="0" y="0"/>
+          <a:chExt cx="0" cy="0"/>
+        </a:xfrm>
+      </p:grpSpPr>
+      <p:sp>
+        <p:nvSpPr>
+          <p:cNvPr id="2" name="スライド イメージ プレースホルダー 1">
+            <a:extLst>
+              <a:ext uri="{FF2B5EF4-FFF2-40B4-BE49-F238E27FC236}">
+                <a16:creationId xmlns:a16="http://schemas.microsoft.com/office/drawing/2014/main" id="{63B1300F-2AB7-0E66-9C4D-D20032FD54D0}"/>
+              </a:ext>
+            </a:extLst>
+          </p:cNvPr>
+          <p:cNvSpPr>
+            <a:spLocks noGrp="1" noRot="1" noChangeAspect="1"/>
+          </p:cNvSpPr>
+          <p:nvPr>
+            <p:ph type="sldImg"/>
+          </p:nvPr>
+        </p:nvSpPr>
+        <p:spPr/>
+      </p:sp>
+      <p:sp>
+        <p:nvSpPr>
+          <p:cNvPr id="3" name="ノート プレースホルダー 2">
+            <a:extLst>
+              <a:ext uri="{FF2B5EF4-FFF2-40B4-BE49-F238E27FC236}">
+                <a16:creationId xmlns:a16="http://schemas.microsoft.com/office/drawing/2014/main" id="{502A48A8-9F34-A293-654E-31DDF9BA5AAC}"/>
+              </a:ext>
+            </a:extLst>
+          </p:cNvPr>
+          <p:cNvSpPr>
+            <a:spLocks noGrp="1"/>
+          </p:cNvSpPr>
+          <p:nvPr>
+            <p:ph type="body" idx="1"/>
+          </p:nvPr>
+        </p:nvSpPr>
+        <p:spPr/>
+        <p:txBody>
+          <a:bodyPr/>
+          <a:lstStyle/>
+          <a:p>
+            <a:r>
+              <a:rPr kumimoji="1" lang="en-US" altLang="ja-ES"/>
+              <a:t> </a:t>
+            </a:r>
+          </a:p>
+        </p:txBody>
+      </p:sp>
+      <p:sp>
+        <p:nvSpPr>
+          <p:cNvPr id="4" name="スライド番号プレースホルダー 3">
+            <a:extLst>
+              <a:ext uri="{FF2B5EF4-FFF2-40B4-BE49-F238E27FC236}">
+                <a16:creationId xmlns:a16="http://schemas.microsoft.com/office/drawing/2014/main" id="{0DECA395-180F-C47C-5838-13FA58E2838B}"/>
+              </a:ext>
+            </a:extLst>
+          </p:cNvPr>
+          <p:cNvSpPr>
+            <a:spLocks noGrp="1"/>
+          </p:cNvSpPr>
+          <p:nvPr>
+            <p:ph type="sldNum" sz="quarter" idx="5"/>
+          </p:nvPr>
+        </p:nvSpPr>
+        <p:spPr/>
+        <p:txBody>
+          <a:bodyPr/>
+          <a:lstStyle/>
+          <a:p>
+            <a:fld id="{3498438F-8954-6F4B-8CFE-5C58AB865F80}" type="slidenum">
+              <a:rPr kumimoji="1" lang="ja-ES" altLang="en-US" smtClean="0"/>
+              <a:t>8</a:t>
+            </a:fld>
+            <a:endParaRPr kumimoji="1" lang="ja-ES" altLang="en-US"/>
+          </a:p>
+        </p:txBody>
+      </p:sp>
+    </p:spTree>
+    <p:extLst>
+      <p:ext uri="{BB962C8B-B14F-4D97-AF65-F5344CB8AC3E}">
+        <p14:creationId xmlns:p14="http://schemas.microsoft.com/office/powerpoint/2010/main" val="172065926"/>
       </p:ext>
     </p:extLst>
   </p:cSld>
@@ -4899,10 +5459,2301 @@
           </a:p>
         </p:txBody>
       </p:sp>
+      <p:pic>
+        <p:nvPicPr>
+          <p:cNvPr id="7" name="図 6" descr="プレート, コンパクトディスク, ミラー が含まれている画像&#10;&#10;自動的に生成された説明">
+            <a:extLst>
+              <a:ext uri="{FF2B5EF4-FFF2-40B4-BE49-F238E27FC236}">
+                <a16:creationId xmlns:a16="http://schemas.microsoft.com/office/drawing/2014/main" id="{97427B13-3AFC-3775-0E0F-D01CCAB4DBB9}"/>
+              </a:ext>
+            </a:extLst>
+          </p:cNvPr>
+          <p:cNvPicPr>
+            <a:picLocks noChangeAspect="1"/>
+          </p:cNvPicPr>
+          <p:nvPr/>
+        </p:nvPicPr>
+        <p:blipFill>
+          <a:blip r:embed="rId3"/>
+          <a:stretch>
+            <a:fillRect/>
+          </a:stretch>
+        </p:blipFill>
+        <p:spPr>
+          <a:xfrm>
+            <a:off x="515116" y="2112464"/>
+            <a:ext cx="3123802" cy="1788416"/>
+          </a:xfrm>
+          <a:prstGeom prst="rect">
+            <a:avLst/>
+          </a:prstGeom>
+        </p:spPr>
+      </p:pic>
+      <p:sp>
+        <p:nvSpPr>
+          <p:cNvPr id="8" name="テキスト ボックス 7">
+            <a:extLst>
+              <a:ext uri="{FF2B5EF4-FFF2-40B4-BE49-F238E27FC236}">
+                <a16:creationId xmlns:a16="http://schemas.microsoft.com/office/drawing/2014/main" id="{E9002375-583E-FF97-FA8B-660482A45C48}"/>
+              </a:ext>
+            </a:extLst>
+          </p:cNvPr>
+          <p:cNvSpPr txBox="1"/>
+          <p:nvPr/>
+        </p:nvSpPr>
+        <p:spPr>
+          <a:xfrm>
+            <a:off x="262128" y="1268866"/>
+            <a:ext cx="11667744" cy="707886"/>
+          </a:xfrm>
+          <a:prstGeom prst="rect">
+            <a:avLst/>
+          </a:prstGeom>
+          <a:noFill/>
+        </p:spPr>
+        <p:txBody>
+          <a:bodyPr wrap="square" rtlCol="0">
+            <a:spAutoFit/>
+          </a:bodyPr>
+          <a:lstStyle/>
+          <a:p>
+            <a:pPr marL="342900" indent="-342900">
+              <a:buFont typeface="Arial" panose="020B0604020202020204" pitchFamily="34" charset="0"/>
+              <a:buChar char="•"/>
+            </a:pPr>
+            <a:r>
+              <a:rPr kumimoji="1" lang="en-US" altLang="ja-ES" sz="2000" dirty="0">
+                <a:latin typeface="Meiryo" panose="020B0604030504040204" pitchFamily="34" charset="-128"/>
+                <a:ea typeface="Meiryo" panose="020B0604030504040204" pitchFamily="34" charset="-128"/>
+                <a:cs typeface="Arial" panose="020B0604020202020204" pitchFamily="34" charset="0"/>
+              </a:rPr>
+              <a:t>CMB : </a:t>
+            </a:r>
+            <a:r>
+              <a:rPr kumimoji="1" lang="ja-ES" altLang="en-US" sz="2000" dirty="0">
+                <a:latin typeface="Meiryo" panose="020B0604030504040204" pitchFamily="34" charset="-128"/>
+                <a:ea typeface="Meiryo" panose="020B0604030504040204" pitchFamily="34" charset="-128"/>
+                <a:cs typeface="Arial" panose="020B0604020202020204" pitchFamily="34" charset="0"/>
+              </a:rPr>
+              <a:t>宇宙の晴れ上がり以降、電子に散乱されずに進む光で我々が観測できる宇宙最古の光。</a:t>
+            </a:r>
+            <a:endParaRPr kumimoji="1" lang="en-US" altLang="ja-ES" sz="2000" dirty="0">
+              <a:latin typeface="Meiryo" panose="020B0604030504040204" pitchFamily="34" charset="-128"/>
+              <a:ea typeface="Meiryo" panose="020B0604030504040204" pitchFamily="34" charset="-128"/>
+              <a:cs typeface="Arial" panose="020B0604020202020204" pitchFamily="34" charset="0"/>
+            </a:endParaRPr>
+          </a:p>
+          <a:p>
+            <a:r>
+              <a:rPr kumimoji="1" lang="ja-ES" altLang="en-US" sz="2000" dirty="0">
+                <a:latin typeface="Meiryo" panose="020B0604030504040204" pitchFamily="34" charset="-128"/>
+                <a:ea typeface="Meiryo" panose="020B0604030504040204" pitchFamily="34" charset="-128"/>
+                <a:cs typeface="Arial" panose="020B0604020202020204" pitchFamily="34" charset="0"/>
+              </a:rPr>
+              <a:t>　　　　　→</a:t>
+            </a:r>
+            <a:r>
+              <a:rPr kumimoji="1" lang="ja-JP" altLang="en-US" sz="2000">
+                <a:latin typeface="Meiryo" panose="020B0604030504040204" pitchFamily="34" charset="-128"/>
+                <a:ea typeface="Meiryo" panose="020B0604030504040204" pitchFamily="34" charset="-128"/>
+                <a:cs typeface="Arial" panose="020B0604020202020204" pitchFamily="34" charset="0"/>
+              </a:rPr>
+              <a:t> </a:t>
+            </a:r>
+            <a:r>
+              <a:rPr kumimoji="1" lang="en-US" altLang="ja-ES" sz="2000" dirty="0">
+                <a:latin typeface="Meiryo" panose="020B0604030504040204" pitchFamily="34" charset="-128"/>
+                <a:ea typeface="Meiryo" panose="020B0604030504040204" pitchFamily="34" charset="-128"/>
+                <a:cs typeface="Arial" panose="020B0604020202020204" pitchFamily="34" charset="0"/>
+              </a:rPr>
+              <a:t>CMB</a:t>
+            </a:r>
+            <a:r>
+              <a:rPr kumimoji="1" lang="ja-ES" altLang="en-US" sz="2000" dirty="0">
+                <a:latin typeface="Meiryo" panose="020B0604030504040204" pitchFamily="34" charset="-128"/>
+                <a:ea typeface="Meiryo" panose="020B0604030504040204" pitchFamily="34" charset="-128"/>
+                <a:cs typeface="Arial" panose="020B0604020202020204" pitchFamily="34" charset="0"/>
+              </a:rPr>
+              <a:t>は宇宙初期の情報を含んでいる</a:t>
+            </a:r>
+            <a:endParaRPr kumimoji="1" lang="en-US" altLang="ja-ES" sz="2000" dirty="0">
+              <a:latin typeface="Meiryo" panose="020B0604030504040204" pitchFamily="34" charset="-128"/>
+              <a:ea typeface="Meiryo" panose="020B0604030504040204" pitchFamily="34" charset="-128"/>
+              <a:cs typeface="Arial" panose="020B0604020202020204" pitchFamily="34" charset="0"/>
+            </a:endParaRPr>
+          </a:p>
+        </p:txBody>
+      </p:sp>
+      <p:sp>
+        <p:nvSpPr>
+          <p:cNvPr id="10" name="テキスト ボックス 9">
+            <a:extLst>
+              <a:ext uri="{FF2B5EF4-FFF2-40B4-BE49-F238E27FC236}">
+                <a16:creationId xmlns:a16="http://schemas.microsoft.com/office/drawing/2014/main" id="{30506776-D9FF-4005-2F8C-CEB5DD164E9A}"/>
+              </a:ext>
+            </a:extLst>
+          </p:cNvPr>
+          <p:cNvSpPr txBox="1"/>
+          <p:nvPr/>
+        </p:nvSpPr>
+        <p:spPr>
+          <a:xfrm>
+            <a:off x="3794760" y="2098615"/>
+            <a:ext cx="8223504" cy="707886"/>
+          </a:xfrm>
+          <a:prstGeom prst="rect">
+            <a:avLst/>
+          </a:prstGeom>
+          <a:noFill/>
+        </p:spPr>
+        <p:txBody>
+          <a:bodyPr wrap="square" rtlCol="0">
+            <a:spAutoFit/>
+          </a:bodyPr>
+          <a:lstStyle/>
+          <a:p>
+            <a:pPr marL="342900" indent="-342900">
+              <a:buFont typeface="Arial" panose="020B0604020202020204" pitchFamily="34" charset="0"/>
+              <a:buChar char="•"/>
+            </a:pPr>
+            <a:r>
+              <a:rPr kumimoji="1" lang="en-US" altLang="ja-ES" sz="2000" dirty="0">
+                <a:latin typeface="Meiryo" panose="020B0604030504040204" pitchFamily="34" charset="-128"/>
+                <a:ea typeface="Meiryo" panose="020B0604030504040204" pitchFamily="34" charset="-128"/>
+                <a:cs typeface="Arial" panose="020B0604020202020204" pitchFamily="34" charset="0"/>
+              </a:rPr>
+              <a:t>CMB</a:t>
+            </a:r>
+            <a:r>
+              <a:rPr kumimoji="1" lang="ja-ES" altLang="en-US" sz="2000" dirty="0">
+                <a:latin typeface="Meiryo" panose="020B0604030504040204" pitchFamily="34" charset="-128"/>
+                <a:ea typeface="Meiryo" panose="020B0604030504040204" pitchFamily="34" charset="-128"/>
+                <a:cs typeface="Arial" panose="020B0604020202020204" pitchFamily="34" charset="0"/>
+              </a:rPr>
+              <a:t>はほぼ</a:t>
+            </a:r>
+            <a:r>
+              <a:rPr kumimoji="1" lang="en-US" altLang="ja-ES" sz="2000" dirty="0">
+                <a:latin typeface="Meiryo" panose="020B0604030504040204" pitchFamily="34" charset="-128"/>
+                <a:ea typeface="Meiryo" panose="020B0604030504040204" pitchFamily="34" charset="-128"/>
+                <a:cs typeface="Arial" panose="020B0604020202020204" pitchFamily="34" charset="0"/>
+              </a:rPr>
+              <a:t>2.725K</a:t>
+            </a:r>
+            <a:r>
+              <a:rPr kumimoji="1" lang="ja-ES" altLang="en-US" sz="2000" dirty="0">
+                <a:latin typeface="Meiryo" panose="020B0604030504040204" pitchFamily="34" charset="-128"/>
+                <a:ea typeface="Meiryo" panose="020B0604030504040204" pitchFamily="34" charset="-128"/>
+                <a:cs typeface="Arial" panose="020B0604020202020204" pitchFamily="34" charset="0"/>
+              </a:rPr>
+              <a:t>の黒体放射のスペクトルを持つと同時に、わずかな温度異方性を持つ。</a:t>
+            </a:r>
+            <a:endParaRPr kumimoji="1" lang="en-US" altLang="ja-ES" sz="2000" dirty="0">
+              <a:latin typeface="Meiryo" panose="020B0604030504040204" pitchFamily="34" charset="-128"/>
+              <a:ea typeface="Meiryo" panose="020B0604030504040204" pitchFamily="34" charset="-128"/>
+              <a:cs typeface="Arial" panose="020B0604020202020204" pitchFamily="34" charset="0"/>
+            </a:endParaRPr>
+          </a:p>
+        </p:txBody>
+      </p:sp>
+      <p:sp>
+        <p:nvSpPr>
+          <p:cNvPr id="11" name="テキスト ボックス 10">
+            <a:extLst>
+              <a:ext uri="{FF2B5EF4-FFF2-40B4-BE49-F238E27FC236}">
+                <a16:creationId xmlns:a16="http://schemas.microsoft.com/office/drawing/2014/main" id="{0034A900-4125-1F41-CED0-393380A164A5}"/>
+              </a:ext>
+            </a:extLst>
+          </p:cNvPr>
+          <p:cNvSpPr txBox="1"/>
+          <p:nvPr/>
+        </p:nvSpPr>
+        <p:spPr>
+          <a:xfrm>
+            <a:off x="708433" y="3673951"/>
+            <a:ext cx="600913" cy="307777"/>
+          </a:xfrm>
+          <a:prstGeom prst="rect">
+            <a:avLst/>
+          </a:prstGeom>
+          <a:solidFill>
+            <a:schemeClr val="bg1"/>
+          </a:solidFill>
+        </p:spPr>
+        <p:txBody>
+          <a:bodyPr wrap="square" rtlCol="0">
+            <a:spAutoFit/>
+          </a:bodyPr>
+          <a:lstStyle/>
+          <a:p>
+            <a:r>
+              <a:rPr kumimoji="1" lang="en-US" altLang="ja-ES" sz="1400" dirty="0">
+                <a:latin typeface="Meiryo" panose="020B0604030504040204" pitchFamily="34" charset="-128"/>
+                <a:ea typeface="Meiryo" panose="020B0604030504040204" pitchFamily="34" charset="-128"/>
+              </a:rPr>
+              <a:t>-300</a:t>
+            </a:r>
+            <a:endParaRPr kumimoji="1" lang="ja-ES" altLang="en-US" sz="1400" dirty="0">
+              <a:latin typeface="Meiryo" panose="020B0604030504040204" pitchFamily="34" charset="-128"/>
+              <a:ea typeface="Meiryo" panose="020B0604030504040204" pitchFamily="34" charset="-128"/>
+            </a:endParaRPr>
+          </a:p>
+        </p:txBody>
+      </p:sp>
+      <mc:AlternateContent xmlns:mc="http://schemas.openxmlformats.org/markup-compatibility/2006">
+        <mc:Choice xmlns:a14="http://schemas.microsoft.com/office/drawing/2010/main" Requires="a14">
+          <p:sp>
+            <p:nvSpPr>
+              <p:cNvPr id="12" name="テキスト ボックス 11">
+                <a:extLst>
+                  <a:ext uri="{FF2B5EF4-FFF2-40B4-BE49-F238E27FC236}">
+                    <a16:creationId xmlns:a16="http://schemas.microsoft.com/office/drawing/2014/main" id="{59BCCFCC-D862-157D-CBC5-F1F22663E491}"/>
+                  </a:ext>
+                </a:extLst>
+              </p:cNvPr>
+              <p:cNvSpPr txBox="1"/>
+              <p:nvPr/>
+            </p:nvSpPr>
+            <p:spPr>
+              <a:xfrm>
+                <a:off x="2855617" y="3673950"/>
+                <a:ext cx="783301" cy="307777"/>
+              </a:xfrm>
+              <a:prstGeom prst="rect">
+                <a:avLst/>
+              </a:prstGeom>
+              <a:solidFill>
+                <a:schemeClr val="bg1"/>
+              </a:solidFill>
+            </p:spPr>
+            <p:txBody>
+              <a:bodyPr wrap="square" rtlCol="0">
+                <a:spAutoFit/>
+              </a:bodyPr>
+              <a:lstStyle/>
+              <a:p>
+                <a:r>
+                  <a:rPr kumimoji="1" lang="en-US" altLang="ja-ES" sz="1400" dirty="0">
+                    <a:latin typeface="Meiryo" panose="020B0604030504040204" pitchFamily="34" charset="-128"/>
+                    <a:ea typeface="Meiryo" panose="020B0604030504040204" pitchFamily="34" charset="-128"/>
+                  </a:rPr>
+                  <a:t>300</a:t>
+                </a:r>
+                <a14:m>
+                  <m:oMath xmlns:m="http://schemas.openxmlformats.org/officeDocument/2006/math">
+                    <m:r>
+                      <a:rPr kumimoji="1" lang="en-US" altLang="ja-ES" sz="1400" i="1" smtClean="0">
+                        <a:latin typeface="Cambria Math" panose="02040503050406030204" pitchFamily="18" charset="0"/>
+                        <a:ea typeface="Cambria Math" panose="02040503050406030204" pitchFamily="18" charset="0"/>
+                      </a:rPr>
+                      <m:t>𝜇</m:t>
+                    </m:r>
+                    <m:r>
+                      <a:rPr kumimoji="1" lang="en-US" altLang="ja-ES" sz="1400" b="0" i="1" smtClean="0">
+                        <a:latin typeface="Cambria Math" panose="02040503050406030204" pitchFamily="18" charset="0"/>
+                        <a:ea typeface="Cambria Math" panose="02040503050406030204" pitchFamily="18" charset="0"/>
+                      </a:rPr>
+                      <m:t>𝐾</m:t>
+                    </m:r>
+                  </m:oMath>
+                </a14:m>
+                <a:endParaRPr kumimoji="1" lang="ja-ES" altLang="en-US" sz="1400" dirty="0">
+                  <a:latin typeface="Meiryo" panose="020B0604030504040204" pitchFamily="34" charset="-128"/>
+                  <a:ea typeface="Meiryo" panose="020B0604030504040204" pitchFamily="34" charset="-128"/>
+                </a:endParaRPr>
+              </a:p>
+            </p:txBody>
+          </p:sp>
+        </mc:Choice>
+        <mc:Fallback>
+          <p:sp>
+            <p:nvSpPr>
+              <p:cNvPr id="12" name="テキスト ボックス 11">
+                <a:extLst>
+                  <a:ext uri="{FF2B5EF4-FFF2-40B4-BE49-F238E27FC236}">
+                    <a16:creationId xmlns:a16="http://schemas.microsoft.com/office/drawing/2014/main" id="{59BCCFCC-D862-157D-CBC5-F1F22663E491}"/>
+                  </a:ext>
+                </a:extLst>
+              </p:cNvPr>
+              <p:cNvSpPr txBox="1">
+                <a:spLocks noRot="1" noChangeAspect="1" noMove="1" noResize="1" noEditPoints="1" noAdjustHandles="1" noChangeArrowheads="1" noChangeShapeType="1" noTextEdit="1"/>
+              </p:cNvSpPr>
+              <p:nvPr/>
+            </p:nvSpPr>
+            <p:spPr>
+              <a:xfrm>
+                <a:off x="2855617" y="3673950"/>
+                <a:ext cx="783301" cy="307777"/>
+              </a:xfrm>
+              <a:prstGeom prst="rect">
+                <a:avLst/>
+              </a:prstGeom>
+              <a:blipFill>
+                <a:blip r:embed="rId4"/>
+                <a:stretch>
+                  <a:fillRect l="-1587" t="-4000" b="-20000"/>
+                </a:stretch>
+              </a:blipFill>
+            </p:spPr>
+            <p:txBody>
+              <a:bodyPr/>
+              <a:lstStyle/>
+              <a:p>
+                <a:r>
+                  <a:rPr lang="ja-ES" altLang="en-US">
+                    <a:noFill/>
+                  </a:rPr>
+                  <a:t> </a:t>
+                </a:r>
+              </a:p>
+            </p:txBody>
+          </p:sp>
+        </mc:Fallback>
+      </mc:AlternateContent>
     </p:spTree>
     <p:extLst>
       <p:ext uri="{BB962C8B-B14F-4D97-AF65-F5344CB8AC3E}">
         <p14:creationId xmlns:p14="http://schemas.microsoft.com/office/powerpoint/2010/main" val="1828092857"/>
+      </p:ext>
+    </p:extLst>
+  </p:cSld>
+  <p:clrMapOvr>
+    <a:masterClrMapping/>
+  </p:clrMapOvr>
+</p:sld>
+</file>
+
+<file path=ppt/slides/slide4.xml><?xml version="1.0" encoding="utf-8"?>
+<p:sld xmlns:a="http://schemas.openxmlformats.org/drawingml/2006/main" xmlns:r="http://schemas.openxmlformats.org/officeDocument/2006/relationships" xmlns:p="http://schemas.openxmlformats.org/presentationml/2006/main">
+  <p:cSld>
+    <p:spTree>
+      <p:nvGrpSpPr>
+        <p:cNvPr id="1" name="">
+          <a:extLst>
+            <a:ext uri="{FF2B5EF4-FFF2-40B4-BE49-F238E27FC236}">
+              <a16:creationId xmlns:a16="http://schemas.microsoft.com/office/drawing/2014/main" id="{6E0C56A2-4A3C-912C-F3F8-6D3C5A70B12E}"/>
+            </a:ext>
+          </a:extLst>
+        </p:cNvPr>
+        <p:cNvGrpSpPr/>
+        <p:nvPr/>
+      </p:nvGrpSpPr>
+      <p:grpSpPr>
+        <a:xfrm>
+          <a:off x="0" y="0"/>
+          <a:ext cx="0" cy="0"/>
+          <a:chOff x="0" y="0"/>
+          <a:chExt cx="0" cy="0"/>
+        </a:xfrm>
+      </p:grpSpPr>
+      <p:sp>
+        <p:nvSpPr>
+          <p:cNvPr id="2" name="タイトル 1">
+            <a:extLst>
+              <a:ext uri="{FF2B5EF4-FFF2-40B4-BE49-F238E27FC236}">
+                <a16:creationId xmlns:a16="http://schemas.microsoft.com/office/drawing/2014/main" id="{E0A0F0F7-853F-CA18-BC6E-9D91D9B3F51D}"/>
+              </a:ext>
+            </a:extLst>
+          </p:cNvPr>
+          <p:cNvSpPr>
+            <a:spLocks noGrp="1"/>
+          </p:cNvSpPr>
+          <p:nvPr>
+            <p:ph type="title"/>
+          </p:nvPr>
+        </p:nvSpPr>
+        <p:spPr>
+          <a:xfrm>
+            <a:off x="0" y="-6128"/>
+            <a:ext cx="12192000" cy="1089862"/>
+          </a:xfrm>
+          <a:solidFill>
+            <a:schemeClr val="tx2">
+              <a:lumMod val="25000"/>
+              <a:lumOff val="75000"/>
+            </a:schemeClr>
+          </a:solidFill>
+        </p:spPr>
+        <p:txBody>
+          <a:bodyPr>
+            <a:normAutofit/>
+          </a:bodyPr>
+          <a:lstStyle/>
+          <a:p>
+            <a:r>
+              <a:rPr kumimoji="1" lang="en-US" altLang="ja-JP" sz="3600" dirty="0">
+                <a:latin typeface="Meiryo" panose="020B0604030504040204" pitchFamily="34" charset="-128"/>
+                <a:ea typeface="Meiryo" panose="020B0604030504040204" pitchFamily="34" charset="-128"/>
+              </a:rPr>
+              <a:t>   </a:t>
+            </a:r>
+            <a:r>
+              <a:rPr kumimoji="1" lang="ja-ES" altLang="en-US" sz="3600" dirty="0">
+                <a:latin typeface="Meiryo" panose="020B0604030504040204" pitchFamily="34" charset="-128"/>
+                <a:ea typeface="Meiryo" panose="020B0604030504040204" pitchFamily="34" charset="-128"/>
+              </a:rPr>
+              <a:t>宇宙マイクロ波背景放射</a:t>
+            </a:r>
+            <a:r>
+              <a:rPr kumimoji="1" lang="en-US" altLang="ja-ES" sz="3600" dirty="0">
+                <a:latin typeface="Meiryo" panose="020B0604030504040204" pitchFamily="34" charset="-128"/>
+                <a:ea typeface="Meiryo" panose="020B0604030504040204" pitchFamily="34" charset="-128"/>
+              </a:rPr>
+              <a:t>(CMB)</a:t>
+            </a:r>
+            <a:endParaRPr kumimoji="1" lang="ja-JP" altLang="en-US" sz="2400">
+              <a:latin typeface="Meiryo" panose="020B0604030504040204" pitchFamily="34" charset="-128"/>
+              <a:ea typeface="Meiryo" panose="020B0604030504040204" pitchFamily="34" charset="-128"/>
+            </a:endParaRPr>
+          </a:p>
+        </p:txBody>
+      </p:sp>
+      <p:sp>
+        <p:nvSpPr>
+          <p:cNvPr id="4" name="日付プレースホルダー 3">
+            <a:extLst>
+              <a:ext uri="{FF2B5EF4-FFF2-40B4-BE49-F238E27FC236}">
+                <a16:creationId xmlns:a16="http://schemas.microsoft.com/office/drawing/2014/main" id="{79B334D9-ED85-0F60-396C-69EBA90EEB42}"/>
+              </a:ext>
+            </a:extLst>
+          </p:cNvPr>
+          <p:cNvSpPr>
+            <a:spLocks noGrp="1"/>
+          </p:cNvSpPr>
+          <p:nvPr>
+            <p:ph type="dt" sz="half" idx="10"/>
+          </p:nvPr>
+        </p:nvSpPr>
+        <p:spPr/>
+        <p:txBody>
+          <a:bodyPr/>
+          <a:lstStyle/>
+          <a:p>
+            <a:r>
+              <a:rPr kumimoji="1" lang="en-US" altLang="ja-JP"/>
+              <a:t>2025/2/3</a:t>
+            </a:r>
+            <a:endParaRPr kumimoji="1" lang="ja-JP" altLang="en-US"/>
+          </a:p>
+        </p:txBody>
+      </p:sp>
+      <p:sp>
+        <p:nvSpPr>
+          <p:cNvPr id="6" name="スライド番号プレースホルダー 5">
+            <a:extLst>
+              <a:ext uri="{FF2B5EF4-FFF2-40B4-BE49-F238E27FC236}">
+                <a16:creationId xmlns:a16="http://schemas.microsoft.com/office/drawing/2014/main" id="{A6C719DC-83F5-F678-B12A-13D0801F5BDA}"/>
+              </a:ext>
+            </a:extLst>
+          </p:cNvPr>
+          <p:cNvSpPr>
+            <a:spLocks noGrp="1"/>
+          </p:cNvSpPr>
+          <p:nvPr>
+            <p:ph type="sldNum" sz="quarter" idx="12"/>
+          </p:nvPr>
+        </p:nvSpPr>
+        <p:spPr/>
+        <p:txBody>
+          <a:bodyPr/>
+          <a:lstStyle/>
+          <a:p>
+            <a:fld id="{A346F7B0-2C6C-2749-AD43-9AA6CBC0C428}" type="slidenum">
+              <a:rPr kumimoji="1" lang="ja-JP" altLang="en-US" smtClean="0"/>
+              <a:t>4</a:t>
+            </a:fld>
+            <a:endParaRPr kumimoji="1" lang="ja-JP" altLang="en-US"/>
+          </a:p>
+        </p:txBody>
+      </p:sp>
+      <p:sp>
+        <p:nvSpPr>
+          <p:cNvPr id="9" name="コンテンツ プレースホルダー 2">
+            <a:extLst>
+              <a:ext uri="{FF2B5EF4-FFF2-40B4-BE49-F238E27FC236}">
+                <a16:creationId xmlns:a16="http://schemas.microsoft.com/office/drawing/2014/main" id="{87632D40-0F12-9B4A-5883-C7DE78322207}"/>
+              </a:ext>
+            </a:extLst>
+          </p:cNvPr>
+          <p:cNvSpPr txBox="1">
+            <a:spLocks/>
+          </p:cNvSpPr>
+          <p:nvPr/>
+        </p:nvSpPr>
+        <p:spPr>
+          <a:xfrm>
+            <a:off x="1008890" y="1571559"/>
+            <a:ext cx="10515600" cy="880999"/>
+          </a:xfrm>
+          <a:prstGeom prst="rect">
+            <a:avLst/>
+          </a:prstGeom>
+        </p:spPr>
+        <p:txBody>
+          <a:bodyPr vert="horz" lIns="91440" tIns="45720" rIns="91440" bIns="45720" rtlCol="0">
+            <a:normAutofit/>
+          </a:bodyPr>
+          <a:lstStyle>
+            <a:lvl1pPr marL="228600" indent="-228600" algn="l" defTabSz="914400" rtl="0" eaLnBrk="1" latinLnBrk="0" hangingPunct="1">
+              <a:lnSpc>
+                <a:spcPct val="90000"/>
+              </a:lnSpc>
+              <a:spcBef>
+                <a:spcPts val="1000"/>
+              </a:spcBef>
+              <a:buFont typeface="Arial" panose="020B0604020202020204" pitchFamily="34" charset="0"/>
+              <a:buChar char="•"/>
+              <a:defRPr kumimoji="1" sz="2800" kern="1200">
+                <a:solidFill>
+                  <a:schemeClr val="tx1"/>
+                </a:solidFill>
+                <a:latin typeface="+mn-lt"/>
+                <a:ea typeface="+mn-ea"/>
+                <a:cs typeface="+mn-cs"/>
+              </a:defRPr>
+            </a:lvl1pPr>
+            <a:lvl2pPr marL="685800" indent="-228600" algn="l" defTabSz="914400" rtl="0" eaLnBrk="1" latinLnBrk="0" hangingPunct="1">
+              <a:lnSpc>
+                <a:spcPct val="90000"/>
+              </a:lnSpc>
+              <a:spcBef>
+                <a:spcPts val="500"/>
+              </a:spcBef>
+              <a:buFont typeface="Arial" panose="020B0604020202020204" pitchFamily="34" charset="0"/>
+              <a:buChar char="•"/>
+              <a:defRPr kumimoji="1" sz="2400" kern="1200">
+                <a:solidFill>
+                  <a:schemeClr val="tx1"/>
+                </a:solidFill>
+                <a:latin typeface="+mn-lt"/>
+                <a:ea typeface="+mn-ea"/>
+                <a:cs typeface="+mn-cs"/>
+              </a:defRPr>
+            </a:lvl2pPr>
+            <a:lvl3pPr marL="1143000" indent="-228600" algn="l" defTabSz="914400" rtl="0" eaLnBrk="1" latinLnBrk="0" hangingPunct="1">
+              <a:lnSpc>
+                <a:spcPct val="90000"/>
+              </a:lnSpc>
+              <a:spcBef>
+                <a:spcPts val="500"/>
+              </a:spcBef>
+              <a:buFont typeface="Arial" panose="020B0604020202020204" pitchFamily="34" charset="0"/>
+              <a:buChar char="•"/>
+              <a:defRPr kumimoji="1" sz="2000" kern="1200">
+                <a:solidFill>
+                  <a:schemeClr val="tx1"/>
+                </a:solidFill>
+                <a:latin typeface="+mn-lt"/>
+                <a:ea typeface="+mn-ea"/>
+                <a:cs typeface="+mn-cs"/>
+              </a:defRPr>
+            </a:lvl3pPr>
+            <a:lvl4pPr marL="1600200" indent="-228600" algn="l" defTabSz="914400" rtl="0" eaLnBrk="1" latinLnBrk="0" hangingPunct="1">
+              <a:lnSpc>
+                <a:spcPct val="90000"/>
+              </a:lnSpc>
+              <a:spcBef>
+                <a:spcPts val="500"/>
+              </a:spcBef>
+              <a:buFont typeface="Arial" panose="020B0604020202020204" pitchFamily="34" charset="0"/>
+              <a:buChar char="•"/>
+              <a:defRPr kumimoji="1" sz="1800" kern="1200">
+                <a:solidFill>
+                  <a:schemeClr val="tx1"/>
+                </a:solidFill>
+                <a:latin typeface="+mn-lt"/>
+                <a:ea typeface="+mn-ea"/>
+                <a:cs typeface="+mn-cs"/>
+              </a:defRPr>
+            </a:lvl4pPr>
+            <a:lvl5pPr marL="2057400" indent="-228600" algn="l" defTabSz="914400" rtl="0" eaLnBrk="1" latinLnBrk="0" hangingPunct="1">
+              <a:lnSpc>
+                <a:spcPct val="90000"/>
+              </a:lnSpc>
+              <a:spcBef>
+                <a:spcPts val="500"/>
+              </a:spcBef>
+              <a:buFont typeface="Arial" panose="020B0604020202020204" pitchFamily="34" charset="0"/>
+              <a:buChar char="•"/>
+              <a:defRPr kumimoji="1" sz="1800" kern="1200">
+                <a:solidFill>
+                  <a:schemeClr val="tx1"/>
+                </a:solidFill>
+                <a:latin typeface="+mn-lt"/>
+                <a:ea typeface="+mn-ea"/>
+                <a:cs typeface="+mn-cs"/>
+              </a:defRPr>
+            </a:lvl5pPr>
+            <a:lvl6pPr marL="2514600" indent="-228600" algn="l" defTabSz="914400" rtl="0" eaLnBrk="1" latinLnBrk="0" hangingPunct="1">
+              <a:lnSpc>
+                <a:spcPct val="90000"/>
+              </a:lnSpc>
+              <a:spcBef>
+                <a:spcPts val="500"/>
+              </a:spcBef>
+              <a:buFont typeface="Arial" panose="020B0604020202020204" pitchFamily="34" charset="0"/>
+              <a:buChar char="•"/>
+              <a:defRPr kumimoji="1" sz="1800" kern="1200">
+                <a:solidFill>
+                  <a:schemeClr val="tx1"/>
+                </a:solidFill>
+                <a:latin typeface="+mn-lt"/>
+                <a:ea typeface="+mn-ea"/>
+                <a:cs typeface="+mn-cs"/>
+              </a:defRPr>
+            </a:lvl6pPr>
+            <a:lvl7pPr marL="2971800" indent="-228600" algn="l" defTabSz="914400" rtl="0" eaLnBrk="1" latinLnBrk="0" hangingPunct="1">
+              <a:lnSpc>
+                <a:spcPct val="90000"/>
+              </a:lnSpc>
+              <a:spcBef>
+                <a:spcPts val="500"/>
+              </a:spcBef>
+              <a:buFont typeface="Arial" panose="020B0604020202020204" pitchFamily="34" charset="0"/>
+              <a:buChar char="•"/>
+              <a:defRPr kumimoji="1" sz="1800" kern="1200">
+                <a:solidFill>
+                  <a:schemeClr val="tx1"/>
+                </a:solidFill>
+                <a:latin typeface="+mn-lt"/>
+                <a:ea typeface="+mn-ea"/>
+                <a:cs typeface="+mn-cs"/>
+              </a:defRPr>
+            </a:lvl7pPr>
+            <a:lvl8pPr marL="3429000" indent="-228600" algn="l" defTabSz="914400" rtl="0" eaLnBrk="1" latinLnBrk="0" hangingPunct="1">
+              <a:lnSpc>
+                <a:spcPct val="90000"/>
+              </a:lnSpc>
+              <a:spcBef>
+                <a:spcPts val="500"/>
+              </a:spcBef>
+              <a:buFont typeface="Arial" panose="020B0604020202020204" pitchFamily="34" charset="0"/>
+              <a:buChar char="•"/>
+              <a:defRPr kumimoji="1" sz="1800" kern="1200">
+                <a:solidFill>
+                  <a:schemeClr val="tx1"/>
+                </a:solidFill>
+                <a:latin typeface="+mn-lt"/>
+                <a:ea typeface="+mn-ea"/>
+                <a:cs typeface="+mn-cs"/>
+              </a:defRPr>
+            </a:lvl8pPr>
+            <a:lvl9pPr marL="3886200" indent="-228600" algn="l" defTabSz="914400" rtl="0" eaLnBrk="1" latinLnBrk="0" hangingPunct="1">
+              <a:lnSpc>
+                <a:spcPct val="90000"/>
+              </a:lnSpc>
+              <a:spcBef>
+                <a:spcPts val="500"/>
+              </a:spcBef>
+              <a:buFont typeface="Arial" panose="020B0604020202020204" pitchFamily="34" charset="0"/>
+              <a:buChar char="•"/>
+              <a:defRPr kumimoji="1" sz="1800" kern="1200">
+                <a:solidFill>
+                  <a:schemeClr val="tx1"/>
+                </a:solidFill>
+                <a:latin typeface="+mn-lt"/>
+                <a:ea typeface="+mn-ea"/>
+                <a:cs typeface="+mn-cs"/>
+              </a:defRPr>
+            </a:lvl9pPr>
+          </a:lstStyle>
+          <a:p>
+            <a:pPr marL="0" indent="0">
+              <a:buFont typeface="Arial" panose="020B0604020202020204" pitchFamily="34" charset="0"/>
+              <a:buNone/>
+            </a:pPr>
+            <a:endParaRPr lang="ja-JP" altLang="en-US">
+              <a:latin typeface="Meiryo" panose="020B0604030504040204" pitchFamily="34" charset="-128"/>
+              <a:ea typeface="Meiryo" panose="020B0604030504040204" pitchFamily="34" charset="-128"/>
+            </a:endParaRPr>
+          </a:p>
+        </p:txBody>
+      </p:sp>
+      <p:sp>
+        <p:nvSpPr>
+          <p:cNvPr id="3" name="フッター プレースホルダー 2">
+            <a:extLst>
+              <a:ext uri="{FF2B5EF4-FFF2-40B4-BE49-F238E27FC236}">
+                <a16:creationId xmlns:a16="http://schemas.microsoft.com/office/drawing/2014/main" id="{13DA2DEB-1AB6-93F6-433B-908EB58893FE}"/>
+              </a:ext>
+            </a:extLst>
+          </p:cNvPr>
+          <p:cNvSpPr>
+            <a:spLocks noGrp="1"/>
+          </p:cNvSpPr>
+          <p:nvPr>
+            <p:ph type="ftr" sz="quarter" idx="11"/>
+          </p:nvPr>
+        </p:nvSpPr>
+        <p:spPr/>
+        <p:txBody>
+          <a:bodyPr/>
+          <a:lstStyle/>
+          <a:p>
+            <a:r>
+              <a:rPr kumimoji="1" lang="ja-JP" altLang="en-US"/>
+              <a:t>修論発表会</a:t>
+            </a:r>
+            <a:endParaRPr kumimoji="1" lang="ja-ES" altLang="en-US"/>
+          </a:p>
+        </p:txBody>
+      </p:sp>
+    </p:spTree>
+    <p:extLst>
+      <p:ext uri="{BB962C8B-B14F-4D97-AF65-F5344CB8AC3E}">
+        <p14:creationId xmlns:p14="http://schemas.microsoft.com/office/powerpoint/2010/main" val="2283897273"/>
+      </p:ext>
+    </p:extLst>
+  </p:cSld>
+  <p:clrMapOvr>
+    <a:masterClrMapping/>
+  </p:clrMapOvr>
+</p:sld>
+</file>
+
+<file path=ppt/slides/slide5.xml><?xml version="1.0" encoding="utf-8"?>
+<p:sld xmlns:a="http://schemas.openxmlformats.org/drawingml/2006/main" xmlns:r="http://schemas.openxmlformats.org/officeDocument/2006/relationships" xmlns:p="http://schemas.openxmlformats.org/presentationml/2006/main">
+  <p:cSld>
+    <p:spTree>
+      <p:nvGrpSpPr>
+        <p:cNvPr id="1" name="">
+          <a:extLst>
+            <a:ext uri="{FF2B5EF4-FFF2-40B4-BE49-F238E27FC236}">
+              <a16:creationId xmlns:a16="http://schemas.microsoft.com/office/drawing/2014/main" id="{8C17F089-01FA-8687-5FF9-CDF79E4D5577}"/>
+            </a:ext>
+          </a:extLst>
+        </p:cNvPr>
+        <p:cNvGrpSpPr/>
+        <p:nvPr/>
+      </p:nvGrpSpPr>
+      <p:grpSpPr>
+        <a:xfrm>
+          <a:off x="0" y="0"/>
+          <a:ext cx="0" cy="0"/>
+          <a:chOff x="0" y="0"/>
+          <a:chExt cx="0" cy="0"/>
+        </a:xfrm>
+      </p:grpSpPr>
+      <p:sp>
+        <p:nvSpPr>
+          <p:cNvPr id="2" name="タイトル 1">
+            <a:extLst>
+              <a:ext uri="{FF2B5EF4-FFF2-40B4-BE49-F238E27FC236}">
+                <a16:creationId xmlns:a16="http://schemas.microsoft.com/office/drawing/2014/main" id="{8115C4B4-B927-6D78-13F8-E77462D11B31}"/>
+              </a:ext>
+            </a:extLst>
+          </p:cNvPr>
+          <p:cNvSpPr>
+            <a:spLocks noGrp="1"/>
+          </p:cNvSpPr>
+          <p:nvPr>
+            <p:ph type="title"/>
+          </p:nvPr>
+        </p:nvSpPr>
+        <p:spPr>
+          <a:xfrm>
+            <a:off x="0" y="-6128"/>
+            <a:ext cx="12192000" cy="1089862"/>
+          </a:xfrm>
+          <a:solidFill>
+            <a:schemeClr val="tx2">
+              <a:lumMod val="25000"/>
+              <a:lumOff val="75000"/>
+            </a:schemeClr>
+          </a:solidFill>
+        </p:spPr>
+        <p:txBody>
+          <a:bodyPr>
+            <a:normAutofit/>
+          </a:bodyPr>
+          <a:lstStyle/>
+          <a:p>
+            <a:r>
+              <a:rPr kumimoji="1" lang="en-US" altLang="ja-JP" sz="3600" dirty="0">
+                <a:latin typeface="Meiryo" panose="020B0604030504040204" pitchFamily="34" charset="-128"/>
+                <a:ea typeface="Meiryo" panose="020B0604030504040204" pitchFamily="34" charset="-128"/>
+              </a:rPr>
+              <a:t>   </a:t>
+            </a:r>
+            <a:r>
+              <a:rPr kumimoji="1" lang="ja-ES" altLang="en-US" sz="3600" dirty="0">
+                <a:latin typeface="Meiryo" panose="020B0604030504040204" pitchFamily="34" charset="-128"/>
+                <a:ea typeface="Meiryo" panose="020B0604030504040204" pitchFamily="34" charset="-128"/>
+              </a:rPr>
+              <a:t>宇宙マイクロ波背景放射</a:t>
+            </a:r>
+            <a:r>
+              <a:rPr kumimoji="1" lang="en-US" altLang="ja-ES" sz="3600" dirty="0">
+                <a:latin typeface="Meiryo" panose="020B0604030504040204" pitchFamily="34" charset="-128"/>
+                <a:ea typeface="Meiryo" panose="020B0604030504040204" pitchFamily="34" charset="-128"/>
+              </a:rPr>
+              <a:t>(CMB)</a:t>
+            </a:r>
+            <a:endParaRPr kumimoji="1" lang="ja-JP" altLang="en-US" sz="2400">
+              <a:latin typeface="Meiryo" panose="020B0604030504040204" pitchFamily="34" charset="-128"/>
+              <a:ea typeface="Meiryo" panose="020B0604030504040204" pitchFamily="34" charset="-128"/>
+            </a:endParaRPr>
+          </a:p>
+        </p:txBody>
+      </p:sp>
+      <p:sp>
+        <p:nvSpPr>
+          <p:cNvPr id="4" name="日付プレースホルダー 3">
+            <a:extLst>
+              <a:ext uri="{FF2B5EF4-FFF2-40B4-BE49-F238E27FC236}">
+                <a16:creationId xmlns:a16="http://schemas.microsoft.com/office/drawing/2014/main" id="{E0F67EB0-3DCC-9EF7-18E3-77875B6C9297}"/>
+              </a:ext>
+            </a:extLst>
+          </p:cNvPr>
+          <p:cNvSpPr>
+            <a:spLocks noGrp="1"/>
+          </p:cNvSpPr>
+          <p:nvPr>
+            <p:ph type="dt" sz="half" idx="10"/>
+          </p:nvPr>
+        </p:nvSpPr>
+        <p:spPr/>
+        <p:txBody>
+          <a:bodyPr/>
+          <a:lstStyle/>
+          <a:p>
+            <a:r>
+              <a:rPr kumimoji="1" lang="en-US" altLang="ja-JP"/>
+              <a:t>2025/2/3</a:t>
+            </a:r>
+            <a:endParaRPr kumimoji="1" lang="ja-JP" altLang="en-US"/>
+          </a:p>
+        </p:txBody>
+      </p:sp>
+      <p:sp>
+        <p:nvSpPr>
+          <p:cNvPr id="6" name="スライド番号プレースホルダー 5">
+            <a:extLst>
+              <a:ext uri="{FF2B5EF4-FFF2-40B4-BE49-F238E27FC236}">
+                <a16:creationId xmlns:a16="http://schemas.microsoft.com/office/drawing/2014/main" id="{9EBD5B6D-6B58-2E10-3846-A3599F5B8CA0}"/>
+              </a:ext>
+            </a:extLst>
+          </p:cNvPr>
+          <p:cNvSpPr>
+            <a:spLocks noGrp="1"/>
+          </p:cNvSpPr>
+          <p:nvPr>
+            <p:ph type="sldNum" sz="quarter" idx="12"/>
+          </p:nvPr>
+        </p:nvSpPr>
+        <p:spPr/>
+        <p:txBody>
+          <a:bodyPr/>
+          <a:lstStyle/>
+          <a:p>
+            <a:fld id="{A346F7B0-2C6C-2749-AD43-9AA6CBC0C428}" type="slidenum">
+              <a:rPr kumimoji="1" lang="ja-JP" altLang="en-US" smtClean="0"/>
+              <a:t>5</a:t>
+            </a:fld>
+            <a:endParaRPr kumimoji="1" lang="ja-JP" altLang="en-US"/>
+          </a:p>
+        </p:txBody>
+      </p:sp>
+      <p:sp>
+        <p:nvSpPr>
+          <p:cNvPr id="9" name="コンテンツ プレースホルダー 2">
+            <a:extLst>
+              <a:ext uri="{FF2B5EF4-FFF2-40B4-BE49-F238E27FC236}">
+                <a16:creationId xmlns:a16="http://schemas.microsoft.com/office/drawing/2014/main" id="{233C107A-CAF2-51AD-E1E1-CDB9A2B9FAD0}"/>
+              </a:ext>
+            </a:extLst>
+          </p:cNvPr>
+          <p:cNvSpPr txBox="1">
+            <a:spLocks/>
+          </p:cNvSpPr>
+          <p:nvPr/>
+        </p:nvSpPr>
+        <p:spPr>
+          <a:xfrm>
+            <a:off x="1008890" y="1571559"/>
+            <a:ext cx="10515600" cy="880999"/>
+          </a:xfrm>
+          <a:prstGeom prst="rect">
+            <a:avLst/>
+          </a:prstGeom>
+        </p:spPr>
+        <p:txBody>
+          <a:bodyPr vert="horz" lIns="91440" tIns="45720" rIns="91440" bIns="45720" rtlCol="0">
+            <a:normAutofit/>
+          </a:bodyPr>
+          <a:lstStyle>
+            <a:lvl1pPr marL="228600" indent="-228600" algn="l" defTabSz="914400" rtl="0" eaLnBrk="1" latinLnBrk="0" hangingPunct="1">
+              <a:lnSpc>
+                <a:spcPct val="90000"/>
+              </a:lnSpc>
+              <a:spcBef>
+                <a:spcPts val="1000"/>
+              </a:spcBef>
+              <a:buFont typeface="Arial" panose="020B0604020202020204" pitchFamily="34" charset="0"/>
+              <a:buChar char="•"/>
+              <a:defRPr kumimoji="1" sz="2800" kern="1200">
+                <a:solidFill>
+                  <a:schemeClr val="tx1"/>
+                </a:solidFill>
+                <a:latin typeface="+mn-lt"/>
+                <a:ea typeface="+mn-ea"/>
+                <a:cs typeface="+mn-cs"/>
+              </a:defRPr>
+            </a:lvl1pPr>
+            <a:lvl2pPr marL="685800" indent="-228600" algn="l" defTabSz="914400" rtl="0" eaLnBrk="1" latinLnBrk="0" hangingPunct="1">
+              <a:lnSpc>
+                <a:spcPct val="90000"/>
+              </a:lnSpc>
+              <a:spcBef>
+                <a:spcPts val="500"/>
+              </a:spcBef>
+              <a:buFont typeface="Arial" panose="020B0604020202020204" pitchFamily="34" charset="0"/>
+              <a:buChar char="•"/>
+              <a:defRPr kumimoji="1" sz="2400" kern="1200">
+                <a:solidFill>
+                  <a:schemeClr val="tx1"/>
+                </a:solidFill>
+                <a:latin typeface="+mn-lt"/>
+                <a:ea typeface="+mn-ea"/>
+                <a:cs typeface="+mn-cs"/>
+              </a:defRPr>
+            </a:lvl2pPr>
+            <a:lvl3pPr marL="1143000" indent="-228600" algn="l" defTabSz="914400" rtl="0" eaLnBrk="1" latinLnBrk="0" hangingPunct="1">
+              <a:lnSpc>
+                <a:spcPct val="90000"/>
+              </a:lnSpc>
+              <a:spcBef>
+                <a:spcPts val="500"/>
+              </a:spcBef>
+              <a:buFont typeface="Arial" panose="020B0604020202020204" pitchFamily="34" charset="0"/>
+              <a:buChar char="•"/>
+              <a:defRPr kumimoji="1" sz="2000" kern="1200">
+                <a:solidFill>
+                  <a:schemeClr val="tx1"/>
+                </a:solidFill>
+                <a:latin typeface="+mn-lt"/>
+                <a:ea typeface="+mn-ea"/>
+                <a:cs typeface="+mn-cs"/>
+              </a:defRPr>
+            </a:lvl3pPr>
+            <a:lvl4pPr marL="1600200" indent="-228600" algn="l" defTabSz="914400" rtl="0" eaLnBrk="1" latinLnBrk="0" hangingPunct="1">
+              <a:lnSpc>
+                <a:spcPct val="90000"/>
+              </a:lnSpc>
+              <a:spcBef>
+                <a:spcPts val="500"/>
+              </a:spcBef>
+              <a:buFont typeface="Arial" panose="020B0604020202020204" pitchFamily="34" charset="0"/>
+              <a:buChar char="•"/>
+              <a:defRPr kumimoji="1" sz="1800" kern="1200">
+                <a:solidFill>
+                  <a:schemeClr val="tx1"/>
+                </a:solidFill>
+                <a:latin typeface="+mn-lt"/>
+                <a:ea typeface="+mn-ea"/>
+                <a:cs typeface="+mn-cs"/>
+              </a:defRPr>
+            </a:lvl4pPr>
+            <a:lvl5pPr marL="2057400" indent="-228600" algn="l" defTabSz="914400" rtl="0" eaLnBrk="1" latinLnBrk="0" hangingPunct="1">
+              <a:lnSpc>
+                <a:spcPct val="90000"/>
+              </a:lnSpc>
+              <a:spcBef>
+                <a:spcPts val="500"/>
+              </a:spcBef>
+              <a:buFont typeface="Arial" panose="020B0604020202020204" pitchFamily="34" charset="0"/>
+              <a:buChar char="•"/>
+              <a:defRPr kumimoji="1" sz="1800" kern="1200">
+                <a:solidFill>
+                  <a:schemeClr val="tx1"/>
+                </a:solidFill>
+                <a:latin typeface="+mn-lt"/>
+                <a:ea typeface="+mn-ea"/>
+                <a:cs typeface="+mn-cs"/>
+              </a:defRPr>
+            </a:lvl5pPr>
+            <a:lvl6pPr marL="2514600" indent="-228600" algn="l" defTabSz="914400" rtl="0" eaLnBrk="1" latinLnBrk="0" hangingPunct="1">
+              <a:lnSpc>
+                <a:spcPct val="90000"/>
+              </a:lnSpc>
+              <a:spcBef>
+                <a:spcPts val="500"/>
+              </a:spcBef>
+              <a:buFont typeface="Arial" panose="020B0604020202020204" pitchFamily="34" charset="0"/>
+              <a:buChar char="•"/>
+              <a:defRPr kumimoji="1" sz="1800" kern="1200">
+                <a:solidFill>
+                  <a:schemeClr val="tx1"/>
+                </a:solidFill>
+                <a:latin typeface="+mn-lt"/>
+                <a:ea typeface="+mn-ea"/>
+                <a:cs typeface="+mn-cs"/>
+              </a:defRPr>
+            </a:lvl6pPr>
+            <a:lvl7pPr marL="2971800" indent="-228600" algn="l" defTabSz="914400" rtl="0" eaLnBrk="1" latinLnBrk="0" hangingPunct="1">
+              <a:lnSpc>
+                <a:spcPct val="90000"/>
+              </a:lnSpc>
+              <a:spcBef>
+                <a:spcPts val="500"/>
+              </a:spcBef>
+              <a:buFont typeface="Arial" panose="020B0604020202020204" pitchFamily="34" charset="0"/>
+              <a:buChar char="•"/>
+              <a:defRPr kumimoji="1" sz="1800" kern="1200">
+                <a:solidFill>
+                  <a:schemeClr val="tx1"/>
+                </a:solidFill>
+                <a:latin typeface="+mn-lt"/>
+                <a:ea typeface="+mn-ea"/>
+                <a:cs typeface="+mn-cs"/>
+              </a:defRPr>
+            </a:lvl7pPr>
+            <a:lvl8pPr marL="3429000" indent="-228600" algn="l" defTabSz="914400" rtl="0" eaLnBrk="1" latinLnBrk="0" hangingPunct="1">
+              <a:lnSpc>
+                <a:spcPct val="90000"/>
+              </a:lnSpc>
+              <a:spcBef>
+                <a:spcPts val="500"/>
+              </a:spcBef>
+              <a:buFont typeface="Arial" panose="020B0604020202020204" pitchFamily="34" charset="0"/>
+              <a:buChar char="•"/>
+              <a:defRPr kumimoji="1" sz="1800" kern="1200">
+                <a:solidFill>
+                  <a:schemeClr val="tx1"/>
+                </a:solidFill>
+                <a:latin typeface="+mn-lt"/>
+                <a:ea typeface="+mn-ea"/>
+                <a:cs typeface="+mn-cs"/>
+              </a:defRPr>
+            </a:lvl8pPr>
+            <a:lvl9pPr marL="3886200" indent="-228600" algn="l" defTabSz="914400" rtl="0" eaLnBrk="1" latinLnBrk="0" hangingPunct="1">
+              <a:lnSpc>
+                <a:spcPct val="90000"/>
+              </a:lnSpc>
+              <a:spcBef>
+                <a:spcPts val="500"/>
+              </a:spcBef>
+              <a:buFont typeface="Arial" panose="020B0604020202020204" pitchFamily="34" charset="0"/>
+              <a:buChar char="•"/>
+              <a:defRPr kumimoji="1" sz="1800" kern="1200">
+                <a:solidFill>
+                  <a:schemeClr val="tx1"/>
+                </a:solidFill>
+                <a:latin typeface="+mn-lt"/>
+                <a:ea typeface="+mn-ea"/>
+                <a:cs typeface="+mn-cs"/>
+              </a:defRPr>
+            </a:lvl9pPr>
+          </a:lstStyle>
+          <a:p>
+            <a:pPr marL="0" indent="0">
+              <a:buFont typeface="Arial" panose="020B0604020202020204" pitchFamily="34" charset="0"/>
+              <a:buNone/>
+            </a:pPr>
+            <a:endParaRPr lang="ja-JP" altLang="en-US">
+              <a:latin typeface="Meiryo" panose="020B0604030504040204" pitchFamily="34" charset="-128"/>
+              <a:ea typeface="Meiryo" panose="020B0604030504040204" pitchFamily="34" charset="-128"/>
+            </a:endParaRPr>
+          </a:p>
+        </p:txBody>
+      </p:sp>
+      <p:sp>
+        <p:nvSpPr>
+          <p:cNvPr id="3" name="フッター プレースホルダー 2">
+            <a:extLst>
+              <a:ext uri="{FF2B5EF4-FFF2-40B4-BE49-F238E27FC236}">
+                <a16:creationId xmlns:a16="http://schemas.microsoft.com/office/drawing/2014/main" id="{42EBB180-9AF8-E25E-C73D-B4E85A18E754}"/>
+              </a:ext>
+            </a:extLst>
+          </p:cNvPr>
+          <p:cNvSpPr>
+            <a:spLocks noGrp="1"/>
+          </p:cNvSpPr>
+          <p:nvPr>
+            <p:ph type="ftr" sz="quarter" idx="11"/>
+          </p:nvPr>
+        </p:nvSpPr>
+        <p:spPr/>
+        <p:txBody>
+          <a:bodyPr/>
+          <a:lstStyle/>
+          <a:p>
+            <a:r>
+              <a:rPr kumimoji="1" lang="ja-JP" altLang="en-US"/>
+              <a:t>修論発表会</a:t>
+            </a:r>
+            <a:endParaRPr kumimoji="1" lang="ja-ES" altLang="en-US"/>
+          </a:p>
+        </p:txBody>
+      </p:sp>
+    </p:spTree>
+    <p:extLst>
+      <p:ext uri="{BB962C8B-B14F-4D97-AF65-F5344CB8AC3E}">
+        <p14:creationId xmlns:p14="http://schemas.microsoft.com/office/powerpoint/2010/main" val="222617811"/>
+      </p:ext>
+    </p:extLst>
+  </p:cSld>
+  <p:clrMapOvr>
+    <a:masterClrMapping/>
+  </p:clrMapOvr>
+</p:sld>
+</file>
+
+<file path=ppt/slides/slide6.xml><?xml version="1.0" encoding="utf-8"?>
+<p:sld xmlns:a="http://schemas.openxmlformats.org/drawingml/2006/main" xmlns:r="http://schemas.openxmlformats.org/officeDocument/2006/relationships" xmlns:p="http://schemas.openxmlformats.org/presentationml/2006/main">
+  <p:cSld>
+    <p:spTree>
+      <p:nvGrpSpPr>
+        <p:cNvPr id="1" name="">
+          <a:extLst>
+            <a:ext uri="{FF2B5EF4-FFF2-40B4-BE49-F238E27FC236}">
+              <a16:creationId xmlns:a16="http://schemas.microsoft.com/office/drawing/2014/main" id="{0F2838CF-A074-5C0F-9C5B-89E0E4355751}"/>
+            </a:ext>
+          </a:extLst>
+        </p:cNvPr>
+        <p:cNvGrpSpPr/>
+        <p:nvPr/>
+      </p:nvGrpSpPr>
+      <p:grpSpPr>
+        <a:xfrm>
+          <a:off x="0" y="0"/>
+          <a:ext cx="0" cy="0"/>
+          <a:chOff x="0" y="0"/>
+          <a:chExt cx="0" cy="0"/>
+        </a:xfrm>
+      </p:grpSpPr>
+      <p:sp>
+        <p:nvSpPr>
+          <p:cNvPr id="2" name="タイトル 1">
+            <a:extLst>
+              <a:ext uri="{FF2B5EF4-FFF2-40B4-BE49-F238E27FC236}">
+                <a16:creationId xmlns:a16="http://schemas.microsoft.com/office/drawing/2014/main" id="{22B583BF-6754-7B3A-3533-349133556E14}"/>
+              </a:ext>
+            </a:extLst>
+          </p:cNvPr>
+          <p:cNvSpPr>
+            <a:spLocks noGrp="1"/>
+          </p:cNvSpPr>
+          <p:nvPr>
+            <p:ph type="title"/>
+          </p:nvPr>
+        </p:nvSpPr>
+        <p:spPr>
+          <a:xfrm>
+            <a:off x="0" y="-6128"/>
+            <a:ext cx="12192000" cy="1089862"/>
+          </a:xfrm>
+          <a:solidFill>
+            <a:schemeClr val="tx2">
+              <a:lumMod val="25000"/>
+              <a:lumOff val="75000"/>
+            </a:schemeClr>
+          </a:solidFill>
+        </p:spPr>
+        <p:txBody>
+          <a:bodyPr>
+            <a:normAutofit/>
+          </a:bodyPr>
+          <a:lstStyle/>
+          <a:p>
+            <a:r>
+              <a:rPr kumimoji="1" lang="en-US" altLang="ja-JP" sz="3600" dirty="0">
+                <a:latin typeface="Meiryo" panose="020B0604030504040204" pitchFamily="34" charset="-128"/>
+                <a:ea typeface="Meiryo" panose="020B0604030504040204" pitchFamily="34" charset="-128"/>
+              </a:rPr>
+              <a:t>   </a:t>
+            </a:r>
+            <a:r>
+              <a:rPr kumimoji="1" lang="ja-ES" altLang="en-US" sz="3600" dirty="0">
+                <a:latin typeface="Meiryo" panose="020B0604030504040204" pitchFamily="34" charset="-128"/>
+                <a:ea typeface="Meiryo" panose="020B0604030504040204" pitchFamily="34" charset="-128"/>
+              </a:rPr>
+              <a:t>宇宙マイクロ波背景放射</a:t>
+            </a:r>
+            <a:r>
+              <a:rPr kumimoji="1" lang="en-US" altLang="ja-ES" sz="3600" dirty="0">
+                <a:latin typeface="Meiryo" panose="020B0604030504040204" pitchFamily="34" charset="-128"/>
+                <a:ea typeface="Meiryo" panose="020B0604030504040204" pitchFamily="34" charset="-128"/>
+              </a:rPr>
+              <a:t>(CMB)</a:t>
+            </a:r>
+            <a:endParaRPr kumimoji="1" lang="ja-JP" altLang="en-US" sz="2400">
+              <a:latin typeface="Meiryo" panose="020B0604030504040204" pitchFamily="34" charset="-128"/>
+              <a:ea typeface="Meiryo" panose="020B0604030504040204" pitchFamily="34" charset="-128"/>
+            </a:endParaRPr>
+          </a:p>
+        </p:txBody>
+      </p:sp>
+      <p:sp>
+        <p:nvSpPr>
+          <p:cNvPr id="4" name="日付プレースホルダー 3">
+            <a:extLst>
+              <a:ext uri="{FF2B5EF4-FFF2-40B4-BE49-F238E27FC236}">
+                <a16:creationId xmlns:a16="http://schemas.microsoft.com/office/drawing/2014/main" id="{96D0A9F3-5474-85CA-6DE7-2F366E8242ED}"/>
+              </a:ext>
+            </a:extLst>
+          </p:cNvPr>
+          <p:cNvSpPr>
+            <a:spLocks noGrp="1"/>
+          </p:cNvSpPr>
+          <p:nvPr>
+            <p:ph type="dt" sz="half" idx="10"/>
+          </p:nvPr>
+        </p:nvSpPr>
+        <p:spPr/>
+        <p:txBody>
+          <a:bodyPr/>
+          <a:lstStyle/>
+          <a:p>
+            <a:r>
+              <a:rPr kumimoji="1" lang="en-US" altLang="ja-JP"/>
+              <a:t>2025/2/3</a:t>
+            </a:r>
+            <a:endParaRPr kumimoji="1" lang="ja-JP" altLang="en-US"/>
+          </a:p>
+        </p:txBody>
+      </p:sp>
+      <p:sp>
+        <p:nvSpPr>
+          <p:cNvPr id="6" name="スライド番号プレースホルダー 5">
+            <a:extLst>
+              <a:ext uri="{FF2B5EF4-FFF2-40B4-BE49-F238E27FC236}">
+                <a16:creationId xmlns:a16="http://schemas.microsoft.com/office/drawing/2014/main" id="{92FFC9C0-7058-B110-DFD1-CE8F5A833678}"/>
+              </a:ext>
+            </a:extLst>
+          </p:cNvPr>
+          <p:cNvSpPr>
+            <a:spLocks noGrp="1"/>
+          </p:cNvSpPr>
+          <p:nvPr>
+            <p:ph type="sldNum" sz="quarter" idx="12"/>
+          </p:nvPr>
+        </p:nvSpPr>
+        <p:spPr/>
+        <p:txBody>
+          <a:bodyPr/>
+          <a:lstStyle/>
+          <a:p>
+            <a:fld id="{A346F7B0-2C6C-2749-AD43-9AA6CBC0C428}" type="slidenum">
+              <a:rPr kumimoji="1" lang="ja-JP" altLang="en-US" smtClean="0"/>
+              <a:t>6</a:t>
+            </a:fld>
+            <a:endParaRPr kumimoji="1" lang="ja-JP" altLang="en-US"/>
+          </a:p>
+        </p:txBody>
+      </p:sp>
+      <p:sp>
+        <p:nvSpPr>
+          <p:cNvPr id="9" name="コンテンツ プレースホルダー 2">
+            <a:extLst>
+              <a:ext uri="{FF2B5EF4-FFF2-40B4-BE49-F238E27FC236}">
+                <a16:creationId xmlns:a16="http://schemas.microsoft.com/office/drawing/2014/main" id="{0DBB55CF-FFA0-2B6A-C46F-BA3819C06210}"/>
+              </a:ext>
+            </a:extLst>
+          </p:cNvPr>
+          <p:cNvSpPr txBox="1">
+            <a:spLocks/>
+          </p:cNvSpPr>
+          <p:nvPr/>
+        </p:nvSpPr>
+        <p:spPr>
+          <a:xfrm>
+            <a:off x="1008890" y="1571559"/>
+            <a:ext cx="10515600" cy="880999"/>
+          </a:xfrm>
+          <a:prstGeom prst="rect">
+            <a:avLst/>
+          </a:prstGeom>
+        </p:spPr>
+        <p:txBody>
+          <a:bodyPr vert="horz" lIns="91440" tIns="45720" rIns="91440" bIns="45720" rtlCol="0">
+            <a:normAutofit/>
+          </a:bodyPr>
+          <a:lstStyle>
+            <a:lvl1pPr marL="228600" indent="-228600" algn="l" defTabSz="914400" rtl="0" eaLnBrk="1" latinLnBrk="0" hangingPunct="1">
+              <a:lnSpc>
+                <a:spcPct val="90000"/>
+              </a:lnSpc>
+              <a:spcBef>
+                <a:spcPts val="1000"/>
+              </a:spcBef>
+              <a:buFont typeface="Arial" panose="020B0604020202020204" pitchFamily="34" charset="0"/>
+              <a:buChar char="•"/>
+              <a:defRPr kumimoji="1" sz="2800" kern="1200">
+                <a:solidFill>
+                  <a:schemeClr val="tx1"/>
+                </a:solidFill>
+                <a:latin typeface="+mn-lt"/>
+                <a:ea typeface="+mn-ea"/>
+                <a:cs typeface="+mn-cs"/>
+              </a:defRPr>
+            </a:lvl1pPr>
+            <a:lvl2pPr marL="685800" indent="-228600" algn="l" defTabSz="914400" rtl="0" eaLnBrk="1" latinLnBrk="0" hangingPunct="1">
+              <a:lnSpc>
+                <a:spcPct val="90000"/>
+              </a:lnSpc>
+              <a:spcBef>
+                <a:spcPts val="500"/>
+              </a:spcBef>
+              <a:buFont typeface="Arial" panose="020B0604020202020204" pitchFamily="34" charset="0"/>
+              <a:buChar char="•"/>
+              <a:defRPr kumimoji="1" sz="2400" kern="1200">
+                <a:solidFill>
+                  <a:schemeClr val="tx1"/>
+                </a:solidFill>
+                <a:latin typeface="+mn-lt"/>
+                <a:ea typeface="+mn-ea"/>
+                <a:cs typeface="+mn-cs"/>
+              </a:defRPr>
+            </a:lvl2pPr>
+            <a:lvl3pPr marL="1143000" indent="-228600" algn="l" defTabSz="914400" rtl="0" eaLnBrk="1" latinLnBrk="0" hangingPunct="1">
+              <a:lnSpc>
+                <a:spcPct val="90000"/>
+              </a:lnSpc>
+              <a:spcBef>
+                <a:spcPts val="500"/>
+              </a:spcBef>
+              <a:buFont typeface="Arial" panose="020B0604020202020204" pitchFamily="34" charset="0"/>
+              <a:buChar char="•"/>
+              <a:defRPr kumimoji="1" sz="2000" kern="1200">
+                <a:solidFill>
+                  <a:schemeClr val="tx1"/>
+                </a:solidFill>
+                <a:latin typeface="+mn-lt"/>
+                <a:ea typeface="+mn-ea"/>
+                <a:cs typeface="+mn-cs"/>
+              </a:defRPr>
+            </a:lvl3pPr>
+            <a:lvl4pPr marL="1600200" indent="-228600" algn="l" defTabSz="914400" rtl="0" eaLnBrk="1" latinLnBrk="0" hangingPunct="1">
+              <a:lnSpc>
+                <a:spcPct val="90000"/>
+              </a:lnSpc>
+              <a:spcBef>
+                <a:spcPts val="500"/>
+              </a:spcBef>
+              <a:buFont typeface="Arial" panose="020B0604020202020204" pitchFamily="34" charset="0"/>
+              <a:buChar char="•"/>
+              <a:defRPr kumimoji="1" sz="1800" kern="1200">
+                <a:solidFill>
+                  <a:schemeClr val="tx1"/>
+                </a:solidFill>
+                <a:latin typeface="+mn-lt"/>
+                <a:ea typeface="+mn-ea"/>
+                <a:cs typeface="+mn-cs"/>
+              </a:defRPr>
+            </a:lvl4pPr>
+            <a:lvl5pPr marL="2057400" indent="-228600" algn="l" defTabSz="914400" rtl="0" eaLnBrk="1" latinLnBrk="0" hangingPunct="1">
+              <a:lnSpc>
+                <a:spcPct val="90000"/>
+              </a:lnSpc>
+              <a:spcBef>
+                <a:spcPts val="500"/>
+              </a:spcBef>
+              <a:buFont typeface="Arial" panose="020B0604020202020204" pitchFamily="34" charset="0"/>
+              <a:buChar char="•"/>
+              <a:defRPr kumimoji="1" sz="1800" kern="1200">
+                <a:solidFill>
+                  <a:schemeClr val="tx1"/>
+                </a:solidFill>
+                <a:latin typeface="+mn-lt"/>
+                <a:ea typeface="+mn-ea"/>
+                <a:cs typeface="+mn-cs"/>
+              </a:defRPr>
+            </a:lvl5pPr>
+            <a:lvl6pPr marL="2514600" indent="-228600" algn="l" defTabSz="914400" rtl="0" eaLnBrk="1" latinLnBrk="0" hangingPunct="1">
+              <a:lnSpc>
+                <a:spcPct val="90000"/>
+              </a:lnSpc>
+              <a:spcBef>
+                <a:spcPts val="500"/>
+              </a:spcBef>
+              <a:buFont typeface="Arial" panose="020B0604020202020204" pitchFamily="34" charset="0"/>
+              <a:buChar char="•"/>
+              <a:defRPr kumimoji="1" sz="1800" kern="1200">
+                <a:solidFill>
+                  <a:schemeClr val="tx1"/>
+                </a:solidFill>
+                <a:latin typeface="+mn-lt"/>
+                <a:ea typeface="+mn-ea"/>
+                <a:cs typeface="+mn-cs"/>
+              </a:defRPr>
+            </a:lvl6pPr>
+            <a:lvl7pPr marL="2971800" indent="-228600" algn="l" defTabSz="914400" rtl="0" eaLnBrk="1" latinLnBrk="0" hangingPunct="1">
+              <a:lnSpc>
+                <a:spcPct val="90000"/>
+              </a:lnSpc>
+              <a:spcBef>
+                <a:spcPts val="500"/>
+              </a:spcBef>
+              <a:buFont typeface="Arial" panose="020B0604020202020204" pitchFamily="34" charset="0"/>
+              <a:buChar char="•"/>
+              <a:defRPr kumimoji="1" sz="1800" kern="1200">
+                <a:solidFill>
+                  <a:schemeClr val="tx1"/>
+                </a:solidFill>
+                <a:latin typeface="+mn-lt"/>
+                <a:ea typeface="+mn-ea"/>
+                <a:cs typeface="+mn-cs"/>
+              </a:defRPr>
+            </a:lvl7pPr>
+            <a:lvl8pPr marL="3429000" indent="-228600" algn="l" defTabSz="914400" rtl="0" eaLnBrk="1" latinLnBrk="0" hangingPunct="1">
+              <a:lnSpc>
+                <a:spcPct val="90000"/>
+              </a:lnSpc>
+              <a:spcBef>
+                <a:spcPts val="500"/>
+              </a:spcBef>
+              <a:buFont typeface="Arial" panose="020B0604020202020204" pitchFamily="34" charset="0"/>
+              <a:buChar char="•"/>
+              <a:defRPr kumimoji="1" sz="1800" kern="1200">
+                <a:solidFill>
+                  <a:schemeClr val="tx1"/>
+                </a:solidFill>
+                <a:latin typeface="+mn-lt"/>
+                <a:ea typeface="+mn-ea"/>
+                <a:cs typeface="+mn-cs"/>
+              </a:defRPr>
+            </a:lvl8pPr>
+            <a:lvl9pPr marL="3886200" indent="-228600" algn="l" defTabSz="914400" rtl="0" eaLnBrk="1" latinLnBrk="0" hangingPunct="1">
+              <a:lnSpc>
+                <a:spcPct val="90000"/>
+              </a:lnSpc>
+              <a:spcBef>
+                <a:spcPts val="500"/>
+              </a:spcBef>
+              <a:buFont typeface="Arial" panose="020B0604020202020204" pitchFamily="34" charset="0"/>
+              <a:buChar char="•"/>
+              <a:defRPr kumimoji="1" sz="1800" kern="1200">
+                <a:solidFill>
+                  <a:schemeClr val="tx1"/>
+                </a:solidFill>
+                <a:latin typeface="+mn-lt"/>
+                <a:ea typeface="+mn-ea"/>
+                <a:cs typeface="+mn-cs"/>
+              </a:defRPr>
+            </a:lvl9pPr>
+          </a:lstStyle>
+          <a:p>
+            <a:pPr marL="0" indent="0">
+              <a:buFont typeface="Arial" panose="020B0604020202020204" pitchFamily="34" charset="0"/>
+              <a:buNone/>
+            </a:pPr>
+            <a:endParaRPr lang="ja-JP" altLang="en-US">
+              <a:latin typeface="Meiryo" panose="020B0604030504040204" pitchFamily="34" charset="-128"/>
+              <a:ea typeface="Meiryo" panose="020B0604030504040204" pitchFamily="34" charset="-128"/>
+            </a:endParaRPr>
+          </a:p>
+        </p:txBody>
+      </p:sp>
+      <p:sp>
+        <p:nvSpPr>
+          <p:cNvPr id="3" name="フッター プレースホルダー 2">
+            <a:extLst>
+              <a:ext uri="{FF2B5EF4-FFF2-40B4-BE49-F238E27FC236}">
+                <a16:creationId xmlns:a16="http://schemas.microsoft.com/office/drawing/2014/main" id="{AC8BA845-6E8E-7AAA-3249-FAC9D1DD93F1}"/>
+              </a:ext>
+            </a:extLst>
+          </p:cNvPr>
+          <p:cNvSpPr>
+            <a:spLocks noGrp="1"/>
+          </p:cNvSpPr>
+          <p:nvPr>
+            <p:ph type="ftr" sz="quarter" idx="11"/>
+          </p:nvPr>
+        </p:nvSpPr>
+        <p:spPr/>
+        <p:txBody>
+          <a:bodyPr/>
+          <a:lstStyle/>
+          <a:p>
+            <a:r>
+              <a:rPr kumimoji="1" lang="ja-JP" altLang="en-US"/>
+              <a:t>修論発表会</a:t>
+            </a:r>
+            <a:endParaRPr kumimoji="1" lang="ja-ES" altLang="en-US"/>
+          </a:p>
+        </p:txBody>
+      </p:sp>
+    </p:spTree>
+    <p:extLst>
+      <p:ext uri="{BB962C8B-B14F-4D97-AF65-F5344CB8AC3E}">
+        <p14:creationId xmlns:p14="http://schemas.microsoft.com/office/powerpoint/2010/main" val="2886088103"/>
+      </p:ext>
+    </p:extLst>
+  </p:cSld>
+  <p:clrMapOvr>
+    <a:masterClrMapping/>
+  </p:clrMapOvr>
+</p:sld>
+</file>
+
+<file path=ppt/slides/slide7.xml><?xml version="1.0" encoding="utf-8"?>
+<p:sld xmlns:a="http://schemas.openxmlformats.org/drawingml/2006/main" xmlns:r="http://schemas.openxmlformats.org/officeDocument/2006/relationships" xmlns:p="http://schemas.openxmlformats.org/presentationml/2006/main">
+  <p:cSld>
+    <p:spTree>
+      <p:nvGrpSpPr>
+        <p:cNvPr id="1" name="">
+          <a:extLst>
+            <a:ext uri="{FF2B5EF4-FFF2-40B4-BE49-F238E27FC236}">
+              <a16:creationId xmlns:a16="http://schemas.microsoft.com/office/drawing/2014/main" id="{E3E520B2-568E-A193-805D-0E25D39AF737}"/>
+            </a:ext>
+          </a:extLst>
+        </p:cNvPr>
+        <p:cNvGrpSpPr/>
+        <p:nvPr/>
+      </p:nvGrpSpPr>
+      <p:grpSpPr>
+        <a:xfrm>
+          <a:off x="0" y="0"/>
+          <a:ext cx="0" cy="0"/>
+          <a:chOff x="0" y="0"/>
+          <a:chExt cx="0" cy="0"/>
+        </a:xfrm>
+      </p:grpSpPr>
+      <p:sp>
+        <p:nvSpPr>
+          <p:cNvPr id="2" name="タイトル 1">
+            <a:extLst>
+              <a:ext uri="{FF2B5EF4-FFF2-40B4-BE49-F238E27FC236}">
+                <a16:creationId xmlns:a16="http://schemas.microsoft.com/office/drawing/2014/main" id="{D9959476-7013-1D4F-2B6E-4659F209A8B9}"/>
+              </a:ext>
+            </a:extLst>
+          </p:cNvPr>
+          <p:cNvSpPr>
+            <a:spLocks noGrp="1"/>
+          </p:cNvSpPr>
+          <p:nvPr>
+            <p:ph type="title"/>
+          </p:nvPr>
+        </p:nvSpPr>
+        <p:spPr>
+          <a:xfrm>
+            <a:off x="0" y="-6128"/>
+            <a:ext cx="12192000" cy="1089862"/>
+          </a:xfrm>
+          <a:solidFill>
+            <a:schemeClr val="tx2">
+              <a:lumMod val="25000"/>
+              <a:lumOff val="75000"/>
+            </a:schemeClr>
+          </a:solidFill>
+        </p:spPr>
+        <p:txBody>
+          <a:bodyPr>
+            <a:normAutofit/>
+          </a:bodyPr>
+          <a:lstStyle/>
+          <a:p>
+            <a:r>
+              <a:rPr kumimoji="1" lang="en-US" altLang="ja-JP" sz="3600" dirty="0">
+                <a:latin typeface="Meiryo" panose="020B0604030504040204" pitchFamily="34" charset="-128"/>
+                <a:ea typeface="Meiryo" panose="020B0604030504040204" pitchFamily="34" charset="-128"/>
+              </a:rPr>
+              <a:t>   </a:t>
+            </a:r>
+            <a:r>
+              <a:rPr kumimoji="1" lang="ja-ES" altLang="en-US" sz="3600" dirty="0">
+                <a:latin typeface="Meiryo" panose="020B0604030504040204" pitchFamily="34" charset="-128"/>
+                <a:ea typeface="Meiryo" panose="020B0604030504040204" pitchFamily="34" charset="-128"/>
+              </a:rPr>
+              <a:t>宇宙マイクロ波背景放射</a:t>
+            </a:r>
+            <a:r>
+              <a:rPr kumimoji="1" lang="en-US" altLang="ja-ES" sz="3600" dirty="0">
+                <a:latin typeface="Meiryo" panose="020B0604030504040204" pitchFamily="34" charset="-128"/>
+                <a:ea typeface="Meiryo" panose="020B0604030504040204" pitchFamily="34" charset="-128"/>
+              </a:rPr>
+              <a:t>(CMB)</a:t>
+            </a:r>
+            <a:endParaRPr kumimoji="1" lang="ja-JP" altLang="en-US" sz="2400">
+              <a:latin typeface="Meiryo" panose="020B0604030504040204" pitchFamily="34" charset="-128"/>
+              <a:ea typeface="Meiryo" panose="020B0604030504040204" pitchFamily="34" charset="-128"/>
+            </a:endParaRPr>
+          </a:p>
+        </p:txBody>
+      </p:sp>
+      <p:sp>
+        <p:nvSpPr>
+          <p:cNvPr id="4" name="日付プレースホルダー 3">
+            <a:extLst>
+              <a:ext uri="{FF2B5EF4-FFF2-40B4-BE49-F238E27FC236}">
+                <a16:creationId xmlns:a16="http://schemas.microsoft.com/office/drawing/2014/main" id="{9546D49A-EC06-B784-B6E9-50E661266D80}"/>
+              </a:ext>
+            </a:extLst>
+          </p:cNvPr>
+          <p:cNvSpPr>
+            <a:spLocks noGrp="1"/>
+          </p:cNvSpPr>
+          <p:nvPr>
+            <p:ph type="dt" sz="half" idx="10"/>
+          </p:nvPr>
+        </p:nvSpPr>
+        <p:spPr/>
+        <p:txBody>
+          <a:bodyPr/>
+          <a:lstStyle/>
+          <a:p>
+            <a:r>
+              <a:rPr kumimoji="1" lang="en-US" altLang="ja-JP"/>
+              <a:t>2025/2/3</a:t>
+            </a:r>
+            <a:endParaRPr kumimoji="1" lang="ja-JP" altLang="en-US"/>
+          </a:p>
+        </p:txBody>
+      </p:sp>
+      <p:sp>
+        <p:nvSpPr>
+          <p:cNvPr id="6" name="スライド番号プレースホルダー 5">
+            <a:extLst>
+              <a:ext uri="{FF2B5EF4-FFF2-40B4-BE49-F238E27FC236}">
+                <a16:creationId xmlns:a16="http://schemas.microsoft.com/office/drawing/2014/main" id="{CECE8CB3-8416-A7F5-80D8-7B7D22FB405E}"/>
+              </a:ext>
+            </a:extLst>
+          </p:cNvPr>
+          <p:cNvSpPr>
+            <a:spLocks noGrp="1"/>
+          </p:cNvSpPr>
+          <p:nvPr>
+            <p:ph type="sldNum" sz="quarter" idx="12"/>
+          </p:nvPr>
+        </p:nvSpPr>
+        <p:spPr/>
+        <p:txBody>
+          <a:bodyPr/>
+          <a:lstStyle/>
+          <a:p>
+            <a:fld id="{A346F7B0-2C6C-2749-AD43-9AA6CBC0C428}" type="slidenum">
+              <a:rPr kumimoji="1" lang="ja-JP" altLang="en-US" smtClean="0"/>
+              <a:t>7</a:t>
+            </a:fld>
+            <a:endParaRPr kumimoji="1" lang="ja-JP" altLang="en-US"/>
+          </a:p>
+        </p:txBody>
+      </p:sp>
+      <p:sp>
+        <p:nvSpPr>
+          <p:cNvPr id="9" name="コンテンツ プレースホルダー 2">
+            <a:extLst>
+              <a:ext uri="{FF2B5EF4-FFF2-40B4-BE49-F238E27FC236}">
+                <a16:creationId xmlns:a16="http://schemas.microsoft.com/office/drawing/2014/main" id="{B860E25E-73E0-0359-385C-9C4DD5FF9230}"/>
+              </a:ext>
+            </a:extLst>
+          </p:cNvPr>
+          <p:cNvSpPr txBox="1">
+            <a:spLocks/>
+          </p:cNvSpPr>
+          <p:nvPr/>
+        </p:nvSpPr>
+        <p:spPr>
+          <a:xfrm>
+            <a:off x="1008890" y="1571559"/>
+            <a:ext cx="10515600" cy="880999"/>
+          </a:xfrm>
+          <a:prstGeom prst="rect">
+            <a:avLst/>
+          </a:prstGeom>
+        </p:spPr>
+        <p:txBody>
+          <a:bodyPr vert="horz" lIns="91440" tIns="45720" rIns="91440" bIns="45720" rtlCol="0">
+            <a:normAutofit/>
+          </a:bodyPr>
+          <a:lstStyle>
+            <a:lvl1pPr marL="228600" indent="-228600" algn="l" defTabSz="914400" rtl="0" eaLnBrk="1" latinLnBrk="0" hangingPunct="1">
+              <a:lnSpc>
+                <a:spcPct val="90000"/>
+              </a:lnSpc>
+              <a:spcBef>
+                <a:spcPts val="1000"/>
+              </a:spcBef>
+              <a:buFont typeface="Arial" panose="020B0604020202020204" pitchFamily="34" charset="0"/>
+              <a:buChar char="•"/>
+              <a:defRPr kumimoji="1" sz="2800" kern="1200">
+                <a:solidFill>
+                  <a:schemeClr val="tx1"/>
+                </a:solidFill>
+                <a:latin typeface="+mn-lt"/>
+                <a:ea typeface="+mn-ea"/>
+                <a:cs typeface="+mn-cs"/>
+              </a:defRPr>
+            </a:lvl1pPr>
+            <a:lvl2pPr marL="685800" indent="-228600" algn="l" defTabSz="914400" rtl="0" eaLnBrk="1" latinLnBrk="0" hangingPunct="1">
+              <a:lnSpc>
+                <a:spcPct val="90000"/>
+              </a:lnSpc>
+              <a:spcBef>
+                <a:spcPts val="500"/>
+              </a:spcBef>
+              <a:buFont typeface="Arial" panose="020B0604020202020204" pitchFamily="34" charset="0"/>
+              <a:buChar char="•"/>
+              <a:defRPr kumimoji="1" sz="2400" kern="1200">
+                <a:solidFill>
+                  <a:schemeClr val="tx1"/>
+                </a:solidFill>
+                <a:latin typeface="+mn-lt"/>
+                <a:ea typeface="+mn-ea"/>
+                <a:cs typeface="+mn-cs"/>
+              </a:defRPr>
+            </a:lvl2pPr>
+            <a:lvl3pPr marL="1143000" indent="-228600" algn="l" defTabSz="914400" rtl="0" eaLnBrk="1" latinLnBrk="0" hangingPunct="1">
+              <a:lnSpc>
+                <a:spcPct val="90000"/>
+              </a:lnSpc>
+              <a:spcBef>
+                <a:spcPts val="500"/>
+              </a:spcBef>
+              <a:buFont typeface="Arial" panose="020B0604020202020204" pitchFamily="34" charset="0"/>
+              <a:buChar char="•"/>
+              <a:defRPr kumimoji="1" sz="2000" kern="1200">
+                <a:solidFill>
+                  <a:schemeClr val="tx1"/>
+                </a:solidFill>
+                <a:latin typeface="+mn-lt"/>
+                <a:ea typeface="+mn-ea"/>
+                <a:cs typeface="+mn-cs"/>
+              </a:defRPr>
+            </a:lvl3pPr>
+            <a:lvl4pPr marL="1600200" indent="-228600" algn="l" defTabSz="914400" rtl="0" eaLnBrk="1" latinLnBrk="0" hangingPunct="1">
+              <a:lnSpc>
+                <a:spcPct val="90000"/>
+              </a:lnSpc>
+              <a:spcBef>
+                <a:spcPts val="500"/>
+              </a:spcBef>
+              <a:buFont typeface="Arial" panose="020B0604020202020204" pitchFamily="34" charset="0"/>
+              <a:buChar char="•"/>
+              <a:defRPr kumimoji="1" sz="1800" kern="1200">
+                <a:solidFill>
+                  <a:schemeClr val="tx1"/>
+                </a:solidFill>
+                <a:latin typeface="+mn-lt"/>
+                <a:ea typeface="+mn-ea"/>
+                <a:cs typeface="+mn-cs"/>
+              </a:defRPr>
+            </a:lvl4pPr>
+            <a:lvl5pPr marL="2057400" indent="-228600" algn="l" defTabSz="914400" rtl="0" eaLnBrk="1" latinLnBrk="0" hangingPunct="1">
+              <a:lnSpc>
+                <a:spcPct val="90000"/>
+              </a:lnSpc>
+              <a:spcBef>
+                <a:spcPts val="500"/>
+              </a:spcBef>
+              <a:buFont typeface="Arial" panose="020B0604020202020204" pitchFamily="34" charset="0"/>
+              <a:buChar char="•"/>
+              <a:defRPr kumimoji="1" sz="1800" kern="1200">
+                <a:solidFill>
+                  <a:schemeClr val="tx1"/>
+                </a:solidFill>
+                <a:latin typeface="+mn-lt"/>
+                <a:ea typeface="+mn-ea"/>
+                <a:cs typeface="+mn-cs"/>
+              </a:defRPr>
+            </a:lvl5pPr>
+            <a:lvl6pPr marL="2514600" indent="-228600" algn="l" defTabSz="914400" rtl="0" eaLnBrk="1" latinLnBrk="0" hangingPunct="1">
+              <a:lnSpc>
+                <a:spcPct val="90000"/>
+              </a:lnSpc>
+              <a:spcBef>
+                <a:spcPts val="500"/>
+              </a:spcBef>
+              <a:buFont typeface="Arial" panose="020B0604020202020204" pitchFamily="34" charset="0"/>
+              <a:buChar char="•"/>
+              <a:defRPr kumimoji="1" sz="1800" kern="1200">
+                <a:solidFill>
+                  <a:schemeClr val="tx1"/>
+                </a:solidFill>
+                <a:latin typeface="+mn-lt"/>
+                <a:ea typeface="+mn-ea"/>
+                <a:cs typeface="+mn-cs"/>
+              </a:defRPr>
+            </a:lvl6pPr>
+            <a:lvl7pPr marL="2971800" indent="-228600" algn="l" defTabSz="914400" rtl="0" eaLnBrk="1" latinLnBrk="0" hangingPunct="1">
+              <a:lnSpc>
+                <a:spcPct val="90000"/>
+              </a:lnSpc>
+              <a:spcBef>
+                <a:spcPts val="500"/>
+              </a:spcBef>
+              <a:buFont typeface="Arial" panose="020B0604020202020204" pitchFamily="34" charset="0"/>
+              <a:buChar char="•"/>
+              <a:defRPr kumimoji="1" sz="1800" kern="1200">
+                <a:solidFill>
+                  <a:schemeClr val="tx1"/>
+                </a:solidFill>
+                <a:latin typeface="+mn-lt"/>
+                <a:ea typeface="+mn-ea"/>
+                <a:cs typeface="+mn-cs"/>
+              </a:defRPr>
+            </a:lvl7pPr>
+            <a:lvl8pPr marL="3429000" indent="-228600" algn="l" defTabSz="914400" rtl="0" eaLnBrk="1" latinLnBrk="0" hangingPunct="1">
+              <a:lnSpc>
+                <a:spcPct val="90000"/>
+              </a:lnSpc>
+              <a:spcBef>
+                <a:spcPts val="500"/>
+              </a:spcBef>
+              <a:buFont typeface="Arial" panose="020B0604020202020204" pitchFamily="34" charset="0"/>
+              <a:buChar char="•"/>
+              <a:defRPr kumimoji="1" sz="1800" kern="1200">
+                <a:solidFill>
+                  <a:schemeClr val="tx1"/>
+                </a:solidFill>
+                <a:latin typeface="+mn-lt"/>
+                <a:ea typeface="+mn-ea"/>
+                <a:cs typeface="+mn-cs"/>
+              </a:defRPr>
+            </a:lvl8pPr>
+            <a:lvl9pPr marL="3886200" indent="-228600" algn="l" defTabSz="914400" rtl="0" eaLnBrk="1" latinLnBrk="0" hangingPunct="1">
+              <a:lnSpc>
+                <a:spcPct val="90000"/>
+              </a:lnSpc>
+              <a:spcBef>
+                <a:spcPts val="500"/>
+              </a:spcBef>
+              <a:buFont typeface="Arial" panose="020B0604020202020204" pitchFamily="34" charset="0"/>
+              <a:buChar char="•"/>
+              <a:defRPr kumimoji="1" sz="1800" kern="1200">
+                <a:solidFill>
+                  <a:schemeClr val="tx1"/>
+                </a:solidFill>
+                <a:latin typeface="+mn-lt"/>
+                <a:ea typeface="+mn-ea"/>
+                <a:cs typeface="+mn-cs"/>
+              </a:defRPr>
+            </a:lvl9pPr>
+          </a:lstStyle>
+          <a:p>
+            <a:pPr marL="0" indent="0">
+              <a:buFont typeface="Arial" panose="020B0604020202020204" pitchFamily="34" charset="0"/>
+              <a:buNone/>
+            </a:pPr>
+            <a:endParaRPr lang="ja-JP" altLang="en-US">
+              <a:latin typeface="Meiryo" panose="020B0604030504040204" pitchFamily="34" charset="-128"/>
+              <a:ea typeface="Meiryo" panose="020B0604030504040204" pitchFamily="34" charset="-128"/>
+            </a:endParaRPr>
+          </a:p>
+        </p:txBody>
+      </p:sp>
+      <p:sp>
+        <p:nvSpPr>
+          <p:cNvPr id="3" name="フッター プレースホルダー 2">
+            <a:extLst>
+              <a:ext uri="{FF2B5EF4-FFF2-40B4-BE49-F238E27FC236}">
+                <a16:creationId xmlns:a16="http://schemas.microsoft.com/office/drawing/2014/main" id="{5FE5A229-9AF8-8A65-52E6-A063E6B472D2}"/>
+              </a:ext>
+            </a:extLst>
+          </p:cNvPr>
+          <p:cNvSpPr>
+            <a:spLocks noGrp="1"/>
+          </p:cNvSpPr>
+          <p:nvPr>
+            <p:ph type="ftr" sz="quarter" idx="11"/>
+          </p:nvPr>
+        </p:nvSpPr>
+        <p:spPr/>
+        <p:txBody>
+          <a:bodyPr/>
+          <a:lstStyle/>
+          <a:p>
+            <a:r>
+              <a:rPr kumimoji="1" lang="ja-JP" altLang="en-US"/>
+              <a:t>修論発表会</a:t>
+            </a:r>
+            <a:endParaRPr kumimoji="1" lang="ja-ES" altLang="en-US"/>
+          </a:p>
+        </p:txBody>
+      </p:sp>
+    </p:spTree>
+    <p:extLst>
+      <p:ext uri="{BB962C8B-B14F-4D97-AF65-F5344CB8AC3E}">
+        <p14:creationId xmlns:p14="http://schemas.microsoft.com/office/powerpoint/2010/main" val="1363013617"/>
+      </p:ext>
+    </p:extLst>
+  </p:cSld>
+  <p:clrMapOvr>
+    <a:masterClrMapping/>
+  </p:clrMapOvr>
+</p:sld>
+</file>
+
+<file path=ppt/slides/slide8.xml><?xml version="1.0" encoding="utf-8"?>
+<p:sld xmlns:a="http://schemas.openxmlformats.org/drawingml/2006/main" xmlns:r="http://schemas.openxmlformats.org/officeDocument/2006/relationships" xmlns:p="http://schemas.openxmlformats.org/presentationml/2006/main">
+  <p:cSld>
+    <p:spTree>
+      <p:nvGrpSpPr>
+        <p:cNvPr id="1" name="">
+          <a:extLst>
+            <a:ext uri="{FF2B5EF4-FFF2-40B4-BE49-F238E27FC236}">
+              <a16:creationId xmlns:a16="http://schemas.microsoft.com/office/drawing/2014/main" id="{D443BA97-0B04-2743-0B07-CFCEEA14BD02}"/>
+            </a:ext>
+          </a:extLst>
+        </p:cNvPr>
+        <p:cNvGrpSpPr/>
+        <p:nvPr/>
+      </p:nvGrpSpPr>
+      <p:grpSpPr>
+        <a:xfrm>
+          <a:off x="0" y="0"/>
+          <a:ext cx="0" cy="0"/>
+          <a:chOff x="0" y="0"/>
+          <a:chExt cx="0" cy="0"/>
+        </a:xfrm>
+      </p:grpSpPr>
+      <p:sp>
+        <p:nvSpPr>
+          <p:cNvPr id="2" name="タイトル 1">
+            <a:extLst>
+              <a:ext uri="{FF2B5EF4-FFF2-40B4-BE49-F238E27FC236}">
+                <a16:creationId xmlns:a16="http://schemas.microsoft.com/office/drawing/2014/main" id="{5523E244-5077-DA92-7B1B-F163E73D6239}"/>
+              </a:ext>
+            </a:extLst>
+          </p:cNvPr>
+          <p:cNvSpPr>
+            <a:spLocks noGrp="1"/>
+          </p:cNvSpPr>
+          <p:nvPr>
+            <p:ph type="title"/>
+          </p:nvPr>
+        </p:nvSpPr>
+        <p:spPr>
+          <a:xfrm>
+            <a:off x="0" y="-6128"/>
+            <a:ext cx="12192000" cy="1089862"/>
+          </a:xfrm>
+          <a:solidFill>
+            <a:schemeClr val="tx2">
+              <a:lumMod val="25000"/>
+              <a:lumOff val="75000"/>
+            </a:schemeClr>
+          </a:solidFill>
+        </p:spPr>
+        <p:txBody>
+          <a:bodyPr>
+            <a:normAutofit/>
+          </a:bodyPr>
+          <a:lstStyle/>
+          <a:p>
+            <a:r>
+              <a:rPr kumimoji="1" lang="en-US" altLang="ja-JP" sz="3600" dirty="0">
+                <a:latin typeface="Meiryo" panose="020B0604030504040204" pitchFamily="34" charset="-128"/>
+                <a:ea typeface="Meiryo" panose="020B0604030504040204" pitchFamily="34" charset="-128"/>
+              </a:rPr>
+              <a:t>   </a:t>
+            </a:r>
+            <a:r>
+              <a:rPr kumimoji="1" lang="ja-ES" altLang="en-US" sz="3600" dirty="0">
+                <a:latin typeface="Meiryo" panose="020B0604030504040204" pitchFamily="34" charset="-128"/>
+                <a:ea typeface="Meiryo" panose="020B0604030504040204" pitchFamily="34" charset="-128"/>
+              </a:rPr>
+              <a:t>宇宙マイクロ波背景放射</a:t>
+            </a:r>
+            <a:r>
+              <a:rPr kumimoji="1" lang="en-US" altLang="ja-ES" sz="3600" dirty="0">
+                <a:latin typeface="Meiryo" panose="020B0604030504040204" pitchFamily="34" charset="-128"/>
+                <a:ea typeface="Meiryo" panose="020B0604030504040204" pitchFamily="34" charset="-128"/>
+              </a:rPr>
+              <a:t>(CMB)</a:t>
+            </a:r>
+            <a:endParaRPr kumimoji="1" lang="ja-JP" altLang="en-US" sz="2400">
+              <a:latin typeface="Meiryo" panose="020B0604030504040204" pitchFamily="34" charset="-128"/>
+              <a:ea typeface="Meiryo" panose="020B0604030504040204" pitchFamily="34" charset="-128"/>
+            </a:endParaRPr>
+          </a:p>
+        </p:txBody>
+      </p:sp>
+      <p:sp>
+        <p:nvSpPr>
+          <p:cNvPr id="4" name="日付プレースホルダー 3">
+            <a:extLst>
+              <a:ext uri="{FF2B5EF4-FFF2-40B4-BE49-F238E27FC236}">
+                <a16:creationId xmlns:a16="http://schemas.microsoft.com/office/drawing/2014/main" id="{7E01655A-2B8E-A024-5941-564B40D9950E}"/>
+              </a:ext>
+            </a:extLst>
+          </p:cNvPr>
+          <p:cNvSpPr>
+            <a:spLocks noGrp="1"/>
+          </p:cNvSpPr>
+          <p:nvPr>
+            <p:ph type="dt" sz="half" idx="10"/>
+          </p:nvPr>
+        </p:nvSpPr>
+        <p:spPr/>
+        <p:txBody>
+          <a:bodyPr/>
+          <a:lstStyle/>
+          <a:p>
+            <a:r>
+              <a:rPr kumimoji="1" lang="en-US" altLang="ja-JP"/>
+              <a:t>2025/2/3</a:t>
+            </a:r>
+            <a:endParaRPr kumimoji="1" lang="ja-JP" altLang="en-US"/>
+          </a:p>
+        </p:txBody>
+      </p:sp>
+      <p:sp>
+        <p:nvSpPr>
+          <p:cNvPr id="6" name="スライド番号プレースホルダー 5">
+            <a:extLst>
+              <a:ext uri="{FF2B5EF4-FFF2-40B4-BE49-F238E27FC236}">
+                <a16:creationId xmlns:a16="http://schemas.microsoft.com/office/drawing/2014/main" id="{C8FA9682-EC17-4C40-887A-18E8CC75E864}"/>
+              </a:ext>
+            </a:extLst>
+          </p:cNvPr>
+          <p:cNvSpPr>
+            <a:spLocks noGrp="1"/>
+          </p:cNvSpPr>
+          <p:nvPr>
+            <p:ph type="sldNum" sz="quarter" idx="12"/>
+          </p:nvPr>
+        </p:nvSpPr>
+        <p:spPr/>
+        <p:txBody>
+          <a:bodyPr/>
+          <a:lstStyle/>
+          <a:p>
+            <a:fld id="{A346F7B0-2C6C-2749-AD43-9AA6CBC0C428}" type="slidenum">
+              <a:rPr kumimoji="1" lang="ja-JP" altLang="en-US" smtClean="0"/>
+              <a:t>8</a:t>
+            </a:fld>
+            <a:endParaRPr kumimoji="1" lang="ja-JP" altLang="en-US"/>
+          </a:p>
+        </p:txBody>
+      </p:sp>
+      <p:sp>
+        <p:nvSpPr>
+          <p:cNvPr id="9" name="コンテンツ プレースホルダー 2">
+            <a:extLst>
+              <a:ext uri="{FF2B5EF4-FFF2-40B4-BE49-F238E27FC236}">
+                <a16:creationId xmlns:a16="http://schemas.microsoft.com/office/drawing/2014/main" id="{F9C6CC6C-9CC8-D0CD-694E-0E6D5FB15890}"/>
+              </a:ext>
+            </a:extLst>
+          </p:cNvPr>
+          <p:cNvSpPr txBox="1">
+            <a:spLocks/>
+          </p:cNvSpPr>
+          <p:nvPr/>
+        </p:nvSpPr>
+        <p:spPr>
+          <a:xfrm>
+            <a:off x="1008890" y="1571559"/>
+            <a:ext cx="10515600" cy="880999"/>
+          </a:xfrm>
+          <a:prstGeom prst="rect">
+            <a:avLst/>
+          </a:prstGeom>
+        </p:spPr>
+        <p:txBody>
+          <a:bodyPr vert="horz" lIns="91440" tIns="45720" rIns="91440" bIns="45720" rtlCol="0">
+            <a:normAutofit/>
+          </a:bodyPr>
+          <a:lstStyle>
+            <a:lvl1pPr marL="228600" indent="-228600" algn="l" defTabSz="914400" rtl="0" eaLnBrk="1" latinLnBrk="0" hangingPunct="1">
+              <a:lnSpc>
+                <a:spcPct val="90000"/>
+              </a:lnSpc>
+              <a:spcBef>
+                <a:spcPts val="1000"/>
+              </a:spcBef>
+              <a:buFont typeface="Arial" panose="020B0604020202020204" pitchFamily="34" charset="0"/>
+              <a:buChar char="•"/>
+              <a:defRPr kumimoji="1" sz="2800" kern="1200">
+                <a:solidFill>
+                  <a:schemeClr val="tx1"/>
+                </a:solidFill>
+                <a:latin typeface="+mn-lt"/>
+                <a:ea typeface="+mn-ea"/>
+                <a:cs typeface="+mn-cs"/>
+              </a:defRPr>
+            </a:lvl1pPr>
+            <a:lvl2pPr marL="685800" indent="-228600" algn="l" defTabSz="914400" rtl="0" eaLnBrk="1" latinLnBrk="0" hangingPunct="1">
+              <a:lnSpc>
+                <a:spcPct val="90000"/>
+              </a:lnSpc>
+              <a:spcBef>
+                <a:spcPts val="500"/>
+              </a:spcBef>
+              <a:buFont typeface="Arial" panose="020B0604020202020204" pitchFamily="34" charset="0"/>
+              <a:buChar char="•"/>
+              <a:defRPr kumimoji="1" sz="2400" kern="1200">
+                <a:solidFill>
+                  <a:schemeClr val="tx1"/>
+                </a:solidFill>
+                <a:latin typeface="+mn-lt"/>
+                <a:ea typeface="+mn-ea"/>
+                <a:cs typeface="+mn-cs"/>
+              </a:defRPr>
+            </a:lvl2pPr>
+            <a:lvl3pPr marL="1143000" indent="-228600" algn="l" defTabSz="914400" rtl="0" eaLnBrk="1" latinLnBrk="0" hangingPunct="1">
+              <a:lnSpc>
+                <a:spcPct val="90000"/>
+              </a:lnSpc>
+              <a:spcBef>
+                <a:spcPts val="500"/>
+              </a:spcBef>
+              <a:buFont typeface="Arial" panose="020B0604020202020204" pitchFamily="34" charset="0"/>
+              <a:buChar char="•"/>
+              <a:defRPr kumimoji="1" sz="2000" kern="1200">
+                <a:solidFill>
+                  <a:schemeClr val="tx1"/>
+                </a:solidFill>
+                <a:latin typeface="+mn-lt"/>
+                <a:ea typeface="+mn-ea"/>
+                <a:cs typeface="+mn-cs"/>
+              </a:defRPr>
+            </a:lvl3pPr>
+            <a:lvl4pPr marL="1600200" indent="-228600" algn="l" defTabSz="914400" rtl="0" eaLnBrk="1" latinLnBrk="0" hangingPunct="1">
+              <a:lnSpc>
+                <a:spcPct val="90000"/>
+              </a:lnSpc>
+              <a:spcBef>
+                <a:spcPts val="500"/>
+              </a:spcBef>
+              <a:buFont typeface="Arial" panose="020B0604020202020204" pitchFamily="34" charset="0"/>
+              <a:buChar char="•"/>
+              <a:defRPr kumimoji="1" sz="1800" kern="1200">
+                <a:solidFill>
+                  <a:schemeClr val="tx1"/>
+                </a:solidFill>
+                <a:latin typeface="+mn-lt"/>
+                <a:ea typeface="+mn-ea"/>
+                <a:cs typeface="+mn-cs"/>
+              </a:defRPr>
+            </a:lvl4pPr>
+            <a:lvl5pPr marL="2057400" indent="-228600" algn="l" defTabSz="914400" rtl="0" eaLnBrk="1" latinLnBrk="0" hangingPunct="1">
+              <a:lnSpc>
+                <a:spcPct val="90000"/>
+              </a:lnSpc>
+              <a:spcBef>
+                <a:spcPts val="500"/>
+              </a:spcBef>
+              <a:buFont typeface="Arial" panose="020B0604020202020204" pitchFamily="34" charset="0"/>
+              <a:buChar char="•"/>
+              <a:defRPr kumimoji="1" sz="1800" kern="1200">
+                <a:solidFill>
+                  <a:schemeClr val="tx1"/>
+                </a:solidFill>
+                <a:latin typeface="+mn-lt"/>
+                <a:ea typeface="+mn-ea"/>
+                <a:cs typeface="+mn-cs"/>
+              </a:defRPr>
+            </a:lvl5pPr>
+            <a:lvl6pPr marL="2514600" indent="-228600" algn="l" defTabSz="914400" rtl="0" eaLnBrk="1" latinLnBrk="0" hangingPunct="1">
+              <a:lnSpc>
+                <a:spcPct val="90000"/>
+              </a:lnSpc>
+              <a:spcBef>
+                <a:spcPts val="500"/>
+              </a:spcBef>
+              <a:buFont typeface="Arial" panose="020B0604020202020204" pitchFamily="34" charset="0"/>
+              <a:buChar char="•"/>
+              <a:defRPr kumimoji="1" sz="1800" kern="1200">
+                <a:solidFill>
+                  <a:schemeClr val="tx1"/>
+                </a:solidFill>
+                <a:latin typeface="+mn-lt"/>
+                <a:ea typeface="+mn-ea"/>
+                <a:cs typeface="+mn-cs"/>
+              </a:defRPr>
+            </a:lvl6pPr>
+            <a:lvl7pPr marL="2971800" indent="-228600" algn="l" defTabSz="914400" rtl="0" eaLnBrk="1" latinLnBrk="0" hangingPunct="1">
+              <a:lnSpc>
+                <a:spcPct val="90000"/>
+              </a:lnSpc>
+              <a:spcBef>
+                <a:spcPts val="500"/>
+              </a:spcBef>
+              <a:buFont typeface="Arial" panose="020B0604020202020204" pitchFamily="34" charset="0"/>
+              <a:buChar char="•"/>
+              <a:defRPr kumimoji="1" sz="1800" kern="1200">
+                <a:solidFill>
+                  <a:schemeClr val="tx1"/>
+                </a:solidFill>
+                <a:latin typeface="+mn-lt"/>
+                <a:ea typeface="+mn-ea"/>
+                <a:cs typeface="+mn-cs"/>
+              </a:defRPr>
+            </a:lvl7pPr>
+            <a:lvl8pPr marL="3429000" indent="-228600" algn="l" defTabSz="914400" rtl="0" eaLnBrk="1" latinLnBrk="0" hangingPunct="1">
+              <a:lnSpc>
+                <a:spcPct val="90000"/>
+              </a:lnSpc>
+              <a:spcBef>
+                <a:spcPts val="500"/>
+              </a:spcBef>
+              <a:buFont typeface="Arial" panose="020B0604020202020204" pitchFamily="34" charset="0"/>
+              <a:buChar char="•"/>
+              <a:defRPr kumimoji="1" sz="1800" kern="1200">
+                <a:solidFill>
+                  <a:schemeClr val="tx1"/>
+                </a:solidFill>
+                <a:latin typeface="+mn-lt"/>
+                <a:ea typeface="+mn-ea"/>
+                <a:cs typeface="+mn-cs"/>
+              </a:defRPr>
+            </a:lvl8pPr>
+            <a:lvl9pPr marL="3886200" indent="-228600" algn="l" defTabSz="914400" rtl="0" eaLnBrk="1" latinLnBrk="0" hangingPunct="1">
+              <a:lnSpc>
+                <a:spcPct val="90000"/>
+              </a:lnSpc>
+              <a:spcBef>
+                <a:spcPts val="500"/>
+              </a:spcBef>
+              <a:buFont typeface="Arial" panose="020B0604020202020204" pitchFamily="34" charset="0"/>
+              <a:buChar char="•"/>
+              <a:defRPr kumimoji="1" sz="1800" kern="1200">
+                <a:solidFill>
+                  <a:schemeClr val="tx1"/>
+                </a:solidFill>
+                <a:latin typeface="+mn-lt"/>
+                <a:ea typeface="+mn-ea"/>
+                <a:cs typeface="+mn-cs"/>
+              </a:defRPr>
+            </a:lvl9pPr>
+          </a:lstStyle>
+          <a:p>
+            <a:pPr marL="0" indent="0">
+              <a:buFont typeface="Arial" panose="020B0604020202020204" pitchFamily="34" charset="0"/>
+              <a:buNone/>
+            </a:pPr>
+            <a:endParaRPr lang="ja-JP" altLang="en-US">
+              <a:latin typeface="Meiryo" panose="020B0604030504040204" pitchFamily="34" charset="-128"/>
+              <a:ea typeface="Meiryo" panose="020B0604030504040204" pitchFamily="34" charset="-128"/>
+            </a:endParaRPr>
+          </a:p>
+        </p:txBody>
+      </p:sp>
+      <p:sp>
+        <p:nvSpPr>
+          <p:cNvPr id="3" name="フッター プレースホルダー 2">
+            <a:extLst>
+              <a:ext uri="{FF2B5EF4-FFF2-40B4-BE49-F238E27FC236}">
+                <a16:creationId xmlns:a16="http://schemas.microsoft.com/office/drawing/2014/main" id="{75AEEC74-ECA3-9C99-2F74-D22BA31A413F}"/>
+              </a:ext>
+            </a:extLst>
+          </p:cNvPr>
+          <p:cNvSpPr>
+            <a:spLocks noGrp="1"/>
+          </p:cNvSpPr>
+          <p:nvPr>
+            <p:ph type="ftr" sz="quarter" idx="11"/>
+          </p:nvPr>
+        </p:nvSpPr>
+        <p:spPr/>
+        <p:txBody>
+          <a:bodyPr/>
+          <a:lstStyle/>
+          <a:p>
+            <a:r>
+              <a:rPr kumimoji="1" lang="ja-JP" altLang="en-US"/>
+              <a:t>修論発表会</a:t>
+            </a:r>
+            <a:endParaRPr kumimoji="1" lang="ja-ES" altLang="en-US"/>
+          </a:p>
+        </p:txBody>
+      </p:sp>
+    </p:spTree>
+    <p:extLst>
+      <p:ext uri="{BB962C8B-B14F-4D97-AF65-F5344CB8AC3E}">
+        <p14:creationId xmlns:p14="http://schemas.microsoft.com/office/powerpoint/2010/main" val="1909110976"/>
       </p:ext>
     </p:extLst>
   </p:cSld>

</xml_diff>

<commit_message>
Commit at 2025-01-26 17:30:01
</commit_message>
<xml_diff>
--- a/mt_presentation.pptx
+++ b/mt_presentation.pptx
@@ -5459,36 +5459,6 @@
           </a:p>
         </p:txBody>
       </p:sp>
-      <p:pic>
-        <p:nvPicPr>
-          <p:cNvPr id="7" name="図 6" descr="プレート, コンパクトディスク, ミラー が含まれている画像&#10;&#10;自動的に生成された説明">
-            <a:extLst>
-              <a:ext uri="{FF2B5EF4-FFF2-40B4-BE49-F238E27FC236}">
-                <a16:creationId xmlns:a16="http://schemas.microsoft.com/office/drawing/2014/main" id="{97427B13-3AFC-3775-0E0F-D01CCAB4DBB9}"/>
-              </a:ext>
-            </a:extLst>
-          </p:cNvPr>
-          <p:cNvPicPr>
-            <a:picLocks noChangeAspect="1"/>
-          </p:cNvPicPr>
-          <p:nvPr/>
-        </p:nvPicPr>
-        <p:blipFill>
-          <a:blip r:embed="rId3"/>
-          <a:stretch>
-            <a:fillRect/>
-          </a:stretch>
-        </p:blipFill>
-        <p:spPr>
-          <a:xfrm>
-            <a:off x="515116" y="2112464"/>
-            <a:ext cx="3123802" cy="1788416"/>
-          </a:xfrm>
-          <a:prstGeom prst="rect">
-            <a:avLst/>
-          </a:prstGeom>
-        </p:spPr>
-      </p:pic>
       <p:sp>
         <p:nvSpPr>
           <p:cNvPr id="8" name="テキスト ボックス 7">
@@ -5584,130 +5554,14 @@
           </a:p>
         </p:txBody>
       </p:sp>
-      <p:sp>
-        <p:nvSpPr>
-          <p:cNvPr id="10" name="テキスト ボックス 9">
-            <a:extLst>
-              <a:ext uri="{FF2B5EF4-FFF2-40B4-BE49-F238E27FC236}">
-                <a16:creationId xmlns:a16="http://schemas.microsoft.com/office/drawing/2014/main" id="{30506776-D9FF-4005-2F8C-CEB5DD164E9A}"/>
-              </a:ext>
-            </a:extLst>
-          </p:cNvPr>
-          <p:cNvSpPr txBox="1"/>
-          <p:nvPr/>
-        </p:nvSpPr>
-        <p:spPr>
-          <a:xfrm>
-            <a:off x="3794760" y="2098615"/>
-            <a:ext cx="8223504" cy="707886"/>
-          </a:xfrm>
-          <a:prstGeom prst="rect">
-            <a:avLst/>
-          </a:prstGeom>
-          <a:noFill/>
-        </p:spPr>
-        <p:txBody>
-          <a:bodyPr wrap="square" rtlCol="0">
-            <a:spAutoFit/>
-          </a:bodyPr>
-          <a:lstStyle/>
-          <a:p>
-            <a:pPr marL="342900" indent="-342900">
-              <a:buFont typeface="Arial" panose="020B0604020202020204" pitchFamily="34" charset="0"/>
-              <a:buChar char="•"/>
-            </a:pPr>
-            <a:r>
-              <a:rPr kumimoji="1" lang="en-US" altLang="ja-ES" sz="2000" dirty="0">
-                <a:latin typeface="Meiryo" panose="020B0604030504040204" pitchFamily="34" charset="-128"/>
-                <a:ea typeface="Meiryo" panose="020B0604030504040204" pitchFamily="34" charset="-128"/>
-                <a:cs typeface="Arial" panose="020B0604020202020204" pitchFamily="34" charset="0"/>
-              </a:rPr>
-              <a:t>CMB</a:t>
-            </a:r>
-            <a:r>
-              <a:rPr kumimoji="1" lang="ja-ES" altLang="en-US" sz="2000" dirty="0">
-                <a:latin typeface="Meiryo" panose="020B0604030504040204" pitchFamily="34" charset="-128"/>
-                <a:ea typeface="Meiryo" panose="020B0604030504040204" pitchFamily="34" charset="-128"/>
-                <a:cs typeface="Arial" panose="020B0604020202020204" pitchFamily="34" charset="0"/>
-              </a:rPr>
-              <a:t>はほぼ</a:t>
-            </a:r>
-            <a:r>
-              <a:rPr kumimoji="1" lang="en-US" altLang="ja-ES" sz="2000" dirty="0">
-                <a:latin typeface="Meiryo" panose="020B0604030504040204" pitchFamily="34" charset="-128"/>
-                <a:ea typeface="Meiryo" panose="020B0604030504040204" pitchFamily="34" charset="-128"/>
-                <a:cs typeface="Arial" panose="020B0604020202020204" pitchFamily="34" charset="0"/>
-              </a:rPr>
-              <a:t>2.725K</a:t>
-            </a:r>
-            <a:r>
-              <a:rPr kumimoji="1" lang="ja-ES" altLang="en-US" sz="2000" dirty="0">
-                <a:latin typeface="Meiryo" panose="020B0604030504040204" pitchFamily="34" charset="-128"/>
-                <a:ea typeface="Meiryo" panose="020B0604030504040204" pitchFamily="34" charset="-128"/>
-                <a:cs typeface="Arial" panose="020B0604020202020204" pitchFamily="34" charset="0"/>
-              </a:rPr>
-              <a:t>の黒体放射のスペクトルを持つと同時に、わずかな温度異方性を持つ。</a:t>
-            </a:r>
-            <a:endParaRPr kumimoji="1" lang="en-US" altLang="ja-ES" sz="2000" dirty="0">
-              <a:latin typeface="Meiryo" panose="020B0604030504040204" pitchFamily="34" charset="-128"/>
-              <a:ea typeface="Meiryo" panose="020B0604030504040204" pitchFamily="34" charset="-128"/>
-              <a:cs typeface="Arial" panose="020B0604020202020204" pitchFamily="34" charset="0"/>
-            </a:endParaRPr>
-          </a:p>
-        </p:txBody>
-      </p:sp>
-      <p:sp>
-        <p:nvSpPr>
-          <p:cNvPr id="11" name="テキスト ボックス 10">
-            <a:extLst>
-              <a:ext uri="{FF2B5EF4-FFF2-40B4-BE49-F238E27FC236}">
-                <a16:creationId xmlns:a16="http://schemas.microsoft.com/office/drawing/2014/main" id="{0034A900-4125-1F41-CED0-393380A164A5}"/>
-              </a:ext>
-            </a:extLst>
-          </p:cNvPr>
-          <p:cNvSpPr txBox="1"/>
-          <p:nvPr/>
-        </p:nvSpPr>
-        <p:spPr>
-          <a:xfrm>
-            <a:off x="708433" y="3673951"/>
-            <a:ext cx="600913" cy="307777"/>
-          </a:xfrm>
-          <a:prstGeom prst="rect">
-            <a:avLst/>
-          </a:prstGeom>
-          <a:solidFill>
-            <a:schemeClr val="bg1"/>
-          </a:solidFill>
-        </p:spPr>
-        <p:txBody>
-          <a:bodyPr wrap="square" rtlCol="0">
-            <a:spAutoFit/>
-          </a:bodyPr>
-          <a:lstStyle/>
-          <a:p>
-            <a:r>
-              <a:rPr kumimoji="1" lang="en-US" altLang="ja-ES" sz="1400" dirty="0">
-                <a:latin typeface="Meiryo" panose="020B0604030504040204" pitchFamily="34" charset="-128"/>
-                <a:ea typeface="Meiryo" panose="020B0604030504040204" pitchFamily="34" charset="-128"/>
-              </a:rPr>
-              <a:t>-300</a:t>
-            </a:r>
-            <a:endParaRPr kumimoji="1" lang="ja-ES" altLang="en-US" sz="1400" dirty="0">
-              <a:latin typeface="Meiryo" panose="020B0604030504040204" pitchFamily="34" charset="-128"/>
-              <a:ea typeface="Meiryo" panose="020B0604030504040204" pitchFamily="34" charset="-128"/>
-            </a:endParaRPr>
-          </a:p>
-        </p:txBody>
-      </p:sp>
       <mc:AlternateContent xmlns:mc="http://schemas.openxmlformats.org/markup-compatibility/2006">
         <mc:Choice xmlns:a14="http://schemas.microsoft.com/office/drawing/2010/main" Requires="a14">
           <p:sp>
             <p:nvSpPr>
-              <p:cNvPr id="12" name="テキスト ボックス 11">
+              <p:cNvPr id="10" name="テキスト ボックス 9">
                 <a:extLst>
                   <a:ext uri="{FF2B5EF4-FFF2-40B4-BE49-F238E27FC236}">
-                    <a16:creationId xmlns:a16="http://schemas.microsoft.com/office/drawing/2014/main" id="{59BCCFCC-D862-157D-CBC5-F1F22663E491}"/>
+                    <a16:creationId xmlns:a16="http://schemas.microsoft.com/office/drawing/2014/main" id="{30506776-D9FF-4005-2F8C-CEB5DD164E9A}"/>
                   </a:ext>
                 </a:extLst>
               </p:cNvPr>
@@ -5716,15 +5570,13 @@
             </p:nvSpPr>
             <p:spPr>
               <a:xfrm>
-                <a:off x="2855617" y="3673950"/>
-                <a:ext cx="783301" cy="307777"/>
+                <a:off x="3788663" y="2236302"/>
+                <a:ext cx="8223504" cy="1323439"/>
               </a:xfrm>
               <a:prstGeom prst="rect">
                 <a:avLst/>
               </a:prstGeom>
-              <a:solidFill>
-                <a:schemeClr val="bg1"/>
-              </a:solidFill>
+              <a:noFill/>
             </p:spPr>
             <p:txBody>
               <a:bodyPr wrap="square" rtlCol="0">
@@ -5732,34 +5584,123 @@
               </a:bodyPr>
               <a:lstStyle/>
               <a:p>
+                <a:pPr marL="342900" indent="-342900">
+                  <a:buFont typeface="Arial" panose="020B0604020202020204" pitchFamily="34" charset="0"/>
+                  <a:buChar char="•"/>
+                </a:pPr>
                 <a:r>
-                  <a:rPr kumimoji="1" lang="en-US" altLang="ja-ES" sz="1400" dirty="0">
+                  <a:rPr kumimoji="1" lang="en-US" altLang="ja-ES" sz="2000" dirty="0">
                     <a:latin typeface="Meiryo" panose="020B0604030504040204" pitchFamily="34" charset="-128"/>
                     <a:ea typeface="Meiryo" panose="020B0604030504040204" pitchFamily="34" charset="-128"/>
+                    <a:cs typeface="Arial" panose="020B0604020202020204" pitchFamily="34" charset="0"/>
                   </a:rPr>
-                  <a:t>300</a:t>
+                  <a:t>CMB</a:t>
+                </a:r>
+                <a:r>
+                  <a:rPr kumimoji="1" lang="ja-ES" altLang="en-US" sz="2000" dirty="0">
+                    <a:latin typeface="Meiryo" panose="020B0604030504040204" pitchFamily="34" charset="-128"/>
+                    <a:ea typeface="Meiryo" panose="020B0604030504040204" pitchFamily="34" charset="-128"/>
+                    <a:cs typeface="Arial" panose="020B0604020202020204" pitchFamily="34" charset="0"/>
+                  </a:rPr>
+                  <a:t>はほぼ</a:t>
+                </a:r>
+                <a:r>
+                  <a:rPr kumimoji="1" lang="en-US" altLang="ja-ES" sz="2000" dirty="0">
+                    <a:latin typeface="Meiryo" panose="020B0604030504040204" pitchFamily="34" charset="-128"/>
+                    <a:ea typeface="Meiryo" panose="020B0604030504040204" pitchFamily="34" charset="-128"/>
+                    <a:cs typeface="Arial" panose="020B0604020202020204" pitchFamily="34" charset="0"/>
+                  </a:rPr>
+                  <a:t>2.725K</a:t>
+                </a:r>
+                <a:r>
+                  <a:rPr kumimoji="1" lang="ja-ES" altLang="en-US" sz="2000" dirty="0">
+                    <a:latin typeface="Meiryo" panose="020B0604030504040204" pitchFamily="34" charset="-128"/>
+                    <a:ea typeface="Meiryo" panose="020B0604030504040204" pitchFamily="34" charset="-128"/>
+                    <a:cs typeface="Arial" panose="020B0604020202020204" pitchFamily="34" charset="0"/>
+                  </a:rPr>
+                  <a:t>の黒体放射のスペクトルを持つと同時に、わずかな</a:t>
+                </a:r>
+                <a:r>
+                  <a:rPr kumimoji="1" lang="ja-ES" altLang="en-US" sz="2000" dirty="0">
+                    <a:solidFill>
+                      <a:srgbClr val="FF0000"/>
+                    </a:solidFill>
+                    <a:latin typeface="Meiryo" panose="020B0604030504040204" pitchFamily="34" charset="-128"/>
+                    <a:ea typeface="Meiryo" panose="020B0604030504040204" pitchFamily="34" charset="-128"/>
+                    <a:cs typeface="Arial" panose="020B0604020202020204" pitchFamily="34" charset="0"/>
+                  </a:rPr>
+                  <a:t>温度異方性</a:t>
+                </a:r>
+                <a:r>
+                  <a:rPr kumimoji="1" lang="ja-ES" altLang="en-US" sz="2000" dirty="0">
+                    <a:latin typeface="Meiryo" panose="020B0604030504040204" pitchFamily="34" charset="-128"/>
+                    <a:ea typeface="Meiryo" panose="020B0604030504040204" pitchFamily="34" charset="-128"/>
+                    <a:cs typeface="Arial" panose="020B0604020202020204" pitchFamily="34" charset="0"/>
+                  </a:rPr>
+                  <a:t>を持つ。</a:t>
+                </a:r>
+                <a:endParaRPr kumimoji="1" lang="en-US" altLang="ja-ES" sz="2000" dirty="0">
+                  <a:latin typeface="Meiryo" panose="020B0604030504040204" pitchFamily="34" charset="-128"/>
+                  <a:ea typeface="Meiryo" panose="020B0604030504040204" pitchFamily="34" charset="-128"/>
+                  <a:cs typeface="Arial" panose="020B0604020202020204" pitchFamily="34" charset="0"/>
+                </a:endParaRPr>
+              </a:p>
+              <a:p>
+                <a:pPr marL="342900" indent="-342900">
+                  <a:buFont typeface="Arial" panose="020B0604020202020204" pitchFamily="34" charset="0"/>
+                  <a:buChar char="•"/>
+                </a:pPr>
+                <a:r>
+                  <a:rPr kumimoji="1" lang="ja-ES" altLang="en-US" sz="2000" dirty="0">
+                    <a:latin typeface="Meiryo" panose="020B0604030504040204" pitchFamily="34" charset="-128"/>
+                    <a:ea typeface="Meiryo" panose="020B0604030504040204" pitchFamily="34" charset="-128"/>
+                    <a:cs typeface="Arial" panose="020B0604020202020204" pitchFamily="34" charset="0"/>
+                  </a:rPr>
+                  <a:t>温度異方性の観測により、宇宙を記述する標準理論</a:t>
+                </a:r>
+                <a:r>
+                  <a:rPr kumimoji="1" lang="en-US" altLang="ja-ES" sz="2000" dirty="0">
+                    <a:latin typeface="Meiryo" panose="020B0604030504040204" pitchFamily="34" charset="-128"/>
+                    <a:ea typeface="Meiryo" panose="020B0604030504040204" pitchFamily="34" charset="-128"/>
+                    <a:cs typeface="Arial" panose="020B0604020202020204" pitchFamily="34" charset="0"/>
+                  </a:rPr>
+                  <a:t> </a:t>
                 </a:r>
                 <a14:m>
                   <m:oMath xmlns:m="http://schemas.openxmlformats.org/officeDocument/2006/math">
                     <m:r>
-                      <a:rPr kumimoji="1" lang="en-US" altLang="ja-ES" sz="1400" i="1" smtClean="0">
+                      <m:rPr>
+                        <m:sty m:val="p"/>
+                      </m:rPr>
+                      <a:rPr kumimoji="1" lang="el-GR" altLang="ja-ES" sz="2000" i="0" smtClean="0">
                         <a:latin typeface="Cambria Math" panose="02040503050406030204" pitchFamily="18" charset="0"/>
                         <a:ea typeface="Cambria Math" panose="02040503050406030204" pitchFamily="18" charset="0"/>
+                        <a:cs typeface="Arial" panose="020B0604020202020204" pitchFamily="34" charset="0"/>
                       </a:rPr>
-                      <m:t>𝜇</m:t>
-                    </m:r>
-                    <m:r>
-                      <a:rPr kumimoji="1" lang="en-US" altLang="ja-ES" sz="1400" b="0" i="1" smtClean="0">
-                        <a:latin typeface="Cambria Math" panose="02040503050406030204" pitchFamily="18" charset="0"/>
-                        <a:ea typeface="Cambria Math" panose="02040503050406030204" pitchFamily="18" charset="0"/>
-                      </a:rPr>
-                      <m:t>𝐾</m:t>
+                      <m:t>Λ</m:t>
                     </m:r>
                   </m:oMath>
                 </a14:m>
-                <a:endParaRPr kumimoji="1" lang="ja-ES" altLang="en-US" sz="1400" dirty="0">
+                <a:r>
+                  <a:rPr kumimoji="1" lang="en-US" altLang="ja-ES" sz="2000" dirty="0">
+                    <a:latin typeface="Meiryo" panose="020B0604030504040204" pitchFamily="34" charset="-128"/>
+                    <a:ea typeface="Meiryo" panose="020B0604030504040204" pitchFamily="34" charset="-128"/>
+                    <a:cs typeface="Arial" panose="020B0604020202020204" pitchFamily="34" charset="0"/>
+                  </a:rPr>
+                  <a:t>-CDM</a:t>
+                </a:r>
+                <a:r>
+                  <a:rPr kumimoji="1" lang="ja-ES" altLang="en-US" sz="2000" dirty="0">
+                    <a:latin typeface="Meiryo" panose="020B0604030504040204" pitchFamily="34" charset="-128"/>
+                    <a:ea typeface="Meiryo" panose="020B0604030504040204" pitchFamily="34" charset="-128"/>
+                    <a:cs typeface="Arial" panose="020B0604020202020204" pitchFamily="34" charset="0"/>
+                  </a:rPr>
+                  <a:t>モデルが構築。</a:t>
+                </a:r>
+                <a:endParaRPr kumimoji="1" lang="en-US" altLang="ja-ES" sz="2000" dirty="0">
                   <a:latin typeface="Meiryo" panose="020B0604030504040204" pitchFamily="34" charset="-128"/>
                   <a:ea typeface="Meiryo" panose="020B0604030504040204" pitchFamily="34" charset="-128"/>
+                  <a:cs typeface="Arial" panose="020B0604020202020204" pitchFamily="34" charset="0"/>
                 </a:endParaRPr>
               </a:p>
             </p:txBody>
@@ -5768,10 +5709,10 @@
         <mc:Fallback>
           <p:sp>
             <p:nvSpPr>
-              <p:cNvPr id="12" name="テキスト ボックス 11">
+              <p:cNvPr id="10" name="テキスト ボックス 9">
                 <a:extLst>
                   <a:ext uri="{FF2B5EF4-FFF2-40B4-BE49-F238E27FC236}">
-                    <a16:creationId xmlns:a16="http://schemas.microsoft.com/office/drawing/2014/main" id="{59BCCFCC-D862-157D-CBC5-F1F22663E491}"/>
+                    <a16:creationId xmlns:a16="http://schemas.microsoft.com/office/drawing/2014/main" id="{30506776-D9FF-4005-2F8C-CEB5DD164E9A}"/>
                   </a:ext>
                 </a:extLst>
               </p:cNvPr>
@@ -5782,16 +5723,16 @@
             </p:nvSpPr>
             <p:spPr>
               <a:xfrm>
-                <a:off x="2855617" y="3673950"/>
-                <a:ext cx="783301" cy="307777"/>
+                <a:off x="3788663" y="2236302"/>
+                <a:ext cx="8223504" cy="1323439"/>
               </a:xfrm>
               <a:prstGeom prst="rect">
                 <a:avLst/>
               </a:prstGeom>
               <a:blipFill>
-                <a:blip r:embed="rId4"/>
+                <a:blip r:embed="rId3"/>
                 <a:stretch>
-                  <a:fillRect l="-1587" t="-4000" b="-20000"/>
+                  <a:fillRect l="-617" t="-3810" b="-6667"/>
                 </a:stretch>
               </a:blipFill>
             </p:spPr>
@@ -5810,6 +5751,659 @@
           </p:sp>
         </mc:Fallback>
       </mc:AlternateContent>
+      <p:grpSp>
+        <p:nvGrpSpPr>
+          <p:cNvPr id="13" name="グループ化 12">
+            <a:extLst>
+              <a:ext uri="{FF2B5EF4-FFF2-40B4-BE49-F238E27FC236}">
+                <a16:creationId xmlns:a16="http://schemas.microsoft.com/office/drawing/2014/main" id="{4E47C558-8EA0-8939-CC98-80169DA3D659}"/>
+              </a:ext>
+            </a:extLst>
+          </p:cNvPr>
+          <p:cNvGrpSpPr/>
+          <p:nvPr/>
+        </p:nvGrpSpPr>
+        <p:grpSpPr>
+          <a:xfrm>
+            <a:off x="515116" y="2112464"/>
+            <a:ext cx="3123802" cy="1869264"/>
+            <a:chOff x="515116" y="2112464"/>
+            <a:chExt cx="3123802" cy="1869264"/>
+          </a:xfrm>
+        </p:grpSpPr>
+        <p:pic>
+          <p:nvPicPr>
+            <p:cNvPr id="7" name="図 6" descr="プレート, コンパクトディスク, ミラー が含まれている画像&#10;&#10;自動的に生成された説明">
+              <a:extLst>
+                <a:ext uri="{FF2B5EF4-FFF2-40B4-BE49-F238E27FC236}">
+                  <a16:creationId xmlns:a16="http://schemas.microsoft.com/office/drawing/2014/main" id="{97427B13-3AFC-3775-0E0F-D01CCAB4DBB9}"/>
+                </a:ext>
+              </a:extLst>
+            </p:cNvPr>
+            <p:cNvPicPr>
+              <a:picLocks noChangeAspect="1"/>
+            </p:cNvPicPr>
+            <p:nvPr/>
+          </p:nvPicPr>
+          <p:blipFill>
+            <a:blip r:embed="rId4"/>
+            <a:stretch>
+              <a:fillRect/>
+            </a:stretch>
+          </p:blipFill>
+          <p:spPr>
+            <a:xfrm>
+              <a:off x="515116" y="2112464"/>
+              <a:ext cx="3123802" cy="1788416"/>
+            </a:xfrm>
+            <a:prstGeom prst="rect">
+              <a:avLst/>
+            </a:prstGeom>
+          </p:spPr>
+        </p:pic>
+        <p:sp>
+          <p:nvSpPr>
+            <p:cNvPr id="11" name="テキスト ボックス 10">
+              <a:extLst>
+                <a:ext uri="{FF2B5EF4-FFF2-40B4-BE49-F238E27FC236}">
+                  <a16:creationId xmlns:a16="http://schemas.microsoft.com/office/drawing/2014/main" id="{0034A900-4125-1F41-CED0-393380A164A5}"/>
+                </a:ext>
+              </a:extLst>
+            </p:cNvPr>
+            <p:cNvSpPr txBox="1"/>
+            <p:nvPr/>
+          </p:nvSpPr>
+          <p:spPr>
+            <a:xfrm>
+              <a:off x="708433" y="3673951"/>
+              <a:ext cx="600913" cy="307777"/>
+            </a:xfrm>
+            <a:prstGeom prst="rect">
+              <a:avLst/>
+            </a:prstGeom>
+            <a:solidFill>
+              <a:schemeClr val="bg1"/>
+            </a:solidFill>
+          </p:spPr>
+          <p:txBody>
+            <a:bodyPr wrap="square" rtlCol="0">
+              <a:spAutoFit/>
+            </a:bodyPr>
+            <a:lstStyle/>
+            <a:p>
+              <a:r>
+                <a:rPr kumimoji="1" lang="en-US" altLang="ja-ES" sz="1400" dirty="0">
+                  <a:latin typeface="Meiryo" panose="020B0604030504040204" pitchFamily="34" charset="-128"/>
+                  <a:ea typeface="Meiryo" panose="020B0604030504040204" pitchFamily="34" charset="-128"/>
+                </a:rPr>
+                <a:t>-300</a:t>
+              </a:r>
+              <a:endParaRPr kumimoji="1" lang="ja-ES" altLang="en-US" sz="1400" dirty="0">
+                <a:latin typeface="Meiryo" panose="020B0604030504040204" pitchFamily="34" charset="-128"/>
+                <a:ea typeface="Meiryo" panose="020B0604030504040204" pitchFamily="34" charset="-128"/>
+              </a:endParaRPr>
+            </a:p>
+          </p:txBody>
+        </p:sp>
+        <mc:AlternateContent xmlns:mc="http://schemas.openxmlformats.org/markup-compatibility/2006">
+          <mc:Choice xmlns:a14="http://schemas.microsoft.com/office/drawing/2010/main" Requires="a14">
+            <p:sp>
+              <p:nvSpPr>
+                <p:cNvPr id="12" name="テキスト ボックス 11">
+                  <a:extLst>
+                    <a:ext uri="{FF2B5EF4-FFF2-40B4-BE49-F238E27FC236}">
+                      <a16:creationId xmlns:a16="http://schemas.microsoft.com/office/drawing/2014/main" id="{59BCCFCC-D862-157D-CBC5-F1F22663E491}"/>
+                    </a:ext>
+                  </a:extLst>
+                </p:cNvPr>
+                <p:cNvSpPr txBox="1"/>
+                <p:nvPr/>
+              </p:nvSpPr>
+              <p:spPr>
+                <a:xfrm>
+                  <a:off x="2855617" y="3673950"/>
+                  <a:ext cx="783301" cy="307777"/>
+                </a:xfrm>
+                <a:prstGeom prst="rect">
+                  <a:avLst/>
+                </a:prstGeom>
+                <a:solidFill>
+                  <a:schemeClr val="bg1"/>
+                </a:solidFill>
+              </p:spPr>
+              <p:txBody>
+                <a:bodyPr wrap="square" rtlCol="0">
+                  <a:spAutoFit/>
+                </a:bodyPr>
+                <a:lstStyle/>
+                <a:p>
+                  <a:r>
+                    <a:rPr kumimoji="1" lang="en-US" altLang="ja-ES" sz="1400" dirty="0">
+                      <a:latin typeface="Meiryo" panose="020B0604030504040204" pitchFamily="34" charset="-128"/>
+                      <a:ea typeface="Meiryo" panose="020B0604030504040204" pitchFamily="34" charset="-128"/>
+                    </a:rPr>
+                    <a:t>300</a:t>
+                  </a:r>
+                  <a14:m>
+                    <m:oMath xmlns:m="http://schemas.openxmlformats.org/officeDocument/2006/math">
+                      <m:r>
+                        <a:rPr kumimoji="1" lang="en-US" altLang="ja-ES" sz="1400" i="1" smtClean="0">
+                          <a:latin typeface="Cambria Math" panose="02040503050406030204" pitchFamily="18" charset="0"/>
+                          <a:ea typeface="Cambria Math" panose="02040503050406030204" pitchFamily="18" charset="0"/>
+                        </a:rPr>
+                        <m:t>𝜇</m:t>
+                      </m:r>
+                      <m:r>
+                        <a:rPr kumimoji="1" lang="en-US" altLang="ja-ES" sz="1400" b="0" i="1" smtClean="0">
+                          <a:latin typeface="Cambria Math" panose="02040503050406030204" pitchFamily="18" charset="0"/>
+                          <a:ea typeface="Cambria Math" panose="02040503050406030204" pitchFamily="18" charset="0"/>
+                        </a:rPr>
+                        <m:t>𝐾</m:t>
+                      </m:r>
+                    </m:oMath>
+                  </a14:m>
+                  <a:endParaRPr kumimoji="1" lang="ja-ES" altLang="en-US" sz="1400" dirty="0">
+                    <a:latin typeface="Meiryo" panose="020B0604030504040204" pitchFamily="34" charset="-128"/>
+                    <a:ea typeface="Meiryo" panose="020B0604030504040204" pitchFamily="34" charset="-128"/>
+                  </a:endParaRPr>
+                </a:p>
+              </p:txBody>
+            </p:sp>
+          </mc:Choice>
+          <mc:Fallback>
+            <p:sp>
+              <p:nvSpPr>
+                <p:cNvPr id="12" name="テキスト ボックス 11">
+                  <a:extLst>
+                    <a:ext uri="{FF2B5EF4-FFF2-40B4-BE49-F238E27FC236}">
+                      <a16:creationId xmlns:a16="http://schemas.microsoft.com/office/drawing/2014/main" id="{59BCCFCC-D862-157D-CBC5-F1F22663E491}"/>
+                    </a:ext>
+                  </a:extLst>
+                </p:cNvPr>
+                <p:cNvSpPr txBox="1">
+                  <a:spLocks noRot="1" noChangeAspect="1" noMove="1" noResize="1" noEditPoints="1" noAdjustHandles="1" noChangeArrowheads="1" noChangeShapeType="1" noTextEdit="1"/>
+                </p:cNvSpPr>
+                <p:nvPr/>
+              </p:nvSpPr>
+              <p:spPr>
+                <a:xfrm>
+                  <a:off x="2855617" y="3673950"/>
+                  <a:ext cx="783301" cy="307777"/>
+                </a:xfrm>
+                <a:prstGeom prst="rect">
+                  <a:avLst/>
+                </a:prstGeom>
+                <a:blipFill>
+                  <a:blip r:embed="rId5"/>
+                  <a:stretch>
+                    <a:fillRect l="-1587" t="-4000" b="-20000"/>
+                  </a:stretch>
+                </a:blipFill>
+              </p:spPr>
+              <p:txBody>
+                <a:bodyPr/>
+                <a:lstStyle/>
+                <a:p>
+                  <a:r>
+                    <a:rPr lang="ja-ES" altLang="en-US">
+                      <a:noFill/>
+                    </a:rPr>
+                    <a:t> </a:t>
+                  </a:r>
+                </a:p>
+              </p:txBody>
+            </p:sp>
+          </mc:Fallback>
+        </mc:AlternateContent>
+      </p:grpSp>
+      <p:sp>
+        <p:nvSpPr>
+          <p:cNvPr id="14" name="上矢印 13">
+            <a:extLst>
+              <a:ext uri="{FF2B5EF4-FFF2-40B4-BE49-F238E27FC236}">
+                <a16:creationId xmlns:a16="http://schemas.microsoft.com/office/drawing/2014/main" id="{CEEC324A-0463-98D1-26DE-F276B073137C}"/>
+              </a:ext>
+            </a:extLst>
+          </p:cNvPr>
+          <p:cNvSpPr/>
+          <p:nvPr/>
+        </p:nvSpPr>
+        <p:spPr>
+          <a:xfrm rot="10800000">
+            <a:off x="7589519" y="3668527"/>
+            <a:ext cx="310896" cy="575170"/>
+          </a:xfrm>
+          <a:prstGeom prst="upArrow">
+            <a:avLst>
+              <a:gd name="adj1" fmla="val 50000"/>
+              <a:gd name="adj2" fmla="val 55882"/>
+            </a:avLst>
+          </a:prstGeom>
+          <a:solidFill>
+            <a:srgbClr val="FF0000"/>
+          </a:solidFill>
+          <a:ln>
+            <a:solidFill>
+              <a:srgbClr val="FF0000"/>
+            </a:solidFill>
+          </a:ln>
+        </p:spPr>
+        <p:style>
+          <a:lnRef idx="2">
+            <a:schemeClr val="accent1">
+              <a:shade val="15000"/>
+            </a:schemeClr>
+          </a:lnRef>
+          <a:fillRef idx="1">
+            <a:schemeClr val="accent1"/>
+          </a:fillRef>
+          <a:effectRef idx="0">
+            <a:schemeClr val="accent1"/>
+          </a:effectRef>
+          <a:fontRef idx="minor">
+            <a:schemeClr val="lt1"/>
+          </a:fontRef>
+        </p:style>
+        <p:txBody>
+          <a:bodyPr rtlCol="0" anchor="ctr"/>
+          <a:lstStyle/>
+          <a:p>
+            <a:pPr algn="ctr"/>
+            <a:endParaRPr kumimoji="1" lang="ja-ES" altLang="en-US"/>
+          </a:p>
+        </p:txBody>
+      </p:sp>
+      <mc:AlternateContent xmlns:mc="http://schemas.openxmlformats.org/markup-compatibility/2006">
+        <mc:Choice xmlns:a14="http://schemas.microsoft.com/office/drawing/2010/main" Requires="a14">
+          <p:sp>
+            <p:nvSpPr>
+              <p:cNvPr id="15" name="テキスト ボックス 14">
+                <a:extLst>
+                  <a:ext uri="{FF2B5EF4-FFF2-40B4-BE49-F238E27FC236}">
+                    <a16:creationId xmlns:a16="http://schemas.microsoft.com/office/drawing/2014/main" id="{F381DA78-99D9-9145-5B49-5B869C6AB283}"/>
+                  </a:ext>
+                </a:extLst>
+              </p:cNvPr>
+              <p:cNvSpPr txBox="1"/>
+              <p:nvPr/>
+            </p:nvSpPr>
+            <p:spPr>
+              <a:xfrm>
+                <a:off x="3794760" y="4412893"/>
+                <a:ext cx="8223504" cy="1323439"/>
+              </a:xfrm>
+              <a:prstGeom prst="rect">
+                <a:avLst/>
+              </a:prstGeom>
+              <a:noFill/>
+            </p:spPr>
+            <p:txBody>
+              <a:bodyPr wrap="square" rtlCol="0">
+                <a:spAutoFit/>
+              </a:bodyPr>
+              <a:lstStyle/>
+              <a:p>
+                <a:pPr marL="342900" indent="-342900">
+                  <a:buFont typeface="Arial" panose="020B0604020202020204" pitchFamily="34" charset="0"/>
+                  <a:buChar char="•"/>
+                </a:pPr>
+                <a:r>
+                  <a:rPr kumimoji="1" lang="ja-ES" altLang="en-US" sz="2000" dirty="0">
+                    <a:latin typeface="Meiryo" panose="020B0604030504040204" pitchFamily="34" charset="-128"/>
+                    <a:ea typeface="Meiryo" panose="020B0604030504040204" pitchFamily="34" charset="-128"/>
+                    <a:cs typeface="Arial" panose="020B0604020202020204" pitchFamily="34" charset="0"/>
+                  </a:rPr>
+                  <a:t>現在では、</a:t>
+                </a:r>
+                <a:r>
+                  <a:rPr kumimoji="1" lang="en-US" altLang="ja-ES" sz="2000" dirty="0">
+                    <a:latin typeface="Meiryo" panose="020B0604030504040204" pitchFamily="34" charset="-128"/>
+                    <a:ea typeface="Meiryo" panose="020B0604030504040204" pitchFamily="34" charset="-128"/>
+                    <a:cs typeface="Arial" panose="020B0604020202020204" pitchFamily="34" charset="0"/>
+                  </a:rPr>
+                  <a:t>CMB</a:t>
+                </a:r>
+                <a:r>
+                  <a:rPr kumimoji="1" lang="ja-ES" altLang="en-US" sz="2000" dirty="0">
+                    <a:latin typeface="Meiryo" panose="020B0604030504040204" pitchFamily="34" charset="-128"/>
+                    <a:ea typeface="Meiryo" panose="020B0604030504040204" pitchFamily="34" charset="-128"/>
+                    <a:cs typeface="Arial" panose="020B0604020202020204" pitchFamily="34" charset="0"/>
+                  </a:rPr>
+                  <a:t>の</a:t>
+                </a:r>
+                <a:r>
+                  <a:rPr kumimoji="1" lang="ja-ES" altLang="en-US" sz="2000" dirty="0">
+                    <a:solidFill>
+                      <a:srgbClr val="FF0000"/>
+                    </a:solidFill>
+                    <a:latin typeface="Meiryo" panose="020B0604030504040204" pitchFamily="34" charset="-128"/>
+                    <a:ea typeface="Meiryo" panose="020B0604030504040204" pitchFamily="34" charset="-128"/>
+                    <a:cs typeface="Arial" panose="020B0604020202020204" pitchFamily="34" charset="0"/>
+                  </a:rPr>
+                  <a:t>偏光</a:t>
+                </a:r>
+                <a:r>
+                  <a:rPr kumimoji="1" lang="ja-ES" altLang="en-US" sz="2000" dirty="0">
+                    <a:latin typeface="Meiryo" panose="020B0604030504040204" pitchFamily="34" charset="-128"/>
+                    <a:ea typeface="Meiryo" panose="020B0604030504040204" pitchFamily="34" charset="-128"/>
+                    <a:cs typeface="Arial" panose="020B0604020202020204" pitchFamily="34" charset="0"/>
+                  </a:rPr>
+                  <a:t>が大きなテーマとなっている</a:t>
+                </a:r>
+                <a:endParaRPr kumimoji="1" lang="en-US" altLang="ja-ES" sz="2000" dirty="0">
+                  <a:latin typeface="Meiryo" panose="020B0604030504040204" pitchFamily="34" charset="-128"/>
+                  <a:ea typeface="Meiryo" panose="020B0604030504040204" pitchFamily="34" charset="-128"/>
+                  <a:cs typeface="Arial" panose="020B0604020202020204" pitchFamily="34" charset="0"/>
+                </a:endParaRPr>
+              </a:p>
+              <a:p>
+                <a:pPr marL="342900" indent="-342900">
+                  <a:buFont typeface="Arial" panose="020B0604020202020204" pitchFamily="34" charset="0"/>
+                  <a:buChar char="•"/>
+                </a:pPr>
+                <a:r>
+                  <a:rPr kumimoji="1" lang="en-US" altLang="ja-ES" sz="2000" dirty="0">
+                    <a:latin typeface="Meiryo" panose="020B0604030504040204" pitchFamily="34" charset="-128"/>
+                    <a:ea typeface="Meiryo" panose="020B0604030504040204" pitchFamily="34" charset="-128"/>
+                    <a:cs typeface="Arial" panose="020B0604020202020204" pitchFamily="34" charset="0"/>
+                  </a:rPr>
+                  <a:t>2</a:t>
+                </a:r>
+                <a:r>
+                  <a:rPr kumimoji="1" lang="ja-ES" altLang="en-US" sz="2000" dirty="0">
+                    <a:latin typeface="Meiryo" panose="020B0604030504040204" pitchFamily="34" charset="-128"/>
+                    <a:ea typeface="Meiryo" panose="020B0604030504040204" pitchFamily="34" charset="-128"/>
+                    <a:cs typeface="Arial" panose="020B0604020202020204" pitchFamily="34" charset="0"/>
+                  </a:rPr>
+                  <a:t>つの偏光モードがあり、それぞれのモードで異なる物理に迫れる</a:t>
+                </a:r>
+                <a:endParaRPr kumimoji="1" lang="en-US" altLang="ja-ES" sz="2000" dirty="0">
+                  <a:latin typeface="Meiryo" panose="020B0604030504040204" pitchFamily="34" charset="-128"/>
+                  <a:ea typeface="Meiryo" panose="020B0604030504040204" pitchFamily="34" charset="-128"/>
+                  <a:cs typeface="Arial" panose="020B0604020202020204" pitchFamily="34" charset="0"/>
+                </a:endParaRPr>
+              </a:p>
+              <a:p>
+                <a:pPr marL="800100" lvl="1" indent="-342900">
+                  <a:buFont typeface="Wingdings" pitchFamily="2" charset="2"/>
+                  <a:buChar char="§"/>
+                </a:pPr>
+                <a:r>
+                  <a:rPr kumimoji="1" lang="en-US" altLang="ja-ES" sz="2000" dirty="0">
+                    <a:latin typeface="Meiryo" panose="020B0604030504040204" pitchFamily="34" charset="-128"/>
+                    <a:ea typeface="Meiryo" panose="020B0604030504040204" pitchFamily="34" charset="-128"/>
+                    <a:cs typeface="Arial" panose="020B0604020202020204" pitchFamily="34" charset="0"/>
+                  </a:rPr>
+                  <a:t>E</a:t>
+                </a:r>
+                <a:r>
+                  <a:rPr kumimoji="1" lang="ja-ES" altLang="en-US" sz="2000" dirty="0">
+                    <a:latin typeface="Meiryo" panose="020B0604030504040204" pitchFamily="34" charset="-128"/>
+                    <a:ea typeface="Meiryo" panose="020B0604030504040204" pitchFamily="34" charset="-128"/>
+                    <a:cs typeface="Arial" panose="020B0604020202020204" pitchFamily="34" charset="0"/>
+                  </a:rPr>
+                  <a:t>モード</a:t>
+                </a:r>
+                <a:r>
+                  <a:rPr kumimoji="1" lang="en-US" altLang="ja-ES" sz="2000" dirty="0">
+                    <a:latin typeface="Meiryo" panose="020B0604030504040204" pitchFamily="34" charset="-128"/>
+                    <a:ea typeface="Meiryo" panose="020B0604030504040204" pitchFamily="34" charset="-128"/>
+                    <a:cs typeface="Arial" panose="020B0604020202020204" pitchFamily="34" charset="0"/>
+                  </a:rPr>
+                  <a:t> : </a:t>
+                </a:r>
+                <a14:m>
+                  <m:oMath xmlns:m="http://schemas.openxmlformats.org/officeDocument/2006/math">
+                    <m:nary>
+                      <m:naryPr>
+                        <m:chr m:val="∑"/>
+                        <m:subHide m:val="on"/>
+                        <m:supHide m:val="on"/>
+                        <m:ctrlPr>
+                          <a:rPr kumimoji="1" lang="ja-ES" altLang="en-US" sz="2000" i="1" smtClean="0">
+                            <a:latin typeface="Cambria Math" panose="02040503050406030204" pitchFamily="18" charset="0"/>
+                            <a:ea typeface="Meiryo" panose="020B0604030504040204" pitchFamily="34" charset="-128"/>
+                            <a:cs typeface="Arial" panose="020B0604020202020204" pitchFamily="34" charset="0"/>
+                          </a:rPr>
+                        </m:ctrlPr>
+                      </m:naryPr>
+                      <m:sub/>
+                      <m:sup/>
+                      <m:e>
+                        <m:sSub>
+                          <m:sSubPr>
+                            <m:ctrlPr>
+                              <a:rPr kumimoji="1" lang="en-US" altLang="ja-ES" sz="2000" smtClean="0">
+                                <a:latin typeface="Cambria Math" panose="02040503050406030204" pitchFamily="18" charset="0"/>
+                                <a:ea typeface="Meiryo" panose="020B0604030504040204" pitchFamily="34" charset="-128"/>
+                                <a:cs typeface="Arial" panose="020B0604020202020204" pitchFamily="34" charset="0"/>
+                              </a:rPr>
+                            </m:ctrlPr>
+                          </m:sSubPr>
+                          <m:e>
+                            <m:r>
+                              <m:rPr>
+                                <m:sty m:val="p"/>
+                              </m:rPr>
+                              <a:rPr kumimoji="1" lang="en-US" altLang="ja-ES" sz="2000" i="0">
+                                <a:latin typeface="Cambria Math" panose="02040503050406030204" pitchFamily="18" charset="0"/>
+                                <a:ea typeface="Meiryo" panose="020B0604030504040204" pitchFamily="34" charset="-128"/>
+                                <a:cs typeface="Arial" panose="020B0604020202020204" pitchFamily="34" charset="0"/>
+                              </a:rPr>
+                              <m:t>m</m:t>
+                            </m:r>
+                          </m:e>
+                          <m:sub>
+                            <m:r>
+                              <m:rPr>
+                                <m:sty m:val="p"/>
+                              </m:rPr>
+                              <a:rPr kumimoji="1" lang="en-US" altLang="ja-ES" sz="2000" i="0" smtClean="0">
+                                <a:latin typeface="Cambria Math" panose="02040503050406030204" pitchFamily="18" charset="0"/>
+                                <a:ea typeface="Cambria Math" panose="02040503050406030204" pitchFamily="18" charset="0"/>
+                                <a:cs typeface="Arial" panose="020B0604020202020204" pitchFamily="34" charset="0"/>
+                              </a:rPr>
+                              <m:t>ν</m:t>
+                            </m:r>
+                          </m:sub>
+                        </m:sSub>
+                      </m:e>
+                    </m:nary>
+                  </m:oMath>
+                </a14:m>
+                <a:endParaRPr kumimoji="1" lang="en-US" altLang="ja-ES" sz="2000" dirty="0">
+                  <a:latin typeface="Meiryo" panose="020B0604030504040204" pitchFamily="34" charset="-128"/>
+                  <a:ea typeface="Meiryo" panose="020B0604030504040204" pitchFamily="34" charset="-128"/>
+                  <a:cs typeface="Arial" panose="020B0604020202020204" pitchFamily="34" charset="0"/>
+                </a:endParaRPr>
+              </a:p>
+              <a:p>
+                <a:pPr marL="800100" lvl="1" indent="-342900">
+                  <a:buFont typeface="Wingdings" pitchFamily="2" charset="2"/>
+                  <a:buChar char="§"/>
+                </a:pPr>
+                <a:r>
+                  <a:rPr kumimoji="1" lang="en-US" altLang="ja-ES" sz="2000" dirty="0">
+                    <a:latin typeface="Meiryo" panose="020B0604030504040204" pitchFamily="34" charset="-128"/>
+                    <a:ea typeface="Meiryo" panose="020B0604030504040204" pitchFamily="34" charset="-128"/>
+                    <a:cs typeface="Arial" panose="020B0604020202020204" pitchFamily="34" charset="0"/>
+                  </a:rPr>
+                  <a:t>B</a:t>
+                </a:r>
+                <a:r>
+                  <a:rPr kumimoji="1" lang="ja-ES" altLang="en-US" sz="2000" dirty="0">
+                    <a:latin typeface="Meiryo" panose="020B0604030504040204" pitchFamily="34" charset="-128"/>
+                    <a:ea typeface="Meiryo" panose="020B0604030504040204" pitchFamily="34" charset="-128"/>
+                    <a:cs typeface="Arial" panose="020B0604020202020204" pitchFamily="34" charset="0"/>
+                  </a:rPr>
+                  <a:t>モード</a:t>
+                </a:r>
+                <a:r>
+                  <a:rPr kumimoji="1" lang="en-US" altLang="ja-ES" sz="2000" dirty="0">
+                    <a:latin typeface="Meiryo" panose="020B0604030504040204" pitchFamily="34" charset="-128"/>
+                    <a:ea typeface="Meiryo" panose="020B0604030504040204" pitchFamily="34" charset="-128"/>
+                    <a:cs typeface="Arial" panose="020B0604020202020204" pitchFamily="34" charset="0"/>
+                  </a:rPr>
+                  <a:t> : </a:t>
+                </a:r>
+                <a:r>
+                  <a:rPr kumimoji="1" lang="ja-ES" altLang="en-US" sz="2000" dirty="0">
+                    <a:latin typeface="Meiryo" panose="020B0604030504040204" pitchFamily="34" charset="-128"/>
+                    <a:ea typeface="Meiryo" panose="020B0604030504040204" pitchFamily="34" charset="-128"/>
+                    <a:cs typeface="Arial" panose="020B0604020202020204" pitchFamily="34" charset="0"/>
+                  </a:rPr>
+                  <a:t>インフレーション、</a:t>
+                </a:r>
+                <a:r>
+                  <a:rPr kumimoji="1" lang="ja-ES" altLang="en-US" sz="2000" dirty="0">
+                    <a:ea typeface="Meiryo" panose="020B0604030504040204" pitchFamily="34" charset="-128"/>
+                    <a:cs typeface="Arial" panose="020B0604020202020204" pitchFamily="34" charset="0"/>
+                  </a:rPr>
+                  <a:t> </a:t>
+                </a:r>
+                <a14:m>
+                  <m:oMath xmlns:m="http://schemas.openxmlformats.org/officeDocument/2006/math">
+                    <m:nary>
+                      <m:naryPr>
+                        <m:chr m:val="∑"/>
+                        <m:subHide m:val="on"/>
+                        <m:supHide m:val="on"/>
+                        <m:ctrlPr>
+                          <a:rPr kumimoji="1" lang="ja-ES" altLang="en-US" sz="2000" i="1" smtClean="0">
+                            <a:latin typeface="Cambria Math" panose="02040503050406030204" pitchFamily="18" charset="0"/>
+                            <a:ea typeface="Meiryo" panose="020B0604030504040204" pitchFamily="34" charset="-128"/>
+                            <a:cs typeface="Arial" panose="020B0604020202020204" pitchFamily="34" charset="0"/>
+                          </a:rPr>
+                        </m:ctrlPr>
+                      </m:naryPr>
+                      <m:sub/>
+                      <m:sup/>
+                      <m:e>
+                        <m:sSub>
+                          <m:sSubPr>
+                            <m:ctrlPr>
+                              <a:rPr kumimoji="1" lang="en-US" altLang="ja-ES" sz="2000" i="1" smtClean="0">
+                                <a:latin typeface="Cambria Math" panose="02040503050406030204" pitchFamily="18" charset="0"/>
+                                <a:ea typeface="Meiryo" panose="020B0604030504040204" pitchFamily="34" charset="-128"/>
+                                <a:cs typeface="Arial" panose="020B0604020202020204" pitchFamily="34" charset="0"/>
+                              </a:rPr>
+                            </m:ctrlPr>
+                          </m:sSubPr>
+                          <m:e>
+                            <m:r>
+                              <m:rPr>
+                                <m:sty m:val="p"/>
+                              </m:rPr>
+                              <a:rPr kumimoji="1" lang="en-US" altLang="ja-ES" sz="2000" i="0">
+                                <a:latin typeface="Cambria Math" panose="02040503050406030204" pitchFamily="18" charset="0"/>
+                                <a:ea typeface="Meiryo" panose="020B0604030504040204" pitchFamily="34" charset="-128"/>
+                                <a:cs typeface="Arial" panose="020B0604020202020204" pitchFamily="34" charset="0"/>
+                              </a:rPr>
+                              <m:t>m</m:t>
+                            </m:r>
+                          </m:e>
+                          <m:sub>
+                            <m:r>
+                              <m:rPr>
+                                <m:sty m:val="p"/>
+                              </m:rPr>
+                              <a:rPr kumimoji="1" lang="en-US" altLang="ja-ES" sz="2000" i="0" smtClean="0">
+                                <a:latin typeface="Cambria Math" panose="02040503050406030204" pitchFamily="18" charset="0"/>
+                                <a:ea typeface="Cambria Math" panose="02040503050406030204" pitchFamily="18" charset="0"/>
+                                <a:cs typeface="Arial" panose="020B0604020202020204" pitchFamily="34" charset="0"/>
+                              </a:rPr>
+                              <m:t>ν</m:t>
+                            </m:r>
+                          </m:sub>
+                        </m:sSub>
+                      </m:e>
+                    </m:nary>
+                  </m:oMath>
+                </a14:m>
+                <a:endParaRPr kumimoji="1" lang="en-US" altLang="ja-ES" sz="2000" dirty="0">
+                  <a:latin typeface="Meiryo" panose="020B0604030504040204" pitchFamily="34" charset="-128"/>
+                  <a:ea typeface="Meiryo" panose="020B0604030504040204" pitchFamily="34" charset="-128"/>
+                  <a:cs typeface="Arial" panose="020B0604020202020204" pitchFamily="34" charset="0"/>
+                </a:endParaRPr>
+              </a:p>
+            </p:txBody>
+          </p:sp>
+        </mc:Choice>
+        <mc:Fallback>
+          <p:sp>
+            <p:nvSpPr>
+              <p:cNvPr id="15" name="テキスト ボックス 14">
+                <a:extLst>
+                  <a:ext uri="{FF2B5EF4-FFF2-40B4-BE49-F238E27FC236}">
+                    <a16:creationId xmlns:a16="http://schemas.microsoft.com/office/drawing/2014/main" id="{F381DA78-99D9-9145-5B49-5B869C6AB283}"/>
+                  </a:ext>
+                </a:extLst>
+              </p:cNvPr>
+              <p:cNvSpPr txBox="1">
+                <a:spLocks noRot="1" noChangeAspect="1" noMove="1" noResize="1" noEditPoints="1" noAdjustHandles="1" noChangeArrowheads="1" noChangeShapeType="1" noTextEdit="1"/>
+              </p:cNvSpPr>
+              <p:nvPr/>
+            </p:nvSpPr>
+            <p:spPr>
+              <a:xfrm>
+                <a:off x="3794760" y="4412893"/>
+                <a:ext cx="8223504" cy="1323439"/>
+              </a:xfrm>
+              <a:prstGeom prst="rect">
+                <a:avLst/>
+              </a:prstGeom>
+              <a:blipFill>
+                <a:blip r:embed="rId6"/>
+                <a:stretch>
+                  <a:fillRect l="-772" t="-2857" b="-53333"/>
+                </a:stretch>
+              </a:blipFill>
+            </p:spPr>
+            <p:txBody>
+              <a:bodyPr/>
+              <a:lstStyle/>
+              <a:p>
+                <a:r>
+                  <a:rPr lang="ja-ES" altLang="en-US">
+                    <a:noFill/>
+                  </a:rPr>
+                  <a:t> </a:t>
+                </a:r>
+              </a:p>
+            </p:txBody>
+          </p:sp>
+        </mc:Fallback>
+      </mc:AlternateContent>
+      <p:pic>
+        <p:nvPicPr>
+          <p:cNvPr id="17" name="図 16">
+            <a:extLst>
+              <a:ext uri="{FF2B5EF4-FFF2-40B4-BE49-F238E27FC236}">
+                <a16:creationId xmlns:a16="http://schemas.microsoft.com/office/drawing/2014/main" id="{E46F30F1-CA52-452B-5C30-FBD37423E429}"/>
+              </a:ext>
+            </a:extLst>
+          </p:cNvPr>
+          <p:cNvPicPr>
+            <a:picLocks noChangeAspect="1"/>
+          </p:cNvPicPr>
+          <p:nvPr/>
+        </p:nvPicPr>
+        <p:blipFill>
+          <a:blip r:embed="rId7"/>
+          <a:stretch>
+            <a:fillRect/>
+          </a:stretch>
+        </p:blipFill>
+        <p:spPr>
+          <a:xfrm>
+            <a:off x="515116" y="4267042"/>
+            <a:ext cx="3123964" cy="2038798"/>
+          </a:xfrm>
+          <a:prstGeom prst="rect">
+            <a:avLst/>
+          </a:prstGeom>
+        </p:spPr>
+      </p:pic>
     </p:spTree>
     <p:extLst>
       <p:ext uri="{BB962C8B-B14F-4D97-AF65-F5344CB8AC3E}">
@@ -5892,14 +6486,21 @@
                 <a:latin typeface="Meiryo" panose="020B0604030504040204" pitchFamily="34" charset="-128"/>
                 <a:ea typeface="Meiryo" panose="020B0604030504040204" pitchFamily="34" charset="-128"/>
               </a:rPr>
-              <a:t>宇宙マイクロ波背景放射</a:t>
+              <a:t>偏光</a:t>
             </a:r>
             <a:r>
               <a:rPr kumimoji="1" lang="en-US" altLang="ja-ES" sz="3600" dirty="0">
                 <a:latin typeface="Meiryo" panose="020B0604030504040204" pitchFamily="34" charset="-128"/>
                 <a:ea typeface="Meiryo" panose="020B0604030504040204" pitchFamily="34" charset="-128"/>
               </a:rPr>
-              <a:t>(CMB)</a:t>
+              <a:t>B</a:t>
+            </a:r>
+            <a:r>
+              <a:rPr kumimoji="1" lang="ja-ES" altLang="en-US" sz="3600" dirty="0">
+                <a:latin typeface="Meiryo" panose="020B0604030504040204" pitchFamily="34" charset="-128"/>
+                <a:ea typeface="Meiryo" panose="020B0604030504040204" pitchFamily="34" charset="-128"/>
+              </a:rPr>
+              <a:t>モードと角度スケール</a:t>
             </a:r>
             <a:endParaRPr kumimoji="1" lang="ja-JP" altLang="en-US" sz="2400">
               <a:latin typeface="Meiryo" panose="020B0604030504040204" pitchFamily="34" charset="-128"/>
@@ -6198,6 +6799,36 @@
           </a:p>
         </p:txBody>
       </p:sp>
+      <p:pic>
+        <p:nvPicPr>
+          <p:cNvPr id="7" name="図 6">
+            <a:extLst>
+              <a:ext uri="{FF2B5EF4-FFF2-40B4-BE49-F238E27FC236}">
+                <a16:creationId xmlns:a16="http://schemas.microsoft.com/office/drawing/2014/main" id="{C106D858-B2FE-CA25-569C-72664F78DDBB}"/>
+              </a:ext>
+            </a:extLst>
+          </p:cNvPr>
+          <p:cNvPicPr>
+            <a:picLocks noChangeAspect="1"/>
+          </p:cNvPicPr>
+          <p:nvPr/>
+        </p:nvPicPr>
+        <p:blipFill>
+          <a:blip r:embed="rId3"/>
+          <a:stretch>
+            <a:fillRect/>
+          </a:stretch>
+        </p:blipFill>
+        <p:spPr>
+          <a:xfrm>
+            <a:off x="3145716" y="1845879"/>
+            <a:ext cx="5279950" cy="4242817"/>
+          </a:xfrm>
+          <a:prstGeom prst="rect">
+            <a:avLst/>
+          </a:prstGeom>
+        </p:spPr>
+      </p:pic>
     </p:spTree>
     <p:extLst>
       <p:ext uri="{BB962C8B-B14F-4D97-AF65-F5344CB8AC3E}">

</xml_diff>

<commit_message>
Commit at 2025-01-26 18:00:00
</commit_message>
<xml_diff>
--- a/mt_presentation.pptx
+++ b/mt_presentation.pptx
@@ -5637,7 +5637,7 @@
                     <a:ea typeface="Meiryo" panose="020B0604030504040204" pitchFamily="34" charset="-128"/>
                     <a:cs typeface="Arial" panose="020B0604020202020204" pitchFamily="34" charset="0"/>
                   </a:rPr>
-                  <a:t>を持つ。</a:t>
+                  <a:t>を持つ</a:t>
                 </a:r>
                 <a:endParaRPr kumimoji="1" lang="en-US" altLang="ja-ES" sz="2000" dirty="0">
                   <a:latin typeface="Meiryo" panose="020B0604030504040204" pitchFamily="34" charset="-128"/>
@@ -5695,7 +5695,7 @@
                     <a:ea typeface="Meiryo" panose="020B0604030504040204" pitchFamily="34" charset="-128"/>
                     <a:cs typeface="Arial" panose="020B0604020202020204" pitchFamily="34" charset="0"/>
                   </a:rPr>
-                  <a:t>モデルが構築。</a:t>
+                  <a:t>モデルが構築</a:t>
                 </a:r>
                 <a:endParaRPr kumimoji="1" lang="en-US" altLang="ja-ES" sz="2000" dirty="0">
                   <a:latin typeface="Meiryo" panose="020B0604030504040204" pitchFamily="34" charset="-128"/>
@@ -6821,14 +6821,1085 @@
         </p:blipFill>
         <p:spPr>
           <a:xfrm>
-            <a:off x="3145716" y="1845879"/>
-            <a:ext cx="5279950" cy="4242817"/>
+            <a:off x="3911677" y="2464707"/>
+            <a:ext cx="4725904" cy="3797601"/>
           </a:xfrm>
           <a:prstGeom prst="rect">
             <a:avLst/>
           </a:prstGeom>
         </p:spPr>
       </p:pic>
+      <p:sp>
+        <p:nvSpPr>
+          <p:cNvPr id="8" name="テキスト ボックス 7">
+            <a:extLst>
+              <a:ext uri="{FF2B5EF4-FFF2-40B4-BE49-F238E27FC236}">
+                <a16:creationId xmlns:a16="http://schemas.microsoft.com/office/drawing/2014/main" id="{26CB4A82-D2DB-1EFB-9032-B2E300C7FB4E}"/>
+              </a:ext>
+            </a:extLst>
+          </p:cNvPr>
+          <p:cNvSpPr txBox="1"/>
+          <p:nvPr/>
+        </p:nvSpPr>
+        <p:spPr>
+          <a:xfrm>
+            <a:off x="262128" y="1171054"/>
+            <a:ext cx="11667744" cy="1323439"/>
+          </a:xfrm>
+          <a:prstGeom prst="rect">
+            <a:avLst/>
+          </a:prstGeom>
+          <a:noFill/>
+        </p:spPr>
+        <p:txBody>
+          <a:bodyPr wrap="square" rtlCol="0">
+            <a:spAutoFit/>
+          </a:bodyPr>
+          <a:lstStyle/>
+          <a:p>
+            <a:pPr marL="342900" indent="-342900">
+              <a:buFont typeface="Arial" panose="020B0604020202020204" pitchFamily="34" charset="0"/>
+              <a:buChar char="•"/>
+            </a:pPr>
+            <a:r>
+              <a:rPr kumimoji="1" lang="en-US" altLang="ja-ES" sz="2000" dirty="0">
+                <a:latin typeface="Meiryo" panose="020B0604030504040204" pitchFamily="34" charset="-128"/>
+                <a:ea typeface="Meiryo" panose="020B0604030504040204" pitchFamily="34" charset="-128"/>
+                <a:cs typeface="Arial" panose="020B0604020202020204" pitchFamily="34" charset="0"/>
+              </a:rPr>
+              <a:t>CMB</a:t>
+            </a:r>
+            <a:r>
+              <a:rPr kumimoji="1" lang="ja-ES" altLang="en-US" sz="2000" dirty="0">
+                <a:latin typeface="Meiryo" panose="020B0604030504040204" pitchFamily="34" charset="-128"/>
+                <a:ea typeface="Meiryo" panose="020B0604030504040204" pitchFamily="34" charset="-128"/>
+                <a:cs typeface="Arial" panose="020B0604020202020204" pitchFamily="34" charset="0"/>
+              </a:rPr>
+              <a:t>の偏光は角度スケールに対するパワースペクトルを通して観測する</a:t>
+            </a:r>
+            <a:endParaRPr kumimoji="1" lang="en-US" altLang="ja-ES" sz="2000" dirty="0">
+              <a:latin typeface="Meiryo" panose="020B0604030504040204" pitchFamily="34" charset="-128"/>
+              <a:ea typeface="Meiryo" panose="020B0604030504040204" pitchFamily="34" charset="-128"/>
+              <a:cs typeface="Arial" panose="020B0604020202020204" pitchFamily="34" charset="0"/>
+            </a:endParaRPr>
+          </a:p>
+          <a:p>
+            <a:pPr marL="342900" indent="-342900">
+              <a:buFont typeface="Arial" panose="020B0604020202020204" pitchFamily="34" charset="0"/>
+              <a:buChar char="•"/>
+            </a:pPr>
+            <a:r>
+              <a:rPr kumimoji="1" lang="ja-ES" altLang="en-US" sz="2000" dirty="0">
+                <a:latin typeface="Meiryo" panose="020B0604030504040204" pitchFamily="34" charset="-128"/>
+                <a:ea typeface="Meiryo" panose="020B0604030504040204" pitchFamily="34" charset="-128"/>
+                <a:cs typeface="Arial" panose="020B0604020202020204" pitchFamily="34" charset="0"/>
+              </a:rPr>
+              <a:t>偏光</a:t>
+            </a:r>
+            <a:r>
+              <a:rPr kumimoji="1" lang="en-US" altLang="ja-ES" sz="2000" dirty="0">
+                <a:latin typeface="Meiryo" panose="020B0604030504040204" pitchFamily="34" charset="-128"/>
+                <a:ea typeface="Meiryo" panose="020B0604030504040204" pitchFamily="34" charset="-128"/>
+                <a:cs typeface="Arial" panose="020B0604020202020204" pitchFamily="34" charset="0"/>
+              </a:rPr>
+              <a:t>B</a:t>
+            </a:r>
+            <a:r>
+              <a:rPr kumimoji="1" lang="ja-ES" altLang="en-US" sz="2000" dirty="0">
+                <a:latin typeface="Meiryo" panose="020B0604030504040204" pitchFamily="34" charset="-128"/>
+                <a:ea typeface="Meiryo" panose="020B0604030504040204" pitchFamily="34" charset="-128"/>
+                <a:cs typeface="Arial" panose="020B0604020202020204" pitchFamily="34" charset="0"/>
+              </a:rPr>
+              <a:t>モードは</a:t>
+            </a:r>
+            <a:r>
+              <a:rPr kumimoji="1" lang="en-US" altLang="ja-ES" sz="2000" dirty="0">
+                <a:latin typeface="Meiryo" panose="020B0604030504040204" pitchFamily="34" charset="-128"/>
+                <a:ea typeface="Meiryo" panose="020B0604030504040204" pitchFamily="34" charset="-128"/>
+                <a:cs typeface="Arial" panose="020B0604020202020204" pitchFamily="34" charset="0"/>
+              </a:rPr>
+              <a:t>2</a:t>
+            </a:r>
+            <a:r>
+              <a:rPr kumimoji="1" lang="ja-ES" altLang="en-US" sz="2000" dirty="0">
+                <a:latin typeface="Meiryo" panose="020B0604030504040204" pitchFamily="34" charset="-128"/>
+                <a:ea typeface="Meiryo" panose="020B0604030504040204" pitchFamily="34" charset="-128"/>
+                <a:cs typeface="Arial" panose="020B0604020202020204" pitchFamily="34" charset="0"/>
+              </a:rPr>
+              <a:t>つの生成起源がある</a:t>
+            </a:r>
+            <a:endParaRPr kumimoji="1" lang="en-US" altLang="ja-ES" sz="2000" dirty="0">
+              <a:latin typeface="Meiryo" panose="020B0604030504040204" pitchFamily="34" charset="-128"/>
+              <a:ea typeface="Meiryo" panose="020B0604030504040204" pitchFamily="34" charset="-128"/>
+              <a:cs typeface="Arial" panose="020B0604020202020204" pitchFamily="34" charset="0"/>
+            </a:endParaRPr>
+          </a:p>
+          <a:p>
+            <a:pPr marL="800100" lvl="1" indent="-342900">
+              <a:buFont typeface="Wingdings" pitchFamily="2" charset="2"/>
+              <a:buChar char="§"/>
+            </a:pPr>
+            <a:r>
+              <a:rPr kumimoji="1" lang="ja-ES" altLang="en-US" sz="2000" dirty="0">
+                <a:latin typeface="Meiryo" panose="020B0604030504040204" pitchFamily="34" charset="-128"/>
+                <a:ea typeface="Meiryo" panose="020B0604030504040204" pitchFamily="34" charset="-128"/>
+                <a:cs typeface="Arial" panose="020B0604020202020204" pitchFamily="34" charset="0"/>
+              </a:rPr>
+              <a:t>原始重力波</a:t>
+            </a:r>
+            <a:r>
+              <a:rPr kumimoji="1" lang="en-US" altLang="ja-ES" sz="2000" dirty="0">
+                <a:latin typeface="Meiryo" panose="020B0604030504040204" pitchFamily="34" charset="-128"/>
+                <a:ea typeface="Meiryo" panose="020B0604030504040204" pitchFamily="34" charset="-128"/>
+                <a:cs typeface="Arial" panose="020B0604020202020204" pitchFamily="34" charset="0"/>
+              </a:rPr>
+              <a:t> (</a:t>
+            </a:r>
+            <a:r>
+              <a:rPr kumimoji="1" lang="ja-ES" altLang="en-US" sz="2000" dirty="0">
+                <a:latin typeface="Meiryo" panose="020B0604030504040204" pitchFamily="34" charset="-128"/>
+                <a:ea typeface="Meiryo" panose="020B0604030504040204" pitchFamily="34" charset="-128"/>
+                <a:cs typeface="Arial" panose="020B0604020202020204" pitchFamily="34" charset="0"/>
+              </a:rPr>
+              <a:t>インフレーションの痕跡</a:t>
+            </a:r>
+            <a:r>
+              <a:rPr kumimoji="1" lang="en-US" altLang="ja-ES" sz="2000" dirty="0">
+                <a:latin typeface="Meiryo" panose="020B0604030504040204" pitchFamily="34" charset="-128"/>
+                <a:ea typeface="Meiryo" panose="020B0604030504040204" pitchFamily="34" charset="-128"/>
+                <a:cs typeface="Arial" panose="020B0604020202020204" pitchFamily="34" charset="0"/>
+              </a:rPr>
+              <a:t>)</a:t>
+            </a:r>
+          </a:p>
+          <a:p>
+            <a:pPr marL="800100" lvl="1" indent="-342900">
+              <a:buFont typeface="Wingdings" pitchFamily="2" charset="2"/>
+              <a:buChar char="§"/>
+            </a:pPr>
+            <a:r>
+              <a:rPr kumimoji="1" lang="ja-ES" altLang="en-US" sz="2000" dirty="0">
+                <a:latin typeface="Meiryo" panose="020B0604030504040204" pitchFamily="34" charset="-128"/>
+                <a:ea typeface="Meiryo" panose="020B0604030504040204" pitchFamily="34" charset="-128"/>
+                <a:cs typeface="Arial" panose="020B0604020202020204" pitchFamily="34" charset="0"/>
+              </a:rPr>
+              <a:t>重力レンズ</a:t>
+            </a:r>
+            <a:r>
+              <a:rPr kumimoji="1" lang="en-US" altLang="ja-ES" sz="2000" dirty="0">
+                <a:latin typeface="Meiryo" panose="020B0604030504040204" pitchFamily="34" charset="-128"/>
+                <a:ea typeface="Meiryo" panose="020B0604030504040204" pitchFamily="34" charset="-128"/>
+                <a:cs typeface="Arial" panose="020B0604020202020204" pitchFamily="34" charset="0"/>
+              </a:rPr>
+              <a:t> (E</a:t>
+            </a:r>
+            <a:r>
+              <a:rPr kumimoji="1" lang="ja-ES" altLang="en-US" sz="2000" dirty="0">
+                <a:latin typeface="Meiryo" panose="020B0604030504040204" pitchFamily="34" charset="-128"/>
+                <a:ea typeface="Meiryo" panose="020B0604030504040204" pitchFamily="34" charset="-128"/>
+                <a:cs typeface="Arial" panose="020B0604020202020204" pitchFamily="34" charset="0"/>
+              </a:rPr>
+              <a:t>モードの偏光軸が回転</a:t>
+            </a:r>
+            <a:r>
+              <a:rPr kumimoji="1" lang="en-US" altLang="ja-ES" sz="2000" dirty="0">
+                <a:latin typeface="Meiryo" panose="020B0604030504040204" pitchFamily="34" charset="-128"/>
+                <a:ea typeface="Meiryo" panose="020B0604030504040204" pitchFamily="34" charset="-128"/>
+                <a:cs typeface="Arial" panose="020B0604020202020204" pitchFamily="34" charset="0"/>
+              </a:rPr>
+              <a:t>)</a:t>
+            </a:r>
+          </a:p>
+        </p:txBody>
+      </p:sp>
+      <p:sp>
+        <p:nvSpPr>
+          <p:cNvPr id="10" name="ドーナツ 9">
+            <a:extLst>
+              <a:ext uri="{FF2B5EF4-FFF2-40B4-BE49-F238E27FC236}">
+                <a16:creationId xmlns:a16="http://schemas.microsoft.com/office/drawing/2014/main" id="{7CFBC694-A0E3-AC63-B67A-7FA6C2909AD5}"/>
+              </a:ext>
+            </a:extLst>
+          </p:cNvPr>
+          <p:cNvSpPr/>
+          <p:nvPr/>
+        </p:nvSpPr>
+        <p:spPr>
+          <a:xfrm>
+            <a:off x="7210785" y="3608017"/>
+            <a:ext cx="1469136" cy="1206127"/>
+          </a:xfrm>
+          <a:prstGeom prst="donut">
+            <a:avLst>
+              <a:gd name="adj" fmla="val 2976"/>
+            </a:avLst>
+          </a:prstGeom>
+          <a:solidFill>
+            <a:srgbClr val="FF0000"/>
+          </a:solidFill>
+          <a:ln>
+            <a:solidFill>
+              <a:srgbClr val="FF0000"/>
+            </a:solidFill>
+          </a:ln>
+        </p:spPr>
+        <p:style>
+          <a:lnRef idx="2">
+            <a:schemeClr val="accent1">
+              <a:shade val="15000"/>
+            </a:schemeClr>
+          </a:lnRef>
+          <a:fillRef idx="1">
+            <a:schemeClr val="accent1"/>
+          </a:fillRef>
+          <a:effectRef idx="0">
+            <a:schemeClr val="accent1"/>
+          </a:effectRef>
+          <a:fontRef idx="minor">
+            <a:schemeClr val="lt1"/>
+          </a:fontRef>
+        </p:style>
+        <p:txBody>
+          <a:bodyPr rtlCol="0" anchor="ctr"/>
+          <a:lstStyle/>
+          <a:p>
+            <a:pPr algn="ctr"/>
+            <a:endParaRPr kumimoji="1" lang="ja-ES" altLang="en-US">
+              <a:solidFill>
+                <a:schemeClr val="tx1"/>
+              </a:solidFill>
+            </a:endParaRPr>
+          </a:p>
+        </p:txBody>
+      </p:sp>
+      <p:cxnSp>
+        <p:nvCxnSpPr>
+          <p:cNvPr id="11" name="直線コネクタ 10">
+            <a:extLst>
+              <a:ext uri="{FF2B5EF4-FFF2-40B4-BE49-F238E27FC236}">
+                <a16:creationId xmlns:a16="http://schemas.microsoft.com/office/drawing/2014/main" id="{CB1F4330-5B58-AB9F-A8C3-6F28EB10DDC7}"/>
+              </a:ext>
+            </a:extLst>
+          </p:cNvPr>
+          <p:cNvCxnSpPr>
+            <a:cxnSpLocks/>
+          </p:cNvCxnSpPr>
+          <p:nvPr/>
+        </p:nvCxnSpPr>
+        <p:spPr>
+          <a:xfrm flipV="1">
+            <a:off x="8371346" y="3429000"/>
+            <a:ext cx="489271" cy="172942"/>
+          </a:xfrm>
+          <a:prstGeom prst="line">
+            <a:avLst/>
+          </a:prstGeom>
+          <a:ln w="69850">
+            <a:solidFill>
+              <a:schemeClr val="tx1"/>
+            </a:solidFill>
+            <a:headEnd type="oval"/>
+          </a:ln>
+        </p:spPr>
+        <p:style>
+          <a:lnRef idx="2">
+            <a:schemeClr val="accent1"/>
+          </a:lnRef>
+          <a:fillRef idx="0">
+            <a:schemeClr val="accent1"/>
+          </a:fillRef>
+          <a:effectRef idx="1">
+            <a:schemeClr val="accent1"/>
+          </a:effectRef>
+          <a:fontRef idx="minor">
+            <a:schemeClr val="tx1"/>
+          </a:fontRef>
+        </p:style>
+      </p:cxnSp>
+      <mc:AlternateContent xmlns:mc="http://schemas.openxmlformats.org/markup-compatibility/2006">
+        <mc:Choice xmlns:a14="http://schemas.microsoft.com/office/drawing/2010/main" Requires="a14">
+          <p:sp>
+            <p:nvSpPr>
+              <p:cNvPr id="13" name="テキスト ボックス 12">
+                <a:extLst>
+                  <a:ext uri="{FF2B5EF4-FFF2-40B4-BE49-F238E27FC236}">
+                    <a16:creationId xmlns:a16="http://schemas.microsoft.com/office/drawing/2014/main" id="{DC2CACD7-BA86-29C0-8951-672F880B0A50}"/>
+                  </a:ext>
+                </a:extLst>
+              </p:cNvPr>
+              <p:cNvSpPr txBox="1"/>
+              <p:nvPr/>
+            </p:nvSpPr>
+            <p:spPr>
+              <a:xfrm>
+                <a:off x="8860617" y="2793351"/>
+                <a:ext cx="3118412" cy="3170099"/>
+              </a:xfrm>
+              <a:prstGeom prst="rect">
+                <a:avLst/>
+              </a:prstGeom>
+              <a:noFill/>
+              <a:ln w="31750">
+                <a:solidFill>
+                  <a:schemeClr val="tx1"/>
+                </a:solidFill>
+              </a:ln>
+            </p:spPr>
+            <p:txBody>
+              <a:bodyPr wrap="square" rtlCol="0">
+                <a:spAutoFit/>
+              </a:bodyPr>
+              <a:lstStyle/>
+              <a:p>
+                <a:pPr marL="342900" indent="-342900">
+                  <a:buFont typeface="Arial" panose="020B0604020202020204" pitchFamily="34" charset="0"/>
+                  <a:buChar char="•"/>
+                </a:pPr>
+                <a:r>
+                  <a:rPr kumimoji="1" lang="ja-ES" altLang="en-US" sz="2000" dirty="0">
+                    <a:latin typeface="Meiryo" panose="020B0604030504040204" pitchFamily="34" charset="-128"/>
+                    <a:ea typeface="Meiryo" panose="020B0604030504040204" pitchFamily="34" charset="-128"/>
+                    <a:cs typeface="Arial" panose="020B0604020202020204" pitchFamily="34" charset="0"/>
+                  </a:rPr>
+                  <a:t>重力レンズ</a:t>
+                </a:r>
+                <a:r>
+                  <a:rPr kumimoji="1" lang="en-US" altLang="ja-ES" sz="2000" dirty="0">
+                    <a:latin typeface="Meiryo" panose="020B0604030504040204" pitchFamily="34" charset="-128"/>
+                    <a:ea typeface="Meiryo" panose="020B0604030504040204" pitchFamily="34" charset="-128"/>
+                    <a:cs typeface="Arial" panose="020B0604020202020204" pitchFamily="34" charset="0"/>
+                  </a:rPr>
+                  <a:t>B</a:t>
+                </a:r>
+                <a:r>
+                  <a:rPr kumimoji="1" lang="ja-ES" altLang="en-US" sz="2000" dirty="0">
+                    <a:latin typeface="Meiryo" panose="020B0604030504040204" pitchFamily="34" charset="-128"/>
+                    <a:ea typeface="Meiryo" panose="020B0604030504040204" pitchFamily="34" charset="-128"/>
+                    <a:cs typeface="Arial" panose="020B0604020202020204" pitchFamily="34" charset="0"/>
+                  </a:rPr>
+                  <a:t>モード</a:t>
+                </a:r>
+                <a:endParaRPr kumimoji="1" lang="en-US" altLang="ja-ES" sz="2000" dirty="0">
+                  <a:latin typeface="Meiryo" panose="020B0604030504040204" pitchFamily="34" charset="-128"/>
+                  <a:ea typeface="Meiryo" panose="020B0604030504040204" pitchFamily="34" charset="-128"/>
+                  <a:cs typeface="Arial" panose="020B0604020202020204" pitchFamily="34" charset="0"/>
+                </a:endParaRPr>
+              </a:p>
+              <a:p>
+                <a:pPr marL="800100" lvl="1" indent="-342900">
+                  <a:buFont typeface="Wingdings" pitchFamily="2" charset="2"/>
+                  <a:buChar char="§"/>
+                </a:pPr>
+                <a:r>
+                  <a:rPr kumimoji="1" lang="ja-ES" altLang="en-US" sz="2000" dirty="0">
+                    <a:latin typeface="Meiryo" panose="020B0604030504040204" pitchFamily="34" charset="-128"/>
+                    <a:ea typeface="Meiryo" panose="020B0604030504040204" pitchFamily="34" charset="-128"/>
+                    <a:cs typeface="Arial" panose="020B0604020202020204" pitchFamily="34" charset="0"/>
+                  </a:rPr>
+                  <a:t>小角度スケール</a:t>
+                </a:r>
+                <a:r>
+                  <a:rPr kumimoji="1" lang="en-US" altLang="ja-ES" sz="2000" dirty="0">
+                    <a:latin typeface="Meiryo" panose="020B0604030504040204" pitchFamily="34" charset="-128"/>
+                    <a:ea typeface="Meiryo" panose="020B0604030504040204" pitchFamily="34" charset="-128"/>
+                    <a:cs typeface="Arial" panose="020B0604020202020204" pitchFamily="34" charset="0"/>
+                  </a:rPr>
+                  <a:t>(</a:t>
+                </a:r>
+                <a14:m>
+                  <m:oMath xmlns:m="http://schemas.openxmlformats.org/officeDocument/2006/math">
+                    <m:r>
+                      <a:rPr kumimoji="1" lang="en-US" altLang="ja-ES" sz="2000" i="1" smtClean="0">
+                        <a:latin typeface="Cambria Math" panose="02040503050406030204" pitchFamily="18" charset="0"/>
+                        <a:ea typeface="Cambria Math" panose="02040503050406030204" pitchFamily="18" charset="0"/>
+                        <a:cs typeface="Arial" panose="020B0604020202020204" pitchFamily="34" charset="0"/>
+                      </a:rPr>
+                      <m:t>ℓ</m:t>
+                    </m:r>
+                    <m:r>
+                      <a:rPr kumimoji="1" lang="en-US" altLang="ja-ES" sz="2000" b="0" i="1" smtClean="0">
+                        <a:latin typeface="Cambria Math" panose="02040503050406030204" pitchFamily="18" charset="0"/>
+                        <a:ea typeface="Cambria Math" panose="02040503050406030204" pitchFamily="18" charset="0"/>
+                        <a:cs typeface="Arial" panose="020B0604020202020204" pitchFamily="34" charset="0"/>
+                      </a:rPr>
+                      <m:t>~1000</m:t>
+                    </m:r>
+                  </m:oMath>
+                </a14:m>
+                <a:r>
+                  <a:rPr kumimoji="1" lang="en-US" altLang="ja-ES" sz="2000" dirty="0">
+                    <a:latin typeface="Meiryo" panose="020B0604030504040204" pitchFamily="34" charset="-128"/>
+                    <a:ea typeface="Meiryo" panose="020B0604030504040204" pitchFamily="34" charset="-128"/>
+                    <a:cs typeface="Arial" panose="020B0604020202020204" pitchFamily="34" charset="0"/>
+                  </a:rPr>
+                  <a:t>)</a:t>
+                </a:r>
+              </a:p>
+              <a:p>
+                <a:pPr marL="800100" lvl="1" indent="-342900">
+                  <a:buFont typeface="Wingdings" pitchFamily="2" charset="2"/>
+                  <a:buChar char="§"/>
+                </a:pPr>
+                <a:r>
+                  <a:rPr kumimoji="1" lang="en-US" altLang="ja-ES" sz="2000" dirty="0">
+                    <a:latin typeface="Meiryo" panose="020B0604030504040204" pitchFamily="34" charset="-128"/>
+                    <a:ea typeface="Meiryo" panose="020B0604030504040204" pitchFamily="34" charset="-128"/>
+                    <a:cs typeface="Arial" panose="020B0604020202020204" pitchFamily="34" charset="0"/>
+                  </a:rPr>
+                  <a:t>E</a:t>
+                </a:r>
+                <a:r>
+                  <a:rPr kumimoji="1" lang="ja-ES" altLang="en-US" sz="2000" dirty="0">
+                    <a:latin typeface="Meiryo" panose="020B0604030504040204" pitchFamily="34" charset="-128"/>
+                    <a:ea typeface="Meiryo" panose="020B0604030504040204" pitchFamily="34" charset="-128"/>
+                    <a:cs typeface="Arial" panose="020B0604020202020204" pitchFamily="34" charset="0"/>
+                  </a:rPr>
+                  <a:t>モード偏光が我々に届くまでに</a:t>
+                </a:r>
+                <a:r>
+                  <a:rPr kumimoji="1" lang="en-US" altLang="ja-ES" sz="2000" dirty="0">
+                    <a:latin typeface="Meiryo" panose="020B0604030504040204" pitchFamily="34" charset="-128"/>
+                    <a:ea typeface="Meiryo" panose="020B0604030504040204" pitchFamily="34" charset="-128"/>
+                    <a:cs typeface="Arial" panose="020B0604020202020204" pitchFamily="34" charset="0"/>
+                  </a:rPr>
+                  <a:t>B</a:t>
+                </a:r>
+                <a:r>
+                  <a:rPr kumimoji="1" lang="ja-ES" altLang="en-US" sz="2000" dirty="0">
+                    <a:latin typeface="Meiryo" panose="020B0604030504040204" pitchFamily="34" charset="-128"/>
+                    <a:ea typeface="Meiryo" panose="020B0604030504040204" pitchFamily="34" charset="-128"/>
+                    <a:cs typeface="Arial" panose="020B0604020202020204" pitchFamily="34" charset="0"/>
+                  </a:rPr>
+                  <a:t>モードに変わる</a:t>
+                </a:r>
+                <a:endParaRPr kumimoji="1" lang="en-US" altLang="ja-ES" sz="2000" dirty="0">
+                  <a:latin typeface="Meiryo" panose="020B0604030504040204" pitchFamily="34" charset="-128"/>
+                  <a:ea typeface="Meiryo" panose="020B0604030504040204" pitchFamily="34" charset="-128"/>
+                  <a:cs typeface="Arial" panose="020B0604020202020204" pitchFamily="34" charset="0"/>
+                </a:endParaRPr>
+              </a:p>
+              <a:p>
+                <a:pPr marL="800100" lvl="1" indent="-342900">
+                  <a:buFont typeface="Wingdings" pitchFamily="2" charset="2"/>
+                  <a:buChar char="§"/>
+                </a:pPr>
+                <a14:m>
+                  <m:oMath xmlns:m="http://schemas.openxmlformats.org/officeDocument/2006/math">
+                    <m:nary>
+                      <m:naryPr>
+                        <m:chr m:val="∑"/>
+                        <m:subHide m:val="on"/>
+                        <m:supHide m:val="on"/>
+                        <m:ctrlPr>
+                          <a:rPr kumimoji="1" lang="ja-ES" altLang="en-US" sz="2000" i="1" smtClean="0">
+                            <a:latin typeface="Cambria Math" panose="02040503050406030204" pitchFamily="18" charset="0"/>
+                            <a:ea typeface="Meiryo" panose="020B0604030504040204" pitchFamily="34" charset="-128"/>
+                            <a:cs typeface="Arial" panose="020B0604020202020204" pitchFamily="34" charset="0"/>
+                          </a:rPr>
+                        </m:ctrlPr>
+                      </m:naryPr>
+                      <m:sub/>
+                      <m:sup/>
+                      <m:e>
+                        <m:sSub>
+                          <m:sSubPr>
+                            <m:ctrlPr>
+                              <a:rPr kumimoji="1" lang="en-US" altLang="ja-ES" sz="2000" i="1" smtClean="0">
+                                <a:latin typeface="Cambria Math" panose="02040503050406030204" pitchFamily="18" charset="0"/>
+                                <a:ea typeface="Meiryo" panose="020B0604030504040204" pitchFamily="34" charset="-128"/>
+                                <a:cs typeface="Arial" panose="020B0604020202020204" pitchFamily="34" charset="0"/>
+                              </a:rPr>
+                            </m:ctrlPr>
+                          </m:sSubPr>
+                          <m:e>
+                            <m:r>
+                              <m:rPr>
+                                <m:sty m:val="p"/>
+                              </m:rPr>
+                              <a:rPr kumimoji="1" lang="en-US" altLang="ja-ES" sz="2000" i="0">
+                                <a:latin typeface="Cambria Math" panose="02040503050406030204" pitchFamily="18" charset="0"/>
+                                <a:ea typeface="Meiryo" panose="020B0604030504040204" pitchFamily="34" charset="-128"/>
+                                <a:cs typeface="Arial" panose="020B0604020202020204" pitchFamily="34" charset="0"/>
+                              </a:rPr>
+                              <m:t>m</m:t>
+                            </m:r>
+                          </m:e>
+                          <m:sub>
+                            <m:r>
+                              <m:rPr>
+                                <m:sty m:val="p"/>
+                              </m:rPr>
+                              <a:rPr kumimoji="1" lang="en-US" altLang="ja-ES" sz="2000" i="0" smtClean="0">
+                                <a:latin typeface="Cambria Math" panose="02040503050406030204" pitchFamily="18" charset="0"/>
+                                <a:ea typeface="Cambria Math" panose="02040503050406030204" pitchFamily="18" charset="0"/>
+                                <a:cs typeface="Arial" panose="020B0604020202020204" pitchFamily="34" charset="0"/>
+                              </a:rPr>
+                              <m:t>ν</m:t>
+                            </m:r>
+                          </m:sub>
+                        </m:sSub>
+                      </m:e>
+                    </m:nary>
+                  </m:oMath>
+                </a14:m>
+                <a:r>
+                  <a:rPr kumimoji="1" lang="ja-ES" altLang="en-US" sz="2000" dirty="0">
+                    <a:latin typeface="Meiryo" panose="020B0604030504040204" pitchFamily="34" charset="-128"/>
+                    <a:ea typeface="Meiryo" panose="020B0604030504040204" pitchFamily="34" charset="-128"/>
+                    <a:cs typeface="Arial" panose="020B0604020202020204" pitchFamily="34" charset="0"/>
+                  </a:rPr>
+                  <a:t>と縮退した宇宙再電離期の光学的厚み</a:t>
+                </a:r>
+                <a14:m>
+                  <m:oMath xmlns:m="http://schemas.openxmlformats.org/officeDocument/2006/math">
+                    <m:r>
+                      <a:rPr kumimoji="1" lang="en-US" altLang="ja-ES" sz="2000" b="0" i="0" dirty="0" smtClean="0">
+                        <a:latin typeface="Cambria Math" panose="02040503050406030204" pitchFamily="18" charset="0"/>
+                        <a:ea typeface="Meiryo" panose="020B0604030504040204" pitchFamily="34" charset="-128"/>
+                        <a:cs typeface="Arial" panose="020B0604020202020204" pitchFamily="34" charset="0"/>
+                      </a:rPr>
+                      <m:t> </m:t>
+                    </m:r>
+                    <m:r>
+                      <a:rPr kumimoji="1" lang="ja-ES" altLang="en-US" sz="2000" i="1" dirty="0" smtClean="0">
+                        <a:latin typeface="Cambria Math" panose="02040503050406030204" pitchFamily="18" charset="0"/>
+                        <a:ea typeface="Meiryo" panose="020B0604030504040204" pitchFamily="34" charset="-128"/>
+                        <a:cs typeface="Arial" panose="020B0604020202020204" pitchFamily="34" charset="0"/>
+                      </a:rPr>
+                      <m:t>𝜏</m:t>
+                    </m:r>
+                    <m:r>
+                      <a:rPr kumimoji="1" lang="en-US" altLang="ja-ES" sz="2000" b="0" i="1" dirty="0" smtClean="0">
+                        <a:latin typeface="Cambria Math" panose="02040503050406030204" pitchFamily="18" charset="0"/>
+                        <a:ea typeface="Meiryo" panose="020B0604030504040204" pitchFamily="34" charset="-128"/>
+                        <a:cs typeface="Arial" panose="020B0604020202020204" pitchFamily="34" charset="0"/>
+                      </a:rPr>
+                      <m:t> </m:t>
+                    </m:r>
+                  </m:oMath>
+                </a14:m>
+                <a:r>
+                  <a:rPr kumimoji="1" lang="ja-ES" altLang="en-US" sz="2000" dirty="0">
+                    <a:latin typeface="Meiryo" panose="020B0604030504040204" pitchFamily="34" charset="-128"/>
+                    <a:ea typeface="Meiryo" panose="020B0604030504040204" pitchFamily="34" charset="-128"/>
+                    <a:cs typeface="Arial" panose="020B0604020202020204" pitchFamily="34" charset="0"/>
+                  </a:rPr>
+                  <a:t>の測定</a:t>
+                </a:r>
+                <a:endParaRPr kumimoji="1" lang="en-US" altLang="ja-ES" sz="2000" dirty="0">
+                  <a:latin typeface="Meiryo" panose="020B0604030504040204" pitchFamily="34" charset="-128"/>
+                  <a:ea typeface="Meiryo" panose="020B0604030504040204" pitchFamily="34" charset="-128"/>
+                  <a:cs typeface="Arial" panose="020B0604020202020204" pitchFamily="34" charset="0"/>
+                </a:endParaRPr>
+              </a:p>
+              <a:p>
+                <a:pPr marL="800100" lvl="1" indent="-342900">
+                  <a:buFont typeface="Wingdings" pitchFamily="2" charset="2"/>
+                  <a:buChar char="§"/>
+                </a:pPr>
+                <a:endParaRPr kumimoji="1" lang="en-US" altLang="ja-ES" sz="2000" dirty="0">
+                  <a:latin typeface="Meiryo" panose="020B0604030504040204" pitchFamily="34" charset="-128"/>
+                  <a:ea typeface="Meiryo" panose="020B0604030504040204" pitchFamily="34" charset="-128"/>
+                  <a:cs typeface="Arial" panose="020B0604020202020204" pitchFamily="34" charset="0"/>
+                </a:endParaRPr>
+              </a:p>
+            </p:txBody>
+          </p:sp>
+        </mc:Choice>
+        <mc:Fallback>
+          <p:sp>
+            <p:nvSpPr>
+              <p:cNvPr id="13" name="テキスト ボックス 12">
+                <a:extLst>
+                  <a:ext uri="{FF2B5EF4-FFF2-40B4-BE49-F238E27FC236}">
+                    <a16:creationId xmlns:a16="http://schemas.microsoft.com/office/drawing/2014/main" id="{DC2CACD7-BA86-29C0-8951-672F880B0A50}"/>
+                  </a:ext>
+                </a:extLst>
+              </p:cNvPr>
+              <p:cNvSpPr txBox="1">
+                <a:spLocks noRot="1" noChangeAspect="1" noMove="1" noResize="1" noEditPoints="1" noAdjustHandles="1" noChangeArrowheads="1" noChangeShapeType="1" noTextEdit="1"/>
+              </p:cNvSpPr>
+              <p:nvPr/>
+            </p:nvSpPr>
+            <p:spPr>
+              <a:xfrm>
+                <a:off x="8860617" y="2793351"/>
+                <a:ext cx="3118412" cy="3170099"/>
+              </a:xfrm>
+              <a:prstGeom prst="rect">
+                <a:avLst/>
+              </a:prstGeom>
+              <a:blipFill>
+                <a:blip r:embed="rId4"/>
+                <a:stretch>
+                  <a:fillRect l="-1205" t="-791"/>
+                </a:stretch>
+              </a:blipFill>
+              <a:ln w="31750">
+                <a:solidFill>
+                  <a:schemeClr val="tx1"/>
+                </a:solidFill>
+              </a:ln>
+            </p:spPr>
+            <p:txBody>
+              <a:bodyPr/>
+              <a:lstStyle/>
+              <a:p>
+                <a:r>
+                  <a:rPr lang="ja-ES" altLang="en-US">
+                    <a:noFill/>
+                  </a:rPr>
+                  <a:t> </a:t>
+                </a:r>
+              </a:p>
+            </p:txBody>
+          </p:sp>
+        </mc:Fallback>
+      </mc:AlternateContent>
+      <p:sp>
+        <p:nvSpPr>
+          <p:cNvPr id="18" name="ドーナツ 17">
+            <a:extLst>
+              <a:ext uri="{FF2B5EF4-FFF2-40B4-BE49-F238E27FC236}">
+                <a16:creationId xmlns:a16="http://schemas.microsoft.com/office/drawing/2014/main" id="{B4F3131D-D24E-9D99-0A9D-095FFDF81121}"/>
+              </a:ext>
+            </a:extLst>
+          </p:cNvPr>
+          <p:cNvSpPr/>
+          <p:nvPr/>
+        </p:nvSpPr>
+        <p:spPr>
+          <a:xfrm>
+            <a:off x="4355371" y="4535682"/>
+            <a:ext cx="2059830" cy="1391415"/>
+          </a:xfrm>
+          <a:prstGeom prst="donut">
+            <a:avLst>
+              <a:gd name="adj" fmla="val 2976"/>
+            </a:avLst>
+          </a:prstGeom>
+          <a:solidFill>
+            <a:srgbClr val="FF0000"/>
+          </a:solidFill>
+          <a:ln>
+            <a:solidFill>
+              <a:srgbClr val="FF0000"/>
+            </a:solidFill>
+          </a:ln>
+        </p:spPr>
+        <p:style>
+          <a:lnRef idx="2">
+            <a:schemeClr val="accent1">
+              <a:shade val="15000"/>
+            </a:schemeClr>
+          </a:lnRef>
+          <a:fillRef idx="1">
+            <a:schemeClr val="accent1"/>
+          </a:fillRef>
+          <a:effectRef idx="0">
+            <a:schemeClr val="accent1"/>
+          </a:effectRef>
+          <a:fontRef idx="minor">
+            <a:schemeClr val="lt1"/>
+          </a:fontRef>
+        </p:style>
+        <p:txBody>
+          <a:bodyPr rtlCol="0" anchor="ctr"/>
+          <a:lstStyle/>
+          <a:p>
+            <a:pPr algn="ctr"/>
+            <a:endParaRPr kumimoji="1" lang="ja-ES" altLang="en-US">
+              <a:solidFill>
+                <a:schemeClr val="tx1"/>
+              </a:solidFill>
+            </a:endParaRPr>
+          </a:p>
+        </p:txBody>
+      </p:sp>
+      <p:cxnSp>
+        <p:nvCxnSpPr>
+          <p:cNvPr id="19" name="直線コネクタ 18">
+            <a:extLst>
+              <a:ext uri="{FF2B5EF4-FFF2-40B4-BE49-F238E27FC236}">
+                <a16:creationId xmlns:a16="http://schemas.microsoft.com/office/drawing/2014/main" id="{91150503-B9D8-2DEC-D722-B627D0911C8B}"/>
+              </a:ext>
+            </a:extLst>
+          </p:cNvPr>
+          <p:cNvCxnSpPr>
+            <a:cxnSpLocks/>
+          </p:cNvCxnSpPr>
+          <p:nvPr/>
+        </p:nvCxnSpPr>
+        <p:spPr>
+          <a:xfrm flipH="1" flipV="1">
+            <a:off x="3730981" y="4974336"/>
+            <a:ext cx="511835" cy="192024"/>
+          </a:xfrm>
+          <a:prstGeom prst="line">
+            <a:avLst/>
+          </a:prstGeom>
+          <a:ln w="69850">
+            <a:solidFill>
+              <a:schemeClr val="tx1"/>
+            </a:solidFill>
+            <a:headEnd type="oval"/>
+          </a:ln>
+        </p:spPr>
+        <p:style>
+          <a:lnRef idx="2">
+            <a:schemeClr val="accent1"/>
+          </a:lnRef>
+          <a:fillRef idx="0">
+            <a:schemeClr val="accent1"/>
+          </a:fillRef>
+          <a:effectRef idx="1">
+            <a:schemeClr val="accent1"/>
+          </a:effectRef>
+          <a:fontRef idx="minor">
+            <a:schemeClr val="tx1"/>
+          </a:fontRef>
+        </p:style>
+      </p:cxnSp>
+      <mc:AlternateContent xmlns:mc="http://schemas.openxmlformats.org/markup-compatibility/2006">
+        <mc:Choice xmlns:a14="http://schemas.microsoft.com/office/drawing/2010/main" Requires="a14">
+          <p:sp>
+            <p:nvSpPr>
+              <p:cNvPr id="24" name="テキスト ボックス 23">
+                <a:extLst>
+                  <a:ext uri="{FF2B5EF4-FFF2-40B4-BE49-F238E27FC236}">
+                    <a16:creationId xmlns:a16="http://schemas.microsoft.com/office/drawing/2014/main" id="{C9C7FF12-1FEE-BC15-21EE-ACE78560214F}"/>
+                  </a:ext>
+                </a:extLst>
+              </p:cNvPr>
+              <p:cNvSpPr txBox="1"/>
+              <p:nvPr/>
+            </p:nvSpPr>
+            <p:spPr>
+              <a:xfrm>
+                <a:off x="126869" y="2840372"/>
+                <a:ext cx="3604112" cy="3170099"/>
+              </a:xfrm>
+              <a:prstGeom prst="rect">
+                <a:avLst/>
+              </a:prstGeom>
+              <a:noFill/>
+              <a:ln w="31750">
+                <a:solidFill>
+                  <a:schemeClr val="tx1"/>
+                </a:solidFill>
+              </a:ln>
+            </p:spPr>
+            <p:txBody>
+              <a:bodyPr wrap="square" rtlCol="0">
+                <a:spAutoFit/>
+              </a:bodyPr>
+              <a:lstStyle/>
+              <a:p>
+                <a:pPr marL="342900" indent="-342900">
+                  <a:buFont typeface="Arial" panose="020B0604020202020204" pitchFamily="34" charset="0"/>
+                  <a:buChar char="•"/>
+                </a:pPr>
+                <a:r>
+                  <a:rPr kumimoji="1" lang="ja-ES" altLang="en-US" sz="2000" dirty="0">
+                    <a:latin typeface="Meiryo" panose="020B0604030504040204" pitchFamily="34" charset="-128"/>
+                    <a:ea typeface="Meiryo" panose="020B0604030504040204" pitchFamily="34" charset="-128"/>
+                    <a:cs typeface="Arial" panose="020B0604020202020204" pitchFamily="34" charset="0"/>
+                  </a:rPr>
+                  <a:t>重力レンズ</a:t>
+                </a:r>
+                <a:r>
+                  <a:rPr kumimoji="1" lang="en-US" altLang="ja-ES" sz="2000" dirty="0">
+                    <a:latin typeface="Meiryo" panose="020B0604030504040204" pitchFamily="34" charset="-128"/>
+                    <a:ea typeface="Meiryo" panose="020B0604030504040204" pitchFamily="34" charset="-128"/>
+                    <a:cs typeface="Arial" panose="020B0604020202020204" pitchFamily="34" charset="0"/>
+                  </a:rPr>
+                  <a:t>B</a:t>
+                </a:r>
+                <a:r>
+                  <a:rPr kumimoji="1" lang="ja-ES" altLang="en-US" sz="2000" dirty="0">
+                    <a:latin typeface="Meiryo" panose="020B0604030504040204" pitchFamily="34" charset="-128"/>
+                    <a:ea typeface="Meiryo" panose="020B0604030504040204" pitchFamily="34" charset="-128"/>
+                    <a:cs typeface="Arial" panose="020B0604020202020204" pitchFamily="34" charset="0"/>
+                  </a:rPr>
+                  <a:t>モード</a:t>
+                </a:r>
+                <a:endParaRPr kumimoji="1" lang="en-US" altLang="ja-ES" sz="2000" dirty="0">
+                  <a:latin typeface="Meiryo" panose="020B0604030504040204" pitchFamily="34" charset="-128"/>
+                  <a:ea typeface="Meiryo" panose="020B0604030504040204" pitchFamily="34" charset="-128"/>
+                  <a:cs typeface="Arial" panose="020B0604020202020204" pitchFamily="34" charset="0"/>
+                </a:endParaRPr>
+              </a:p>
+              <a:p>
+                <a:pPr marL="800100" lvl="1" indent="-342900">
+                  <a:buFont typeface="Wingdings" pitchFamily="2" charset="2"/>
+                  <a:buChar char="§"/>
+                </a:pPr>
+                <a:r>
+                  <a:rPr kumimoji="1" lang="ja-ES" altLang="en-US" sz="2000" dirty="0">
+                    <a:latin typeface="Meiryo" panose="020B0604030504040204" pitchFamily="34" charset="-128"/>
+                    <a:ea typeface="Meiryo" panose="020B0604030504040204" pitchFamily="34" charset="-128"/>
+                    <a:cs typeface="Arial" panose="020B0604020202020204" pitchFamily="34" charset="0"/>
+                  </a:rPr>
+                  <a:t>小角度スケール</a:t>
+                </a:r>
+                <a:r>
+                  <a:rPr kumimoji="1" lang="en-US" altLang="ja-ES" sz="2000" dirty="0">
+                    <a:latin typeface="Meiryo" panose="020B0604030504040204" pitchFamily="34" charset="-128"/>
+                    <a:ea typeface="Meiryo" panose="020B0604030504040204" pitchFamily="34" charset="-128"/>
+                    <a:cs typeface="Arial" panose="020B0604020202020204" pitchFamily="34" charset="0"/>
+                  </a:rPr>
+                  <a:t>(</a:t>
+                </a:r>
+                <a14:m>
+                  <m:oMath xmlns:m="http://schemas.openxmlformats.org/officeDocument/2006/math">
+                    <m:r>
+                      <a:rPr kumimoji="1" lang="en-US" altLang="ja-ES" sz="2000" i="1" smtClean="0">
+                        <a:latin typeface="Cambria Math" panose="02040503050406030204" pitchFamily="18" charset="0"/>
+                        <a:ea typeface="Cambria Math" panose="02040503050406030204" pitchFamily="18" charset="0"/>
+                        <a:cs typeface="Arial" panose="020B0604020202020204" pitchFamily="34" charset="0"/>
+                      </a:rPr>
+                      <m:t>ℓ</m:t>
+                    </m:r>
+                    <m:r>
+                      <a:rPr kumimoji="1" lang="en-US" altLang="ja-ES" sz="2000" b="0" i="1" smtClean="0">
+                        <a:latin typeface="Cambria Math" panose="02040503050406030204" pitchFamily="18" charset="0"/>
+                        <a:ea typeface="Cambria Math" panose="02040503050406030204" pitchFamily="18" charset="0"/>
+                        <a:cs typeface="Arial" panose="020B0604020202020204" pitchFamily="34" charset="0"/>
+                      </a:rPr>
+                      <m:t>~1000</m:t>
+                    </m:r>
+                  </m:oMath>
+                </a14:m>
+                <a:r>
+                  <a:rPr kumimoji="1" lang="en-US" altLang="ja-ES" sz="2000" dirty="0">
+                    <a:latin typeface="Meiryo" panose="020B0604030504040204" pitchFamily="34" charset="-128"/>
+                    <a:ea typeface="Meiryo" panose="020B0604030504040204" pitchFamily="34" charset="-128"/>
+                    <a:cs typeface="Arial" panose="020B0604020202020204" pitchFamily="34" charset="0"/>
+                  </a:rPr>
+                  <a:t>)</a:t>
+                </a:r>
+              </a:p>
+              <a:p>
+                <a:pPr marL="800100" lvl="1" indent="-342900">
+                  <a:buFont typeface="Wingdings" pitchFamily="2" charset="2"/>
+                  <a:buChar char="§"/>
+                </a:pPr>
+                <a:r>
+                  <a:rPr kumimoji="1" lang="en-US" altLang="ja-ES" sz="2000" dirty="0">
+                    <a:latin typeface="Meiryo" panose="020B0604030504040204" pitchFamily="34" charset="-128"/>
+                    <a:ea typeface="Meiryo" panose="020B0604030504040204" pitchFamily="34" charset="-128"/>
+                    <a:cs typeface="Arial" panose="020B0604020202020204" pitchFamily="34" charset="0"/>
+                  </a:rPr>
+                  <a:t>E</a:t>
+                </a:r>
+                <a:r>
+                  <a:rPr kumimoji="1" lang="ja-ES" altLang="en-US" sz="2000" dirty="0">
+                    <a:latin typeface="Meiryo" panose="020B0604030504040204" pitchFamily="34" charset="-128"/>
+                    <a:ea typeface="Meiryo" panose="020B0604030504040204" pitchFamily="34" charset="-128"/>
+                    <a:cs typeface="Arial" panose="020B0604020202020204" pitchFamily="34" charset="0"/>
+                  </a:rPr>
+                  <a:t>モード偏光が我々に届くまでに</a:t>
+                </a:r>
+                <a:r>
+                  <a:rPr kumimoji="1" lang="en-US" altLang="ja-ES" sz="2000" dirty="0">
+                    <a:latin typeface="Meiryo" panose="020B0604030504040204" pitchFamily="34" charset="-128"/>
+                    <a:ea typeface="Meiryo" panose="020B0604030504040204" pitchFamily="34" charset="-128"/>
+                    <a:cs typeface="Arial" panose="020B0604020202020204" pitchFamily="34" charset="0"/>
+                  </a:rPr>
+                  <a:t>B</a:t>
+                </a:r>
+                <a:r>
+                  <a:rPr kumimoji="1" lang="ja-ES" altLang="en-US" sz="2000" dirty="0">
+                    <a:latin typeface="Meiryo" panose="020B0604030504040204" pitchFamily="34" charset="-128"/>
+                    <a:ea typeface="Meiryo" panose="020B0604030504040204" pitchFamily="34" charset="-128"/>
+                    <a:cs typeface="Arial" panose="020B0604020202020204" pitchFamily="34" charset="0"/>
+                  </a:rPr>
+                  <a:t>モードに変わる</a:t>
+                </a:r>
+                <a:endParaRPr kumimoji="1" lang="en-US" altLang="ja-ES" sz="2000" dirty="0">
+                  <a:latin typeface="Meiryo" panose="020B0604030504040204" pitchFamily="34" charset="-128"/>
+                  <a:ea typeface="Meiryo" panose="020B0604030504040204" pitchFamily="34" charset="-128"/>
+                  <a:cs typeface="Arial" panose="020B0604020202020204" pitchFamily="34" charset="0"/>
+                </a:endParaRPr>
+              </a:p>
+              <a:p>
+                <a:pPr marL="800100" lvl="1" indent="-342900">
+                  <a:buFont typeface="Wingdings" pitchFamily="2" charset="2"/>
+                  <a:buChar char="§"/>
+                </a:pPr>
+                <a14:m>
+                  <m:oMath xmlns:m="http://schemas.openxmlformats.org/officeDocument/2006/math">
+                    <m:nary>
+                      <m:naryPr>
+                        <m:chr m:val="∑"/>
+                        <m:subHide m:val="on"/>
+                        <m:supHide m:val="on"/>
+                        <m:ctrlPr>
+                          <a:rPr kumimoji="1" lang="ja-ES" altLang="en-US" sz="2000" i="1" smtClean="0">
+                            <a:latin typeface="Cambria Math" panose="02040503050406030204" pitchFamily="18" charset="0"/>
+                            <a:ea typeface="Meiryo" panose="020B0604030504040204" pitchFamily="34" charset="-128"/>
+                            <a:cs typeface="Arial" panose="020B0604020202020204" pitchFamily="34" charset="0"/>
+                          </a:rPr>
+                        </m:ctrlPr>
+                      </m:naryPr>
+                      <m:sub/>
+                      <m:sup/>
+                      <m:e>
+                        <m:sSub>
+                          <m:sSubPr>
+                            <m:ctrlPr>
+                              <a:rPr kumimoji="1" lang="en-US" altLang="ja-ES" sz="2000" i="1" smtClean="0">
+                                <a:latin typeface="Cambria Math" panose="02040503050406030204" pitchFamily="18" charset="0"/>
+                                <a:ea typeface="Meiryo" panose="020B0604030504040204" pitchFamily="34" charset="-128"/>
+                                <a:cs typeface="Arial" panose="020B0604020202020204" pitchFamily="34" charset="0"/>
+                              </a:rPr>
+                            </m:ctrlPr>
+                          </m:sSubPr>
+                          <m:e>
+                            <m:r>
+                              <m:rPr>
+                                <m:sty m:val="p"/>
+                              </m:rPr>
+                              <a:rPr kumimoji="1" lang="en-US" altLang="ja-ES" sz="2000" i="0">
+                                <a:latin typeface="Cambria Math" panose="02040503050406030204" pitchFamily="18" charset="0"/>
+                                <a:ea typeface="Meiryo" panose="020B0604030504040204" pitchFamily="34" charset="-128"/>
+                                <a:cs typeface="Arial" panose="020B0604020202020204" pitchFamily="34" charset="0"/>
+                              </a:rPr>
+                              <m:t>m</m:t>
+                            </m:r>
+                          </m:e>
+                          <m:sub>
+                            <m:r>
+                              <m:rPr>
+                                <m:sty m:val="p"/>
+                              </m:rPr>
+                              <a:rPr kumimoji="1" lang="en-US" altLang="ja-ES" sz="2000" i="0" smtClean="0">
+                                <a:latin typeface="Cambria Math" panose="02040503050406030204" pitchFamily="18" charset="0"/>
+                                <a:ea typeface="Cambria Math" panose="02040503050406030204" pitchFamily="18" charset="0"/>
+                                <a:cs typeface="Arial" panose="020B0604020202020204" pitchFamily="34" charset="0"/>
+                              </a:rPr>
+                              <m:t>ν</m:t>
+                            </m:r>
+                          </m:sub>
+                        </m:sSub>
+                      </m:e>
+                    </m:nary>
+                  </m:oMath>
+                </a14:m>
+                <a:r>
+                  <a:rPr kumimoji="1" lang="ja-ES" altLang="en-US" sz="2000" dirty="0">
+                    <a:latin typeface="Meiryo" panose="020B0604030504040204" pitchFamily="34" charset="-128"/>
+                    <a:ea typeface="Meiryo" panose="020B0604030504040204" pitchFamily="34" charset="-128"/>
+                    <a:cs typeface="Arial" panose="020B0604020202020204" pitchFamily="34" charset="0"/>
+                  </a:rPr>
+                  <a:t>と縮退した宇宙再電離期の光学的厚み</a:t>
+                </a:r>
+                <a14:m>
+                  <m:oMath xmlns:m="http://schemas.openxmlformats.org/officeDocument/2006/math">
+                    <m:r>
+                      <a:rPr kumimoji="1" lang="en-US" altLang="ja-ES" sz="2000" b="0" i="0" dirty="0" smtClean="0">
+                        <a:latin typeface="Cambria Math" panose="02040503050406030204" pitchFamily="18" charset="0"/>
+                        <a:ea typeface="Meiryo" panose="020B0604030504040204" pitchFamily="34" charset="-128"/>
+                        <a:cs typeface="Arial" panose="020B0604020202020204" pitchFamily="34" charset="0"/>
+                      </a:rPr>
+                      <m:t> </m:t>
+                    </m:r>
+                    <m:r>
+                      <a:rPr kumimoji="1" lang="ja-ES" altLang="en-US" sz="2000" i="1" dirty="0" smtClean="0">
+                        <a:latin typeface="Cambria Math" panose="02040503050406030204" pitchFamily="18" charset="0"/>
+                        <a:ea typeface="Meiryo" panose="020B0604030504040204" pitchFamily="34" charset="-128"/>
+                        <a:cs typeface="Arial" panose="020B0604020202020204" pitchFamily="34" charset="0"/>
+                      </a:rPr>
+                      <m:t>𝜏</m:t>
+                    </m:r>
+                    <m:r>
+                      <a:rPr kumimoji="1" lang="en-US" altLang="ja-ES" sz="2000" b="0" i="1" dirty="0" smtClean="0">
+                        <a:latin typeface="Cambria Math" panose="02040503050406030204" pitchFamily="18" charset="0"/>
+                        <a:ea typeface="Meiryo" panose="020B0604030504040204" pitchFamily="34" charset="-128"/>
+                        <a:cs typeface="Arial" panose="020B0604020202020204" pitchFamily="34" charset="0"/>
+                      </a:rPr>
+                      <m:t> </m:t>
+                    </m:r>
+                  </m:oMath>
+                </a14:m>
+                <a:r>
+                  <a:rPr kumimoji="1" lang="ja-ES" altLang="en-US" sz="2000" dirty="0">
+                    <a:latin typeface="Meiryo" panose="020B0604030504040204" pitchFamily="34" charset="-128"/>
+                    <a:ea typeface="Meiryo" panose="020B0604030504040204" pitchFamily="34" charset="-128"/>
+                    <a:cs typeface="Arial" panose="020B0604020202020204" pitchFamily="34" charset="0"/>
+                  </a:rPr>
+                  <a:t>の測定</a:t>
+                </a:r>
+                <a:endParaRPr kumimoji="1" lang="en-US" altLang="ja-ES" sz="2000" dirty="0">
+                  <a:latin typeface="Meiryo" panose="020B0604030504040204" pitchFamily="34" charset="-128"/>
+                  <a:ea typeface="Meiryo" panose="020B0604030504040204" pitchFamily="34" charset="-128"/>
+                  <a:cs typeface="Arial" panose="020B0604020202020204" pitchFamily="34" charset="0"/>
+                </a:endParaRPr>
+              </a:p>
+              <a:p>
+                <a:pPr marL="800100" lvl="1" indent="-342900">
+                  <a:buFont typeface="Wingdings" pitchFamily="2" charset="2"/>
+                  <a:buChar char="§"/>
+                </a:pPr>
+                <a:endParaRPr kumimoji="1" lang="en-US" altLang="ja-ES" sz="2000" dirty="0">
+                  <a:latin typeface="Meiryo" panose="020B0604030504040204" pitchFamily="34" charset="-128"/>
+                  <a:ea typeface="Meiryo" panose="020B0604030504040204" pitchFamily="34" charset="-128"/>
+                  <a:cs typeface="Arial" panose="020B0604020202020204" pitchFamily="34" charset="0"/>
+                </a:endParaRPr>
+              </a:p>
+            </p:txBody>
+          </p:sp>
+        </mc:Choice>
+        <mc:Fallback>
+          <p:sp>
+            <p:nvSpPr>
+              <p:cNvPr id="24" name="テキスト ボックス 23">
+                <a:extLst>
+                  <a:ext uri="{FF2B5EF4-FFF2-40B4-BE49-F238E27FC236}">
+                    <a16:creationId xmlns:a16="http://schemas.microsoft.com/office/drawing/2014/main" id="{C9C7FF12-1FEE-BC15-21EE-ACE78560214F}"/>
+                  </a:ext>
+                </a:extLst>
+              </p:cNvPr>
+              <p:cNvSpPr txBox="1">
+                <a:spLocks noRot="1" noChangeAspect="1" noMove="1" noResize="1" noEditPoints="1" noAdjustHandles="1" noChangeArrowheads="1" noChangeShapeType="1" noTextEdit="1"/>
+              </p:cNvSpPr>
+              <p:nvPr/>
+            </p:nvSpPr>
+            <p:spPr>
+              <a:xfrm>
+                <a:off x="126869" y="2840372"/>
+                <a:ext cx="3604112" cy="3170099"/>
+              </a:xfrm>
+              <a:prstGeom prst="rect">
+                <a:avLst/>
+              </a:prstGeom>
+              <a:blipFill>
+                <a:blip r:embed="rId5"/>
+                <a:stretch>
+                  <a:fillRect l="-1394" t="-791"/>
+                </a:stretch>
+              </a:blipFill>
+              <a:ln w="31750">
+                <a:solidFill>
+                  <a:schemeClr val="tx1"/>
+                </a:solidFill>
+              </a:ln>
+            </p:spPr>
+            <p:txBody>
+              <a:bodyPr/>
+              <a:lstStyle/>
+              <a:p>
+                <a:r>
+                  <a:rPr lang="ja-ES" altLang="en-US">
+                    <a:noFill/>
+                  </a:rPr>
+                  <a:t> </a:t>
+                </a:r>
+              </a:p>
+            </p:txBody>
+          </p:sp>
+        </mc:Fallback>
+      </mc:AlternateContent>
     </p:spTree>
     <p:extLst>
       <p:ext uri="{BB962C8B-B14F-4D97-AF65-F5344CB8AC3E}">

</xml_diff>

<commit_message>
Commit at 2025-01-26 18:30:01
</commit_message>
<xml_diff>
--- a/mt_presentation.pptx
+++ b/mt_presentation.pptx
@@ -11,8 +11,8 @@
     <p:sldId id="256" r:id="rId2"/>
     <p:sldId id="383" r:id="rId3"/>
     <p:sldId id="382" r:id="rId4"/>
-    <p:sldId id="384" r:id="rId5"/>
-    <p:sldId id="385" r:id="rId6"/>
+    <p:sldId id="385" r:id="rId5"/>
+    <p:sldId id="384" r:id="rId6"/>
     <p:sldId id="386" r:id="rId7"/>
     <p:sldId id="387" r:id="rId8"/>
     <p:sldId id="388" r:id="rId9"/>
@@ -594,7 +594,7 @@
         <p:cNvPr id="1" name="">
           <a:extLst>
             <a:ext uri="{FF2B5EF4-FFF2-40B4-BE49-F238E27FC236}">
-              <a16:creationId xmlns:a16="http://schemas.microsoft.com/office/drawing/2014/main" id="{B3B43DA5-DCAC-0E7E-8AE7-0D3A6955BEF4}"/>
+              <a16:creationId xmlns:a16="http://schemas.microsoft.com/office/drawing/2014/main" id="{49FE36B3-3AA8-7F66-A4FB-CB1EC26D69FA}"/>
             </a:ext>
           </a:extLst>
         </p:cNvPr>
@@ -614,7 +614,7 @@
           <p:cNvPr id="2" name="スライド イメージ プレースホルダー 1">
             <a:extLst>
               <a:ext uri="{FF2B5EF4-FFF2-40B4-BE49-F238E27FC236}">
-                <a16:creationId xmlns:a16="http://schemas.microsoft.com/office/drawing/2014/main" id="{8AE1021D-A003-B413-93C6-18CFCC69DEEE}"/>
+                <a16:creationId xmlns:a16="http://schemas.microsoft.com/office/drawing/2014/main" id="{7EFE5852-76F7-27F4-9EE7-D914B6DDA431}"/>
               </a:ext>
             </a:extLst>
           </p:cNvPr>
@@ -632,7 +632,7 @@
           <p:cNvPr id="3" name="ノート プレースホルダー 2">
             <a:extLst>
               <a:ext uri="{FF2B5EF4-FFF2-40B4-BE49-F238E27FC236}">
-                <a16:creationId xmlns:a16="http://schemas.microsoft.com/office/drawing/2014/main" id="{769000A6-4683-FAC1-3754-97D384A11E23}"/>
+                <a16:creationId xmlns:a16="http://schemas.microsoft.com/office/drawing/2014/main" id="{9F6AA2A0-6239-DBFF-1812-48469CEB45A3}"/>
               </a:ext>
             </a:extLst>
           </p:cNvPr>
@@ -660,7 +660,7 @@
           <p:cNvPr id="4" name="スライド番号プレースホルダー 3">
             <a:extLst>
               <a:ext uri="{FF2B5EF4-FFF2-40B4-BE49-F238E27FC236}">
-                <a16:creationId xmlns:a16="http://schemas.microsoft.com/office/drawing/2014/main" id="{922A1A0D-C3E8-0D76-9F99-9F68EC563646}"/>
+                <a16:creationId xmlns:a16="http://schemas.microsoft.com/office/drawing/2014/main" id="{876D5C3B-F692-D130-6C7D-D43A43B54C92}"/>
               </a:ext>
             </a:extLst>
           </p:cNvPr>
@@ -687,7 +687,7 @@
     </p:spTree>
     <p:extLst>
       <p:ext uri="{BB962C8B-B14F-4D97-AF65-F5344CB8AC3E}">
-        <p14:creationId xmlns:p14="http://schemas.microsoft.com/office/powerpoint/2010/main" val="3257920284"/>
+        <p14:creationId xmlns:p14="http://schemas.microsoft.com/office/powerpoint/2010/main" val="2685656053"/>
       </p:ext>
     </p:extLst>
   </p:cSld>
@@ -705,7 +705,7 @@
         <p:cNvPr id="1" name="">
           <a:extLst>
             <a:ext uri="{FF2B5EF4-FFF2-40B4-BE49-F238E27FC236}">
-              <a16:creationId xmlns:a16="http://schemas.microsoft.com/office/drawing/2014/main" id="{49FE36B3-3AA8-7F66-A4FB-CB1EC26D69FA}"/>
+              <a16:creationId xmlns:a16="http://schemas.microsoft.com/office/drawing/2014/main" id="{B3B43DA5-DCAC-0E7E-8AE7-0D3A6955BEF4}"/>
             </a:ext>
           </a:extLst>
         </p:cNvPr>
@@ -725,7 +725,7 @@
           <p:cNvPr id="2" name="スライド イメージ プレースホルダー 1">
             <a:extLst>
               <a:ext uri="{FF2B5EF4-FFF2-40B4-BE49-F238E27FC236}">
-                <a16:creationId xmlns:a16="http://schemas.microsoft.com/office/drawing/2014/main" id="{7EFE5852-76F7-27F4-9EE7-D914B6DDA431}"/>
+                <a16:creationId xmlns:a16="http://schemas.microsoft.com/office/drawing/2014/main" id="{8AE1021D-A003-B413-93C6-18CFCC69DEEE}"/>
               </a:ext>
             </a:extLst>
           </p:cNvPr>
@@ -743,7 +743,7 @@
           <p:cNvPr id="3" name="ノート プレースホルダー 2">
             <a:extLst>
               <a:ext uri="{FF2B5EF4-FFF2-40B4-BE49-F238E27FC236}">
-                <a16:creationId xmlns:a16="http://schemas.microsoft.com/office/drawing/2014/main" id="{9F6AA2A0-6239-DBFF-1812-48469CEB45A3}"/>
+                <a16:creationId xmlns:a16="http://schemas.microsoft.com/office/drawing/2014/main" id="{769000A6-4683-FAC1-3754-97D384A11E23}"/>
               </a:ext>
             </a:extLst>
           </p:cNvPr>
@@ -771,7 +771,7 @@
           <p:cNvPr id="4" name="スライド番号プレースホルダー 3">
             <a:extLst>
               <a:ext uri="{FF2B5EF4-FFF2-40B4-BE49-F238E27FC236}">
-                <a16:creationId xmlns:a16="http://schemas.microsoft.com/office/drawing/2014/main" id="{876D5C3B-F692-D130-6C7D-D43A43B54C92}"/>
+                <a16:creationId xmlns:a16="http://schemas.microsoft.com/office/drawing/2014/main" id="{922A1A0D-C3E8-0D76-9F99-9F68EC563646}"/>
               </a:ext>
             </a:extLst>
           </p:cNvPr>
@@ -798,7 +798,7 @@
     </p:spTree>
     <p:extLst>
       <p:ext uri="{BB962C8B-B14F-4D97-AF65-F5344CB8AC3E}">
-        <p14:creationId xmlns:p14="http://schemas.microsoft.com/office/powerpoint/2010/main" val="2685656053"/>
+        <p14:creationId xmlns:p14="http://schemas.microsoft.com/office/powerpoint/2010/main" val="3257920284"/>
       </p:ext>
     </p:extLst>
   </p:cSld>
@@ -6425,7 +6425,7 @@
         <p:cNvPr id="1" name="">
           <a:extLst>
             <a:ext uri="{FF2B5EF4-FFF2-40B4-BE49-F238E27FC236}">
-              <a16:creationId xmlns:a16="http://schemas.microsoft.com/office/drawing/2014/main" id="{6E0C56A2-4A3C-912C-F3F8-6D3C5A70B12E}"/>
+              <a16:creationId xmlns:a16="http://schemas.microsoft.com/office/drawing/2014/main" id="{8C17F089-01FA-8687-5FF9-CDF79E4D5577}"/>
             </a:ext>
           </a:extLst>
         </p:cNvPr>
@@ -6445,7 +6445,7 @@
           <p:cNvPr id="2" name="タイトル 1">
             <a:extLst>
               <a:ext uri="{FF2B5EF4-FFF2-40B4-BE49-F238E27FC236}">
-                <a16:creationId xmlns:a16="http://schemas.microsoft.com/office/drawing/2014/main" id="{E0A0F0F7-853F-CA18-BC6E-9D91D9B3F51D}"/>
+                <a16:creationId xmlns:a16="http://schemas.microsoft.com/office/drawing/2014/main" id="{8115C4B4-B927-6D78-13F8-E77462D11B31}"/>
               </a:ext>
             </a:extLst>
           </p:cNvPr>
@@ -6493,7 +6493,7 @@
                 <a:latin typeface="Meiryo" panose="020B0604030504040204" pitchFamily="34" charset="-128"/>
                 <a:ea typeface="Meiryo" panose="020B0604030504040204" pitchFamily="34" charset="-128"/>
               </a:rPr>
-              <a:t>B</a:t>
+              <a:t>E</a:t>
             </a:r>
             <a:r>
               <a:rPr kumimoji="1" lang="ja-ES" altLang="en-US" sz="3600" dirty="0">
@@ -6514,7 +6514,7 @@
           <p:cNvPr id="4" name="日付プレースホルダー 3">
             <a:extLst>
               <a:ext uri="{FF2B5EF4-FFF2-40B4-BE49-F238E27FC236}">
-                <a16:creationId xmlns:a16="http://schemas.microsoft.com/office/drawing/2014/main" id="{79B334D9-ED85-0F60-396C-69EBA90EEB42}"/>
+                <a16:creationId xmlns:a16="http://schemas.microsoft.com/office/drawing/2014/main" id="{E0F67EB0-3DCC-9EF7-18E3-77875B6C9297}"/>
               </a:ext>
             </a:extLst>
           </p:cNvPr>
@@ -6543,7 +6543,7 @@
           <p:cNvPr id="6" name="スライド番号プレースホルダー 5">
             <a:extLst>
               <a:ext uri="{FF2B5EF4-FFF2-40B4-BE49-F238E27FC236}">
-                <a16:creationId xmlns:a16="http://schemas.microsoft.com/office/drawing/2014/main" id="{A6C719DC-83F5-F678-B12A-13D0801F5BDA}"/>
+                <a16:creationId xmlns:a16="http://schemas.microsoft.com/office/drawing/2014/main" id="{9EBD5B6D-6B58-2E10-3846-A3599F5B8CA0}"/>
               </a:ext>
             </a:extLst>
           </p:cNvPr>
@@ -6572,7 +6572,7 @@
           <p:cNvPr id="9" name="コンテンツ プレースホルダー 2">
             <a:extLst>
               <a:ext uri="{FF2B5EF4-FFF2-40B4-BE49-F238E27FC236}">
-                <a16:creationId xmlns:a16="http://schemas.microsoft.com/office/drawing/2014/main" id="{87632D40-0F12-9B4A-5883-C7DE78322207}"/>
+                <a16:creationId xmlns:a16="http://schemas.microsoft.com/office/drawing/2014/main" id="{233C107A-CAF2-51AD-E1E1-CDB9A2B9FAD0}"/>
               </a:ext>
             </a:extLst>
           </p:cNvPr>
@@ -6775,6 +6775,476 @@
           <p:cNvPr id="3" name="フッター プレースホルダー 2">
             <a:extLst>
               <a:ext uri="{FF2B5EF4-FFF2-40B4-BE49-F238E27FC236}">
+                <a16:creationId xmlns:a16="http://schemas.microsoft.com/office/drawing/2014/main" id="{42EBB180-9AF8-E25E-C73D-B4E85A18E754}"/>
+              </a:ext>
+            </a:extLst>
+          </p:cNvPr>
+          <p:cNvSpPr>
+            <a:spLocks noGrp="1"/>
+          </p:cNvSpPr>
+          <p:nvPr>
+            <p:ph type="ftr" sz="quarter" idx="11"/>
+          </p:nvPr>
+        </p:nvSpPr>
+        <p:spPr/>
+        <p:txBody>
+          <a:bodyPr/>
+          <a:lstStyle/>
+          <a:p>
+            <a:r>
+              <a:rPr kumimoji="1" lang="ja-JP" altLang="en-US"/>
+              <a:t>修論発表会</a:t>
+            </a:r>
+            <a:endParaRPr kumimoji="1" lang="ja-ES" altLang="en-US"/>
+          </a:p>
+        </p:txBody>
+      </p:sp>
+      <p:sp>
+        <p:nvSpPr>
+          <p:cNvPr id="5" name="テキスト ボックス 4">
+            <a:extLst>
+              <a:ext uri="{FF2B5EF4-FFF2-40B4-BE49-F238E27FC236}">
+                <a16:creationId xmlns:a16="http://schemas.microsoft.com/office/drawing/2014/main" id="{EC656AFD-E505-DACA-CFEF-0BBC1A5928FE}"/>
+              </a:ext>
+            </a:extLst>
+          </p:cNvPr>
+          <p:cNvSpPr txBox="1"/>
+          <p:nvPr/>
+        </p:nvSpPr>
+        <p:spPr>
+          <a:xfrm>
+            <a:off x="262128" y="1171054"/>
+            <a:ext cx="11667744" cy="400110"/>
+          </a:xfrm>
+          <a:prstGeom prst="rect">
+            <a:avLst/>
+          </a:prstGeom>
+          <a:noFill/>
+        </p:spPr>
+        <p:txBody>
+          <a:bodyPr wrap="square" rtlCol="0">
+            <a:spAutoFit/>
+          </a:bodyPr>
+          <a:lstStyle/>
+          <a:p>
+            <a:pPr marL="342900" indent="-342900">
+              <a:buFont typeface="Arial" panose="020B0604020202020204" pitchFamily="34" charset="0"/>
+              <a:buChar char="•"/>
+            </a:pPr>
+            <a:r>
+              <a:rPr kumimoji="1" lang="en-US" altLang="ja-ES" sz="2000" dirty="0">
+                <a:latin typeface="Meiryo" panose="020B0604030504040204" pitchFamily="34" charset="-128"/>
+                <a:ea typeface="Meiryo" panose="020B0604030504040204" pitchFamily="34" charset="-128"/>
+                <a:cs typeface="Arial" panose="020B0604020202020204" pitchFamily="34" charset="0"/>
+              </a:rPr>
+              <a:t>CMB</a:t>
+            </a:r>
+            <a:r>
+              <a:rPr kumimoji="1" lang="ja-ES" altLang="en-US" sz="2000" dirty="0">
+                <a:latin typeface="Meiryo" panose="020B0604030504040204" pitchFamily="34" charset="-128"/>
+                <a:ea typeface="Meiryo" panose="020B0604030504040204" pitchFamily="34" charset="-128"/>
+                <a:cs typeface="Arial" panose="020B0604020202020204" pitchFamily="34" charset="0"/>
+              </a:rPr>
+              <a:t>の偏光は角度スケールに対する</a:t>
+            </a:r>
+            <a:r>
+              <a:rPr kumimoji="1" lang="ja-ES" altLang="en-US" sz="2000" dirty="0">
+                <a:solidFill>
+                  <a:srgbClr val="FF0000"/>
+                </a:solidFill>
+                <a:latin typeface="Meiryo" panose="020B0604030504040204" pitchFamily="34" charset="-128"/>
+                <a:ea typeface="Meiryo" panose="020B0604030504040204" pitchFamily="34" charset="-128"/>
+                <a:cs typeface="Arial" panose="020B0604020202020204" pitchFamily="34" charset="0"/>
+              </a:rPr>
+              <a:t>パワースペクトル</a:t>
+            </a:r>
+            <a:r>
+              <a:rPr kumimoji="1" lang="ja-ES" altLang="en-US" sz="2000" dirty="0">
+                <a:latin typeface="Meiryo" panose="020B0604030504040204" pitchFamily="34" charset="-128"/>
+                <a:ea typeface="Meiryo" panose="020B0604030504040204" pitchFamily="34" charset="-128"/>
+                <a:cs typeface="Arial" panose="020B0604020202020204" pitchFamily="34" charset="0"/>
+              </a:rPr>
+              <a:t>を通して観測する</a:t>
+            </a:r>
+            <a:endParaRPr kumimoji="1" lang="en-US" altLang="ja-ES" sz="2000" dirty="0">
+              <a:latin typeface="Meiryo" panose="020B0604030504040204" pitchFamily="34" charset="-128"/>
+              <a:ea typeface="Meiryo" panose="020B0604030504040204" pitchFamily="34" charset="-128"/>
+              <a:cs typeface="Arial" panose="020B0604020202020204" pitchFamily="34" charset="0"/>
+            </a:endParaRPr>
+          </a:p>
+        </p:txBody>
+      </p:sp>
+    </p:spTree>
+    <p:extLst>
+      <p:ext uri="{BB962C8B-B14F-4D97-AF65-F5344CB8AC3E}">
+        <p14:creationId xmlns:p14="http://schemas.microsoft.com/office/powerpoint/2010/main" val="222617811"/>
+      </p:ext>
+    </p:extLst>
+  </p:cSld>
+  <p:clrMapOvr>
+    <a:masterClrMapping/>
+  </p:clrMapOvr>
+</p:sld>
+</file>
+
+<file path=ppt/slides/slide5.xml><?xml version="1.0" encoding="utf-8"?>
+<p:sld xmlns:a="http://schemas.openxmlformats.org/drawingml/2006/main" xmlns:r="http://schemas.openxmlformats.org/officeDocument/2006/relationships" xmlns:p="http://schemas.openxmlformats.org/presentationml/2006/main">
+  <p:cSld>
+    <p:spTree>
+      <p:nvGrpSpPr>
+        <p:cNvPr id="1" name="">
+          <a:extLst>
+            <a:ext uri="{FF2B5EF4-FFF2-40B4-BE49-F238E27FC236}">
+              <a16:creationId xmlns:a16="http://schemas.microsoft.com/office/drawing/2014/main" id="{6E0C56A2-4A3C-912C-F3F8-6D3C5A70B12E}"/>
+            </a:ext>
+          </a:extLst>
+        </p:cNvPr>
+        <p:cNvGrpSpPr/>
+        <p:nvPr/>
+      </p:nvGrpSpPr>
+      <p:grpSpPr>
+        <a:xfrm>
+          <a:off x="0" y="0"/>
+          <a:ext cx="0" cy="0"/>
+          <a:chOff x="0" y="0"/>
+          <a:chExt cx="0" cy="0"/>
+        </a:xfrm>
+      </p:grpSpPr>
+      <p:sp>
+        <p:nvSpPr>
+          <p:cNvPr id="2" name="タイトル 1">
+            <a:extLst>
+              <a:ext uri="{FF2B5EF4-FFF2-40B4-BE49-F238E27FC236}">
+                <a16:creationId xmlns:a16="http://schemas.microsoft.com/office/drawing/2014/main" id="{E0A0F0F7-853F-CA18-BC6E-9D91D9B3F51D}"/>
+              </a:ext>
+            </a:extLst>
+          </p:cNvPr>
+          <p:cNvSpPr>
+            <a:spLocks noGrp="1"/>
+          </p:cNvSpPr>
+          <p:nvPr>
+            <p:ph type="title"/>
+          </p:nvPr>
+        </p:nvSpPr>
+        <p:spPr>
+          <a:xfrm>
+            <a:off x="0" y="-6128"/>
+            <a:ext cx="12192000" cy="1089862"/>
+          </a:xfrm>
+          <a:solidFill>
+            <a:schemeClr val="tx2">
+              <a:lumMod val="25000"/>
+              <a:lumOff val="75000"/>
+            </a:schemeClr>
+          </a:solidFill>
+        </p:spPr>
+        <p:txBody>
+          <a:bodyPr>
+            <a:normAutofit/>
+          </a:bodyPr>
+          <a:lstStyle/>
+          <a:p>
+            <a:r>
+              <a:rPr kumimoji="1" lang="en-US" altLang="ja-JP" sz="3600" dirty="0">
+                <a:latin typeface="Meiryo" panose="020B0604030504040204" pitchFamily="34" charset="-128"/>
+                <a:ea typeface="Meiryo" panose="020B0604030504040204" pitchFamily="34" charset="-128"/>
+              </a:rPr>
+              <a:t>   </a:t>
+            </a:r>
+            <a:r>
+              <a:rPr kumimoji="1" lang="ja-ES" altLang="en-US" sz="3600" dirty="0">
+                <a:latin typeface="Meiryo" panose="020B0604030504040204" pitchFamily="34" charset="-128"/>
+                <a:ea typeface="Meiryo" panose="020B0604030504040204" pitchFamily="34" charset="-128"/>
+              </a:rPr>
+              <a:t>偏光</a:t>
+            </a:r>
+            <a:r>
+              <a:rPr kumimoji="1" lang="en-US" altLang="ja-ES" sz="3600" dirty="0">
+                <a:latin typeface="Meiryo" panose="020B0604030504040204" pitchFamily="34" charset="-128"/>
+                <a:ea typeface="Meiryo" panose="020B0604030504040204" pitchFamily="34" charset="-128"/>
+              </a:rPr>
+              <a:t>B</a:t>
+            </a:r>
+            <a:r>
+              <a:rPr kumimoji="1" lang="ja-ES" altLang="en-US" sz="3600" dirty="0">
+                <a:latin typeface="Meiryo" panose="020B0604030504040204" pitchFamily="34" charset="-128"/>
+                <a:ea typeface="Meiryo" panose="020B0604030504040204" pitchFamily="34" charset="-128"/>
+              </a:rPr>
+              <a:t>モードと角度スケール</a:t>
+            </a:r>
+            <a:endParaRPr kumimoji="1" lang="ja-JP" altLang="en-US" sz="2400">
+              <a:latin typeface="Meiryo" panose="020B0604030504040204" pitchFamily="34" charset="-128"/>
+              <a:ea typeface="Meiryo" panose="020B0604030504040204" pitchFamily="34" charset="-128"/>
+            </a:endParaRPr>
+          </a:p>
+        </p:txBody>
+      </p:sp>
+      <p:sp>
+        <p:nvSpPr>
+          <p:cNvPr id="4" name="日付プレースホルダー 3">
+            <a:extLst>
+              <a:ext uri="{FF2B5EF4-FFF2-40B4-BE49-F238E27FC236}">
+                <a16:creationId xmlns:a16="http://schemas.microsoft.com/office/drawing/2014/main" id="{79B334D9-ED85-0F60-396C-69EBA90EEB42}"/>
+              </a:ext>
+            </a:extLst>
+          </p:cNvPr>
+          <p:cNvSpPr>
+            <a:spLocks noGrp="1"/>
+          </p:cNvSpPr>
+          <p:nvPr>
+            <p:ph type="dt" sz="half" idx="10"/>
+          </p:nvPr>
+        </p:nvSpPr>
+        <p:spPr/>
+        <p:txBody>
+          <a:bodyPr/>
+          <a:lstStyle/>
+          <a:p>
+            <a:r>
+              <a:rPr kumimoji="1" lang="en-US" altLang="ja-JP"/>
+              <a:t>2025/2/3</a:t>
+            </a:r>
+            <a:endParaRPr kumimoji="1" lang="ja-JP" altLang="en-US"/>
+          </a:p>
+        </p:txBody>
+      </p:sp>
+      <p:sp>
+        <p:nvSpPr>
+          <p:cNvPr id="6" name="スライド番号プレースホルダー 5">
+            <a:extLst>
+              <a:ext uri="{FF2B5EF4-FFF2-40B4-BE49-F238E27FC236}">
+                <a16:creationId xmlns:a16="http://schemas.microsoft.com/office/drawing/2014/main" id="{A6C719DC-83F5-F678-B12A-13D0801F5BDA}"/>
+              </a:ext>
+            </a:extLst>
+          </p:cNvPr>
+          <p:cNvSpPr>
+            <a:spLocks noGrp="1"/>
+          </p:cNvSpPr>
+          <p:nvPr>
+            <p:ph type="sldNum" sz="quarter" idx="12"/>
+          </p:nvPr>
+        </p:nvSpPr>
+        <p:spPr/>
+        <p:txBody>
+          <a:bodyPr/>
+          <a:lstStyle/>
+          <a:p>
+            <a:fld id="{A346F7B0-2C6C-2749-AD43-9AA6CBC0C428}" type="slidenum">
+              <a:rPr kumimoji="1" lang="ja-JP" altLang="en-US" smtClean="0"/>
+              <a:t>5</a:t>
+            </a:fld>
+            <a:endParaRPr kumimoji="1" lang="ja-JP" altLang="en-US"/>
+          </a:p>
+        </p:txBody>
+      </p:sp>
+      <p:sp>
+        <p:nvSpPr>
+          <p:cNvPr id="9" name="コンテンツ プレースホルダー 2">
+            <a:extLst>
+              <a:ext uri="{FF2B5EF4-FFF2-40B4-BE49-F238E27FC236}">
+                <a16:creationId xmlns:a16="http://schemas.microsoft.com/office/drawing/2014/main" id="{87632D40-0F12-9B4A-5883-C7DE78322207}"/>
+              </a:ext>
+            </a:extLst>
+          </p:cNvPr>
+          <p:cNvSpPr txBox="1">
+            <a:spLocks/>
+          </p:cNvSpPr>
+          <p:nvPr/>
+        </p:nvSpPr>
+        <p:spPr>
+          <a:xfrm>
+            <a:off x="1008890" y="1571559"/>
+            <a:ext cx="10515600" cy="880999"/>
+          </a:xfrm>
+          <a:prstGeom prst="rect">
+            <a:avLst/>
+          </a:prstGeom>
+        </p:spPr>
+        <p:txBody>
+          <a:bodyPr vert="horz" lIns="91440" tIns="45720" rIns="91440" bIns="45720" rtlCol="0">
+            <a:normAutofit/>
+          </a:bodyPr>
+          <a:lstStyle>
+            <a:lvl1pPr marL="228600" indent="-228600" algn="l" defTabSz="914400" rtl="0" eaLnBrk="1" latinLnBrk="0" hangingPunct="1">
+              <a:lnSpc>
+                <a:spcPct val="90000"/>
+              </a:lnSpc>
+              <a:spcBef>
+                <a:spcPts val="1000"/>
+              </a:spcBef>
+              <a:buFont typeface="Arial" panose="020B0604020202020204" pitchFamily="34" charset="0"/>
+              <a:buChar char="•"/>
+              <a:defRPr kumimoji="1" sz="2800" kern="1200">
+                <a:solidFill>
+                  <a:schemeClr val="tx1"/>
+                </a:solidFill>
+                <a:latin typeface="+mn-lt"/>
+                <a:ea typeface="+mn-ea"/>
+                <a:cs typeface="+mn-cs"/>
+              </a:defRPr>
+            </a:lvl1pPr>
+            <a:lvl2pPr marL="685800" indent="-228600" algn="l" defTabSz="914400" rtl="0" eaLnBrk="1" latinLnBrk="0" hangingPunct="1">
+              <a:lnSpc>
+                <a:spcPct val="90000"/>
+              </a:lnSpc>
+              <a:spcBef>
+                <a:spcPts val="500"/>
+              </a:spcBef>
+              <a:buFont typeface="Arial" panose="020B0604020202020204" pitchFamily="34" charset="0"/>
+              <a:buChar char="•"/>
+              <a:defRPr kumimoji="1" sz="2400" kern="1200">
+                <a:solidFill>
+                  <a:schemeClr val="tx1"/>
+                </a:solidFill>
+                <a:latin typeface="+mn-lt"/>
+                <a:ea typeface="+mn-ea"/>
+                <a:cs typeface="+mn-cs"/>
+              </a:defRPr>
+            </a:lvl2pPr>
+            <a:lvl3pPr marL="1143000" indent="-228600" algn="l" defTabSz="914400" rtl="0" eaLnBrk="1" latinLnBrk="0" hangingPunct="1">
+              <a:lnSpc>
+                <a:spcPct val="90000"/>
+              </a:lnSpc>
+              <a:spcBef>
+                <a:spcPts val="500"/>
+              </a:spcBef>
+              <a:buFont typeface="Arial" panose="020B0604020202020204" pitchFamily="34" charset="0"/>
+              <a:buChar char="•"/>
+              <a:defRPr kumimoji="1" sz="2000" kern="1200">
+                <a:solidFill>
+                  <a:schemeClr val="tx1"/>
+                </a:solidFill>
+                <a:latin typeface="+mn-lt"/>
+                <a:ea typeface="+mn-ea"/>
+                <a:cs typeface="+mn-cs"/>
+              </a:defRPr>
+            </a:lvl3pPr>
+            <a:lvl4pPr marL="1600200" indent="-228600" algn="l" defTabSz="914400" rtl="0" eaLnBrk="1" latinLnBrk="0" hangingPunct="1">
+              <a:lnSpc>
+                <a:spcPct val="90000"/>
+              </a:lnSpc>
+              <a:spcBef>
+                <a:spcPts val="500"/>
+              </a:spcBef>
+              <a:buFont typeface="Arial" panose="020B0604020202020204" pitchFamily="34" charset="0"/>
+              <a:buChar char="•"/>
+              <a:defRPr kumimoji="1" sz="1800" kern="1200">
+                <a:solidFill>
+                  <a:schemeClr val="tx1"/>
+                </a:solidFill>
+                <a:latin typeface="+mn-lt"/>
+                <a:ea typeface="+mn-ea"/>
+                <a:cs typeface="+mn-cs"/>
+              </a:defRPr>
+            </a:lvl4pPr>
+            <a:lvl5pPr marL="2057400" indent="-228600" algn="l" defTabSz="914400" rtl="0" eaLnBrk="1" latinLnBrk="0" hangingPunct="1">
+              <a:lnSpc>
+                <a:spcPct val="90000"/>
+              </a:lnSpc>
+              <a:spcBef>
+                <a:spcPts val="500"/>
+              </a:spcBef>
+              <a:buFont typeface="Arial" panose="020B0604020202020204" pitchFamily="34" charset="0"/>
+              <a:buChar char="•"/>
+              <a:defRPr kumimoji="1" sz="1800" kern="1200">
+                <a:solidFill>
+                  <a:schemeClr val="tx1"/>
+                </a:solidFill>
+                <a:latin typeface="+mn-lt"/>
+                <a:ea typeface="+mn-ea"/>
+                <a:cs typeface="+mn-cs"/>
+              </a:defRPr>
+            </a:lvl5pPr>
+            <a:lvl6pPr marL="2514600" indent="-228600" algn="l" defTabSz="914400" rtl="0" eaLnBrk="1" latinLnBrk="0" hangingPunct="1">
+              <a:lnSpc>
+                <a:spcPct val="90000"/>
+              </a:lnSpc>
+              <a:spcBef>
+                <a:spcPts val="500"/>
+              </a:spcBef>
+              <a:buFont typeface="Arial" panose="020B0604020202020204" pitchFamily="34" charset="0"/>
+              <a:buChar char="•"/>
+              <a:defRPr kumimoji="1" sz="1800" kern="1200">
+                <a:solidFill>
+                  <a:schemeClr val="tx1"/>
+                </a:solidFill>
+                <a:latin typeface="+mn-lt"/>
+                <a:ea typeface="+mn-ea"/>
+                <a:cs typeface="+mn-cs"/>
+              </a:defRPr>
+            </a:lvl6pPr>
+            <a:lvl7pPr marL="2971800" indent="-228600" algn="l" defTabSz="914400" rtl="0" eaLnBrk="1" latinLnBrk="0" hangingPunct="1">
+              <a:lnSpc>
+                <a:spcPct val="90000"/>
+              </a:lnSpc>
+              <a:spcBef>
+                <a:spcPts val="500"/>
+              </a:spcBef>
+              <a:buFont typeface="Arial" panose="020B0604020202020204" pitchFamily="34" charset="0"/>
+              <a:buChar char="•"/>
+              <a:defRPr kumimoji="1" sz="1800" kern="1200">
+                <a:solidFill>
+                  <a:schemeClr val="tx1"/>
+                </a:solidFill>
+                <a:latin typeface="+mn-lt"/>
+                <a:ea typeface="+mn-ea"/>
+                <a:cs typeface="+mn-cs"/>
+              </a:defRPr>
+            </a:lvl7pPr>
+            <a:lvl8pPr marL="3429000" indent="-228600" algn="l" defTabSz="914400" rtl="0" eaLnBrk="1" latinLnBrk="0" hangingPunct="1">
+              <a:lnSpc>
+                <a:spcPct val="90000"/>
+              </a:lnSpc>
+              <a:spcBef>
+                <a:spcPts val="500"/>
+              </a:spcBef>
+              <a:buFont typeface="Arial" panose="020B0604020202020204" pitchFamily="34" charset="0"/>
+              <a:buChar char="•"/>
+              <a:defRPr kumimoji="1" sz="1800" kern="1200">
+                <a:solidFill>
+                  <a:schemeClr val="tx1"/>
+                </a:solidFill>
+                <a:latin typeface="+mn-lt"/>
+                <a:ea typeface="+mn-ea"/>
+                <a:cs typeface="+mn-cs"/>
+              </a:defRPr>
+            </a:lvl8pPr>
+            <a:lvl9pPr marL="3886200" indent="-228600" algn="l" defTabSz="914400" rtl="0" eaLnBrk="1" latinLnBrk="0" hangingPunct="1">
+              <a:lnSpc>
+                <a:spcPct val="90000"/>
+              </a:lnSpc>
+              <a:spcBef>
+                <a:spcPts val="500"/>
+              </a:spcBef>
+              <a:buFont typeface="Arial" panose="020B0604020202020204" pitchFamily="34" charset="0"/>
+              <a:buChar char="•"/>
+              <a:defRPr kumimoji="1" sz="1800" kern="1200">
+                <a:solidFill>
+                  <a:schemeClr val="tx1"/>
+                </a:solidFill>
+                <a:latin typeface="+mn-lt"/>
+                <a:ea typeface="+mn-ea"/>
+                <a:cs typeface="+mn-cs"/>
+              </a:defRPr>
+            </a:lvl9pPr>
+          </a:lstStyle>
+          <a:p>
+            <a:pPr marL="0" indent="0">
+              <a:buFont typeface="Arial" panose="020B0604020202020204" pitchFamily="34" charset="0"/>
+              <a:buNone/>
+            </a:pPr>
+            <a:endParaRPr lang="ja-JP" altLang="en-US">
+              <a:latin typeface="Meiryo" panose="020B0604030504040204" pitchFamily="34" charset="-128"/>
+              <a:ea typeface="Meiryo" panose="020B0604030504040204" pitchFamily="34" charset="-128"/>
+            </a:endParaRPr>
+          </a:p>
+        </p:txBody>
+      </p:sp>
+      <p:sp>
+        <p:nvSpPr>
+          <p:cNvPr id="3" name="フッター プレースホルダー 2">
+            <a:extLst>
+              <a:ext uri="{FF2B5EF4-FFF2-40B4-BE49-F238E27FC236}">
                 <a16:creationId xmlns:a16="http://schemas.microsoft.com/office/drawing/2014/main" id="{13DA2DEB-1AB6-93F6-433B-908EB58893FE}"/>
               </a:ext>
             </a:extLst>
@@ -6821,7 +7291,7 @@
         </p:blipFill>
         <p:spPr>
           <a:xfrm>
-            <a:off x="3911677" y="2464707"/>
+            <a:off x="3860911" y="2479196"/>
             <a:ext cx="4725904" cy="3797601"/>
           </a:xfrm>
           <a:prstGeom prst="rect">
@@ -6843,7 +7313,7 @@
         </p:nvSpPr>
         <p:spPr>
           <a:xfrm>
-            <a:off x="262128" y="1171054"/>
+            <a:off x="311285" y="959307"/>
             <a:ext cx="11667744" cy="1323439"/>
           </a:xfrm>
           <a:prstGeom prst="rect">
@@ -6857,26 +7327,6 @@
           </a:bodyPr>
           <a:lstStyle/>
           <a:p>
-            <a:pPr marL="342900" indent="-342900">
-              <a:buFont typeface="Arial" panose="020B0604020202020204" pitchFamily="34" charset="0"/>
-              <a:buChar char="•"/>
-            </a:pPr>
-            <a:r>
-              <a:rPr kumimoji="1" lang="en-US" altLang="ja-ES" sz="2000" dirty="0">
-                <a:latin typeface="Meiryo" panose="020B0604030504040204" pitchFamily="34" charset="-128"/>
-                <a:ea typeface="Meiryo" panose="020B0604030504040204" pitchFamily="34" charset="-128"/>
-                <a:cs typeface="Arial" panose="020B0604020202020204" pitchFamily="34" charset="0"/>
-              </a:rPr>
-              <a:t>CMB</a:t>
-            </a:r>
-            <a:r>
-              <a:rPr kumimoji="1" lang="ja-ES" altLang="en-US" sz="2000" dirty="0">
-                <a:latin typeface="Meiryo" panose="020B0604030504040204" pitchFamily="34" charset="-128"/>
-                <a:ea typeface="Meiryo" panose="020B0604030504040204" pitchFamily="34" charset="-128"/>
-                <a:cs typeface="Arial" panose="020B0604020202020204" pitchFamily="34" charset="0"/>
-              </a:rPr>
-              <a:t>の偏光は角度スケールに対するパワースペクトルを通して観測する</a:t>
-            </a:r>
             <a:endParaRPr kumimoji="1" lang="en-US" altLang="ja-ES" sz="2000" dirty="0">
               <a:latin typeface="Meiryo" panose="020B0604030504040204" pitchFamily="34" charset="-128"/>
               <a:ea typeface="Meiryo" panose="020B0604030504040204" pitchFamily="34" charset="-128"/>
@@ -7470,8 +7920,8 @@
         </p:nvSpPr>
         <p:spPr>
           <a:xfrm>
-            <a:off x="4355371" y="4535682"/>
-            <a:ext cx="2059830" cy="1391415"/>
+            <a:off x="4666267" y="4683377"/>
+            <a:ext cx="2059830" cy="1206127"/>
           </a:xfrm>
           <a:prstGeom prst="donut">
             <a:avLst>
@@ -7533,7 +7983,7 @@
         <p:spPr>
           <a:xfrm flipH="1" flipV="1">
             <a:off x="3730981" y="4974336"/>
-            <a:ext cx="511835" cy="192024"/>
+            <a:ext cx="822731" cy="246888"/>
           </a:xfrm>
           <a:prstGeom prst="line">
             <a:avLst/>
@@ -7560,738 +8010,160 @@
           </a:fontRef>
         </p:style>
       </p:cxnSp>
-      <mc:AlternateContent xmlns:mc="http://schemas.openxmlformats.org/markup-compatibility/2006">
-        <mc:Choice xmlns:a14="http://schemas.microsoft.com/office/drawing/2010/main" Requires="a14">
-          <p:sp>
-            <p:nvSpPr>
-              <p:cNvPr id="24" name="テキスト ボックス 23">
-                <a:extLst>
-                  <a:ext uri="{FF2B5EF4-FFF2-40B4-BE49-F238E27FC236}">
-                    <a16:creationId xmlns:a16="http://schemas.microsoft.com/office/drawing/2014/main" id="{C9C7FF12-1FEE-BC15-21EE-ACE78560214F}"/>
-                  </a:ext>
-                </a:extLst>
-              </p:cNvPr>
-              <p:cNvSpPr txBox="1"/>
-              <p:nvPr/>
-            </p:nvSpPr>
-            <p:spPr>
-              <a:xfrm>
-                <a:off x="126869" y="2840372"/>
-                <a:ext cx="3604112" cy="3170099"/>
-              </a:xfrm>
-              <a:prstGeom prst="rect">
-                <a:avLst/>
-              </a:prstGeom>
-              <a:noFill/>
-              <a:ln w="31750">
-                <a:solidFill>
-                  <a:schemeClr val="tx1"/>
-                </a:solidFill>
-              </a:ln>
-            </p:spPr>
-            <p:txBody>
-              <a:bodyPr wrap="square" rtlCol="0">
-                <a:spAutoFit/>
-              </a:bodyPr>
-              <a:lstStyle/>
-              <a:p>
-                <a:pPr marL="342900" indent="-342900">
-                  <a:buFont typeface="Arial" panose="020B0604020202020204" pitchFamily="34" charset="0"/>
-                  <a:buChar char="•"/>
-                </a:pPr>
-                <a:r>
-                  <a:rPr kumimoji="1" lang="ja-ES" altLang="en-US" sz="2000" dirty="0">
-                    <a:latin typeface="Meiryo" panose="020B0604030504040204" pitchFamily="34" charset="-128"/>
-                    <a:ea typeface="Meiryo" panose="020B0604030504040204" pitchFamily="34" charset="-128"/>
-                    <a:cs typeface="Arial" panose="020B0604020202020204" pitchFamily="34" charset="0"/>
-                  </a:rPr>
-                  <a:t>重力レンズ</a:t>
-                </a:r>
-                <a:r>
-                  <a:rPr kumimoji="1" lang="en-US" altLang="ja-ES" sz="2000" dirty="0">
-                    <a:latin typeface="Meiryo" panose="020B0604030504040204" pitchFamily="34" charset="-128"/>
-                    <a:ea typeface="Meiryo" panose="020B0604030504040204" pitchFamily="34" charset="-128"/>
-                    <a:cs typeface="Arial" panose="020B0604020202020204" pitchFamily="34" charset="0"/>
-                  </a:rPr>
-                  <a:t>B</a:t>
-                </a:r>
-                <a:r>
-                  <a:rPr kumimoji="1" lang="ja-ES" altLang="en-US" sz="2000" dirty="0">
-                    <a:latin typeface="Meiryo" panose="020B0604030504040204" pitchFamily="34" charset="-128"/>
-                    <a:ea typeface="Meiryo" panose="020B0604030504040204" pitchFamily="34" charset="-128"/>
-                    <a:cs typeface="Arial" panose="020B0604020202020204" pitchFamily="34" charset="0"/>
-                  </a:rPr>
-                  <a:t>モード</a:t>
-                </a:r>
-                <a:endParaRPr kumimoji="1" lang="en-US" altLang="ja-ES" sz="2000" dirty="0">
-                  <a:latin typeface="Meiryo" panose="020B0604030504040204" pitchFamily="34" charset="-128"/>
-                  <a:ea typeface="Meiryo" panose="020B0604030504040204" pitchFamily="34" charset="-128"/>
-                  <a:cs typeface="Arial" panose="020B0604020202020204" pitchFamily="34" charset="0"/>
-                </a:endParaRPr>
-              </a:p>
-              <a:p>
-                <a:pPr marL="800100" lvl="1" indent="-342900">
-                  <a:buFont typeface="Wingdings" pitchFamily="2" charset="2"/>
-                  <a:buChar char="§"/>
-                </a:pPr>
-                <a:r>
-                  <a:rPr kumimoji="1" lang="ja-ES" altLang="en-US" sz="2000" dirty="0">
-                    <a:latin typeface="Meiryo" panose="020B0604030504040204" pitchFamily="34" charset="-128"/>
-                    <a:ea typeface="Meiryo" panose="020B0604030504040204" pitchFamily="34" charset="-128"/>
-                    <a:cs typeface="Arial" panose="020B0604020202020204" pitchFamily="34" charset="0"/>
-                  </a:rPr>
-                  <a:t>小角度スケール</a:t>
-                </a:r>
-                <a:r>
-                  <a:rPr kumimoji="1" lang="en-US" altLang="ja-ES" sz="2000" dirty="0">
-                    <a:latin typeface="Meiryo" panose="020B0604030504040204" pitchFamily="34" charset="-128"/>
-                    <a:ea typeface="Meiryo" panose="020B0604030504040204" pitchFamily="34" charset="-128"/>
-                    <a:cs typeface="Arial" panose="020B0604020202020204" pitchFamily="34" charset="0"/>
-                  </a:rPr>
-                  <a:t>(</a:t>
-                </a:r>
-                <a14:m>
-                  <m:oMath xmlns:m="http://schemas.openxmlformats.org/officeDocument/2006/math">
-                    <m:r>
-                      <a:rPr kumimoji="1" lang="en-US" altLang="ja-ES" sz="2000" i="1" smtClean="0">
-                        <a:latin typeface="Cambria Math" panose="02040503050406030204" pitchFamily="18" charset="0"/>
-                        <a:ea typeface="Cambria Math" panose="02040503050406030204" pitchFamily="18" charset="0"/>
-                        <a:cs typeface="Arial" panose="020B0604020202020204" pitchFamily="34" charset="0"/>
-                      </a:rPr>
-                      <m:t>ℓ</m:t>
-                    </m:r>
-                    <m:r>
-                      <a:rPr kumimoji="1" lang="en-US" altLang="ja-ES" sz="2000" b="0" i="1" smtClean="0">
-                        <a:latin typeface="Cambria Math" panose="02040503050406030204" pitchFamily="18" charset="0"/>
-                        <a:ea typeface="Cambria Math" panose="02040503050406030204" pitchFamily="18" charset="0"/>
-                        <a:cs typeface="Arial" panose="020B0604020202020204" pitchFamily="34" charset="0"/>
-                      </a:rPr>
-                      <m:t>~1000</m:t>
-                    </m:r>
-                  </m:oMath>
-                </a14:m>
-                <a:r>
-                  <a:rPr kumimoji="1" lang="en-US" altLang="ja-ES" sz="2000" dirty="0">
-                    <a:latin typeface="Meiryo" panose="020B0604030504040204" pitchFamily="34" charset="-128"/>
-                    <a:ea typeface="Meiryo" panose="020B0604030504040204" pitchFamily="34" charset="-128"/>
-                    <a:cs typeface="Arial" panose="020B0604020202020204" pitchFamily="34" charset="0"/>
-                  </a:rPr>
-                  <a:t>)</a:t>
-                </a:r>
-              </a:p>
-              <a:p>
-                <a:pPr marL="800100" lvl="1" indent="-342900">
-                  <a:buFont typeface="Wingdings" pitchFamily="2" charset="2"/>
-                  <a:buChar char="§"/>
-                </a:pPr>
-                <a:r>
-                  <a:rPr kumimoji="1" lang="en-US" altLang="ja-ES" sz="2000" dirty="0">
-                    <a:latin typeface="Meiryo" panose="020B0604030504040204" pitchFamily="34" charset="-128"/>
-                    <a:ea typeface="Meiryo" panose="020B0604030504040204" pitchFamily="34" charset="-128"/>
-                    <a:cs typeface="Arial" panose="020B0604020202020204" pitchFamily="34" charset="0"/>
-                  </a:rPr>
-                  <a:t>E</a:t>
-                </a:r>
-                <a:r>
-                  <a:rPr kumimoji="1" lang="ja-ES" altLang="en-US" sz="2000" dirty="0">
-                    <a:latin typeface="Meiryo" panose="020B0604030504040204" pitchFamily="34" charset="-128"/>
-                    <a:ea typeface="Meiryo" panose="020B0604030504040204" pitchFamily="34" charset="-128"/>
-                    <a:cs typeface="Arial" panose="020B0604020202020204" pitchFamily="34" charset="0"/>
-                  </a:rPr>
-                  <a:t>モード偏光が我々に届くまでに</a:t>
-                </a:r>
-                <a:r>
-                  <a:rPr kumimoji="1" lang="en-US" altLang="ja-ES" sz="2000" dirty="0">
-                    <a:latin typeface="Meiryo" panose="020B0604030504040204" pitchFamily="34" charset="-128"/>
-                    <a:ea typeface="Meiryo" panose="020B0604030504040204" pitchFamily="34" charset="-128"/>
-                    <a:cs typeface="Arial" panose="020B0604020202020204" pitchFamily="34" charset="0"/>
-                  </a:rPr>
-                  <a:t>B</a:t>
-                </a:r>
-                <a:r>
-                  <a:rPr kumimoji="1" lang="ja-ES" altLang="en-US" sz="2000" dirty="0">
-                    <a:latin typeface="Meiryo" panose="020B0604030504040204" pitchFamily="34" charset="-128"/>
-                    <a:ea typeface="Meiryo" panose="020B0604030504040204" pitchFamily="34" charset="-128"/>
-                    <a:cs typeface="Arial" panose="020B0604020202020204" pitchFamily="34" charset="0"/>
-                  </a:rPr>
-                  <a:t>モードに変わる</a:t>
-                </a:r>
-                <a:endParaRPr kumimoji="1" lang="en-US" altLang="ja-ES" sz="2000" dirty="0">
-                  <a:latin typeface="Meiryo" panose="020B0604030504040204" pitchFamily="34" charset="-128"/>
-                  <a:ea typeface="Meiryo" panose="020B0604030504040204" pitchFamily="34" charset="-128"/>
-                  <a:cs typeface="Arial" panose="020B0604020202020204" pitchFamily="34" charset="0"/>
-                </a:endParaRPr>
-              </a:p>
-              <a:p>
-                <a:pPr marL="800100" lvl="1" indent="-342900">
-                  <a:buFont typeface="Wingdings" pitchFamily="2" charset="2"/>
-                  <a:buChar char="§"/>
-                </a:pPr>
-                <a14:m>
-                  <m:oMath xmlns:m="http://schemas.openxmlformats.org/officeDocument/2006/math">
-                    <m:nary>
-                      <m:naryPr>
-                        <m:chr m:val="∑"/>
-                        <m:subHide m:val="on"/>
-                        <m:supHide m:val="on"/>
-                        <m:ctrlPr>
-                          <a:rPr kumimoji="1" lang="ja-ES" altLang="en-US" sz="2000" i="1" smtClean="0">
-                            <a:latin typeface="Cambria Math" panose="02040503050406030204" pitchFamily="18" charset="0"/>
-                            <a:ea typeface="Meiryo" panose="020B0604030504040204" pitchFamily="34" charset="-128"/>
-                            <a:cs typeface="Arial" panose="020B0604020202020204" pitchFamily="34" charset="0"/>
-                          </a:rPr>
-                        </m:ctrlPr>
-                      </m:naryPr>
-                      <m:sub/>
-                      <m:sup/>
-                      <m:e>
-                        <m:sSub>
-                          <m:sSubPr>
-                            <m:ctrlPr>
-                              <a:rPr kumimoji="1" lang="en-US" altLang="ja-ES" sz="2000" i="1" smtClean="0">
-                                <a:latin typeface="Cambria Math" panose="02040503050406030204" pitchFamily="18" charset="0"/>
-                                <a:ea typeface="Meiryo" panose="020B0604030504040204" pitchFamily="34" charset="-128"/>
-                                <a:cs typeface="Arial" panose="020B0604020202020204" pitchFamily="34" charset="0"/>
-                              </a:rPr>
-                            </m:ctrlPr>
-                          </m:sSubPr>
-                          <m:e>
-                            <m:r>
-                              <m:rPr>
-                                <m:sty m:val="p"/>
-                              </m:rPr>
-                              <a:rPr kumimoji="1" lang="en-US" altLang="ja-ES" sz="2000" i="0">
-                                <a:latin typeface="Cambria Math" panose="02040503050406030204" pitchFamily="18" charset="0"/>
-                                <a:ea typeface="Meiryo" panose="020B0604030504040204" pitchFamily="34" charset="-128"/>
-                                <a:cs typeface="Arial" panose="020B0604020202020204" pitchFamily="34" charset="0"/>
-                              </a:rPr>
-                              <m:t>m</m:t>
-                            </m:r>
-                          </m:e>
-                          <m:sub>
-                            <m:r>
-                              <m:rPr>
-                                <m:sty m:val="p"/>
-                              </m:rPr>
-                              <a:rPr kumimoji="1" lang="en-US" altLang="ja-ES" sz="2000" i="0" smtClean="0">
-                                <a:latin typeface="Cambria Math" panose="02040503050406030204" pitchFamily="18" charset="0"/>
-                                <a:ea typeface="Cambria Math" panose="02040503050406030204" pitchFamily="18" charset="0"/>
-                                <a:cs typeface="Arial" panose="020B0604020202020204" pitchFamily="34" charset="0"/>
-                              </a:rPr>
-                              <m:t>ν</m:t>
-                            </m:r>
-                          </m:sub>
-                        </m:sSub>
-                      </m:e>
-                    </m:nary>
-                  </m:oMath>
-                </a14:m>
-                <a:r>
-                  <a:rPr kumimoji="1" lang="ja-ES" altLang="en-US" sz="2000" dirty="0">
-                    <a:latin typeface="Meiryo" panose="020B0604030504040204" pitchFamily="34" charset="-128"/>
-                    <a:ea typeface="Meiryo" panose="020B0604030504040204" pitchFamily="34" charset="-128"/>
-                    <a:cs typeface="Arial" panose="020B0604020202020204" pitchFamily="34" charset="0"/>
-                  </a:rPr>
-                  <a:t>と縮退した宇宙再電離期の光学的厚み</a:t>
-                </a:r>
-                <a14:m>
-                  <m:oMath xmlns:m="http://schemas.openxmlformats.org/officeDocument/2006/math">
-                    <m:r>
-                      <a:rPr kumimoji="1" lang="en-US" altLang="ja-ES" sz="2000" b="0" i="0" dirty="0" smtClean="0">
-                        <a:latin typeface="Cambria Math" panose="02040503050406030204" pitchFamily="18" charset="0"/>
-                        <a:ea typeface="Meiryo" panose="020B0604030504040204" pitchFamily="34" charset="-128"/>
-                        <a:cs typeface="Arial" panose="020B0604020202020204" pitchFamily="34" charset="0"/>
-                      </a:rPr>
-                      <m:t> </m:t>
-                    </m:r>
-                    <m:r>
-                      <a:rPr kumimoji="1" lang="ja-ES" altLang="en-US" sz="2000" i="1" dirty="0" smtClean="0">
-                        <a:latin typeface="Cambria Math" panose="02040503050406030204" pitchFamily="18" charset="0"/>
-                        <a:ea typeface="Meiryo" panose="020B0604030504040204" pitchFamily="34" charset="-128"/>
-                        <a:cs typeface="Arial" panose="020B0604020202020204" pitchFamily="34" charset="0"/>
-                      </a:rPr>
-                      <m:t>𝜏</m:t>
-                    </m:r>
-                    <m:r>
-                      <a:rPr kumimoji="1" lang="en-US" altLang="ja-ES" sz="2000" b="0" i="1" dirty="0" smtClean="0">
-                        <a:latin typeface="Cambria Math" panose="02040503050406030204" pitchFamily="18" charset="0"/>
-                        <a:ea typeface="Meiryo" panose="020B0604030504040204" pitchFamily="34" charset="-128"/>
-                        <a:cs typeface="Arial" panose="020B0604020202020204" pitchFamily="34" charset="0"/>
-                      </a:rPr>
-                      <m:t> </m:t>
-                    </m:r>
-                  </m:oMath>
-                </a14:m>
-                <a:r>
-                  <a:rPr kumimoji="1" lang="ja-ES" altLang="en-US" sz="2000" dirty="0">
-                    <a:latin typeface="Meiryo" panose="020B0604030504040204" pitchFamily="34" charset="-128"/>
-                    <a:ea typeface="Meiryo" panose="020B0604030504040204" pitchFamily="34" charset="-128"/>
-                    <a:cs typeface="Arial" panose="020B0604020202020204" pitchFamily="34" charset="0"/>
-                  </a:rPr>
-                  <a:t>の測定</a:t>
-                </a:r>
-                <a:endParaRPr kumimoji="1" lang="en-US" altLang="ja-ES" sz="2000" dirty="0">
-                  <a:latin typeface="Meiryo" panose="020B0604030504040204" pitchFamily="34" charset="-128"/>
-                  <a:ea typeface="Meiryo" panose="020B0604030504040204" pitchFamily="34" charset="-128"/>
-                  <a:cs typeface="Arial" panose="020B0604020202020204" pitchFamily="34" charset="0"/>
-                </a:endParaRPr>
-              </a:p>
-              <a:p>
-                <a:pPr marL="800100" lvl="1" indent="-342900">
-                  <a:buFont typeface="Wingdings" pitchFamily="2" charset="2"/>
-                  <a:buChar char="§"/>
-                </a:pPr>
-                <a:endParaRPr kumimoji="1" lang="en-US" altLang="ja-ES" sz="2000" dirty="0">
-                  <a:latin typeface="Meiryo" panose="020B0604030504040204" pitchFamily="34" charset="-128"/>
-                  <a:ea typeface="Meiryo" panose="020B0604030504040204" pitchFamily="34" charset="-128"/>
-                  <a:cs typeface="Arial" panose="020B0604020202020204" pitchFamily="34" charset="0"/>
-                </a:endParaRPr>
-              </a:p>
-            </p:txBody>
-          </p:sp>
-        </mc:Choice>
-        <mc:Fallback>
-          <p:sp>
-            <p:nvSpPr>
-              <p:cNvPr id="24" name="テキスト ボックス 23">
-                <a:extLst>
-                  <a:ext uri="{FF2B5EF4-FFF2-40B4-BE49-F238E27FC236}">
-                    <a16:creationId xmlns:a16="http://schemas.microsoft.com/office/drawing/2014/main" id="{C9C7FF12-1FEE-BC15-21EE-ACE78560214F}"/>
-                  </a:ext>
-                </a:extLst>
-              </p:cNvPr>
-              <p:cNvSpPr txBox="1">
-                <a:spLocks noRot="1" noChangeAspect="1" noMove="1" noResize="1" noEditPoints="1" noAdjustHandles="1" noChangeArrowheads="1" noChangeShapeType="1" noTextEdit="1"/>
-              </p:cNvSpPr>
-              <p:nvPr/>
-            </p:nvSpPr>
-            <p:spPr>
-              <a:xfrm>
-                <a:off x="126869" y="2840372"/>
-                <a:ext cx="3604112" cy="3170099"/>
-              </a:xfrm>
-              <a:prstGeom prst="rect">
-                <a:avLst/>
-              </a:prstGeom>
-              <a:blipFill>
-                <a:blip r:embed="rId5"/>
-                <a:stretch>
-                  <a:fillRect l="-1394" t="-791"/>
-                </a:stretch>
-              </a:blipFill>
-              <a:ln w="31750">
-                <a:solidFill>
-                  <a:schemeClr val="tx1"/>
-                </a:solidFill>
-              </a:ln>
-            </p:spPr>
-            <p:txBody>
-              <a:bodyPr/>
-              <a:lstStyle/>
-              <a:p>
-                <a:r>
-                  <a:rPr lang="ja-ES" altLang="en-US">
-                    <a:noFill/>
-                  </a:rPr>
-                  <a:t> </a:t>
-                </a:r>
-              </a:p>
-            </p:txBody>
-          </p:sp>
-        </mc:Fallback>
-      </mc:AlternateContent>
+      <p:sp>
+        <p:nvSpPr>
+          <p:cNvPr id="24" name="テキスト ボックス 23">
+            <a:extLst>
+              <a:ext uri="{FF2B5EF4-FFF2-40B4-BE49-F238E27FC236}">
+                <a16:creationId xmlns:a16="http://schemas.microsoft.com/office/drawing/2014/main" id="{C9C7FF12-1FEE-BC15-21EE-ACE78560214F}"/>
+              </a:ext>
+            </a:extLst>
+          </p:cNvPr>
+          <p:cNvSpPr txBox="1"/>
+          <p:nvPr/>
+        </p:nvSpPr>
+        <p:spPr>
+          <a:xfrm>
+            <a:off x="162318" y="3302037"/>
+            <a:ext cx="3561772" cy="2554545"/>
+          </a:xfrm>
+          <a:prstGeom prst="rect">
+            <a:avLst/>
+          </a:prstGeom>
+          <a:noFill/>
+          <a:ln w="31750">
+            <a:solidFill>
+              <a:schemeClr val="tx1"/>
+            </a:solidFill>
+          </a:ln>
+        </p:spPr>
+        <p:txBody>
+          <a:bodyPr wrap="square" rtlCol="0">
+            <a:spAutoFit/>
+          </a:bodyPr>
+          <a:lstStyle/>
+          <a:p>
+            <a:pPr marL="342900" indent="-342900">
+              <a:buFont typeface="Arial" panose="020B0604020202020204" pitchFamily="34" charset="0"/>
+              <a:buChar char="•"/>
+            </a:pPr>
+            <a:r>
+              <a:rPr kumimoji="1" lang="ja-ES" altLang="en-US" sz="2000" dirty="0">
+                <a:latin typeface="Meiryo" panose="020B0604030504040204" pitchFamily="34" charset="-128"/>
+                <a:ea typeface="Meiryo" panose="020B0604030504040204" pitchFamily="34" charset="-128"/>
+                <a:cs typeface="Arial" panose="020B0604020202020204" pitchFamily="34" charset="0"/>
+              </a:rPr>
+              <a:t>原始重力波由来</a:t>
+            </a:r>
+            <a:r>
+              <a:rPr kumimoji="1" lang="en-US" altLang="ja-ES" sz="2000" dirty="0">
+                <a:latin typeface="Meiryo" panose="020B0604030504040204" pitchFamily="34" charset="-128"/>
+                <a:ea typeface="Meiryo" panose="020B0604030504040204" pitchFamily="34" charset="-128"/>
+                <a:cs typeface="Arial" panose="020B0604020202020204" pitchFamily="34" charset="0"/>
+              </a:rPr>
+              <a:t>B</a:t>
+            </a:r>
+            <a:r>
+              <a:rPr kumimoji="1" lang="ja-ES" altLang="en-US" sz="2000" dirty="0">
+                <a:latin typeface="Meiryo" panose="020B0604030504040204" pitchFamily="34" charset="-128"/>
+                <a:ea typeface="Meiryo" panose="020B0604030504040204" pitchFamily="34" charset="-128"/>
+                <a:cs typeface="Arial" panose="020B0604020202020204" pitchFamily="34" charset="0"/>
+              </a:rPr>
+              <a:t>モード</a:t>
+            </a:r>
+            <a:endParaRPr kumimoji="1" lang="en-US" altLang="ja-ES" sz="2000" dirty="0">
+              <a:latin typeface="Meiryo" panose="020B0604030504040204" pitchFamily="34" charset="-128"/>
+              <a:ea typeface="Meiryo" panose="020B0604030504040204" pitchFamily="34" charset="-128"/>
+              <a:cs typeface="Arial" panose="020B0604020202020204" pitchFamily="34" charset="0"/>
+            </a:endParaRPr>
+          </a:p>
+          <a:p>
+            <a:pPr marL="800100" lvl="1" indent="-342900">
+              <a:buFont typeface="Wingdings" pitchFamily="2" charset="2"/>
+              <a:buChar char="§"/>
+            </a:pPr>
+            <a:r>
+              <a:rPr kumimoji="1" lang="ja-ES" altLang="en-US" sz="2000" dirty="0">
+                <a:latin typeface="Meiryo" panose="020B0604030504040204" pitchFamily="34" charset="-128"/>
+                <a:ea typeface="Meiryo" panose="020B0604030504040204" pitchFamily="34" charset="-128"/>
+                <a:cs typeface="Arial" panose="020B0604020202020204" pitchFamily="34" charset="0"/>
+              </a:rPr>
+              <a:t>重力レンズの影響が少ない大角度スケール</a:t>
+            </a:r>
+            <a:endParaRPr kumimoji="1" lang="en-US" altLang="ja-ES" sz="2000" dirty="0">
+              <a:latin typeface="Meiryo" panose="020B0604030504040204" pitchFamily="34" charset="-128"/>
+              <a:ea typeface="Meiryo" panose="020B0604030504040204" pitchFamily="34" charset="-128"/>
+              <a:cs typeface="Arial" panose="020B0604020202020204" pitchFamily="34" charset="0"/>
+            </a:endParaRPr>
+          </a:p>
+          <a:p>
+            <a:pPr marL="800100" lvl="1" indent="-342900">
+              <a:buFont typeface="Wingdings" pitchFamily="2" charset="2"/>
+              <a:buChar char="§"/>
+            </a:pPr>
+            <a:r>
+              <a:rPr kumimoji="1" lang="ja-ES" altLang="en-US" sz="2000" dirty="0">
+                <a:latin typeface="Meiryo" panose="020B0604030504040204" pitchFamily="34" charset="-128"/>
+                <a:ea typeface="Meiryo" panose="020B0604030504040204" pitchFamily="34" charset="-128"/>
+                <a:cs typeface="Arial" panose="020B0604020202020204" pitchFamily="34" charset="0"/>
+              </a:rPr>
+              <a:t>インフレーション時のテンソル揺らぎに対応</a:t>
+            </a:r>
+            <a:endParaRPr kumimoji="1" lang="en-US" altLang="ja-ES" sz="2000" dirty="0">
+              <a:latin typeface="Meiryo" panose="020B0604030504040204" pitchFamily="34" charset="-128"/>
+              <a:ea typeface="Meiryo" panose="020B0604030504040204" pitchFamily="34" charset="-128"/>
+              <a:cs typeface="Arial" panose="020B0604020202020204" pitchFamily="34" charset="0"/>
+            </a:endParaRPr>
+          </a:p>
+          <a:p>
+            <a:pPr marL="800100" lvl="1" indent="-342900">
+              <a:buFont typeface="Wingdings" pitchFamily="2" charset="2"/>
+              <a:buChar char="§"/>
+            </a:pPr>
+            <a:r>
+              <a:rPr kumimoji="1" lang="en-US" altLang="ja-ES" sz="2000" dirty="0">
+                <a:latin typeface="Meiryo" panose="020B0604030504040204" pitchFamily="34" charset="-128"/>
+                <a:ea typeface="Meiryo" panose="020B0604030504040204" pitchFamily="34" charset="-128"/>
+                <a:cs typeface="Arial" panose="020B0604020202020204" pitchFamily="34" charset="0"/>
+              </a:rPr>
+              <a:t>0</a:t>
+            </a:r>
+            <a:r>
+              <a:rPr kumimoji="1" lang="ja-ES" altLang="en-US" sz="2000" dirty="0">
+                <a:latin typeface="Meiryo" panose="020B0604030504040204" pitchFamily="34" charset="-128"/>
+                <a:ea typeface="Meiryo" panose="020B0604030504040204" pitchFamily="34" charset="-128"/>
+                <a:cs typeface="Arial" panose="020B0604020202020204" pitchFamily="34" charset="0"/>
+              </a:rPr>
+              <a:t>ではないテンソル・スカラー比</a:t>
+            </a:r>
+            <a:r>
+              <a:rPr kumimoji="1" lang="en-US" altLang="ja-ES" sz="2000" dirty="0">
+                <a:latin typeface="Meiryo" panose="020B0604030504040204" pitchFamily="34" charset="-128"/>
+                <a:ea typeface="Meiryo" panose="020B0604030504040204" pitchFamily="34" charset="-128"/>
+                <a:cs typeface="Arial" panose="020B0604020202020204" pitchFamily="34" charset="0"/>
+              </a:rPr>
+              <a:t> r </a:t>
+            </a:r>
+            <a:r>
+              <a:rPr kumimoji="1" lang="ja-ES" altLang="en-US" sz="2000" dirty="0">
+                <a:latin typeface="Meiryo" panose="020B0604030504040204" pitchFamily="34" charset="-128"/>
+                <a:ea typeface="Meiryo" panose="020B0604030504040204" pitchFamily="34" charset="-128"/>
+                <a:cs typeface="Arial" panose="020B0604020202020204" pitchFamily="34" charset="0"/>
+              </a:rPr>
+              <a:t>の測定を目指す</a:t>
+            </a:r>
+            <a:endParaRPr kumimoji="1" lang="en-US" altLang="ja-ES" sz="2000" dirty="0">
+              <a:latin typeface="Meiryo" panose="020B0604030504040204" pitchFamily="34" charset="-128"/>
+              <a:ea typeface="Meiryo" panose="020B0604030504040204" pitchFamily="34" charset="-128"/>
+              <a:cs typeface="Arial" panose="020B0604020202020204" pitchFamily="34" charset="0"/>
+            </a:endParaRPr>
+          </a:p>
+        </p:txBody>
+      </p:sp>
     </p:spTree>
     <p:extLst>
       <p:ext uri="{BB962C8B-B14F-4D97-AF65-F5344CB8AC3E}">
         <p14:creationId xmlns:p14="http://schemas.microsoft.com/office/powerpoint/2010/main" val="2283897273"/>
-      </p:ext>
-    </p:extLst>
-  </p:cSld>
-  <p:clrMapOvr>
-    <a:masterClrMapping/>
-  </p:clrMapOvr>
-</p:sld>
-</file>
-
-<file path=ppt/slides/slide5.xml><?xml version="1.0" encoding="utf-8"?>
-<p:sld xmlns:a="http://schemas.openxmlformats.org/drawingml/2006/main" xmlns:r="http://schemas.openxmlformats.org/officeDocument/2006/relationships" xmlns:p="http://schemas.openxmlformats.org/presentationml/2006/main">
-  <p:cSld>
-    <p:spTree>
-      <p:nvGrpSpPr>
-        <p:cNvPr id="1" name="">
-          <a:extLst>
-            <a:ext uri="{FF2B5EF4-FFF2-40B4-BE49-F238E27FC236}">
-              <a16:creationId xmlns:a16="http://schemas.microsoft.com/office/drawing/2014/main" id="{8C17F089-01FA-8687-5FF9-CDF79E4D5577}"/>
-            </a:ext>
-          </a:extLst>
-        </p:cNvPr>
-        <p:cNvGrpSpPr/>
-        <p:nvPr/>
-      </p:nvGrpSpPr>
-      <p:grpSpPr>
-        <a:xfrm>
-          <a:off x="0" y="0"/>
-          <a:ext cx="0" cy="0"/>
-          <a:chOff x="0" y="0"/>
-          <a:chExt cx="0" cy="0"/>
-        </a:xfrm>
-      </p:grpSpPr>
-      <p:sp>
-        <p:nvSpPr>
-          <p:cNvPr id="2" name="タイトル 1">
-            <a:extLst>
-              <a:ext uri="{FF2B5EF4-FFF2-40B4-BE49-F238E27FC236}">
-                <a16:creationId xmlns:a16="http://schemas.microsoft.com/office/drawing/2014/main" id="{8115C4B4-B927-6D78-13F8-E77462D11B31}"/>
-              </a:ext>
-            </a:extLst>
-          </p:cNvPr>
-          <p:cNvSpPr>
-            <a:spLocks noGrp="1"/>
-          </p:cNvSpPr>
-          <p:nvPr>
-            <p:ph type="title"/>
-          </p:nvPr>
-        </p:nvSpPr>
-        <p:spPr>
-          <a:xfrm>
-            <a:off x="0" y="-6128"/>
-            <a:ext cx="12192000" cy="1089862"/>
-          </a:xfrm>
-          <a:solidFill>
-            <a:schemeClr val="tx2">
-              <a:lumMod val="25000"/>
-              <a:lumOff val="75000"/>
-            </a:schemeClr>
-          </a:solidFill>
-        </p:spPr>
-        <p:txBody>
-          <a:bodyPr>
-            <a:normAutofit/>
-          </a:bodyPr>
-          <a:lstStyle/>
-          <a:p>
-            <a:r>
-              <a:rPr kumimoji="1" lang="en-US" altLang="ja-JP" sz="3600" dirty="0">
-                <a:latin typeface="Meiryo" panose="020B0604030504040204" pitchFamily="34" charset="-128"/>
-                <a:ea typeface="Meiryo" panose="020B0604030504040204" pitchFamily="34" charset="-128"/>
-              </a:rPr>
-              <a:t>   </a:t>
-            </a:r>
-            <a:r>
-              <a:rPr kumimoji="1" lang="ja-ES" altLang="en-US" sz="3600" dirty="0">
-                <a:latin typeface="Meiryo" panose="020B0604030504040204" pitchFamily="34" charset="-128"/>
-                <a:ea typeface="Meiryo" panose="020B0604030504040204" pitchFamily="34" charset="-128"/>
-              </a:rPr>
-              <a:t>宇宙マイクロ波背景放射</a:t>
-            </a:r>
-            <a:r>
-              <a:rPr kumimoji="1" lang="en-US" altLang="ja-ES" sz="3600" dirty="0">
-                <a:latin typeface="Meiryo" panose="020B0604030504040204" pitchFamily="34" charset="-128"/>
-                <a:ea typeface="Meiryo" panose="020B0604030504040204" pitchFamily="34" charset="-128"/>
-              </a:rPr>
-              <a:t>(CMB)</a:t>
-            </a:r>
-            <a:endParaRPr kumimoji="1" lang="ja-JP" altLang="en-US" sz="2400">
-              <a:latin typeface="Meiryo" panose="020B0604030504040204" pitchFamily="34" charset="-128"/>
-              <a:ea typeface="Meiryo" panose="020B0604030504040204" pitchFamily="34" charset="-128"/>
-            </a:endParaRPr>
-          </a:p>
-        </p:txBody>
-      </p:sp>
-      <p:sp>
-        <p:nvSpPr>
-          <p:cNvPr id="4" name="日付プレースホルダー 3">
-            <a:extLst>
-              <a:ext uri="{FF2B5EF4-FFF2-40B4-BE49-F238E27FC236}">
-                <a16:creationId xmlns:a16="http://schemas.microsoft.com/office/drawing/2014/main" id="{E0F67EB0-3DCC-9EF7-18E3-77875B6C9297}"/>
-              </a:ext>
-            </a:extLst>
-          </p:cNvPr>
-          <p:cNvSpPr>
-            <a:spLocks noGrp="1"/>
-          </p:cNvSpPr>
-          <p:nvPr>
-            <p:ph type="dt" sz="half" idx="10"/>
-          </p:nvPr>
-        </p:nvSpPr>
-        <p:spPr/>
-        <p:txBody>
-          <a:bodyPr/>
-          <a:lstStyle/>
-          <a:p>
-            <a:r>
-              <a:rPr kumimoji="1" lang="en-US" altLang="ja-JP"/>
-              <a:t>2025/2/3</a:t>
-            </a:r>
-            <a:endParaRPr kumimoji="1" lang="ja-JP" altLang="en-US"/>
-          </a:p>
-        </p:txBody>
-      </p:sp>
-      <p:sp>
-        <p:nvSpPr>
-          <p:cNvPr id="6" name="スライド番号プレースホルダー 5">
-            <a:extLst>
-              <a:ext uri="{FF2B5EF4-FFF2-40B4-BE49-F238E27FC236}">
-                <a16:creationId xmlns:a16="http://schemas.microsoft.com/office/drawing/2014/main" id="{9EBD5B6D-6B58-2E10-3846-A3599F5B8CA0}"/>
-              </a:ext>
-            </a:extLst>
-          </p:cNvPr>
-          <p:cNvSpPr>
-            <a:spLocks noGrp="1"/>
-          </p:cNvSpPr>
-          <p:nvPr>
-            <p:ph type="sldNum" sz="quarter" idx="12"/>
-          </p:nvPr>
-        </p:nvSpPr>
-        <p:spPr/>
-        <p:txBody>
-          <a:bodyPr/>
-          <a:lstStyle/>
-          <a:p>
-            <a:fld id="{A346F7B0-2C6C-2749-AD43-9AA6CBC0C428}" type="slidenum">
-              <a:rPr kumimoji="1" lang="ja-JP" altLang="en-US" smtClean="0"/>
-              <a:t>5</a:t>
-            </a:fld>
-            <a:endParaRPr kumimoji="1" lang="ja-JP" altLang="en-US"/>
-          </a:p>
-        </p:txBody>
-      </p:sp>
-      <p:sp>
-        <p:nvSpPr>
-          <p:cNvPr id="9" name="コンテンツ プレースホルダー 2">
-            <a:extLst>
-              <a:ext uri="{FF2B5EF4-FFF2-40B4-BE49-F238E27FC236}">
-                <a16:creationId xmlns:a16="http://schemas.microsoft.com/office/drawing/2014/main" id="{233C107A-CAF2-51AD-E1E1-CDB9A2B9FAD0}"/>
-              </a:ext>
-            </a:extLst>
-          </p:cNvPr>
-          <p:cNvSpPr txBox="1">
-            <a:spLocks/>
-          </p:cNvSpPr>
-          <p:nvPr/>
-        </p:nvSpPr>
-        <p:spPr>
-          <a:xfrm>
-            <a:off x="1008890" y="1571559"/>
-            <a:ext cx="10515600" cy="880999"/>
-          </a:xfrm>
-          <a:prstGeom prst="rect">
-            <a:avLst/>
-          </a:prstGeom>
-        </p:spPr>
-        <p:txBody>
-          <a:bodyPr vert="horz" lIns="91440" tIns="45720" rIns="91440" bIns="45720" rtlCol="0">
-            <a:normAutofit/>
-          </a:bodyPr>
-          <a:lstStyle>
-            <a:lvl1pPr marL="228600" indent="-228600" algn="l" defTabSz="914400" rtl="0" eaLnBrk="1" latinLnBrk="0" hangingPunct="1">
-              <a:lnSpc>
-                <a:spcPct val="90000"/>
-              </a:lnSpc>
-              <a:spcBef>
-                <a:spcPts val="1000"/>
-              </a:spcBef>
-              <a:buFont typeface="Arial" panose="020B0604020202020204" pitchFamily="34" charset="0"/>
-              <a:buChar char="•"/>
-              <a:defRPr kumimoji="1" sz="2800" kern="1200">
-                <a:solidFill>
-                  <a:schemeClr val="tx1"/>
-                </a:solidFill>
-                <a:latin typeface="+mn-lt"/>
-                <a:ea typeface="+mn-ea"/>
-                <a:cs typeface="+mn-cs"/>
-              </a:defRPr>
-            </a:lvl1pPr>
-            <a:lvl2pPr marL="685800" indent="-228600" algn="l" defTabSz="914400" rtl="0" eaLnBrk="1" latinLnBrk="0" hangingPunct="1">
-              <a:lnSpc>
-                <a:spcPct val="90000"/>
-              </a:lnSpc>
-              <a:spcBef>
-                <a:spcPts val="500"/>
-              </a:spcBef>
-              <a:buFont typeface="Arial" panose="020B0604020202020204" pitchFamily="34" charset="0"/>
-              <a:buChar char="•"/>
-              <a:defRPr kumimoji="1" sz="2400" kern="1200">
-                <a:solidFill>
-                  <a:schemeClr val="tx1"/>
-                </a:solidFill>
-                <a:latin typeface="+mn-lt"/>
-                <a:ea typeface="+mn-ea"/>
-                <a:cs typeface="+mn-cs"/>
-              </a:defRPr>
-            </a:lvl2pPr>
-            <a:lvl3pPr marL="1143000" indent="-228600" algn="l" defTabSz="914400" rtl="0" eaLnBrk="1" latinLnBrk="0" hangingPunct="1">
-              <a:lnSpc>
-                <a:spcPct val="90000"/>
-              </a:lnSpc>
-              <a:spcBef>
-                <a:spcPts val="500"/>
-              </a:spcBef>
-              <a:buFont typeface="Arial" panose="020B0604020202020204" pitchFamily="34" charset="0"/>
-              <a:buChar char="•"/>
-              <a:defRPr kumimoji="1" sz="2000" kern="1200">
-                <a:solidFill>
-                  <a:schemeClr val="tx1"/>
-                </a:solidFill>
-                <a:latin typeface="+mn-lt"/>
-                <a:ea typeface="+mn-ea"/>
-                <a:cs typeface="+mn-cs"/>
-              </a:defRPr>
-            </a:lvl3pPr>
-            <a:lvl4pPr marL="1600200" indent="-228600" algn="l" defTabSz="914400" rtl="0" eaLnBrk="1" latinLnBrk="0" hangingPunct="1">
-              <a:lnSpc>
-                <a:spcPct val="90000"/>
-              </a:lnSpc>
-              <a:spcBef>
-                <a:spcPts val="500"/>
-              </a:spcBef>
-              <a:buFont typeface="Arial" panose="020B0604020202020204" pitchFamily="34" charset="0"/>
-              <a:buChar char="•"/>
-              <a:defRPr kumimoji="1" sz="1800" kern="1200">
-                <a:solidFill>
-                  <a:schemeClr val="tx1"/>
-                </a:solidFill>
-                <a:latin typeface="+mn-lt"/>
-                <a:ea typeface="+mn-ea"/>
-                <a:cs typeface="+mn-cs"/>
-              </a:defRPr>
-            </a:lvl4pPr>
-            <a:lvl5pPr marL="2057400" indent="-228600" algn="l" defTabSz="914400" rtl="0" eaLnBrk="1" latinLnBrk="0" hangingPunct="1">
-              <a:lnSpc>
-                <a:spcPct val="90000"/>
-              </a:lnSpc>
-              <a:spcBef>
-                <a:spcPts val="500"/>
-              </a:spcBef>
-              <a:buFont typeface="Arial" panose="020B0604020202020204" pitchFamily="34" charset="0"/>
-              <a:buChar char="•"/>
-              <a:defRPr kumimoji="1" sz="1800" kern="1200">
-                <a:solidFill>
-                  <a:schemeClr val="tx1"/>
-                </a:solidFill>
-                <a:latin typeface="+mn-lt"/>
-                <a:ea typeface="+mn-ea"/>
-                <a:cs typeface="+mn-cs"/>
-              </a:defRPr>
-            </a:lvl5pPr>
-            <a:lvl6pPr marL="2514600" indent="-228600" algn="l" defTabSz="914400" rtl="0" eaLnBrk="1" latinLnBrk="0" hangingPunct="1">
-              <a:lnSpc>
-                <a:spcPct val="90000"/>
-              </a:lnSpc>
-              <a:spcBef>
-                <a:spcPts val="500"/>
-              </a:spcBef>
-              <a:buFont typeface="Arial" panose="020B0604020202020204" pitchFamily="34" charset="0"/>
-              <a:buChar char="•"/>
-              <a:defRPr kumimoji="1" sz="1800" kern="1200">
-                <a:solidFill>
-                  <a:schemeClr val="tx1"/>
-                </a:solidFill>
-                <a:latin typeface="+mn-lt"/>
-                <a:ea typeface="+mn-ea"/>
-                <a:cs typeface="+mn-cs"/>
-              </a:defRPr>
-            </a:lvl6pPr>
-            <a:lvl7pPr marL="2971800" indent="-228600" algn="l" defTabSz="914400" rtl="0" eaLnBrk="1" latinLnBrk="0" hangingPunct="1">
-              <a:lnSpc>
-                <a:spcPct val="90000"/>
-              </a:lnSpc>
-              <a:spcBef>
-                <a:spcPts val="500"/>
-              </a:spcBef>
-              <a:buFont typeface="Arial" panose="020B0604020202020204" pitchFamily="34" charset="0"/>
-              <a:buChar char="•"/>
-              <a:defRPr kumimoji="1" sz="1800" kern="1200">
-                <a:solidFill>
-                  <a:schemeClr val="tx1"/>
-                </a:solidFill>
-                <a:latin typeface="+mn-lt"/>
-                <a:ea typeface="+mn-ea"/>
-                <a:cs typeface="+mn-cs"/>
-              </a:defRPr>
-            </a:lvl7pPr>
-            <a:lvl8pPr marL="3429000" indent="-228600" algn="l" defTabSz="914400" rtl="0" eaLnBrk="1" latinLnBrk="0" hangingPunct="1">
-              <a:lnSpc>
-                <a:spcPct val="90000"/>
-              </a:lnSpc>
-              <a:spcBef>
-                <a:spcPts val="500"/>
-              </a:spcBef>
-              <a:buFont typeface="Arial" panose="020B0604020202020204" pitchFamily="34" charset="0"/>
-              <a:buChar char="•"/>
-              <a:defRPr kumimoji="1" sz="1800" kern="1200">
-                <a:solidFill>
-                  <a:schemeClr val="tx1"/>
-                </a:solidFill>
-                <a:latin typeface="+mn-lt"/>
-                <a:ea typeface="+mn-ea"/>
-                <a:cs typeface="+mn-cs"/>
-              </a:defRPr>
-            </a:lvl8pPr>
-            <a:lvl9pPr marL="3886200" indent="-228600" algn="l" defTabSz="914400" rtl="0" eaLnBrk="1" latinLnBrk="0" hangingPunct="1">
-              <a:lnSpc>
-                <a:spcPct val="90000"/>
-              </a:lnSpc>
-              <a:spcBef>
-                <a:spcPts val="500"/>
-              </a:spcBef>
-              <a:buFont typeface="Arial" panose="020B0604020202020204" pitchFamily="34" charset="0"/>
-              <a:buChar char="•"/>
-              <a:defRPr kumimoji="1" sz="1800" kern="1200">
-                <a:solidFill>
-                  <a:schemeClr val="tx1"/>
-                </a:solidFill>
-                <a:latin typeface="+mn-lt"/>
-                <a:ea typeface="+mn-ea"/>
-                <a:cs typeface="+mn-cs"/>
-              </a:defRPr>
-            </a:lvl9pPr>
-          </a:lstStyle>
-          <a:p>
-            <a:pPr marL="0" indent="0">
-              <a:buFont typeface="Arial" panose="020B0604020202020204" pitchFamily="34" charset="0"/>
-              <a:buNone/>
-            </a:pPr>
-            <a:endParaRPr lang="ja-JP" altLang="en-US">
-              <a:latin typeface="Meiryo" panose="020B0604030504040204" pitchFamily="34" charset="-128"/>
-              <a:ea typeface="Meiryo" panose="020B0604030504040204" pitchFamily="34" charset="-128"/>
-            </a:endParaRPr>
-          </a:p>
-        </p:txBody>
-      </p:sp>
-      <p:sp>
-        <p:nvSpPr>
-          <p:cNvPr id="3" name="フッター プレースホルダー 2">
-            <a:extLst>
-              <a:ext uri="{FF2B5EF4-FFF2-40B4-BE49-F238E27FC236}">
-                <a16:creationId xmlns:a16="http://schemas.microsoft.com/office/drawing/2014/main" id="{42EBB180-9AF8-E25E-C73D-B4E85A18E754}"/>
-              </a:ext>
-            </a:extLst>
-          </p:cNvPr>
-          <p:cNvSpPr>
-            <a:spLocks noGrp="1"/>
-          </p:cNvSpPr>
-          <p:nvPr>
-            <p:ph type="ftr" sz="quarter" idx="11"/>
-          </p:nvPr>
-        </p:nvSpPr>
-        <p:spPr/>
-        <p:txBody>
-          <a:bodyPr/>
-          <a:lstStyle/>
-          <a:p>
-            <a:r>
-              <a:rPr kumimoji="1" lang="ja-JP" altLang="en-US"/>
-              <a:t>修論発表会</a:t>
-            </a:r>
-            <a:endParaRPr kumimoji="1" lang="ja-ES" altLang="en-US"/>
-          </a:p>
-        </p:txBody>
-      </p:sp>
-    </p:spTree>
-    <p:extLst>
-      <p:ext uri="{BB962C8B-B14F-4D97-AF65-F5344CB8AC3E}">
-        <p14:creationId xmlns:p14="http://schemas.microsoft.com/office/powerpoint/2010/main" val="222617811"/>
       </p:ext>
     </p:extLst>
   </p:cSld>

</xml_diff>

<commit_message>
Commit at 2025-01-26 21:30:00
</commit_message>
<xml_diff>
--- a/mt_presentation.pptx
+++ b/mt_presentation.pptx
@@ -6870,6 +6870,1125 @@
               <a:latin typeface="Meiryo" panose="020B0604030504040204" pitchFamily="34" charset="-128"/>
               <a:ea typeface="Meiryo" panose="020B0604030504040204" pitchFamily="34" charset="-128"/>
               <a:cs typeface="Arial" panose="020B0604020202020204" pitchFamily="34" charset="0"/>
+            </a:endParaRPr>
+          </a:p>
+        </p:txBody>
+      </p:sp>
+      <p:pic>
+        <p:nvPicPr>
+          <p:cNvPr id="7" name="図 6">
+            <a:extLst>
+              <a:ext uri="{FF2B5EF4-FFF2-40B4-BE49-F238E27FC236}">
+                <a16:creationId xmlns:a16="http://schemas.microsoft.com/office/drawing/2014/main" id="{2CF48869-CDAF-406E-7613-9CF1CDC521AD}"/>
+              </a:ext>
+            </a:extLst>
+          </p:cNvPr>
+          <p:cNvPicPr>
+            <a:picLocks noChangeAspect="1"/>
+          </p:cNvPicPr>
+          <p:nvPr/>
+        </p:nvPicPr>
+        <p:blipFill>
+          <a:blip r:embed="rId3"/>
+          <a:stretch>
+            <a:fillRect/>
+          </a:stretch>
+        </p:blipFill>
+        <p:spPr>
+          <a:xfrm>
+            <a:off x="8067593" y="1541472"/>
+            <a:ext cx="3501292" cy="2813538"/>
+          </a:xfrm>
+          <a:prstGeom prst="rect">
+            <a:avLst/>
+          </a:prstGeom>
+        </p:spPr>
+      </p:pic>
+      <p:sp>
+        <p:nvSpPr>
+          <p:cNvPr id="8" name="ドーナツ 7">
+            <a:extLst>
+              <a:ext uri="{FF2B5EF4-FFF2-40B4-BE49-F238E27FC236}">
+                <a16:creationId xmlns:a16="http://schemas.microsoft.com/office/drawing/2014/main" id="{4B092E2C-8C69-1F05-E434-95012FD25C74}"/>
+              </a:ext>
+            </a:extLst>
+          </p:cNvPr>
+          <p:cNvSpPr/>
+          <p:nvPr/>
+        </p:nvSpPr>
+        <p:spPr>
+          <a:xfrm>
+            <a:off x="8240467" y="2330279"/>
+            <a:ext cx="1469136" cy="1206127"/>
+          </a:xfrm>
+          <a:prstGeom prst="donut">
+            <a:avLst>
+              <a:gd name="adj" fmla="val 2976"/>
+            </a:avLst>
+          </a:prstGeom>
+          <a:solidFill>
+            <a:srgbClr val="FF0000"/>
+          </a:solidFill>
+          <a:ln>
+            <a:solidFill>
+              <a:srgbClr val="FF0000"/>
+            </a:solidFill>
+          </a:ln>
+        </p:spPr>
+        <p:style>
+          <a:lnRef idx="2">
+            <a:schemeClr val="accent1">
+              <a:shade val="15000"/>
+            </a:schemeClr>
+          </a:lnRef>
+          <a:fillRef idx="1">
+            <a:schemeClr val="accent1"/>
+          </a:fillRef>
+          <a:effectRef idx="0">
+            <a:schemeClr val="accent1"/>
+          </a:effectRef>
+          <a:fontRef idx="minor">
+            <a:schemeClr val="lt1"/>
+          </a:fontRef>
+        </p:style>
+        <p:txBody>
+          <a:bodyPr rtlCol="0" anchor="ctr"/>
+          <a:lstStyle/>
+          <a:p>
+            <a:pPr algn="ctr"/>
+            <a:endParaRPr kumimoji="1" lang="ja-ES" altLang="en-US">
+              <a:solidFill>
+                <a:schemeClr val="tx1"/>
+              </a:solidFill>
+            </a:endParaRPr>
+          </a:p>
+        </p:txBody>
+      </p:sp>
+      <p:cxnSp>
+        <p:nvCxnSpPr>
+          <p:cNvPr id="10" name="直線コネクタ 9">
+            <a:extLst>
+              <a:ext uri="{FF2B5EF4-FFF2-40B4-BE49-F238E27FC236}">
+                <a16:creationId xmlns:a16="http://schemas.microsoft.com/office/drawing/2014/main" id="{DAA34A14-C766-6C25-6792-F8BE852671D5}"/>
+              </a:ext>
+            </a:extLst>
+          </p:cNvPr>
+          <p:cNvCxnSpPr>
+            <a:cxnSpLocks/>
+          </p:cNvCxnSpPr>
+          <p:nvPr/>
+        </p:nvCxnSpPr>
+        <p:spPr>
+          <a:xfrm flipH="1" flipV="1">
+            <a:off x="7360920" y="2052344"/>
+            <a:ext cx="879547" cy="534345"/>
+          </a:xfrm>
+          <a:prstGeom prst="line">
+            <a:avLst/>
+          </a:prstGeom>
+          <a:ln w="69850">
+            <a:solidFill>
+              <a:schemeClr val="tx1"/>
+            </a:solidFill>
+            <a:headEnd type="oval"/>
+          </a:ln>
+        </p:spPr>
+        <p:style>
+          <a:lnRef idx="2">
+            <a:schemeClr val="accent1"/>
+          </a:lnRef>
+          <a:fillRef idx="0">
+            <a:schemeClr val="accent1"/>
+          </a:fillRef>
+          <a:effectRef idx="1">
+            <a:schemeClr val="accent1"/>
+          </a:effectRef>
+          <a:fontRef idx="minor">
+            <a:schemeClr val="tx1"/>
+          </a:fontRef>
+        </p:style>
+      </p:cxnSp>
+      <mc:AlternateContent xmlns:mc="http://schemas.openxmlformats.org/markup-compatibility/2006">
+        <mc:Choice xmlns:a14="http://schemas.microsoft.com/office/drawing/2010/main" Requires="a14">
+          <p:sp>
+            <p:nvSpPr>
+              <p:cNvPr id="12" name="テキスト ボックス 11">
+                <a:extLst>
+                  <a:ext uri="{FF2B5EF4-FFF2-40B4-BE49-F238E27FC236}">
+                    <a16:creationId xmlns:a16="http://schemas.microsoft.com/office/drawing/2014/main" id="{211EE9A2-21B7-9C45-5703-5832031377FC}"/>
+                  </a:ext>
+                </a:extLst>
+              </p:cNvPr>
+              <p:cNvSpPr txBox="1"/>
+              <p:nvPr/>
+            </p:nvSpPr>
+            <p:spPr>
+              <a:xfrm>
+                <a:off x="262128" y="4188453"/>
+                <a:ext cx="6120384" cy="707886"/>
+              </a:xfrm>
+              <a:prstGeom prst="rect">
+                <a:avLst/>
+              </a:prstGeom>
+              <a:noFill/>
+            </p:spPr>
+            <p:txBody>
+              <a:bodyPr wrap="square" rtlCol="0">
+                <a:spAutoFit/>
+              </a:bodyPr>
+              <a:lstStyle/>
+              <a:p>
+                <a:pPr marL="342900" indent="-342900">
+                  <a:buFont typeface="Arial" panose="020B0604020202020204" pitchFamily="34" charset="0"/>
+                  <a:buChar char="•"/>
+                </a:pPr>
+                <a:r>
+                  <a:rPr kumimoji="1" lang="ja-ES" altLang="en-US" sz="2000" dirty="0">
+                    <a:latin typeface="Meiryo" panose="020B0604030504040204" pitchFamily="34" charset="-128"/>
+                    <a:ea typeface="Meiryo" panose="020B0604030504040204" pitchFamily="34" charset="-128"/>
+                    <a:cs typeface="Arial" panose="020B0604020202020204" pitchFamily="34" charset="0"/>
+                  </a:rPr>
+                  <a:t>光学的厚み</a:t>
+                </a:r>
+                <a:r>
+                  <a:rPr kumimoji="1" lang="en-US" altLang="ja-ES" sz="2000" dirty="0">
+                    <a:latin typeface="Meiryo" panose="020B0604030504040204" pitchFamily="34" charset="-128"/>
+                    <a:ea typeface="Meiryo" panose="020B0604030504040204" pitchFamily="34" charset="-128"/>
+                    <a:cs typeface="Arial" panose="020B0604020202020204" pitchFamily="34" charset="0"/>
+                  </a:rPr>
+                  <a:t> </a:t>
+                </a:r>
+                <a14:m>
+                  <m:oMath xmlns:m="http://schemas.openxmlformats.org/officeDocument/2006/math">
+                    <m:r>
+                      <a:rPr kumimoji="1" lang="en-US" altLang="ja-ES" sz="2000" i="1" smtClean="0">
+                        <a:latin typeface="Cambria Math" panose="02040503050406030204" pitchFamily="18" charset="0"/>
+                        <a:ea typeface="Cambria Math" panose="02040503050406030204" pitchFamily="18" charset="0"/>
+                        <a:cs typeface="Arial" panose="020B0604020202020204" pitchFamily="34" charset="0"/>
+                      </a:rPr>
+                      <m:t>𝜏</m:t>
+                    </m:r>
+                  </m:oMath>
+                </a14:m>
+                <a:r>
+                  <a:rPr kumimoji="1" lang="en-US" altLang="ja-ES" sz="2000" dirty="0">
+                    <a:latin typeface="Meiryo" panose="020B0604030504040204" pitchFamily="34" charset="-128"/>
+                    <a:ea typeface="Meiryo" panose="020B0604030504040204" pitchFamily="34" charset="-128"/>
+                    <a:cs typeface="Arial" panose="020B0604020202020204" pitchFamily="34" charset="0"/>
+                  </a:rPr>
+                  <a:t> </a:t>
+                </a:r>
+                <a:r>
+                  <a:rPr kumimoji="1" lang="ja-ES" altLang="en-US" sz="2000" dirty="0">
+                    <a:latin typeface="Meiryo" panose="020B0604030504040204" pitchFamily="34" charset="-128"/>
+                    <a:ea typeface="Meiryo" panose="020B0604030504040204" pitchFamily="34" charset="-128"/>
+                    <a:cs typeface="Arial" panose="020B0604020202020204" pitchFamily="34" charset="0"/>
+                  </a:rPr>
+                  <a:t>とニュートリノ質量和</a:t>
+                </a:r>
+                <a:r>
+                  <a:rPr kumimoji="1" lang="ja-ES" altLang="en-US" sz="2000" dirty="0">
+                    <a:ea typeface="Meiryo" panose="020B0604030504040204" pitchFamily="34" charset="-128"/>
+                    <a:cs typeface="Arial" panose="020B0604020202020204" pitchFamily="34" charset="0"/>
+                  </a:rPr>
+                  <a:t> </a:t>
+                </a:r>
+                <a:r>
+                  <a:rPr kumimoji="1" lang="en-US" altLang="ja-ES" sz="2000" dirty="0">
+                    <a:ea typeface="Meiryo" panose="020B0604030504040204" pitchFamily="34" charset="-128"/>
+                    <a:cs typeface="Arial" panose="020B0604020202020204" pitchFamily="34" charset="0"/>
+                  </a:rPr>
+                  <a:t> </a:t>
+                </a:r>
+                <a14:m>
+                  <m:oMath xmlns:m="http://schemas.openxmlformats.org/officeDocument/2006/math">
+                    <m:nary>
+                      <m:naryPr>
+                        <m:chr m:val="∑"/>
+                        <m:subHide m:val="on"/>
+                        <m:supHide m:val="on"/>
+                        <m:ctrlPr>
+                          <a:rPr kumimoji="1" lang="ja-ES" altLang="en-US" sz="2000" i="1" smtClean="0">
+                            <a:latin typeface="Cambria Math" panose="02040503050406030204" pitchFamily="18" charset="0"/>
+                            <a:ea typeface="Meiryo" panose="020B0604030504040204" pitchFamily="34" charset="-128"/>
+                            <a:cs typeface="Arial" panose="020B0604020202020204" pitchFamily="34" charset="0"/>
+                          </a:rPr>
+                        </m:ctrlPr>
+                      </m:naryPr>
+                      <m:sub/>
+                      <m:sup/>
+                      <m:e>
+                        <m:sSub>
+                          <m:sSubPr>
+                            <m:ctrlPr>
+                              <a:rPr kumimoji="1" lang="en-US" altLang="ja-ES" sz="2000" i="1" smtClean="0">
+                                <a:latin typeface="Cambria Math" panose="02040503050406030204" pitchFamily="18" charset="0"/>
+                                <a:ea typeface="Meiryo" panose="020B0604030504040204" pitchFamily="34" charset="-128"/>
+                                <a:cs typeface="Arial" panose="020B0604020202020204" pitchFamily="34" charset="0"/>
+                              </a:rPr>
+                            </m:ctrlPr>
+                          </m:sSubPr>
+                          <m:e>
+                            <m:r>
+                              <m:rPr>
+                                <m:sty m:val="p"/>
+                              </m:rPr>
+                              <a:rPr kumimoji="1" lang="en-US" altLang="ja-ES" sz="2000" i="0">
+                                <a:latin typeface="Cambria Math" panose="02040503050406030204" pitchFamily="18" charset="0"/>
+                                <a:ea typeface="Meiryo" panose="020B0604030504040204" pitchFamily="34" charset="-128"/>
+                                <a:cs typeface="Arial" panose="020B0604020202020204" pitchFamily="34" charset="0"/>
+                              </a:rPr>
+                              <m:t>m</m:t>
+                            </m:r>
+                          </m:e>
+                          <m:sub>
+                            <m:r>
+                              <m:rPr>
+                                <m:sty m:val="p"/>
+                              </m:rPr>
+                              <a:rPr kumimoji="1" lang="en-US" altLang="ja-ES" sz="2000" i="0" smtClean="0">
+                                <a:latin typeface="Cambria Math" panose="02040503050406030204" pitchFamily="18" charset="0"/>
+                                <a:ea typeface="Cambria Math" panose="02040503050406030204" pitchFamily="18" charset="0"/>
+                                <a:cs typeface="Arial" panose="020B0604020202020204" pitchFamily="34" charset="0"/>
+                              </a:rPr>
+                              <m:t>ν</m:t>
+                            </m:r>
+                          </m:sub>
+                        </m:sSub>
+                        <m:r>
+                          <a:rPr kumimoji="1" lang="en-US" altLang="ja-ES" sz="2000" b="0" i="1" smtClean="0">
+                            <a:latin typeface="Cambria Math" panose="02040503050406030204" pitchFamily="18" charset="0"/>
+                            <a:ea typeface="Cambria Math" panose="02040503050406030204" pitchFamily="18" charset="0"/>
+                            <a:cs typeface="Arial" panose="020B0604020202020204" pitchFamily="34" charset="0"/>
+                          </a:rPr>
+                          <m:t> </m:t>
+                        </m:r>
+                      </m:e>
+                    </m:nary>
+                  </m:oMath>
+                </a14:m>
+                <a:r>
+                  <a:rPr kumimoji="1" lang="ja-ES" altLang="en-US" sz="2000" dirty="0">
+                    <a:latin typeface="Meiryo" panose="020B0604030504040204" pitchFamily="34" charset="-128"/>
+                    <a:ea typeface="Meiryo" panose="020B0604030504040204" pitchFamily="34" charset="-128"/>
+                    <a:cs typeface="Arial" panose="020B0604020202020204" pitchFamily="34" charset="0"/>
+                  </a:rPr>
+                  <a:t>は縮退したパラメータ</a:t>
+                </a:r>
+                <a:r>
+                  <a:rPr kumimoji="1" lang="en-US" altLang="ja-ES" sz="2000" dirty="0">
+                    <a:latin typeface="Meiryo" panose="020B0604030504040204" pitchFamily="34" charset="-128"/>
+                    <a:ea typeface="Meiryo" panose="020B0604030504040204" pitchFamily="34" charset="-128"/>
+                    <a:cs typeface="Arial" panose="020B0604020202020204" pitchFamily="34" charset="0"/>
+                  </a:rPr>
+                  <a:t> </a:t>
+                </a:r>
+              </a:p>
+            </p:txBody>
+          </p:sp>
+        </mc:Choice>
+        <mc:Fallback>
+          <p:sp>
+            <p:nvSpPr>
+              <p:cNvPr id="12" name="テキスト ボックス 11">
+                <a:extLst>
+                  <a:ext uri="{FF2B5EF4-FFF2-40B4-BE49-F238E27FC236}">
+                    <a16:creationId xmlns:a16="http://schemas.microsoft.com/office/drawing/2014/main" id="{211EE9A2-21B7-9C45-5703-5832031377FC}"/>
+                  </a:ext>
+                </a:extLst>
+              </p:cNvPr>
+              <p:cNvSpPr txBox="1">
+                <a:spLocks noRot="1" noChangeAspect="1" noMove="1" noResize="1" noEditPoints="1" noAdjustHandles="1" noChangeArrowheads="1" noChangeShapeType="1" noTextEdit="1"/>
+              </p:cNvSpPr>
+              <p:nvPr/>
+            </p:nvSpPr>
+            <p:spPr>
+              <a:xfrm>
+                <a:off x="262128" y="4188453"/>
+                <a:ext cx="6120384" cy="707886"/>
+              </a:xfrm>
+              <a:prstGeom prst="rect">
+                <a:avLst/>
+              </a:prstGeom>
+              <a:blipFill>
+                <a:blip r:embed="rId4"/>
+                <a:stretch>
+                  <a:fillRect l="-828" t="-66667" r="-621" b="-56140"/>
+                </a:stretch>
+              </a:blipFill>
+            </p:spPr>
+            <p:txBody>
+              <a:bodyPr/>
+              <a:lstStyle/>
+              <a:p>
+                <a:r>
+                  <a:rPr lang="ja-ES" altLang="en-US">
+                    <a:noFill/>
+                  </a:rPr>
+                  <a:t> </a:t>
+                </a:r>
+              </a:p>
+            </p:txBody>
+          </p:sp>
+        </mc:Fallback>
+      </mc:AlternateContent>
+      <mc:AlternateContent xmlns:mc="http://schemas.openxmlformats.org/markup-compatibility/2006">
+        <mc:Choice xmlns:a14="http://schemas.microsoft.com/office/drawing/2010/main" Requires="a14">
+          <p:sp>
+            <p:nvSpPr>
+              <p:cNvPr id="13" name="テキスト ボックス 12">
+                <a:extLst>
+                  <a:ext uri="{FF2B5EF4-FFF2-40B4-BE49-F238E27FC236}">
+                    <a16:creationId xmlns:a16="http://schemas.microsoft.com/office/drawing/2014/main" id="{0CACFC94-1F5C-4BD4-2EE5-B4075888FBD3}"/>
+                  </a:ext>
+                </a:extLst>
+              </p:cNvPr>
+              <p:cNvSpPr txBox="1"/>
+              <p:nvPr/>
+            </p:nvSpPr>
+            <p:spPr>
+              <a:xfrm>
+                <a:off x="262128" y="1685992"/>
+                <a:ext cx="7098792" cy="1938992"/>
+              </a:xfrm>
+              <a:prstGeom prst="rect">
+                <a:avLst/>
+              </a:prstGeom>
+              <a:noFill/>
+              <a:ln w="31750">
+                <a:solidFill>
+                  <a:schemeClr val="tx1"/>
+                </a:solidFill>
+              </a:ln>
+            </p:spPr>
+            <p:txBody>
+              <a:bodyPr wrap="square" rtlCol="0">
+                <a:spAutoFit/>
+              </a:bodyPr>
+              <a:lstStyle/>
+              <a:p>
+                <a:pPr marL="342900" indent="-342900">
+                  <a:buFont typeface="Arial" panose="020B0604020202020204" pitchFamily="34" charset="0"/>
+                  <a:buChar char="•"/>
+                </a:pPr>
+                <a:r>
+                  <a:rPr kumimoji="1" lang="ja-ES" altLang="en-US" sz="2000" dirty="0">
+                    <a:latin typeface="Meiryo" panose="020B0604030504040204" pitchFamily="34" charset="-128"/>
+                    <a:ea typeface="Meiryo" panose="020B0604030504040204" pitchFamily="34" charset="-128"/>
+                    <a:cs typeface="Arial" panose="020B0604020202020204" pitchFamily="34" charset="0"/>
+                  </a:rPr>
+                  <a:t>宇宙の再電離</a:t>
+                </a:r>
+                <a:r>
+                  <a:rPr kumimoji="1" lang="en-US" altLang="ja-ES" sz="2000" dirty="0">
+                    <a:latin typeface="Meiryo" panose="020B0604030504040204" pitchFamily="34" charset="-128"/>
+                    <a:ea typeface="Meiryo" panose="020B0604030504040204" pitchFamily="34" charset="-128"/>
+                    <a:cs typeface="Arial" panose="020B0604020202020204" pitchFamily="34" charset="0"/>
+                  </a:rPr>
+                  <a:t> : </a:t>
+                </a:r>
+                <a:r>
+                  <a:rPr kumimoji="1" lang="ja-ES" altLang="en-US" sz="2000" dirty="0">
+                    <a:latin typeface="Meiryo" panose="020B0604030504040204" pitchFamily="34" charset="-128"/>
+                    <a:ea typeface="Meiryo" panose="020B0604030504040204" pitchFamily="34" charset="-128"/>
+                    <a:cs typeface="Arial" panose="020B0604020202020204" pitchFamily="34" charset="0"/>
+                  </a:rPr>
+                  <a:t>最初の天体が誕生した時期</a:t>
+                </a:r>
+                <a:r>
+                  <a:rPr kumimoji="1" lang="en-US" altLang="ja-ES" sz="2000" dirty="0">
+                    <a:latin typeface="Meiryo" panose="020B0604030504040204" pitchFamily="34" charset="-128"/>
+                    <a:ea typeface="Meiryo" panose="020B0604030504040204" pitchFamily="34" charset="-128"/>
+                    <a:cs typeface="Arial" panose="020B0604020202020204" pitchFamily="34" charset="0"/>
+                  </a:rPr>
+                  <a:t>(z~20)</a:t>
+                </a:r>
+                <a:r>
+                  <a:rPr kumimoji="1" lang="ja-ES" altLang="en-US" sz="2000" dirty="0">
+                    <a:latin typeface="Meiryo" panose="020B0604030504040204" pitchFamily="34" charset="-128"/>
+                    <a:ea typeface="Meiryo" panose="020B0604030504040204" pitchFamily="34" charset="-128"/>
+                    <a:cs typeface="Arial" panose="020B0604020202020204" pitchFamily="34" charset="0"/>
+                  </a:rPr>
+                  <a:t>に天体からの紫外線によって原子が再度電離する</a:t>
+                </a:r>
+                <a:endParaRPr kumimoji="1" lang="en-US" altLang="ja-ES" sz="2000" dirty="0">
+                  <a:latin typeface="Meiryo" panose="020B0604030504040204" pitchFamily="34" charset="-128"/>
+                  <a:ea typeface="Meiryo" panose="020B0604030504040204" pitchFamily="34" charset="-128"/>
+                  <a:cs typeface="Arial" panose="020B0604020202020204" pitchFamily="34" charset="0"/>
+                </a:endParaRPr>
+              </a:p>
+              <a:p>
+                <a:pPr marL="800100" lvl="1" indent="-342900">
+                  <a:buFont typeface="Wingdings" pitchFamily="2" charset="2"/>
+                  <a:buChar char="§"/>
+                </a:pPr>
+                <a14:m>
+                  <m:oMath xmlns:m="http://schemas.openxmlformats.org/officeDocument/2006/math">
+                    <m:r>
+                      <a:rPr kumimoji="1" lang="en-US" altLang="ja-ES" sz="2000" i="1" smtClean="0">
+                        <a:latin typeface="Cambria Math" panose="02040503050406030204" pitchFamily="18" charset="0"/>
+                        <a:ea typeface="Cambria Math" panose="02040503050406030204" pitchFamily="18" charset="0"/>
+                        <a:cs typeface="Arial" panose="020B0604020202020204" pitchFamily="34" charset="0"/>
+                      </a:rPr>
+                      <m:t>ℓ≤</m:t>
+                    </m:r>
+                  </m:oMath>
+                </a14:m>
+                <a:r>
+                  <a:rPr kumimoji="1" lang="en-US" altLang="ja-ES" sz="2000" dirty="0">
+                    <a:latin typeface="Meiryo" panose="020B0604030504040204" pitchFamily="34" charset="-128"/>
+                    <a:ea typeface="Meiryo" panose="020B0604030504040204" pitchFamily="34" charset="-128"/>
+                    <a:cs typeface="Arial" panose="020B0604020202020204" pitchFamily="34" charset="0"/>
+                  </a:rPr>
+                  <a:t>10 </a:t>
+                </a:r>
+                <a:r>
+                  <a:rPr kumimoji="1" lang="ja-ES" altLang="en-US" sz="2000" dirty="0">
+                    <a:latin typeface="Meiryo" panose="020B0604030504040204" pitchFamily="34" charset="-128"/>
+                    <a:ea typeface="Meiryo" panose="020B0604030504040204" pitchFamily="34" charset="-128"/>
+                    <a:cs typeface="Arial" panose="020B0604020202020204" pitchFamily="34" charset="0"/>
+                  </a:rPr>
+                  <a:t>の大角度スケールで新しい偏光</a:t>
+                </a:r>
+                <a:r>
+                  <a:rPr kumimoji="1" lang="en-US" altLang="ja-ES" sz="2000" dirty="0">
+                    <a:latin typeface="Meiryo" panose="020B0604030504040204" pitchFamily="34" charset="-128"/>
+                    <a:ea typeface="Meiryo" panose="020B0604030504040204" pitchFamily="34" charset="-128"/>
+                    <a:cs typeface="Arial" panose="020B0604020202020204" pitchFamily="34" charset="0"/>
+                  </a:rPr>
+                  <a:t>E</a:t>
+                </a:r>
+                <a:r>
+                  <a:rPr kumimoji="1" lang="ja-ES" altLang="en-US" sz="2000" dirty="0">
+                    <a:latin typeface="Meiryo" panose="020B0604030504040204" pitchFamily="34" charset="-128"/>
+                    <a:ea typeface="Meiryo" panose="020B0604030504040204" pitchFamily="34" charset="-128"/>
+                    <a:cs typeface="Arial" panose="020B0604020202020204" pitchFamily="34" charset="0"/>
+                  </a:rPr>
+                  <a:t>モードを生成</a:t>
+                </a:r>
+                <a:endParaRPr kumimoji="1" lang="en-US" altLang="ja-ES" sz="2000" dirty="0">
+                  <a:latin typeface="Meiryo" panose="020B0604030504040204" pitchFamily="34" charset="-128"/>
+                  <a:ea typeface="Meiryo" panose="020B0604030504040204" pitchFamily="34" charset="-128"/>
+                  <a:cs typeface="Arial" panose="020B0604020202020204" pitchFamily="34" charset="0"/>
+                </a:endParaRPr>
+              </a:p>
+              <a:p>
+                <a:pPr marL="800100" lvl="1" indent="-342900">
+                  <a:buFont typeface="Wingdings" pitchFamily="2" charset="2"/>
+                  <a:buChar char="§"/>
+                </a:pPr>
+                <a:r>
+                  <a:rPr kumimoji="1" lang="ja-ES" altLang="en-US" sz="2000" dirty="0">
+                    <a:latin typeface="Meiryo" panose="020B0604030504040204" pitchFamily="34" charset="-128"/>
+                    <a:ea typeface="Meiryo" panose="020B0604030504040204" pitchFamily="34" charset="-128"/>
+                    <a:cs typeface="Arial" panose="020B0604020202020204" pitchFamily="34" charset="0"/>
+                  </a:rPr>
+                  <a:t>光学的厚み</a:t>
+                </a:r>
+                <a:r>
+                  <a:rPr kumimoji="1" lang="en-US" altLang="ja-ES" sz="2000" dirty="0">
+                    <a:latin typeface="Meiryo" panose="020B0604030504040204" pitchFamily="34" charset="-128"/>
+                    <a:ea typeface="Meiryo" panose="020B0604030504040204" pitchFamily="34" charset="-128"/>
+                    <a:cs typeface="Arial" panose="020B0604020202020204" pitchFamily="34" charset="0"/>
+                  </a:rPr>
+                  <a:t> </a:t>
+                </a:r>
+                <a14:m>
+                  <m:oMath xmlns:m="http://schemas.openxmlformats.org/officeDocument/2006/math">
+                    <m:r>
+                      <a:rPr kumimoji="1" lang="ja-ES" altLang="en-US" sz="2000" i="1" smtClean="0">
+                        <a:solidFill>
+                          <a:srgbClr val="FF0000"/>
+                        </a:solidFill>
+                        <a:latin typeface="Cambria Math" panose="02040503050406030204" pitchFamily="18" charset="0"/>
+                        <a:ea typeface="Meiryo" panose="020B0604030504040204" pitchFamily="34" charset="-128"/>
+                        <a:cs typeface="Arial" panose="020B0604020202020204" pitchFamily="34" charset="0"/>
+                      </a:rPr>
+                      <m:t>𝜏</m:t>
+                    </m:r>
+                    <m:r>
+                      <a:rPr kumimoji="1" lang="ja-ES" altLang="en-US" sz="2000" i="1" smtClean="0">
+                        <a:latin typeface="Cambria Math" panose="02040503050406030204" pitchFamily="18" charset="0"/>
+                        <a:ea typeface="Meiryo" panose="020B0604030504040204" pitchFamily="34" charset="-128"/>
+                        <a:cs typeface="Arial" panose="020B0604020202020204" pitchFamily="34" charset="0"/>
+                      </a:rPr>
+                      <m:t> </m:t>
+                    </m:r>
+                  </m:oMath>
+                </a14:m>
+                <a:r>
+                  <a:rPr kumimoji="1" lang="en-US" altLang="ja-ES" sz="2000" dirty="0">
+                    <a:latin typeface="Meiryo" panose="020B0604030504040204" pitchFamily="34" charset="-128"/>
+                    <a:ea typeface="Meiryo" panose="020B0604030504040204" pitchFamily="34" charset="-128"/>
+                    <a:cs typeface="Arial" panose="020B0604020202020204" pitchFamily="34" charset="0"/>
+                  </a:rPr>
+                  <a:t>(CMB</a:t>
+                </a:r>
+                <a:r>
+                  <a:rPr kumimoji="1" lang="ja-ES" altLang="en-US" sz="2000" dirty="0">
+                    <a:latin typeface="Meiryo" panose="020B0604030504040204" pitchFamily="34" charset="-128"/>
+                    <a:ea typeface="Meiryo" panose="020B0604030504040204" pitchFamily="34" charset="-128"/>
+                    <a:cs typeface="Arial" panose="020B0604020202020204" pitchFamily="34" charset="0"/>
+                  </a:rPr>
+                  <a:t>にとって電子がどれほど不透明であったか</a:t>
+                </a:r>
+                <a:r>
+                  <a:rPr kumimoji="1" lang="en-US" altLang="ja-ES" sz="2000" dirty="0">
+                    <a:latin typeface="Meiryo" panose="020B0604030504040204" pitchFamily="34" charset="-128"/>
+                    <a:ea typeface="Meiryo" panose="020B0604030504040204" pitchFamily="34" charset="-128"/>
+                    <a:cs typeface="Arial" panose="020B0604020202020204" pitchFamily="34" charset="0"/>
+                  </a:rPr>
+                  <a:t>)</a:t>
+                </a:r>
+                <a:r>
+                  <a:rPr kumimoji="1" lang="ja-ES" altLang="en-US" sz="2000" dirty="0">
+                    <a:ea typeface="Meiryo" panose="020B0604030504040204" pitchFamily="34" charset="-128"/>
+                    <a:cs typeface="Arial" panose="020B0604020202020204" pitchFamily="34" charset="0"/>
+                  </a:rPr>
+                  <a:t> </a:t>
+                </a:r>
+                <a14:m>
+                  <m:oMath xmlns:m="http://schemas.openxmlformats.org/officeDocument/2006/math">
+                    <m:r>
+                      <a:rPr kumimoji="1" lang="ja-ES" altLang="en-US" sz="2000" i="1">
+                        <a:latin typeface="Cambria Math" panose="02040503050406030204" pitchFamily="18" charset="0"/>
+                        <a:ea typeface="Meiryo" panose="020B0604030504040204" pitchFamily="34" charset="-128"/>
+                        <a:cs typeface="Arial" panose="020B0604020202020204" pitchFamily="34" charset="0"/>
+                      </a:rPr>
+                      <m:t>で</m:t>
+                    </m:r>
+                  </m:oMath>
+                </a14:m>
+                <a:r>
+                  <a:rPr kumimoji="1" lang="ja-ES" altLang="en-US" sz="2000" dirty="0">
+                    <a:latin typeface="Meiryo" panose="020B0604030504040204" pitchFamily="34" charset="-128"/>
+                    <a:ea typeface="Meiryo" panose="020B0604030504040204" pitchFamily="34" charset="-128"/>
+                    <a:cs typeface="Arial" panose="020B0604020202020204" pitchFamily="34" charset="0"/>
+                  </a:rPr>
+                  <a:t>特徴づけられる</a:t>
+                </a:r>
+                <a:endParaRPr kumimoji="1" lang="en-US" altLang="ja-ES" sz="2000" dirty="0">
+                  <a:latin typeface="Meiryo" panose="020B0604030504040204" pitchFamily="34" charset="-128"/>
+                  <a:ea typeface="Meiryo" panose="020B0604030504040204" pitchFamily="34" charset="-128"/>
+                  <a:cs typeface="Arial" panose="020B0604020202020204" pitchFamily="34" charset="0"/>
+                </a:endParaRPr>
+              </a:p>
+              <a:p>
+                <a:pPr marL="800100" lvl="1" indent="-342900">
+                  <a:buFont typeface="Wingdings" pitchFamily="2" charset="2"/>
+                  <a:buChar char="§"/>
+                </a:pPr>
+                <a:r>
+                  <a:rPr kumimoji="1" lang="en-US" altLang="ja-ES" sz="2000" dirty="0">
+                    <a:latin typeface="Meiryo" panose="020B0604030504040204" pitchFamily="34" charset="-128"/>
+                    <a:ea typeface="Meiryo" panose="020B0604030504040204" pitchFamily="34" charset="-128"/>
+                    <a:cs typeface="Arial" panose="020B0604020202020204" pitchFamily="34" charset="0"/>
+                  </a:rPr>
+                  <a:t>E</a:t>
+                </a:r>
+                <a:r>
+                  <a:rPr kumimoji="1" lang="ja-ES" altLang="en-US" sz="2000" dirty="0">
+                    <a:latin typeface="Meiryo" panose="020B0604030504040204" pitchFamily="34" charset="-128"/>
+                    <a:ea typeface="Meiryo" panose="020B0604030504040204" pitchFamily="34" charset="-128"/>
+                    <a:cs typeface="Arial" panose="020B0604020202020204" pitchFamily="34" charset="0"/>
+                  </a:rPr>
+                  <a:t>モードパワースペクトルから</a:t>
+                </a:r>
+                <a:r>
+                  <a:rPr kumimoji="1" lang="en-US" altLang="ja-ES" sz="2000" dirty="0">
+                    <a:ea typeface="Cambria Math" panose="02040503050406030204" pitchFamily="18" charset="0"/>
+                    <a:cs typeface="Arial" panose="020B0604020202020204" pitchFamily="34" charset="0"/>
+                  </a:rPr>
+                  <a:t> </a:t>
+                </a:r>
+                <a14:m>
+                  <m:oMath xmlns:m="http://schemas.openxmlformats.org/officeDocument/2006/math">
+                    <m:r>
+                      <a:rPr kumimoji="1" lang="en-US" altLang="ja-ES" sz="2000" i="1" smtClean="0">
+                        <a:latin typeface="Cambria Math" panose="02040503050406030204" pitchFamily="18" charset="0"/>
+                        <a:ea typeface="Cambria Math" panose="02040503050406030204" pitchFamily="18" charset="0"/>
+                        <a:cs typeface="Arial" panose="020B0604020202020204" pitchFamily="34" charset="0"/>
+                      </a:rPr>
+                      <m:t>𝜏</m:t>
+                    </m:r>
+                    <m:r>
+                      <a:rPr kumimoji="1" lang="en-US" altLang="ja-ES" sz="2000" b="0" i="0" smtClean="0">
+                        <a:latin typeface="Cambria Math" panose="02040503050406030204" pitchFamily="18" charset="0"/>
+                        <a:ea typeface="Cambria Math" panose="02040503050406030204" pitchFamily="18" charset="0"/>
+                        <a:cs typeface="Arial" panose="020B0604020202020204" pitchFamily="34" charset="0"/>
+                      </a:rPr>
+                      <m:t> </m:t>
+                    </m:r>
+                  </m:oMath>
+                </a14:m>
+                <a:r>
+                  <a:rPr kumimoji="1" lang="ja-ES" altLang="en-US" sz="2000" dirty="0">
+                    <a:latin typeface="Meiryo" panose="020B0604030504040204" pitchFamily="34" charset="-128"/>
+                    <a:ea typeface="Meiryo" panose="020B0604030504040204" pitchFamily="34" charset="-128"/>
+                    <a:cs typeface="Arial" panose="020B0604020202020204" pitchFamily="34" charset="0"/>
+                  </a:rPr>
+                  <a:t>を測定</a:t>
+                </a:r>
+                <a:endParaRPr kumimoji="1" lang="en-US" altLang="ja-ES" sz="2000" dirty="0">
+                  <a:latin typeface="Meiryo" panose="020B0604030504040204" pitchFamily="34" charset="-128"/>
+                  <a:ea typeface="Meiryo" panose="020B0604030504040204" pitchFamily="34" charset="-128"/>
+                  <a:cs typeface="Arial" panose="020B0604020202020204" pitchFamily="34" charset="0"/>
+                </a:endParaRPr>
+              </a:p>
+            </p:txBody>
+          </p:sp>
+        </mc:Choice>
+        <mc:Fallback>
+          <p:sp>
+            <p:nvSpPr>
+              <p:cNvPr id="13" name="テキスト ボックス 12">
+                <a:extLst>
+                  <a:ext uri="{FF2B5EF4-FFF2-40B4-BE49-F238E27FC236}">
+                    <a16:creationId xmlns:a16="http://schemas.microsoft.com/office/drawing/2014/main" id="{0CACFC94-1F5C-4BD4-2EE5-B4075888FBD3}"/>
+                  </a:ext>
+                </a:extLst>
+              </p:cNvPr>
+              <p:cNvSpPr txBox="1">
+                <a:spLocks noRot="1" noChangeAspect="1" noMove="1" noResize="1" noEditPoints="1" noAdjustHandles="1" noChangeArrowheads="1" noChangeShapeType="1" noTextEdit="1"/>
+              </p:cNvSpPr>
+              <p:nvPr/>
+            </p:nvSpPr>
+            <p:spPr>
+              <a:xfrm>
+                <a:off x="262128" y="1685992"/>
+                <a:ext cx="7098792" cy="1938992"/>
+              </a:xfrm>
+              <a:prstGeom prst="rect">
+                <a:avLst/>
+              </a:prstGeom>
+              <a:blipFill>
+                <a:blip r:embed="rId5"/>
+                <a:stretch>
+                  <a:fillRect l="-533" t="-1923" b="-3846"/>
+                </a:stretch>
+              </a:blipFill>
+              <a:ln w="31750">
+                <a:solidFill>
+                  <a:schemeClr val="tx1"/>
+                </a:solidFill>
+              </a:ln>
+            </p:spPr>
+            <p:txBody>
+              <a:bodyPr/>
+              <a:lstStyle/>
+              <a:p>
+                <a:r>
+                  <a:rPr lang="ja-ES" altLang="en-US">
+                    <a:noFill/>
+                  </a:rPr>
+                  <a:t> </a:t>
+                </a:r>
+              </a:p>
+            </p:txBody>
+          </p:sp>
+        </mc:Fallback>
+      </mc:AlternateContent>
+      <p:pic>
+        <p:nvPicPr>
+          <p:cNvPr id="15" name="図 14" descr="グラフ&#10;&#10;自動的に生成された説明">
+            <a:extLst>
+              <a:ext uri="{FF2B5EF4-FFF2-40B4-BE49-F238E27FC236}">
+                <a16:creationId xmlns:a16="http://schemas.microsoft.com/office/drawing/2014/main" id="{BF163A49-6E67-F64F-D3EB-421B0C9FE634}"/>
+              </a:ext>
+            </a:extLst>
+          </p:cNvPr>
+          <p:cNvPicPr>
+            <a:picLocks noChangeAspect="1"/>
+          </p:cNvPicPr>
+          <p:nvPr/>
+        </p:nvPicPr>
+        <p:blipFill>
+          <a:blip r:embed="rId6"/>
+          <a:stretch>
+            <a:fillRect/>
+          </a:stretch>
+        </p:blipFill>
+        <p:spPr>
+          <a:xfrm>
+            <a:off x="7603435" y="4317065"/>
+            <a:ext cx="2743200" cy="2485339"/>
+          </a:xfrm>
+          <a:prstGeom prst="rect">
+            <a:avLst/>
+          </a:prstGeom>
+        </p:spPr>
+      </p:pic>
+      <p:cxnSp>
+        <p:nvCxnSpPr>
+          <p:cNvPr id="17" name="直線コネクタ 16">
+            <a:extLst>
+              <a:ext uri="{FF2B5EF4-FFF2-40B4-BE49-F238E27FC236}">
+                <a16:creationId xmlns:a16="http://schemas.microsoft.com/office/drawing/2014/main" id="{60DB1C90-ECBC-8FA5-D5A9-C3C007326916}"/>
+              </a:ext>
+            </a:extLst>
+          </p:cNvPr>
+          <p:cNvCxnSpPr>
+            <a:cxnSpLocks/>
+          </p:cNvCxnSpPr>
+          <p:nvPr/>
+        </p:nvCxnSpPr>
+        <p:spPr>
+          <a:xfrm flipH="1" flipV="1">
+            <a:off x="6481041" y="4605439"/>
+            <a:ext cx="1122394" cy="254457"/>
+          </a:xfrm>
+          <a:prstGeom prst="line">
+            <a:avLst/>
+          </a:prstGeom>
+          <a:ln w="69850">
+            <a:solidFill>
+              <a:schemeClr val="tx1"/>
+            </a:solidFill>
+            <a:headEnd type="oval"/>
+          </a:ln>
+        </p:spPr>
+        <p:style>
+          <a:lnRef idx="2">
+            <a:schemeClr val="accent1"/>
+          </a:lnRef>
+          <a:fillRef idx="0">
+            <a:schemeClr val="accent1"/>
+          </a:fillRef>
+          <a:effectRef idx="1">
+            <a:schemeClr val="accent1"/>
+          </a:effectRef>
+          <a:fontRef idx="minor">
+            <a:schemeClr val="tx1"/>
+          </a:fontRef>
+        </p:style>
+      </p:cxnSp>
+      <p:sp>
+        <p:nvSpPr>
+          <p:cNvPr id="19" name="上矢印 18">
+            <a:extLst>
+              <a:ext uri="{FF2B5EF4-FFF2-40B4-BE49-F238E27FC236}">
+                <a16:creationId xmlns:a16="http://schemas.microsoft.com/office/drawing/2014/main" id="{C5364359-3D07-27B8-4FA5-B021649F7F82}"/>
+              </a:ext>
+            </a:extLst>
+          </p:cNvPr>
+          <p:cNvSpPr/>
+          <p:nvPr/>
+        </p:nvSpPr>
+        <p:spPr>
+          <a:xfrm rot="10800000">
+            <a:off x="3582393" y="4851550"/>
+            <a:ext cx="310896" cy="575170"/>
+          </a:xfrm>
+          <a:prstGeom prst="upArrow">
+            <a:avLst>
+              <a:gd name="adj1" fmla="val 50000"/>
+              <a:gd name="adj2" fmla="val 55882"/>
+            </a:avLst>
+          </a:prstGeom>
+          <a:solidFill>
+            <a:srgbClr val="FF0000"/>
+          </a:solidFill>
+          <a:ln>
+            <a:solidFill>
+              <a:srgbClr val="FF0000"/>
+            </a:solidFill>
+          </a:ln>
+        </p:spPr>
+        <p:style>
+          <a:lnRef idx="2">
+            <a:schemeClr val="accent1">
+              <a:shade val="15000"/>
+            </a:schemeClr>
+          </a:lnRef>
+          <a:fillRef idx="1">
+            <a:schemeClr val="accent1"/>
+          </a:fillRef>
+          <a:effectRef idx="0">
+            <a:schemeClr val="accent1"/>
+          </a:effectRef>
+          <a:fontRef idx="minor">
+            <a:schemeClr val="lt1"/>
+          </a:fontRef>
+        </p:style>
+        <p:txBody>
+          <a:bodyPr rtlCol="0" anchor="ctr"/>
+          <a:lstStyle/>
+          <a:p>
+            <a:pPr algn="ctr"/>
+            <a:endParaRPr kumimoji="1" lang="ja-ES" altLang="en-US"/>
+          </a:p>
+        </p:txBody>
+      </p:sp>
+      <mc:AlternateContent xmlns:mc="http://schemas.openxmlformats.org/markup-compatibility/2006">
+        <mc:Choice xmlns:a14="http://schemas.microsoft.com/office/drawing/2010/main" Requires="a14">
+          <p:sp>
+            <p:nvSpPr>
+              <p:cNvPr id="20" name="テキスト ボックス 19">
+                <a:extLst>
+                  <a:ext uri="{FF2B5EF4-FFF2-40B4-BE49-F238E27FC236}">
+                    <a16:creationId xmlns:a16="http://schemas.microsoft.com/office/drawing/2014/main" id="{8DD705AE-CF39-2C0F-5777-45FCDF1D65A3}"/>
+                  </a:ext>
+                </a:extLst>
+              </p:cNvPr>
+              <p:cNvSpPr txBox="1"/>
+              <p:nvPr/>
+            </p:nvSpPr>
+            <p:spPr>
+              <a:xfrm>
+                <a:off x="262128" y="5589474"/>
+                <a:ext cx="6120384" cy="707886"/>
+              </a:xfrm>
+              <a:prstGeom prst="rect">
+                <a:avLst/>
+              </a:prstGeom>
+              <a:noFill/>
+            </p:spPr>
+            <p:txBody>
+              <a:bodyPr wrap="square" rtlCol="0">
+                <a:spAutoFit/>
+              </a:bodyPr>
+              <a:lstStyle/>
+              <a:p>
+                <a:pPr marL="342900" indent="-342900">
+                  <a:buFont typeface="Arial" panose="020B0604020202020204" pitchFamily="34" charset="0"/>
+                  <a:buChar char="•"/>
+                </a:pPr>
+                <a:r>
+                  <a:rPr kumimoji="1" lang="ja-ES" altLang="en-US" sz="2000" dirty="0">
+                    <a:latin typeface="Meiryo" panose="020B0604030504040204" pitchFamily="34" charset="-128"/>
+                    <a:ea typeface="Meiryo" panose="020B0604030504040204" pitchFamily="34" charset="-128"/>
+                    <a:cs typeface="Arial" panose="020B0604020202020204" pitchFamily="34" charset="0"/>
+                  </a:rPr>
+                  <a:t>光学的厚み</a:t>
+                </a:r>
+                <a:r>
+                  <a:rPr kumimoji="1" lang="en-US" altLang="ja-ES" sz="2000" dirty="0">
+                    <a:latin typeface="Meiryo" panose="020B0604030504040204" pitchFamily="34" charset="-128"/>
+                    <a:ea typeface="Meiryo" panose="020B0604030504040204" pitchFamily="34" charset="-128"/>
+                    <a:cs typeface="Arial" panose="020B0604020202020204" pitchFamily="34" charset="0"/>
+                  </a:rPr>
+                  <a:t> </a:t>
+                </a:r>
+                <a14:m>
+                  <m:oMath xmlns:m="http://schemas.openxmlformats.org/officeDocument/2006/math">
+                    <m:r>
+                      <a:rPr kumimoji="1" lang="en-US" altLang="ja-ES" sz="2000" i="1" smtClean="0">
+                        <a:latin typeface="Cambria Math" panose="02040503050406030204" pitchFamily="18" charset="0"/>
+                        <a:ea typeface="Cambria Math" panose="02040503050406030204" pitchFamily="18" charset="0"/>
+                        <a:cs typeface="Arial" panose="020B0604020202020204" pitchFamily="34" charset="0"/>
+                      </a:rPr>
+                      <m:t>𝜏</m:t>
+                    </m:r>
+                  </m:oMath>
+                </a14:m>
+                <a:r>
+                  <a:rPr kumimoji="1" lang="en-US" altLang="ja-ES" sz="2000" dirty="0">
+                    <a:latin typeface="Meiryo" panose="020B0604030504040204" pitchFamily="34" charset="-128"/>
+                    <a:ea typeface="Meiryo" panose="020B0604030504040204" pitchFamily="34" charset="-128"/>
+                    <a:cs typeface="Arial" panose="020B0604020202020204" pitchFamily="34" charset="0"/>
+                  </a:rPr>
+                  <a:t> </a:t>
+                </a:r>
+                <a:r>
+                  <a:rPr kumimoji="1" lang="ja-ES" altLang="en-US" sz="2000" dirty="0">
+                    <a:latin typeface="Meiryo" panose="020B0604030504040204" pitchFamily="34" charset="-128"/>
+                    <a:ea typeface="Meiryo" panose="020B0604030504040204" pitchFamily="34" charset="-128"/>
+                    <a:cs typeface="Arial" panose="020B0604020202020204" pitchFamily="34" charset="0"/>
+                  </a:rPr>
+                  <a:t>を精度よく測定することで、</a:t>
+                </a:r>
+                <a:r>
+                  <a:rPr kumimoji="1" lang="ja-ES" altLang="en-US" sz="2000" dirty="0">
+                    <a:ea typeface="Meiryo" panose="020B0604030504040204" pitchFamily="34" charset="-128"/>
+                    <a:cs typeface="Arial" panose="020B0604020202020204" pitchFamily="34" charset="0"/>
+                  </a:rPr>
+                  <a:t> </a:t>
+                </a:r>
+                <a14:m>
+                  <m:oMath xmlns:m="http://schemas.openxmlformats.org/officeDocument/2006/math">
+                    <m:nary>
+                      <m:naryPr>
+                        <m:chr m:val="∑"/>
+                        <m:subHide m:val="on"/>
+                        <m:supHide m:val="on"/>
+                        <m:ctrlPr>
+                          <a:rPr kumimoji="1" lang="ja-ES" altLang="en-US" sz="2000" i="1" smtClean="0">
+                            <a:latin typeface="Cambria Math" panose="02040503050406030204" pitchFamily="18" charset="0"/>
+                            <a:ea typeface="Meiryo" panose="020B0604030504040204" pitchFamily="34" charset="-128"/>
+                            <a:cs typeface="Arial" panose="020B0604020202020204" pitchFamily="34" charset="0"/>
+                          </a:rPr>
+                        </m:ctrlPr>
+                      </m:naryPr>
+                      <m:sub/>
+                      <m:sup/>
+                      <m:e>
+                        <m:sSub>
+                          <m:sSubPr>
+                            <m:ctrlPr>
+                              <a:rPr kumimoji="1" lang="en-US" altLang="ja-ES" sz="2000" i="1" smtClean="0">
+                                <a:latin typeface="Cambria Math" panose="02040503050406030204" pitchFamily="18" charset="0"/>
+                                <a:ea typeface="Meiryo" panose="020B0604030504040204" pitchFamily="34" charset="-128"/>
+                                <a:cs typeface="Arial" panose="020B0604020202020204" pitchFamily="34" charset="0"/>
+                              </a:rPr>
+                            </m:ctrlPr>
+                          </m:sSubPr>
+                          <m:e>
+                            <m:r>
+                              <m:rPr>
+                                <m:sty m:val="p"/>
+                              </m:rPr>
+                              <a:rPr kumimoji="1" lang="en-US" altLang="ja-ES" sz="2000" i="0">
+                                <a:latin typeface="Cambria Math" panose="02040503050406030204" pitchFamily="18" charset="0"/>
+                                <a:ea typeface="Meiryo" panose="020B0604030504040204" pitchFamily="34" charset="-128"/>
+                                <a:cs typeface="Arial" panose="020B0604020202020204" pitchFamily="34" charset="0"/>
+                              </a:rPr>
+                              <m:t>m</m:t>
+                            </m:r>
+                          </m:e>
+                          <m:sub>
+                            <m:r>
+                              <m:rPr>
+                                <m:sty m:val="p"/>
+                              </m:rPr>
+                              <a:rPr kumimoji="1" lang="en-US" altLang="ja-ES" sz="2000" i="0" smtClean="0">
+                                <a:latin typeface="Cambria Math" panose="02040503050406030204" pitchFamily="18" charset="0"/>
+                                <a:ea typeface="Cambria Math" panose="02040503050406030204" pitchFamily="18" charset="0"/>
+                                <a:cs typeface="Arial" panose="020B0604020202020204" pitchFamily="34" charset="0"/>
+                              </a:rPr>
+                              <m:t>ν</m:t>
+                            </m:r>
+                          </m:sub>
+                        </m:sSub>
+                        <m:r>
+                          <a:rPr kumimoji="1" lang="en-US" altLang="ja-ES" sz="2000" b="0" i="1" smtClean="0">
+                            <a:latin typeface="Cambria Math" panose="02040503050406030204" pitchFamily="18" charset="0"/>
+                            <a:ea typeface="Cambria Math" panose="02040503050406030204" pitchFamily="18" charset="0"/>
+                            <a:cs typeface="Arial" panose="020B0604020202020204" pitchFamily="34" charset="0"/>
+                          </a:rPr>
+                          <m:t> </m:t>
+                        </m:r>
+                      </m:e>
+                    </m:nary>
+                  </m:oMath>
+                </a14:m>
+                <a:r>
+                  <a:rPr kumimoji="1" lang="ja-ES" altLang="en-US" sz="2000" dirty="0">
+                    <a:latin typeface="Meiryo" panose="020B0604030504040204" pitchFamily="34" charset="-128"/>
+                    <a:ea typeface="Meiryo" panose="020B0604030504040204" pitchFamily="34" charset="-128"/>
+                    <a:cs typeface="Arial" panose="020B0604020202020204" pitchFamily="34" charset="0"/>
+                  </a:rPr>
+                  <a:t>との縮退を解く！</a:t>
+                </a:r>
+                <a:endParaRPr kumimoji="1" lang="en-US" altLang="ja-ES" sz="2000" dirty="0">
+                  <a:latin typeface="Meiryo" panose="020B0604030504040204" pitchFamily="34" charset="-128"/>
+                  <a:ea typeface="Meiryo" panose="020B0604030504040204" pitchFamily="34" charset="-128"/>
+                  <a:cs typeface="Arial" panose="020B0604020202020204" pitchFamily="34" charset="0"/>
+                </a:endParaRPr>
+              </a:p>
+            </p:txBody>
+          </p:sp>
+        </mc:Choice>
+        <mc:Fallback>
+          <p:sp>
+            <p:nvSpPr>
+              <p:cNvPr id="20" name="テキスト ボックス 19">
+                <a:extLst>
+                  <a:ext uri="{FF2B5EF4-FFF2-40B4-BE49-F238E27FC236}">
+                    <a16:creationId xmlns:a16="http://schemas.microsoft.com/office/drawing/2014/main" id="{8DD705AE-CF39-2C0F-5777-45FCDF1D65A3}"/>
+                  </a:ext>
+                </a:extLst>
+              </p:cNvPr>
+              <p:cNvSpPr txBox="1">
+                <a:spLocks noRot="1" noChangeAspect="1" noMove="1" noResize="1" noEditPoints="1" noAdjustHandles="1" noChangeArrowheads="1" noChangeShapeType="1" noTextEdit="1"/>
+              </p:cNvSpPr>
+              <p:nvPr/>
+            </p:nvSpPr>
+            <p:spPr>
+              <a:xfrm>
+                <a:off x="262128" y="5589474"/>
+                <a:ext cx="6120384" cy="707886"/>
+              </a:xfrm>
+              <a:prstGeom prst="rect">
+                <a:avLst/>
+              </a:prstGeom>
+              <a:blipFill>
+                <a:blip r:embed="rId7"/>
+                <a:stretch>
+                  <a:fillRect l="-828" t="-69643" b="-57143"/>
+                </a:stretch>
+              </a:blipFill>
+            </p:spPr>
+            <p:txBody>
+              <a:bodyPr/>
+              <a:lstStyle/>
+              <a:p>
+                <a:r>
+                  <a:rPr lang="ja-ES" altLang="en-US">
+                    <a:noFill/>
+                  </a:rPr>
+                  <a:t> </a:t>
+                </a:r>
+              </a:p>
+            </p:txBody>
+          </p:sp>
+        </mc:Fallback>
+      </mc:AlternateContent>
+      <p:sp>
+        <p:nvSpPr>
+          <p:cNvPr id="23" name="ドーナツ 22">
+            <a:extLst>
+              <a:ext uri="{FF2B5EF4-FFF2-40B4-BE49-F238E27FC236}">
+                <a16:creationId xmlns:a16="http://schemas.microsoft.com/office/drawing/2014/main" id="{911419CD-7F9F-8325-6562-B999F38B3CBD}"/>
+              </a:ext>
+            </a:extLst>
+          </p:cNvPr>
+          <p:cNvSpPr/>
+          <p:nvPr/>
+        </p:nvSpPr>
+        <p:spPr>
+          <a:xfrm>
+            <a:off x="8975035" y="3923055"/>
+            <a:ext cx="421087" cy="372071"/>
+          </a:xfrm>
+          <a:prstGeom prst="donut">
+            <a:avLst>
+              <a:gd name="adj" fmla="val 2976"/>
+            </a:avLst>
+          </a:prstGeom>
+          <a:solidFill>
+            <a:srgbClr val="00B050"/>
+          </a:solidFill>
+          <a:ln>
+            <a:solidFill>
+              <a:srgbClr val="00B050"/>
+            </a:solidFill>
+          </a:ln>
+        </p:spPr>
+        <p:style>
+          <a:lnRef idx="2">
+            <a:schemeClr val="accent1">
+              <a:shade val="15000"/>
+            </a:schemeClr>
+          </a:lnRef>
+          <a:fillRef idx="1">
+            <a:schemeClr val="accent1"/>
+          </a:fillRef>
+          <a:effectRef idx="0">
+            <a:schemeClr val="accent1"/>
+          </a:effectRef>
+          <a:fontRef idx="minor">
+            <a:schemeClr val="lt1"/>
+          </a:fontRef>
+        </p:style>
+        <p:txBody>
+          <a:bodyPr rtlCol="0" anchor="ctr"/>
+          <a:lstStyle/>
+          <a:p>
+            <a:pPr algn="ctr"/>
+            <a:endParaRPr kumimoji="1" lang="ja-ES" altLang="en-US">
+              <a:solidFill>
+                <a:schemeClr val="tx1"/>
+              </a:solidFill>
             </a:endParaRPr>
           </a:p>
         </p:txBody>
@@ -8024,8 +9143,8 @@
         </p:nvSpPr>
         <p:spPr>
           <a:xfrm>
-            <a:off x="162318" y="3302037"/>
-            <a:ext cx="3561772" cy="2554545"/>
+            <a:off x="162318" y="3302036"/>
+            <a:ext cx="3561772" cy="2556000"/>
           </a:xfrm>
           <a:prstGeom prst="rect">
             <a:avLst/>

</xml_diff>